<commit_message>
+ monday midday presentation
</commit_message>
<xml_diff>
--- a/presentation.pptx
+++ b/presentation.pptx
@@ -7,15 +7,23 @@
   <p:sldIdLst>
     <p:sldId id="256" r:id="rId2"/>
     <p:sldId id="257" r:id="rId3"/>
-    <p:sldId id="265" r:id="rId4"/>
-    <p:sldId id="258" r:id="rId5"/>
-    <p:sldId id="266" r:id="rId6"/>
-    <p:sldId id="259" r:id="rId7"/>
-    <p:sldId id="260" r:id="rId8"/>
-    <p:sldId id="261" r:id="rId9"/>
-    <p:sldId id="262" r:id="rId10"/>
-    <p:sldId id="263" r:id="rId11"/>
-    <p:sldId id="264" r:id="rId12"/>
+    <p:sldId id="267" r:id="rId4"/>
+    <p:sldId id="265" r:id="rId5"/>
+    <p:sldId id="270" r:id="rId6"/>
+    <p:sldId id="271" r:id="rId7"/>
+    <p:sldId id="272" r:id="rId8"/>
+    <p:sldId id="266" r:id="rId9"/>
+    <p:sldId id="273" r:id="rId10"/>
+    <p:sldId id="277" r:id="rId11"/>
+    <p:sldId id="274" r:id="rId12"/>
+    <p:sldId id="275" r:id="rId13"/>
+    <p:sldId id="278" r:id="rId14"/>
+    <p:sldId id="276" r:id="rId15"/>
+    <p:sldId id="261" r:id="rId16"/>
+    <p:sldId id="279" r:id="rId17"/>
+    <p:sldId id="262" r:id="rId18"/>
+    <p:sldId id="263" r:id="rId19"/>
+    <p:sldId id="264" r:id="rId20"/>
   </p:sldIdLst>
   <p:sldSz cx="9144000" cy="6858000" type="screen4x3"/>
   <p:notesSz cx="6858000" cy="9144000"/>
@@ -115,6 +123,716 @@
     </a:lvl9pPr>
   </p:defaultTextStyle>
 </p:presentation>
+</file>
+
+<file path=ppt/charts/chart1.xml><?xml version="1.0" encoding="utf-8"?>
+<c:chartSpace xmlns:c="http://schemas.openxmlformats.org/drawingml/2006/chart" xmlns:a="http://schemas.openxmlformats.org/drawingml/2006/main" xmlns:r="http://schemas.openxmlformats.org/officeDocument/2006/relationships">
+  <c:lang val="ru-RU"/>
+  <c:chart>
+    <c:title>
+      <c:tx>
+        <c:rich>
+          <a:bodyPr/>
+          <a:lstStyle/>
+          <a:p>
+            <a:pPr>
+              <a:defRPr/>
+            </a:pPr>
+            <a:r>
+              <a:rPr lang="ru-RU"/>
+              <a:t>Диаграмма распределения углов абсолютного отклонения осей координат</a:t>
+            </a:r>
+            <a:r>
+              <a:rPr lang="ru-RU" baseline="0"/>
+              <a:t> от верных значений</a:t>
+            </a:r>
+            <a:endParaRPr lang="ru-RU"/>
+          </a:p>
+        </c:rich>
+      </c:tx>
+      <c:layout/>
+    </c:title>
+    <c:plotArea>
+      <c:layout/>
+      <c:scatterChart>
+        <c:scatterStyle val="smoothMarker"/>
+        <c:ser>
+          <c:idx val="0"/>
+          <c:order val="0"/>
+          <c:tx>
+            <c:strRef>
+              <c:f>[stats.xlsx]yudb_indoor_3axis!$G$1</c:f>
+              <c:strCache>
+                <c:ptCount val="1"/>
+                <c:pt idx="0">
+                  <c:v>ось X</c:v>
+                </c:pt>
+              </c:strCache>
+            </c:strRef>
+          </c:tx>
+          <c:xVal>
+            <c:numRef>
+              <c:f>[stats.xlsx]yudb_indoor_3axis!$F$2:$F$10</c:f>
+              <c:numCache>
+                <c:formatCode>General</c:formatCode>
+                <c:ptCount val="9"/>
+                <c:pt idx="0">
+                  <c:v>0.13453294649086756</c:v>
+                </c:pt>
+                <c:pt idx="1">
+                  <c:v>5.6453063177152778</c:v>
+                </c:pt>
+                <c:pt idx="2">
+                  <c:v>11.156079688939693</c:v>
+                </c:pt>
+                <c:pt idx="3">
+                  <c:v>16.666853060164105</c:v>
+                </c:pt>
+                <c:pt idx="4">
+                  <c:v>22.177626431388514</c:v>
+                </c:pt>
+                <c:pt idx="5">
+                  <c:v>27.688399802612921</c:v>
+                </c:pt>
+                <c:pt idx="6">
+                  <c:v>33.199173173837337</c:v>
+                </c:pt>
+                <c:pt idx="7">
+                  <c:v>38.709946545061754</c:v>
+                </c:pt>
+              </c:numCache>
+            </c:numRef>
+          </c:xVal>
+          <c:yVal>
+            <c:numRef>
+              <c:f>[stats.xlsx]yudb_indoor_3axis!$G$2:$G$10</c:f>
+              <c:numCache>
+                <c:formatCode>General</c:formatCode>
+                <c:ptCount val="9"/>
+                <c:pt idx="0">
+                  <c:v>1</c:v>
+                </c:pt>
+                <c:pt idx="1">
+                  <c:v>37</c:v>
+                </c:pt>
+                <c:pt idx="2">
+                  <c:v>2</c:v>
+                </c:pt>
+                <c:pt idx="3">
+                  <c:v>2</c:v>
+                </c:pt>
+                <c:pt idx="4">
+                  <c:v>0</c:v>
+                </c:pt>
+                <c:pt idx="5">
+                  <c:v>2</c:v>
+                </c:pt>
+                <c:pt idx="6">
+                  <c:v>0</c:v>
+                </c:pt>
+                <c:pt idx="7">
+                  <c:v>1</c:v>
+                </c:pt>
+                <c:pt idx="8">
+                  <c:v>0</c:v>
+                </c:pt>
+              </c:numCache>
+            </c:numRef>
+          </c:yVal>
+          <c:smooth val="1"/>
+        </c:ser>
+        <c:ser>
+          <c:idx val="1"/>
+          <c:order val="1"/>
+          <c:tx>
+            <c:strRef>
+              <c:f>[stats.xlsx]yudb_indoor_3axis!$H$1</c:f>
+              <c:strCache>
+                <c:ptCount val="1"/>
+                <c:pt idx="0">
+                  <c:v>ось Y</c:v>
+                </c:pt>
+              </c:strCache>
+            </c:strRef>
+          </c:tx>
+          <c:xVal>
+            <c:numRef>
+              <c:f>[stats.xlsx]yudb_indoor_3axis!$F$2:$F$10</c:f>
+              <c:numCache>
+                <c:formatCode>General</c:formatCode>
+                <c:ptCount val="9"/>
+                <c:pt idx="0">
+                  <c:v>0.13453294649086756</c:v>
+                </c:pt>
+                <c:pt idx="1">
+                  <c:v>5.6453063177152778</c:v>
+                </c:pt>
+                <c:pt idx="2">
+                  <c:v>11.156079688939693</c:v>
+                </c:pt>
+                <c:pt idx="3">
+                  <c:v>16.666853060164105</c:v>
+                </c:pt>
+                <c:pt idx="4">
+                  <c:v>22.177626431388514</c:v>
+                </c:pt>
+                <c:pt idx="5">
+                  <c:v>27.688399802612921</c:v>
+                </c:pt>
+                <c:pt idx="6">
+                  <c:v>33.199173173837337</c:v>
+                </c:pt>
+                <c:pt idx="7">
+                  <c:v>38.709946545061754</c:v>
+                </c:pt>
+              </c:numCache>
+            </c:numRef>
+          </c:xVal>
+          <c:yVal>
+            <c:numRef>
+              <c:f>[stats.xlsx]yudb_indoor_3axis!$H$2:$H$10</c:f>
+              <c:numCache>
+                <c:formatCode>General</c:formatCode>
+                <c:ptCount val="9"/>
+                <c:pt idx="0">
+                  <c:v>0</c:v>
+                </c:pt>
+                <c:pt idx="1">
+                  <c:v>31</c:v>
+                </c:pt>
+                <c:pt idx="2">
+                  <c:v>7</c:v>
+                </c:pt>
+                <c:pt idx="3">
+                  <c:v>3</c:v>
+                </c:pt>
+                <c:pt idx="4">
+                  <c:v>1</c:v>
+                </c:pt>
+                <c:pt idx="5">
+                  <c:v>1</c:v>
+                </c:pt>
+                <c:pt idx="6">
+                  <c:v>1</c:v>
+                </c:pt>
+                <c:pt idx="7">
+                  <c:v>1</c:v>
+                </c:pt>
+                <c:pt idx="8">
+                  <c:v>0</c:v>
+                </c:pt>
+              </c:numCache>
+            </c:numRef>
+          </c:yVal>
+          <c:smooth val="1"/>
+        </c:ser>
+        <c:ser>
+          <c:idx val="2"/>
+          <c:order val="2"/>
+          <c:tx>
+            <c:strRef>
+              <c:f>[stats.xlsx]yudb_indoor_3axis!$I$1</c:f>
+              <c:strCache>
+                <c:ptCount val="1"/>
+                <c:pt idx="0">
+                  <c:v>ось Z</c:v>
+                </c:pt>
+              </c:strCache>
+            </c:strRef>
+          </c:tx>
+          <c:xVal>
+            <c:numRef>
+              <c:f>[stats.xlsx]yudb_indoor_3axis!$F$2:$F$10</c:f>
+              <c:numCache>
+                <c:formatCode>General</c:formatCode>
+                <c:ptCount val="9"/>
+                <c:pt idx="0">
+                  <c:v>0.13453294649086756</c:v>
+                </c:pt>
+                <c:pt idx="1">
+                  <c:v>5.6453063177152778</c:v>
+                </c:pt>
+                <c:pt idx="2">
+                  <c:v>11.156079688939693</c:v>
+                </c:pt>
+                <c:pt idx="3">
+                  <c:v>16.666853060164105</c:v>
+                </c:pt>
+                <c:pt idx="4">
+                  <c:v>22.177626431388514</c:v>
+                </c:pt>
+                <c:pt idx="5">
+                  <c:v>27.688399802612921</c:v>
+                </c:pt>
+                <c:pt idx="6">
+                  <c:v>33.199173173837337</c:v>
+                </c:pt>
+                <c:pt idx="7">
+                  <c:v>38.709946545061754</c:v>
+                </c:pt>
+              </c:numCache>
+            </c:numRef>
+          </c:xVal>
+          <c:yVal>
+            <c:numRef>
+              <c:f>[stats.xlsx]yudb_indoor_3axis!$I$2:$I$10</c:f>
+              <c:numCache>
+                <c:formatCode>General</c:formatCode>
+                <c:ptCount val="9"/>
+                <c:pt idx="0">
+                  <c:v>0</c:v>
+                </c:pt>
+                <c:pt idx="1">
+                  <c:v>35</c:v>
+                </c:pt>
+                <c:pt idx="2">
+                  <c:v>5</c:v>
+                </c:pt>
+                <c:pt idx="3">
+                  <c:v>5</c:v>
+                </c:pt>
+                <c:pt idx="4">
+                  <c:v>0</c:v>
+                </c:pt>
+                <c:pt idx="5">
+                  <c:v>0</c:v>
+                </c:pt>
+                <c:pt idx="6">
+                  <c:v>0</c:v>
+                </c:pt>
+                <c:pt idx="7">
+                  <c:v>0</c:v>
+                </c:pt>
+                <c:pt idx="8">
+                  <c:v>0</c:v>
+                </c:pt>
+              </c:numCache>
+            </c:numRef>
+          </c:yVal>
+          <c:smooth val="1"/>
+        </c:ser>
+        <c:axId val="47544576"/>
+        <c:axId val="47575040"/>
+      </c:scatterChart>
+      <c:valAx>
+        <c:axId val="47544576"/>
+        <c:scaling>
+          <c:orientation val="minMax"/>
+        </c:scaling>
+        <c:axPos val="b"/>
+        <c:numFmt formatCode="General" sourceLinked="1"/>
+        <c:tickLblPos val="nextTo"/>
+        <c:txPr>
+          <a:bodyPr/>
+          <a:lstStyle/>
+          <a:p>
+            <a:pPr>
+              <a:defRPr sz="1400"/>
+            </a:pPr>
+            <a:endParaRPr lang="ru-RU"/>
+          </a:p>
+        </c:txPr>
+        <c:crossAx val="47575040"/>
+        <c:crosses val="autoZero"/>
+        <c:crossBetween val="midCat"/>
+      </c:valAx>
+      <c:valAx>
+        <c:axId val="47575040"/>
+        <c:scaling>
+          <c:orientation val="minMax"/>
+        </c:scaling>
+        <c:axPos val="l"/>
+        <c:majorGridlines/>
+        <c:numFmt formatCode="General" sourceLinked="1"/>
+        <c:tickLblPos val="nextTo"/>
+        <c:txPr>
+          <a:bodyPr/>
+          <a:lstStyle/>
+          <a:p>
+            <a:pPr>
+              <a:defRPr sz="1400"/>
+            </a:pPr>
+            <a:endParaRPr lang="ru-RU"/>
+          </a:p>
+        </c:txPr>
+        <c:crossAx val="47544576"/>
+        <c:crosses val="autoZero"/>
+        <c:crossBetween val="midCat"/>
+      </c:valAx>
+    </c:plotArea>
+    <c:legend>
+      <c:legendPos val="r"/>
+      <c:layout/>
+      <c:txPr>
+        <a:bodyPr/>
+        <a:lstStyle/>
+        <a:p>
+          <a:pPr>
+            <a:defRPr sz="1400"/>
+          </a:pPr>
+          <a:endParaRPr lang="ru-RU"/>
+        </a:p>
+      </c:txPr>
+    </c:legend>
+    <c:plotVisOnly val="1"/>
+  </c:chart>
+  <c:externalData r:id="rId1"/>
+</c:chartSpace>
+</file>
+
+<file path=ppt/charts/chart2.xml><?xml version="1.0" encoding="utf-8"?>
+<c:chartSpace xmlns:c="http://schemas.openxmlformats.org/drawingml/2006/chart" xmlns:a="http://schemas.openxmlformats.org/drawingml/2006/main" xmlns:r="http://schemas.openxmlformats.org/officeDocument/2006/relationships">
+  <c:lang val="ru-RU"/>
+  <c:chart>
+    <c:title>
+      <c:tx>
+        <c:rich>
+          <a:bodyPr/>
+          <a:lstStyle/>
+          <a:p>
+            <a:pPr>
+              <a:defRPr/>
+            </a:pPr>
+            <a:r>
+              <a:rPr lang="ru-RU"/>
+              <a:t>Диаграмма распределения углов абсолютного отклонения осей координат</a:t>
+            </a:r>
+            <a:r>
+              <a:rPr lang="ru-RU" baseline="0"/>
+              <a:t> от верных значений</a:t>
+            </a:r>
+            <a:endParaRPr lang="ru-RU"/>
+          </a:p>
+        </c:rich>
+      </c:tx>
+      <c:layout/>
+    </c:title>
+    <c:plotArea>
+      <c:layout/>
+      <c:scatterChart>
+        <c:scatterStyle val="smoothMarker"/>
+        <c:ser>
+          <c:idx val="0"/>
+          <c:order val="0"/>
+          <c:tx>
+            <c:strRef>
+              <c:f>[stats.xlsx]yudb_outdoor_forMe!$G$1</c:f>
+              <c:strCache>
+                <c:ptCount val="1"/>
+                <c:pt idx="0">
+                  <c:v>ось X</c:v>
+                </c:pt>
+              </c:strCache>
+            </c:strRef>
+          </c:tx>
+          <c:xVal>
+            <c:numRef>
+              <c:f>[stats.xlsx]yudb_outdoor_forMe!$F$2:$F$10</c:f>
+              <c:numCache>
+                <c:formatCode>General</c:formatCode>
+                <c:ptCount val="9"/>
+                <c:pt idx="0">
+                  <c:v>0.3941954012462775</c:v>
+                </c:pt>
+                <c:pt idx="1">
+                  <c:v>7.0408578466579108</c:v>
+                </c:pt>
+                <c:pt idx="2">
+                  <c:v>13.687520292069546</c:v>
+                </c:pt>
+                <c:pt idx="3">
+                  <c:v>20.334182737481186</c:v>
+                </c:pt>
+                <c:pt idx="4">
+                  <c:v>26.980845182892818</c:v>
+                </c:pt>
+                <c:pt idx="5">
+                  <c:v>33.62750762830445</c:v>
+                </c:pt>
+                <c:pt idx="6">
+                  <c:v>40.274170073716078</c:v>
+                </c:pt>
+                <c:pt idx="7">
+                  <c:v>46.920832519127728</c:v>
+                </c:pt>
+              </c:numCache>
+            </c:numRef>
+          </c:xVal>
+          <c:yVal>
+            <c:numRef>
+              <c:f>[stats.xlsx]yudb_outdoor_forMe!$G$2:$G$10</c:f>
+              <c:numCache>
+                <c:formatCode>General</c:formatCode>
+                <c:ptCount val="9"/>
+                <c:pt idx="0">
+                  <c:v>0</c:v>
+                </c:pt>
+                <c:pt idx="1">
+                  <c:v>25</c:v>
+                </c:pt>
+                <c:pt idx="2">
+                  <c:v>14</c:v>
+                </c:pt>
+                <c:pt idx="3">
+                  <c:v>11</c:v>
+                </c:pt>
+                <c:pt idx="4">
+                  <c:v>0</c:v>
+                </c:pt>
+                <c:pt idx="5">
+                  <c:v>2</c:v>
+                </c:pt>
+                <c:pt idx="6">
+                  <c:v>2</c:v>
+                </c:pt>
+                <c:pt idx="7">
+                  <c:v>3</c:v>
+                </c:pt>
+                <c:pt idx="8">
+                  <c:v>0</c:v>
+                </c:pt>
+              </c:numCache>
+            </c:numRef>
+          </c:yVal>
+          <c:smooth val="1"/>
+        </c:ser>
+        <c:ser>
+          <c:idx val="1"/>
+          <c:order val="1"/>
+          <c:tx>
+            <c:strRef>
+              <c:f>[stats.xlsx]yudb_outdoor_forMe!$H$1</c:f>
+              <c:strCache>
+                <c:ptCount val="1"/>
+                <c:pt idx="0">
+                  <c:v>ось Y</c:v>
+                </c:pt>
+              </c:strCache>
+            </c:strRef>
+          </c:tx>
+          <c:xVal>
+            <c:numRef>
+              <c:f>[stats.xlsx]yudb_outdoor_forMe!$F$2:$F$10</c:f>
+              <c:numCache>
+                <c:formatCode>General</c:formatCode>
+                <c:ptCount val="9"/>
+                <c:pt idx="0">
+                  <c:v>0.3941954012462775</c:v>
+                </c:pt>
+                <c:pt idx="1">
+                  <c:v>7.0408578466579108</c:v>
+                </c:pt>
+                <c:pt idx="2">
+                  <c:v>13.687520292069546</c:v>
+                </c:pt>
+                <c:pt idx="3">
+                  <c:v>20.334182737481186</c:v>
+                </c:pt>
+                <c:pt idx="4">
+                  <c:v>26.980845182892818</c:v>
+                </c:pt>
+                <c:pt idx="5">
+                  <c:v>33.62750762830445</c:v>
+                </c:pt>
+                <c:pt idx="6">
+                  <c:v>40.274170073716078</c:v>
+                </c:pt>
+                <c:pt idx="7">
+                  <c:v>46.920832519127728</c:v>
+                </c:pt>
+              </c:numCache>
+            </c:numRef>
+          </c:xVal>
+          <c:yVal>
+            <c:numRef>
+              <c:f>[stats.xlsx]yudb_outdoor_forMe!$H$2:$H$10</c:f>
+              <c:numCache>
+                <c:formatCode>General</c:formatCode>
+                <c:ptCount val="9"/>
+                <c:pt idx="0">
+                  <c:v>0</c:v>
+                </c:pt>
+                <c:pt idx="1">
+                  <c:v>20</c:v>
+                </c:pt>
+                <c:pt idx="2">
+                  <c:v>12</c:v>
+                </c:pt>
+                <c:pt idx="3">
+                  <c:v>19</c:v>
+                </c:pt>
+                <c:pt idx="4">
+                  <c:v>5</c:v>
+                </c:pt>
+                <c:pt idx="5">
+                  <c:v>0</c:v>
+                </c:pt>
+                <c:pt idx="6">
+                  <c:v>0</c:v>
+                </c:pt>
+                <c:pt idx="7">
+                  <c:v>1</c:v>
+                </c:pt>
+                <c:pt idx="8">
+                  <c:v>0</c:v>
+                </c:pt>
+              </c:numCache>
+            </c:numRef>
+          </c:yVal>
+          <c:smooth val="1"/>
+        </c:ser>
+        <c:ser>
+          <c:idx val="2"/>
+          <c:order val="2"/>
+          <c:tx>
+            <c:strRef>
+              <c:f>[stats.xlsx]yudb_outdoor_forMe!$I$1</c:f>
+              <c:strCache>
+                <c:ptCount val="1"/>
+                <c:pt idx="0">
+                  <c:v>ось Z</c:v>
+                </c:pt>
+              </c:strCache>
+            </c:strRef>
+          </c:tx>
+          <c:xVal>
+            <c:numRef>
+              <c:f>[stats.xlsx]yudb_outdoor_forMe!$F$2:$F$10</c:f>
+              <c:numCache>
+                <c:formatCode>General</c:formatCode>
+                <c:ptCount val="9"/>
+                <c:pt idx="0">
+                  <c:v>0.3941954012462775</c:v>
+                </c:pt>
+                <c:pt idx="1">
+                  <c:v>7.0408578466579108</c:v>
+                </c:pt>
+                <c:pt idx="2">
+                  <c:v>13.687520292069546</c:v>
+                </c:pt>
+                <c:pt idx="3">
+                  <c:v>20.334182737481186</c:v>
+                </c:pt>
+                <c:pt idx="4">
+                  <c:v>26.980845182892818</c:v>
+                </c:pt>
+                <c:pt idx="5">
+                  <c:v>33.62750762830445</c:v>
+                </c:pt>
+                <c:pt idx="6">
+                  <c:v>40.274170073716078</c:v>
+                </c:pt>
+                <c:pt idx="7">
+                  <c:v>46.920832519127728</c:v>
+                </c:pt>
+              </c:numCache>
+            </c:numRef>
+          </c:xVal>
+          <c:yVal>
+            <c:numRef>
+              <c:f>[stats.xlsx]yudb_outdoor_forMe!$I$2:$I$10</c:f>
+              <c:numCache>
+                <c:formatCode>General</c:formatCode>
+                <c:ptCount val="9"/>
+                <c:pt idx="0">
+                  <c:v>1</c:v>
+                </c:pt>
+                <c:pt idx="1">
+                  <c:v>21</c:v>
+                </c:pt>
+                <c:pt idx="2">
+                  <c:v>20</c:v>
+                </c:pt>
+                <c:pt idx="3">
+                  <c:v>6</c:v>
+                </c:pt>
+                <c:pt idx="4">
+                  <c:v>3</c:v>
+                </c:pt>
+                <c:pt idx="5">
+                  <c:v>2</c:v>
+                </c:pt>
+                <c:pt idx="6">
+                  <c:v>2</c:v>
+                </c:pt>
+                <c:pt idx="7">
+                  <c:v>2</c:v>
+                </c:pt>
+                <c:pt idx="8">
+                  <c:v>0</c:v>
+                </c:pt>
+              </c:numCache>
+            </c:numRef>
+          </c:yVal>
+          <c:smooth val="1"/>
+        </c:ser>
+        <c:axId val="67029248"/>
+        <c:axId val="67048576"/>
+      </c:scatterChart>
+      <c:valAx>
+        <c:axId val="67029248"/>
+        <c:scaling>
+          <c:orientation val="minMax"/>
+        </c:scaling>
+        <c:axPos val="b"/>
+        <c:numFmt formatCode="General" sourceLinked="1"/>
+        <c:tickLblPos val="nextTo"/>
+        <c:txPr>
+          <a:bodyPr/>
+          <a:lstStyle/>
+          <a:p>
+            <a:pPr>
+              <a:defRPr sz="1400"/>
+            </a:pPr>
+            <a:endParaRPr lang="ru-RU"/>
+          </a:p>
+        </c:txPr>
+        <c:crossAx val="67048576"/>
+        <c:crosses val="autoZero"/>
+        <c:crossBetween val="midCat"/>
+      </c:valAx>
+      <c:valAx>
+        <c:axId val="67048576"/>
+        <c:scaling>
+          <c:orientation val="minMax"/>
+        </c:scaling>
+        <c:axPos val="l"/>
+        <c:majorGridlines/>
+        <c:numFmt formatCode="General" sourceLinked="1"/>
+        <c:tickLblPos val="nextTo"/>
+        <c:txPr>
+          <a:bodyPr/>
+          <a:lstStyle/>
+          <a:p>
+            <a:pPr>
+              <a:defRPr sz="1400"/>
+            </a:pPr>
+            <a:endParaRPr lang="ru-RU"/>
+          </a:p>
+        </c:txPr>
+        <c:crossAx val="67029248"/>
+        <c:crosses val="autoZero"/>
+        <c:crossBetween val="midCat"/>
+      </c:valAx>
+    </c:plotArea>
+    <c:legend>
+      <c:legendPos val="r"/>
+      <c:layout/>
+      <c:txPr>
+        <a:bodyPr/>
+        <a:lstStyle/>
+        <a:p>
+          <a:pPr>
+            <a:defRPr sz="1400"/>
+          </a:pPr>
+          <a:endParaRPr lang="ru-RU"/>
+        </a:p>
+      </c:txPr>
+    </c:legend>
+    <c:plotVisOnly val="1"/>
+  </c:chart>
+  <c:externalData r:id="rId1"/>
+</c:chartSpace>
 </file>
 
 <file path=ppt/slideLayouts/slideLayout1.xml><?xml version="1.0" encoding="utf-8"?>
@@ -3134,36 +3852,46 @@
         </p:nvSpPr>
         <p:spPr/>
         <p:txBody>
-          <a:bodyPr/>
-          <a:lstStyle/>
-          <a:p>
-            <a:r>
-              <a:rPr lang="ru-RU" dirty="0" smtClean="0"/>
-              <a:t>Результаты работы</a:t>
+          <a:bodyPr>
+            <a:normAutofit fontScale="90000"/>
+          </a:bodyPr>
+          <a:lstStyle/>
+          <a:p>
+            <a:r>
+              <a:rPr lang="ru-RU" dirty="0" smtClean="0"/>
+              <a:t>Пример результата работы метода </a:t>
+            </a:r>
+            <a:r>
+              <a:rPr lang="en-US" dirty="0" err="1" smtClean="0"/>
+              <a:t>SfM</a:t>
             </a:r>
             <a:endParaRPr lang="ru-RU" dirty="0"/>
           </a:p>
         </p:txBody>
       </p:sp>
-      <p:sp>
-        <p:nvSpPr>
-          <p:cNvPr id="3" name="Содержимое 2"/>
-          <p:cNvSpPr>
-            <a:spLocks noGrp="1"/>
-          </p:cNvSpPr>
+      <p:pic>
+        <p:nvPicPr>
+          <p:cNvPr id="5" name="Содержимое 4" descr="sfm_example.png"/>
+          <p:cNvPicPr>
+            <a:picLocks noGrp="1" noChangeAspect="1"/>
+          </p:cNvPicPr>
           <p:nvPr>
             <p:ph idx="1"/>
           </p:nvPr>
-        </p:nvSpPr>
-        <p:spPr/>
-        <p:txBody>
-          <a:bodyPr/>
-          <a:lstStyle/>
-          <a:p>
-            <a:endParaRPr lang="ru-RU"/>
-          </a:p>
-        </p:txBody>
-      </p:sp>
+        </p:nvPicPr>
+        <p:blipFill>
+          <a:blip r:embed="rId2" cstate="print"/>
+          <a:stretch>
+            <a:fillRect/>
+          </a:stretch>
+        </p:blipFill>
+        <p:spPr>
+          <a:xfrm>
+            <a:off x="323528" y="1772816"/>
+            <a:ext cx="8581728" cy="3240360"/>
+          </a:xfrm>
+        </p:spPr>
+      </p:pic>
     </p:spTree>
   </p:cSld>
   <p:clrMapOvr>
@@ -3206,6 +3934,728 @@
           <a:p>
             <a:r>
               <a:rPr lang="ru-RU" dirty="0" smtClean="0"/>
+              <a:t>Кратко о методе</a:t>
+            </a:r>
+            <a:r>
+              <a:rPr lang="en-US" dirty="0" smtClean="0"/>
+              <a:t> </a:t>
+            </a:r>
+            <a:r>
+              <a:rPr lang="ru-RU" dirty="0" err="1" smtClean="0"/>
+              <a:t>Хуттунена</a:t>
+            </a:r>
+            <a:r>
+              <a:rPr lang="ru-RU" dirty="0" smtClean="0"/>
+              <a:t>, </a:t>
+            </a:r>
+            <a:r>
+              <a:rPr lang="ru-RU" dirty="0" err="1" smtClean="0"/>
+              <a:t>Пише</a:t>
+            </a:r>
+            <a:endParaRPr lang="ru-RU" dirty="0"/>
+          </a:p>
+        </p:txBody>
+      </p:sp>
+      <p:sp>
+        <p:nvSpPr>
+          <p:cNvPr id="3" name="Содержимое 2"/>
+          <p:cNvSpPr>
+            <a:spLocks noGrp="1"/>
+          </p:cNvSpPr>
+          <p:nvPr>
+            <p:ph idx="1"/>
+          </p:nvPr>
+        </p:nvSpPr>
+        <p:spPr/>
+        <p:txBody>
+          <a:bodyPr>
+            <a:normAutofit fontScale="70000" lnSpcReduction="20000"/>
+          </a:bodyPr>
+          <a:lstStyle/>
+          <a:p>
+            <a:r>
+              <a:rPr lang="ru-RU" dirty="0" smtClean="0"/>
+              <a:t>решает задачу определения трехмерной </a:t>
+            </a:r>
+            <a:r>
+              <a:rPr lang="ru-RU" dirty="0"/>
+              <a:t>ориентации монокулярной камеры </a:t>
+            </a:r>
+            <a:r>
+              <a:rPr lang="ru-RU" dirty="0" smtClean="0"/>
+              <a:t>путем нахождения точек </a:t>
+            </a:r>
+            <a:r>
+              <a:rPr lang="ru-RU" dirty="0"/>
+              <a:t>схождения </a:t>
+            </a:r>
+            <a:r>
+              <a:rPr lang="ru-RU" dirty="0" smtClean="0"/>
+              <a:t>перспективы, </a:t>
+            </a:r>
+            <a:r>
+              <a:rPr lang="ru-RU" dirty="0"/>
+              <a:t>обнаруженных на </a:t>
+            </a:r>
+            <a:r>
+              <a:rPr lang="ru-RU" dirty="0" smtClean="0"/>
+              <a:t>изображении</a:t>
+            </a:r>
+          </a:p>
+          <a:p>
+            <a:r>
+              <a:rPr lang="ru-RU" dirty="0" smtClean="0"/>
+              <a:t>предполагается, что точки схождения перспективы образованы проекциями линий, образующих ортогональную систему</a:t>
+            </a:r>
+          </a:p>
+          <a:p>
+            <a:r>
+              <a:rPr lang="ru-RU" dirty="0" smtClean="0"/>
+              <a:t>такая ситуация возможна, например, внутри помещений, где хорошо выделяются линии, образованные стенами, полом и потолком, а также предметами интерьера, расположенными параллельно или ортогонально им</a:t>
+            </a:r>
+          </a:p>
+          <a:p>
+            <a:r>
+              <a:rPr lang="ru-RU" dirty="0" smtClean="0"/>
+              <a:t>предположение можно расширить на изображения городской застройки,  которая обычно  ведется на декартовой сетке, а дома имеют форму параллелепипедов</a:t>
+            </a:r>
+            <a:endParaRPr lang="ru-RU" dirty="0"/>
+          </a:p>
+        </p:txBody>
+      </p:sp>
+    </p:spTree>
+  </p:cSld>
+  <p:clrMapOvr>
+    <a:masterClrMapping/>
+  </p:clrMapOvr>
+</p:sld>
+</file>
+
+<file path=ppt/slides/slide12.xml><?xml version="1.0" encoding="utf-8"?>
+<p:sld xmlns:a="http://schemas.openxmlformats.org/drawingml/2006/main" xmlns:r="http://schemas.openxmlformats.org/officeDocument/2006/relationships" xmlns:p="http://schemas.openxmlformats.org/presentationml/2006/main">
+  <p:cSld>
+    <p:spTree>
+      <p:nvGrpSpPr>
+        <p:cNvPr id="1" name=""/>
+        <p:cNvGrpSpPr/>
+        <p:nvPr/>
+      </p:nvGrpSpPr>
+      <p:grpSpPr>
+        <a:xfrm>
+          <a:off x="0" y="0"/>
+          <a:ext cx="0" cy="0"/>
+          <a:chOff x="0" y="0"/>
+          <a:chExt cx="0" cy="0"/>
+        </a:xfrm>
+      </p:grpSpPr>
+      <p:sp>
+        <p:nvSpPr>
+          <p:cNvPr id="2" name="Заголовок 1"/>
+          <p:cNvSpPr>
+            <a:spLocks noGrp="1"/>
+          </p:cNvSpPr>
+          <p:nvPr>
+            <p:ph type="title"/>
+          </p:nvPr>
+        </p:nvSpPr>
+        <p:spPr/>
+        <p:txBody>
+          <a:bodyPr>
+            <a:normAutofit fontScale="90000"/>
+          </a:bodyPr>
+          <a:lstStyle/>
+          <a:p>
+            <a:r>
+              <a:rPr lang="ru-RU" dirty="0" smtClean="0"/>
+              <a:t>Пример изображения внутри помещения</a:t>
+            </a:r>
+            <a:endParaRPr lang="ru-RU" dirty="0"/>
+          </a:p>
+        </p:txBody>
+      </p:sp>
+      <p:pic>
+        <p:nvPicPr>
+          <p:cNvPr id="4" name="Содержимое 3" descr="indoor_raw_example.jpg"/>
+          <p:cNvPicPr>
+            <a:picLocks noGrp="1" noChangeAspect="1"/>
+          </p:cNvPicPr>
+          <p:nvPr>
+            <p:ph idx="1"/>
+          </p:nvPr>
+        </p:nvPicPr>
+        <p:blipFill>
+          <a:blip r:embed="rId2" cstate="print"/>
+          <a:stretch>
+            <a:fillRect/>
+          </a:stretch>
+        </p:blipFill>
+        <p:spPr>
+          <a:xfrm>
+            <a:off x="1115616" y="1484784"/>
+            <a:ext cx="6912768" cy="5184576"/>
+          </a:xfrm>
+        </p:spPr>
+      </p:pic>
+    </p:spTree>
+  </p:cSld>
+  <p:clrMapOvr>
+    <a:masterClrMapping/>
+  </p:clrMapOvr>
+</p:sld>
+</file>
+
+<file path=ppt/slides/slide13.xml><?xml version="1.0" encoding="utf-8"?>
+<p:sld xmlns:a="http://schemas.openxmlformats.org/drawingml/2006/main" xmlns:r="http://schemas.openxmlformats.org/officeDocument/2006/relationships" xmlns:p="http://schemas.openxmlformats.org/presentationml/2006/main">
+  <p:cSld>
+    <p:spTree>
+      <p:nvGrpSpPr>
+        <p:cNvPr id="1" name=""/>
+        <p:cNvGrpSpPr/>
+        <p:nvPr/>
+      </p:nvGrpSpPr>
+      <p:grpSpPr>
+        <a:xfrm>
+          <a:off x="0" y="0"/>
+          <a:ext cx="0" cy="0"/>
+          <a:chOff x="0" y="0"/>
+          <a:chExt cx="0" cy="0"/>
+        </a:xfrm>
+      </p:grpSpPr>
+      <p:sp>
+        <p:nvSpPr>
+          <p:cNvPr id="2" name="Заголовок 1"/>
+          <p:cNvSpPr>
+            <a:spLocks noGrp="1"/>
+          </p:cNvSpPr>
+          <p:nvPr>
+            <p:ph type="title"/>
+          </p:nvPr>
+        </p:nvSpPr>
+        <p:spPr/>
+        <p:txBody>
+          <a:bodyPr>
+            <a:normAutofit fontScale="90000"/>
+          </a:bodyPr>
+          <a:lstStyle/>
+          <a:p>
+            <a:r>
+              <a:rPr lang="ru-RU" dirty="0" smtClean="0"/>
+              <a:t>Пример изображения вне помещения</a:t>
+            </a:r>
+            <a:endParaRPr lang="ru-RU" dirty="0"/>
+          </a:p>
+        </p:txBody>
+      </p:sp>
+      <p:pic>
+        <p:nvPicPr>
+          <p:cNvPr id="4" name="Содержимое 3" descr="indoor_raw_example.jpg"/>
+          <p:cNvPicPr>
+            <a:picLocks noGrp="1" noChangeAspect="1"/>
+          </p:cNvPicPr>
+          <p:nvPr>
+            <p:ph idx="1"/>
+          </p:nvPr>
+        </p:nvPicPr>
+        <p:blipFill>
+          <a:blip r:embed="rId2" cstate="print"/>
+          <a:stretch>
+            <a:fillRect/>
+          </a:stretch>
+        </p:blipFill>
+        <p:spPr>
+          <a:xfrm>
+            <a:off x="1115616" y="1484784"/>
+            <a:ext cx="6912768" cy="5184576"/>
+          </a:xfrm>
+        </p:spPr>
+      </p:pic>
+    </p:spTree>
+  </p:cSld>
+  <p:clrMapOvr>
+    <a:masterClrMapping/>
+  </p:clrMapOvr>
+</p:sld>
+</file>
+
+<file path=ppt/slides/slide14.xml><?xml version="1.0" encoding="utf-8"?>
+<p:sld xmlns:a="http://schemas.openxmlformats.org/drawingml/2006/main" xmlns:r="http://schemas.openxmlformats.org/officeDocument/2006/relationships" xmlns:p="http://schemas.openxmlformats.org/presentationml/2006/main">
+  <p:cSld>
+    <p:spTree>
+      <p:nvGrpSpPr>
+        <p:cNvPr id="1" name=""/>
+        <p:cNvGrpSpPr/>
+        <p:nvPr/>
+      </p:nvGrpSpPr>
+      <p:grpSpPr>
+        <a:xfrm>
+          <a:off x="0" y="0"/>
+          <a:ext cx="0" cy="0"/>
+          <a:chOff x="0" y="0"/>
+          <a:chExt cx="0" cy="0"/>
+        </a:xfrm>
+      </p:grpSpPr>
+      <p:sp>
+        <p:nvSpPr>
+          <p:cNvPr id="2" name="Заголовок 1"/>
+          <p:cNvSpPr>
+            <a:spLocks noGrp="1"/>
+          </p:cNvSpPr>
+          <p:nvPr>
+            <p:ph type="title"/>
+          </p:nvPr>
+        </p:nvSpPr>
+        <p:spPr/>
+        <p:txBody>
+          <a:bodyPr/>
+          <a:lstStyle/>
+          <a:p>
+            <a:r>
+              <a:rPr lang="ru-RU" dirty="0" smtClean="0"/>
+              <a:t>Этапы работы алгоритма</a:t>
+            </a:r>
+            <a:endParaRPr lang="ru-RU" dirty="0"/>
+          </a:p>
+        </p:txBody>
+      </p:sp>
+      <p:sp>
+        <p:nvSpPr>
+          <p:cNvPr id="3" name="Содержимое 2"/>
+          <p:cNvSpPr>
+            <a:spLocks noGrp="1"/>
+          </p:cNvSpPr>
+          <p:nvPr>
+            <p:ph idx="1"/>
+          </p:nvPr>
+        </p:nvSpPr>
+        <p:spPr/>
+        <p:txBody>
+          <a:bodyPr>
+            <a:normAutofit fontScale="85000" lnSpcReduction="20000"/>
+          </a:bodyPr>
+          <a:lstStyle/>
+          <a:p>
+            <a:r>
+              <a:rPr lang="ru-RU" dirty="0" smtClean="0"/>
+              <a:t>регистрация видеоряда с декомпозицией на кадры или регистрация отдельного снимка</a:t>
+            </a:r>
+          </a:p>
+          <a:p>
+            <a:r>
+              <a:rPr lang="ru-RU" dirty="0" smtClean="0"/>
+              <a:t>выделение сегментов линий</a:t>
+            </a:r>
+          </a:p>
+          <a:p>
+            <a:r>
+              <a:rPr lang="ru-RU" dirty="0" smtClean="0"/>
+              <a:t>объединение сегментов в кластеры по принципу пересечения в одной точке. Будем считать, что точка пересечения – точка схождения перспективы (</a:t>
+            </a:r>
+            <a:r>
+              <a:rPr lang="ru-RU" dirty="0" err="1" smtClean="0"/>
+              <a:t>ТСП</a:t>
+            </a:r>
+            <a:r>
+              <a:rPr lang="ru-RU" dirty="0" smtClean="0"/>
+              <a:t>)</a:t>
+            </a:r>
+          </a:p>
+          <a:p>
+            <a:r>
+              <a:rPr lang="ru-RU" dirty="0" smtClean="0"/>
+              <a:t>выделение 3 наибольших сегментов</a:t>
+            </a:r>
+          </a:p>
+          <a:p>
+            <a:r>
+              <a:rPr lang="ru-RU" dirty="0" smtClean="0"/>
+              <a:t>уточнение каждой из предполагаемых </a:t>
+            </a:r>
+            <a:r>
+              <a:rPr lang="ru-RU" dirty="0" err="1" smtClean="0"/>
+              <a:t>ТСП</a:t>
+            </a:r>
+            <a:r>
+              <a:rPr lang="ru-RU" dirty="0" smtClean="0"/>
+              <a:t> на основе информации о кластере</a:t>
+            </a:r>
+          </a:p>
+          <a:p>
+            <a:r>
+              <a:rPr lang="ru-RU" dirty="0" smtClean="0"/>
+              <a:t>вычисление углов пространственной ориентации на основе полученной матрицы поворота камеры</a:t>
+            </a:r>
+            <a:endParaRPr lang="ru-RU" dirty="0"/>
+          </a:p>
+        </p:txBody>
+      </p:sp>
+    </p:spTree>
+  </p:cSld>
+  <p:clrMapOvr>
+    <a:masterClrMapping/>
+  </p:clrMapOvr>
+</p:sld>
+</file>
+
+<file path=ppt/slides/slide15.xml><?xml version="1.0" encoding="utf-8"?>
+<p:sld xmlns:a="http://schemas.openxmlformats.org/drawingml/2006/main" xmlns:r="http://schemas.openxmlformats.org/officeDocument/2006/relationships" xmlns:p="http://schemas.openxmlformats.org/presentationml/2006/main">
+  <p:cSld>
+    <p:spTree>
+      <p:nvGrpSpPr>
+        <p:cNvPr id="1" name=""/>
+        <p:cNvGrpSpPr/>
+        <p:nvPr/>
+      </p:nvGrpSpPr>
+      <p:grpSpPr>
+        <a:xfrm>
+          <a:off x="0" y="0"/>
+          <a:ext cx="0" cy="0"/>
+          <a:chOff x="0" y="0"/>
+          <a:chExt cx="0" cy="0"/>
+        </a:xfrm>
+      </p:grpSpPr>
+      <p:sp>
+        <p:nvSpPr>
+          <p:cNvPr id="2" name="Заголовок 1"/>
+          <p:cNvSpPr>
+            <a:spLocks noGrp="1"/>
+          </p:cNvSpPr>
+          <p:nvPr>
+            <p:ph type="title"/>
+          </p:nvPr>
+        </p:nvSpPr>
+        <p:spPr/>
+        <p:txBody>
+          <a:bodyPr/>
+          <a:lstStyle/>
+          <a:p>
+            <a:r>
+              <a:rPr lang="ru-RU" dirty="0" smtClean="0"/>
+              <a:t>Тестовые данные</a:t>
+            </a:r>
+            <a:endParaRPr lang="ru-RU" dirty="0"/>
+          </a:p>
+        </p:txBody>
+      </p:sp>
+      <p:sp>
+        <p:nvSpPr>
+          <p:cNvPr id="3" name="Содержимое 2"/>
+          <p:cNvSpPr>
+            <a:spLocks noGrp="1"/>
+          </p:cNvSpPr>
+          <p:nvPr>
+            <p:ph idx="1"/>
+          </p:nvPr>
+        </p:nvSpPr>
+        <p:spPr/>
+        <p:txBody>
+          <a:bodyPr>
+            <a:normAutofit fontScale="92500" lnSpcReduction="20000"/>
+          </a:bodyPr>
+          <a:lstStyle/>
+          <a:p>
+            <a:r>
+              <a:rPr lang="ru-RU" dirty="0" smtClean="0"/>
+              <a:t>за основу тестовых данных выбрана база изображений</a:t>
+            </a:r>
+            <a:r>
+              <a:rPr lang="en-US" dirty="0" smtClean="0"/>
+              <a:t> </a:t>
+            </a:r>
+            <a:r>
+              <a:rPr lang="en-US" dirty="0" err="1" smtClean="0"/>
+              <a:t>YorkUrbanDb</a:t>
+            </a:r>
+            <a:r>
+              <a:rPr lang="ru-RU" dirty="0" smtClean="0"/>
+              <a:t>, которая содержит: </a:t>
+            </a:r>
+          </a:p>
+          <a:p>
+            <a:pPr lvl="1"/>
+            <a:r>
+              <a:rPr lang="ru-RU" dirty="0" smtClean="0"/>
+              <a:t>45 снимков, снятых внутри помещения</a:t>
+            </a:r>
+          </a:p>
+          <a:p>
+            <a:pPr lvl="1"/>
+            <a:r>
+              <a:rPr lang="ru-RU" dirty="0" smtClean="0"/>
+              <a:t>57 снимков городской местности города Торонто (Канада)</a:t>
+            </a:r>
+          </a:p>
+          <a:p>
+            <a:pPr lvl="1"/>
+            <a:r>
+              <a:rPr lang="ru-RU" dirty="0" smtClean="0"/>
+              <a:t>информацию о матрице калибровки используемой камеры</a:t>
+            </a:r>
+          </a:p>
+          <a:p>
+            <a:pPr lvl="1"/>
+            <a:r>
+              <a:rPr lang="ru-RU" dirty="0" smtClean="0"/>
+              <a:t>вычисленную матрицу поворота системы координат камеры</a:t>
+            </a:r>
+          </a:p>
+          <a:p>
+            <a:pPr lvl="1"/>
+            <a:r>
+              <a:rPr lang="ru-RU" dirty="0" smtClean="0"/>
+              <a:t>список распознанных сегментов линий с отмеченным соответствием их точкам схождения перспективы</a:t>
+            </a:r>
+          </a:p>
+        </p:txBody>
+      </p:sp>
+    </p:spTree>
+  </p:cSld>
+  <p:clrMapOvr>
+    <a:masterClrMapping/>
+  </p:clrMapOvr>
+</p:sld>
+</file>
+
+<file path=ppt/slides/slide16.xml><?xml version="1.0" encoding="utf-8"?>
+<p:sld xmlns:a="http://schemas.openxmlformats.org/drawingml/2006/main" xmlns:r="http://schemas.openxmlformats.org/officeDocument/2006/relationships" xmlns:p="http://schemas.openxmlformats.org/presentationml/2006/main">
+  <p:cSld>
+    <p:spTree>
+      <p:nvGrpSpPr>
+        <p:cNvPr id="1" name=""/>
+        <p:cNvGrpSpPr/>
+        <p:nvPr/>
+      </p:nvGrpSpPr>
+      <p:grpSpPr>
+        <a:xfrm>
+          <a:off x="0" y="0"/>
+          <a:ext cx="0" cy="0"/>
+          <a:chOff x="0" y="0"/>
+          <a:chExt cx="0" cy="0"/>
+        </a:xfrm>
+      </p:grpSpPr>
+      <p:sp>
+        <p:nvSpPr>
+          <p:cNvPr id="2" name="Заголовок 1"/>
+          <p:cNvSpPr>
+            <a:spLocks noGrp="1"/>
+          </p:cNvSpPr>
+          <p:nvPr>
+            <p:ph type="title"/>
+          </p:nvPr>
+        </p:nvSpPr>
+        <p:spPr/>
+        <p:txBody>
+          <a:bodyPr>
+            <a:normAutofit fontScale="90000"/>
+          </a:bodyPr>
+          <a:lstStyle/>
+          <a:p>
+            <a:r>
+              <a:rPr lang="ru-RU" dirty="0" smtClean="0"/>
+              <a:t>Результаты тестирования на изображениях внутри помещений</a:t>
+            </a:r>
+            <a:endParaRPr lang="ru-RU" dirty="0"/>
+          </a:p>
+        </p:txBody>
+      </p:sp>
+      <p:graphicFrame>
+        <p:nvGraphicFramePr>
+          <p:cNvPr id="5" name="Содержимое 4"/>
+          <p:cNvGraphicFramePr>
+            <a:graphicFrameLocks noGrp="1"/>
+          </p:cNvGraphicFramePr>
+          <p:nvPr>
+            <p:ph idx="1"/>
+          </p:nvPr>
+        </p:nvGraphicFramePr>
+        <p:xfrm>
+          <a:off x="457200" y="1600200"/>
+          <a:ext cx="8229600" cy="4525963"/>
+        </p:xfrm>
+        <a:graphic>
+          <a:graphicData uri="http://schemas.openxmlformats.org/drawingml/2006/chart">
+            <c:chart xmlns:c="http://schemas.openxmlformats.org/drawingml/2006/chart" xmlns:r="http://schemas.openxmlformats.org/officeDocument/2006/relationships" r:id="rId2"/>
+          </a:graphicData>
+        </a:graphic>
+      </p:graphicFrame>
+    </p:spTree>
+  </p:cSld>
+  <p:clrMapOvr>
+    <a:masterClrMapping/>
+  </p:clrMapOvr>
+</p:sld>
+</file>
+
+<file path=ppt/slides/slide17.xml><?xml version="1.0" encoding="utf-8"?>
+<p:sld xmlns:a="http://schemas.openxmlformats.org/drawingml/2006/main" xmlns:r="http://schemas.openxmlformats.org/officeDocument/2006/relationships" xmlns:p="http://schemas.openxmlformats.org/presentationml/2006/main">
+  <p:cSld>
+    <p:spTree>
+      <p:nvGrpSpPr>
+        <p:cNvPr id="1" name=""/>
+        <p:cNvGrpSpPr/>
+        <p:nvPr/>
+      </p:nvGrpSpPr>
+      <p:grpSpPr>
+        <a:xfrm>
+          <a:off x="0" y="0"/>
+          <a:ext cx="0" cy="0"/>
+          <a:chOff x="0" y="0"/>
+          <a:chExt cx="0" cy="0"/>
+        </a:xfrm>
+      </p:grpSpPr>
+      <p:sp>
+        <p:nvSpPr>
+          <p:cNvPr id="2" name="Заголовок 1"/>
+          <p:cNvSpPr>
+            <a:spLocks noGrp="1"/>
+          </p:cNvSpPr>
+          <p:nvPr>
+            <p:ph type="title"/>
+          </p:nvPr>
+        </p:nvSpPr>
+        <p:spPr/>
+        <p:txBody>
+          <a:bodyPr>
+            <a:normAutofit fontScale="90000"/>
+          </a:bodyPr>
+          <a:lstStyle/>
+          <a:p>
+            <a:r>
+              <a:rPr lang="ru-RU" dirty="0" smtClean="0"/>
+              <a:t>Результаты тестирования на изображениях вне помещений</a:t>
+            </a:r>
+            <a:endParaRPr lang="ru-RU" dirty="0"/>
+          </a:p>
+        </p:txBody>
+      </p:sp>
+      <p:graphicFrame>
+        <p:nvGraphicFramePr>
+          <p:cNvPr id="8" name="Содержимое 7"/>
+          <p:cNvGraphicFramePr>
+            <a:graphicFrameLocks noGrp="1"/>
+          </p:cNvGraphicFramePr>
+          <p:nvPr>
+            <p:ph idx="1"/>
+          </p:nvPr>
+        </p:nvGraphicFramePr>
+        <p:xfrm>
+          <a:off x="457200" y="1600200"/>
+          <a:ext cx="8229600" cy="4525963"/>
+        </p:xfrm>
+        <a:graphic>
+          <a:graphicData uri="http://schemas.openxmlformats.org/drawingml/2006/chart">
+            <c:chart xmlns:c="http://schemas.openxmlformats.org/drawingml/2006/chart" xmlns:r="http://schemas.openxmlformats.org/officeDocument/2006/relationships" r:id="rId2"/>
+          </a:graphicData>
+        </a:graphic>
+      </p:graphicFrame>
+    </p:spTree>
+  </p:cSld>
+  <p:clrMapOvr>
+    <a:masterClrMapping/>
+  </p:clrMapOvr>
+</p:sld>
+</file>
+
+<file path=ppt/slides/slide18.xml><?xml version="1.0" encoding="utf-8"?>
+<p:sld xmlns:a="http://schemas.openxmlformats.org/drawingml/2006/main" xmlns:r="http://schemas.openxmlformats.org/officeDocument/2006/relationships" xmlns:p="http://schemas.openxmlformats.org/presentationml/2006/main">
+  <p:cSld>
+    <p:spTree>
+      <p:nvGrpSpPr>
+        <p:cNvPr id="1" name=""/>
+        <p:cNvGrpSpPr/>
+        <p:nvPr/>
+      </p:nvGrpSpPr>
+      <p:grpSpPr>
+        <a:xfrm>
+          <a:off x="0" y="0"/>
+          <a:ext cx="0" cy="0"/>
+          <a:chOff x="0" y="0"/>
+          <a:chExt cx="0" cy="0"/>
+        </a:xfrm>
+      </p:grpSpPr>
+      <p:sp>
+        <p:nvSpPr>
+          <p:cNvPr id="2" name="Заголовок 1"/>
+          <p:cNvSpPr>
+            <a:spLocks noGrp="1"/>
+          </p:cNvSpPr>
+          <p:nvPr>
+            <p:ph type="title"/>
+          </p:nvPr>
+        </p:nvSpPr>
+        <p:spPr/>
+        <p:txBody>
+          <a:bodyPr/>
+          <a:lstStyle/>
+          <a:p>
+            <a:r>
+              <a:rPr lang="ru-RU" dirty="0" smtClean="0"/>
+              <a:t>Результаты работы</a:t>
+            </a:r>
+            <a:endParaRPr lang="ru-RU" dirty="0"/>
+          </a:p>
+        </p:txBody>
+      </p:sp>
+      <p:sp>
+        <p:nvSpPr>
+          <p:cNvPr id="3" name="Содержимое 2"/>
+          <p:cNvSpPr>
+            <a:spLocks noGrp="1"/>
+          </p:cNvSpPr>
+          <p:nvPr>
+            <p:ph idx="1"/>
+          </p:nvPr>
+        </p:nvSpPr>
+        <p:spPr/>
+        <p:txBody>
+          <a:bodyPr/>
+          <a:lstStyle/>
+          <a:p>
+            <a:endParaRPr lang="ru-RU"/>
+          </a:p>
+        </p:txBody>
+      </p:sp>
+    </p:spTree>
+  </p:cSld>
+  <p:clrMapOvr>
+    <a:masterClrMapping/>
+  </p:clrMapOvr>
+</p:sld>
+</file>
+
+<file path=ppt/slides/slide19.xml><?xml version="1.0" encoding="utf-8"?>
+<p:sld xmlns:a="http://schemas.openxmlformats.org/drawingml/2006/main" xmlns:r="http://schemas.openxmlformats.org/officeDocument/2006/relationships" xmlns:p="http://schemas.openxmlformats.org/presentationml/2006/main">
+  <p:cSld>
+    <p:spTree>
+      <p:nvGrpSpPr>
+        <p:cNvPr id="1" name=""/>
+        <p:cNvGrpSpPr/>
+        <p:nvPr/>
+      </p:nvGrpSpPr>
+      <p:grpSpPr>
+        <a:xfrm>
+          <a:off x="0" y="0"/>
+          <a:ext cx="0" cy="0"/>
+          <a:chOff x="0" y="0"/>
+          <a:chExt cx="0" cy="0"/>
+        </a:xfrm>
+      </p:grpSpPr>
+      <p:sp>
+        <p:nvSpPr>
+          <p:cNvPr id="2" name="Заголовок 1"/>
+          <p:cNvSpPr>
+            <a:spLocks noGrp="1"/>
+          </p:cNvSpPr>
+          <p:nvPr>
+            <p:ph type="title"/>
+          </p:nvPr>
+        </p:nvSpPr>
+        <p:spPr/>
+        <p:txBody>
+          <a:bodyPr/>
+          <a:lstStyle/>
+          <a:p>
+            <a:r>
+              <a:rPr lang="ru-RU" dirty="0" smtClean="0"/>
               <a:t>Что можно улучшить</a:t>
             </a:r>
             <a:endParaRPr lang="ru-RU" dirty="0"/>
@@ -3273,7 +4723,7 @@
           <a:p>
             <a:r>
               <a:rPr lang="ru-RU" dirty="0" smtClean="0"/>
-              <a:t>Постановка задачи</a:t>
+              <a:t>???</a:t>
             </a:r>
             <a:endParaRPr lang="ru-RU" dirty="0"/>
           </a:p>
@@ -3291,10 +4741,66 @@
         </p:nvSpPr>
         <p:spPr/>
         <p:txBody>
-          <a:bodyPr/>
-          <a:lstStyle/>
-          <a:p>
-            <a:endParaRPr lang="ru-RU"/>
+          <a:bodyPr>
+            <a:normAutofit fontScale="92500" lnSpcReduction="10000"/>
+          </a:bodyPr>
+          <a:lstStyle/>
+          <a:p>
+            <a:r>
+              <a:rPr lang="ru-RU" dirty="0" smtClean="0"/>
+              <a:t>высокий </a:t>
+            </a:r>
+            <a:r>
+              <a:rPr lang="ru-RU" dirty="0"/>
+              <a:t>уровень интереса к автономной самоуправляемой </a:t>
+            </a:r>
+            <a:r>
+              <a:rPr lang="ru-RU" dirty="0" smtClean="0"/>
+              <a:t>технике</a:t>
+            </a:r>
+          </a:p>
+          <a:p>
+            <a:r>
+              <a:rPr lang="ru-RU" dirty="0" smtClean="0"/>
+              <a:t>в </a:t>
+            </a:r>
+            <a:r>
+              <a:rPr lang="ru-RU" dirty="0"/>
+              <a:t>числе наиболее проблемных подсистем </a:t>
+            </a:r>
+            <a:r>
+              <a:rPr lang="ru-RU" dirty="0" smtClean="0"/>
+              <a:t>значится </a:t>
+            </a:r>
+            <a:r>
+              <a:rPr lang="ru-RU" dirty="0"/>
+              <a:t>система </a:t>
+            </a:r>
+            <a:r>
+              <a:rPr lang="ru-RU" dirty="0" smtClean="0"/>
+              <a:t>навигации и позиционирования</a:t>
+            </a:r>
+          </a:p>
+          <a:p>
+            <a:r>
+              <a:rPr lang="ru-RU" dirty="0" smtClean="0"/>
+              <a:t>такую систему можно построить с использованием методов компьютерного зрения</a:t>
+            </a:r>
+          </a:p>
+          <a:p>
+            <a:r>
+              <a:rPr lang="ru-RU" dirty="0" smtClean="0"/>
+              <a:t>одна из решаемых задач – определение </a:t>
+            </a:r>
+            <a:r>
+              <a:rPr lang="ru-RU" dirty="0"/>
+              <a:t>углов наклона и поворота </a:t>
+            </a:r>
+            <a:r>
+              <a:rPr lang="ru-RU" dirty="0" smtClean="0"/>
+              <a:t>камеры</a:t>
+            </a:r>
+            <a:endParaRPr lang="ru-RU" dirty="0"/>
           </a:p>
         </p:txBody>
       </p:sp>
@@ -3335,35 +4841,100 @@
         </p:nvSpPr>
         <p:spPr/>
         <p:txBody>
+          <a:bodyPr/>
+          <a:lstStyle/>
+          <a:p>
+            <a:r>
+              <a:rPr lang="ru-RU" dirty="0" smtClean="0"/>
+              <a:t>Постановка задачи</a:t>
+            </a:r>
+            <a:endParaRPr lang="ru-RU" dirty="0"/>
+          </a:p>
+        </p:txBody>
+      </p:sp>
+      <p:sp>
+        <p:nvSpPr>
+          <p:cNvPr id="3" name="Содержимое 2"/>
+          <p:cNvSpPr>
+            <a:spLocks noGrp="1"/>
+          </p:cNvSpPr>
+          <p:nvPr>
+            <p:ph idx="1"/>
+          </p:nvPr>
+        </p:nvSpPr>
+        <p:spPr/>
+        <p:txBody>
           <a:bodyPr>
-            <a:normAutofit fontScale="90000"/>
+            <a:normAutofit fontScale="92500" lnSpcReduction="20000"/>
           </a:bodyPr>
           <a:lstStyle/>
           <a:p>
             <a:r>
               <a:rPr lang="ru-RU" dirty="0" smtClean="0"/>
-              <a:t>Существующие аналоги систем навигации</a:t>
-            </a:r>
-            <a:endParaRPr lang="ru-RU" dirty="0"/>
-          </a:p>
-        </p:txBody>
-      </p:sp>
-      <p:sp>
-        <p:nvSpPr>
-          <p:cNvPr id="3" name="Содержимое 2"/>
-          <p:cNvSpPr>
-            <a:spLocks noGrp="1"/>
-          </p:cNvSpPr>
-          <p:nvPr>
-            <p:ph idx="1"/>
-          </p:nvPr>
-        </p:nvSpPr>
-        <p:spPr/>
-        <p:txBody>
-          <a:bodyPr/>
-          <a:lstStyle/>
-          <a:p>
-            <a:endParaRPr lang="ru-RU"/>
+              <a:t>реализация метода, предложенного </a:t>
+            </a:r>
+            <a:r>
+              <a:rPr lang="ru-RU" dirty="0"/>
+              <a:t>Вилле </a:t>
+            </a:r>
+            <a:r>
+              <a:rPr lang="ru-RU" dirty="0" err="1"/>
+              <a:t>Хуттуненом</a:t>
+            </a:r>
+            <a:r>
+              <a:rPr lang="ru-RU" dirty="0"/>
+              <a:t> и Робертом </a:t>
+            </a:r>
+            <a:r>
+              <a:rPr lang="ru-RU" dirty="0" err="1"/>
+              <a:t>Пише</a:t>
+            </a:r>
+            <a:r>
+              <a:rPr lang="ru-RU" dirty="0"/>
+              <a:t> [</a:t>
+            </a:r>
+            <a:r>
+              <a:rPr lang="en-US" b="1" dirty="0"/>
+              <a:t>Link</a:t>
+            </a:r>
+            <a:r>
+              <a:rPr lang="ru-RU" b="1" dirty="0"/>
+              <a:t>1</a:t>
+            </a:r>
+            <a:r>
+              <a:rPr lang="ru-RU" dirty="0" smtClean="0"/>
+              <a:t>]</a:t>
+            </a:r>
+          </a:p>
+          <a:p>
+            <a:r>
+              <a:rPr lang="ru-RU" dirty="0" smtClean="0"/>
+              <a:t>проверка работоспособности на изображениях внутренних помещений</a:t>
+            </a:r>
+          </a:p>
+          <a:p>
+            <a:r>
+              <a:rPr lang="ru-RU" dirty="0" smtClean="0"/>
+              <a:t>перенос метода в условия городской среды</a:t>
+            </a:r>
+          </a:p>
+          <a:p>
+            <a:r>
+              <a:rPr lang="ru-RU" dirty="0" smtClean="0"/>
+              <a:t>проведение тестирования на наборе изображений городской застройки</a:t>
+            </a:r>
+          </a:p>
+          <a:p>
+            <a:r>
+              <a:rPr lang="ru-RU" dirty="0" smtClean="0"/>
+              <a:t>тестирование на наборе «плохих» с точки зрения специфики метода изображениях</a:t>
+            </a:r>
+          </a:p>
+          <a:p>
+            <a:r>
+              <a:rPr lang="ru-RU" dirty="0" smtClean="0"/>
+              <a:t>анализ проблем</a:t>
+            </a:r>
           </a:p>
         </p:txBody>
       </p:sp>
@@ -3404,12 +4975,14 @@
         </p:nvSpPr>
         <p:spPr/>
         <p:txBody>
-          <a:bodyPr/>
-          <a:lstStyle/>
-          <a:p>
-            <a:r>
-              <a:rPr lang="ru-RU" dirty="0" smtClean="0"/>
-              <a:t>Кратко о методе</a:t>
+          <a:bodyPr>
+            <a:normAutofit fontScale="90000"/>
+          </a:bodyPr>
+          <a:lstStyle/>
+          <a:p>
+            <a:r>
+              <a:rPr lang="ru-RU" dirty="0" smtClean="0"/>
+              <a:t>Распространенные способы решения задачи позиционирования</a:t>
             </a:r>
             <a:endParaRPr lang="ru-RU" dirty="0"/>
           </a:p>
@@ -3430,7 +5003,23 @@
           <a:bodyPr/>
           <a:lstStyle/>
           <a:p>
-            <a:endParaRPr lang="ru-RU"/>
+            <a:r>
+              <a:rPr lang="ru-RU" dirty="0" smtClean="0"/>
+              <a:t>спутниковые системы навигации</a:t>
+            </a:r>
+          </a:p>
+          <a:p>
+            <a:r>
+              <a:rPr lang="ru-RU" dirty="0" smtClean="0"/>
+              <a:t>инерциальные системы навигации</a:t>
+            </a:r>
+          </a:p>
+          <a:p>
+            <a:r>
+              <a:rPr lang="ru-RU" dirty="0" smtClean="0"/>
+              <a:t>системы локального позиционирования</a:t>
+            </a:r>
+            <a:endParaRPr lang="ru-RU" dirty="0"/>
           </a:p>
         </p:txBody>
       </p:sp>
@@ -3471,35 +5060,110 @@
         </p:nvSpPr>
         <p:spPr/>
         <p:txBody>
+          <a:bodyPr/>
+          <a:lstStyle/>
+          <a:p>
+            <a:r>
+              <a:rPr lang="ru-RU" dirty="0" smtClean="0"/>
+              <a:t>Спутниковые системы навигации</a:t>
+            </a:r>
+            <a:endParaRPr lang="ru-RU" dirty="0"/>
+          </a:p>
+        </p:txBody>
+      </p:sp>
+      <p:sp>
+        <p:nvSpPr>
+          <p:cNvPr id="3" name="Содержимое 2"/>
+          <p:cNvSpPr>
+            <a:spLocks noGrp="1"/>
+          </p:cNvSpPr>
+          <p:nvPr>
+            <p:ph idx="1"/>
+          </p:nvPr>
+        </p:nvSpPr>
+        <p:spPr/>
+        <p:txBody>
           <a:bodyPr>
-            <a:normAutofit fontScale="90000"/>
+            <a:normAutofit fontScale="77500" lnSpcReduction="20000"/>
           </a:bodyPr>
           <a:lstStyle/>
           <a:p>
             <a:r>
-              <a:rPr lang="ru-RU" dirty="0" smtClean="0"/>
-              <a:t>Существующие аналоги, также использующие методы компьютерного зрения</a:t>
+              <a:rPr lang="en-US" dirty="0" smtClean="0"/>
+              <a:t>GPS</a:t>
+            </a:r>
+            <a:r>
+              <a:rPr lang="ru-RU" dirty="0"/>
+              <a:t>, </a:t>
+            </a:r>
+            <a:r>
+              <a:rPr lang="en-US" dirty="0" err="1"/>
+              <a:t>GLONASS</a:t>
+            </a:r>
+            <a:r>
+              <a:rPr lang="ru-RU" dirty="0"/>
+              <a:t>, </a:t>
+            </a:r>
+            <a:r>
+              <a:rPr lang="en-US" dirty="0"/>
+              <a:t>GALILEO</a:t>
+            </a:r>
+            <a:r>
+              <a:rPr lang="ru-RU" dirty="0"/>
+              <a:t> и другие их </a:t>
+            </a:r>
+            <a:r>
+              <a:rPr lang="ru-RU" dirty="0" smtClean="0"/>
+              <a:t>аналоги</a:t>
+            </a:r>
+          </a:p>
+          <a:p>
+            <a:r>
+              <a:rPr lang="ru-RU" dirty="0" smtClean="0"/>
+              <a:t>плюсы:</a:t>
+            </a:r>
+          </a:p>
+          <a:p>
+            <a:pPr lvl="1"/>
+            <a:r>
+              <a:rPr lang="ru-RU" dirty="0" smtClean="0"/>
+              <a:t>универсальность, доступны почти везде и всегда</a:t>
+            </a:r>
+          </a:p>
+          <a:p>
+            <a:pPr lvl="1"/>
+            <a:r>
+              <a:rPr lang="ru-RU" dirty="0" smtClean="0"/>
+              <a:t>является пассивной системой – требуются минимальные вычисления со стороны приемника</a:t>
+            </a:r>
+          </a:p>
+          <a:p>
+            <a:pPr lvl="1"/>
+            <a:r>
+              <a:rPr lang="ru-RU" dirty="0" smtClean="0"/>
+              <a:t>не имеет дрейфа</a:t>
+            </a:r>
+          </a:p>
+          <a:p>
+            <a:r>
+              <a:rPr lang="ru-RU" dirty="0" smtClean="0"/>
+              <a:t>минусы:</a:t>
+            </a:r>
+          </a:p>
+          <a:p>
+            <a:pPr lvl="1"/>
+            <a:r>
+              <a:rPr lang="ru-RU" dirty="0" smtClean="0"/>
+              <a:t>погрешность порядка 5-15 метров – слишком высокая для объектов, чьи линейные размеры не превышают нескольких метров</a:t>
+            </a:r>
+          </a:p>
+          <a:p>
+            <a:pPr lvl="1"/>
+            <a:r>
+              <a:rPr lang="ru-RU" dirty="0" smtClean="0"/>
+              <a:t>увеличение погрешности или невозможность использования в условиях городской застройки, внутри помещений, внутри тоннелей, под землей и даже под густой листвой</a:t>
             </a:r>
             <a:endParaRPr lang="ru-RU" dirty="0"/>
-          </a:p>
-        </p:txBody>
-      </p:sp>
-      <p:sp>
-        <p:nvSpPr>
-          <p:cNvPr id="3" name="Содержимое 2"/>
-          <p:cNvSpPr>
-            <a:spLocks noGrp="1"/>
-          </p:cNvSpPr>
-          <p:nvPr>
-            <p:ph idx="1"/>
-          </p:nvPr>
-        </p:nvSpPr>
-        <p:spPr/>
-        <p:txBody>
-          <a:bodyPr/>
-          <a:lstStyle/>
-          <a:p>
-            <a:endParaRPr lang="ru-RU"/>
           </a:p>
         </p:txBody>
       </p:sp>
@@ -3540,12 +5204,14 @@
         </p:nvSpPr>
         <p:spPr/>
         <p:txBody>
-          <a:bodyPr/>
-          <a:lstStyle/>
-          <a:p>
-            <a:r>
-              <a:rPr lang="ru-RU" dirty="0" smtClean="0"/>
-              <a:t>Кратко о реализации</a:t>
+          <a:bodyPr>
+            <a:normAutofit fontScale="90000"/>
+          </a:bodyPr>
+          <a:lstStyle/>
+          <a:p>
+            <a:r>
+              <a:rPr lang="ru-RU" dirty="0" smtClean="0"/>
+              <a:t>Инерциальные системы навигации</a:t>
             </a:r>
             <a:endParaRPr lang="ru-RU" dirty="0"/>
           </a:p>
@@ -3563,10 +5229,83 @@
         </p:nvSpPr>
         <p:spPr/>
         <p:txBody>
-          <a:bodyPr/>
-          <a:lstStyle/>
-          <a:p>
-            <a:endParaRPr lang="ru-RU"/>
+          <a:bodyPr>
+            <a:normAutofit fontScale="77500" lnSpcReduction="20000"/>
+          </a:bodyPr>
+          <a:lstStyle/>
+          <a:p>
+            <a:r>
+              <a:rPr lang="ru-RU" dirty="0"/>
+              <a:t>содержат акселерометры для определения параметров линейного </a:t>
+            </a:r>
+            <a:r>
+              <a:rPr lang="ru-RU" dirty="0" smtClean="0"/>
+              <a:t>ускорения и гироскоп для </a:t>
+            </a:r>
+            <a:r>
+              <a:rPr lang="ru-RU" dirty="0"/>
+              <a:t>определения углов поворота и наклона</a:t>
+            </a:r>
+            <a:endParaRPr lang="ru-RU" dirty="0" smtClean="0"/>
+          </a:p>
+          <a:p>
+            <a:r>
+              <a:rPr lang="ru-RU" dirty="0" smtClean="0"/>
+              <a:t>плюсы:</a:t>
+            </a:r>
+          </a:p>
+          <a:p>
+            <a:pPr lvl="1"/>
+            <a:r>
+              <a:rPr lang="ru-RU" dirty="0" smtClean="0"/>
+              <a:t>автономность</a:t>
+            </a:r>
+          </a:p>
+          <a:p>
+            <a:pPr lvl="1"/>
+            <a:r>
+              <a:rPr lang="ru-RU" dirty="0" smtClean="0"/>
+              <a:t>помехозащищенность</a:t>
+            </a:r>
+          </a:p>
+          <a:p>
+            <a:pPr lvl="1"/>
+            <a:r>
+              <a:rPr lang="ru-RU" dirty="0" smtClean="0"/>
+              <a:t>возможность </a:t>
+            </a:r>
+            <a:r>
+              <a:rPr lang="ru-RU" dirty="0"/>
+              <a:t>полной автоматизации всех процессов </a:t>
+            </a:r>
+            <a:r>
+              <a:rPr lang="ru-RU" dirty="0" smtClean="0"/>
+              <a:t>навигации</a:t>
+            </a:r>
+          </a:p>
+          <a:p>
+            <a:pPr lvl="1"/>
+            <a:r>
+              <a:rPr lang="ru-RU" dirty="0" smtClean="0"/>
+              <a:t>низкое энергопотребление</a:t>
+            </a:r>
+          </a:p>
+          <a:p>
+            <a:r>
+              <a:rPr lang="ru-RU" dirty="0" smtClean="0"/>
+              <a:t>минусы:</a:t>
+            </a:r>
+          </a:p>
+          <a:p>
+            <a:pPr lvl="1"/>
+            <a:r>
+              <a:rPr lang="ru-RU" dirty="0" smtClean="0"/>
+              <a:t>наличие дрейфа – накопление ошибки </a:t>
+            </a:r>
+            <a:r>
+              <a:rPr lang="ru-RU" dirty="0"/>
+              <a:t>со временем работы. Различными техниками можно уменьшить величину ошибки, но не избавиться вовсе.</a:t>
+            </a:r>
           </a:p>
         </p:txBody>
       </p:sp>
@@ -3607,12 +5346,14 @@
         </p:nvSpPr>
         <p:spPr/>
         <p:txBody>
-          <a:bodyPr/>
-          <a:lstStyle/>
-          <a:p>
-            <a:r>
-              <a:rPr lang="ru-RU" dirty="0" smtClean="0"/>
-              <a:t>Структура приложения</a:t>
+          <a:bodyPr>
+            <a:normAutofit fontScale="90000"/>
+          </a:bodyPr>
+          <a:lstStyle/>
+          <a:p>
+            <a:r>
+              <a:rPr lang="ru-RU" dirty="0" smtClean="0"/>
+              <a:t>Системы локального позиционирования</a:t>
             </a:r>
             <a:endParaRPr lang="ru-RU" dirty="0"/>
           </a:p>
@@ -3633,7 +5374,41 @@
           <a:bodyPr/>
           <a:lstStyle/>
           <a:p>
-            <a:endParaRPr lang="ru-RU"/>
+            <a:r>
+              <a:rPr lang="ru-RU" dirty="0"/>
+              <a:t>использование технологий построения трехмерной карты окружающей </a:t>
+            </a:r>
+            <a:r>
+              <a:rPr lang="ru-RU" dirty="0" smtClean="0"/>
+              <a:t>среды:</a:t>
+            </a:r>
+          </a:p>
+          <a:p>
+            <a:pPr lvl="1"/>
+            <a:r>
+              <a:rPr lang="ru-RU" dirty="0" smtClean="0"/>
+              <a:t>на основе данных </a:t>
+            </a:r>
+            <a:r>
+              <a:rPr lang="ru-RU" dirty="0" err="1"/>
+              <a:t>эхолокации</a:t>
+            </a:r>
+            <a:r>
+              <a:rPr lang="ru-RU" dirty="0"/>
+              <a:t> инфракрасными или ультразвуковыми </a:t>
+            </a:r>
+            <a:r>
+              <a:rPr lang="ru-RU" dirty="0" smtClean="0"/>
+              <a:t>датчиками</a:t>
+            </a:r>
+          </a:p>
+          <a:p>
+            <a:pPr lvl="1"/>
+            <a:r>
+              <a:rPr lang="ru-RU" dirty="0" smtClean="0"/>
+              <a:t>на основе фотографических данных методами компьютерного зрения</a:t>
+            </a:r>
+            <a:endParaRPr lang="ru-RU" dirty="0"/>
           </a:p>
         </p:txBody>
       </p:sp>
@@ -3672,14 +5447,25 @@
             <p:ph type="title"/>
           </p:nvPr>
         </p:nvSpPr>
-        <p:spPr/>
-        <p:txBody>
-          <a:bodyPr/>
-          <a:lstStyle/>
-          <a:p>
-            <a:r>
-              <a:rPr lang="ru-RU" dirty="0" smtClean="0"/>
-              <a:t>Тестовые данные</a:t>
+        <p:spPr>
+          <a:xfrm>
+            <a:off x="323528" y="274638"/>
+            <a:ext cx="8568952" cy="1498178"/>
+          </a:xfrm>
+        </p:spPr>
+        <p:txBody>
+          <a:bodyPr>
+            <a:normAutofit fontScale="90000"/>
+          </a:bodyPr>
+          <a:lstStyle/>
+          <a:p>
+            <a:r>
+              <a:rPr lang="ru-RU" dirty="0" smtClean="0"/>
+              <a:t>Методы компьютерного зрения, использующиеся в системах по</a:t>
+            </a:r>
+            <a:r>
+              <a:rPr lang="ru-RU" dirty="0" smtClean="0"/>
+              <a:t>зиционирования</a:t>
             </a:r>
             <a:endParaRPr lang="ru-RU" dirty="0"/>
           </a:p>
@@ -3695,12 +5481,62 @@
             <p:ph idx="1"/>
           </p:nvPr>
         </p:nvSpPr>
-        <p:spPr/>
-        <p:txBody>
-          <a:bodyPr/>
-          <a:lstStyle/>
-          <a:p>
-            <a:endParaRPr lang="ru-RU"/>
+        <p:spPr>
+          <a:xfrm>
+            <a:off x="457200" y="1988840"/>
+            <a:ext cx="8229600" cy="4137323"/>
+          </a:xfrm>
+        </p:spPr>
+        <p:txBody>
+          <a:bodyPr/>
+          <a:lstStyle/>
+          <a:p>
+            <a:r>
+              <a:rPr lang="ru-RU" dirty="0"/>
+              <a:t>метод одновременной навигации и картирования (</a:t>
+            </a:r>
+            <a:r>
+              <a:rPr lang="en-US" dirty="0"/>
+              <a:t>simultaneous localization and mapping</a:t>
+            </a:r>
+            <a:r>
+              <a:rPr lang="ru-RU" dirty="0"/>
+              <a:t>, </a:t>
+            </a:r>
+            <a:r>
+              <a:rPr lang="en-US" dirty="0"/>
+              <a:t>SLAM</a:t>
+            </a:r>
+            <a:r>
+              <a:rPr lang="ru-RU" dirty="0" smtClean="0"/>
+              <a:t>)</a:t>
+            </a:r>
+          </a:p>
+          <a:p>
+            <a:r>
+              <a:rPr lang="ru-RU" dirty="0" smtClean="0"/>
+              <a:t>метод </a:t>
+            </a:r>
+            <a:r>
+              <a:rPr lang="ru-RU" dirty="0"/>
+              <a:t>определения структуры объекта в процессе движения (</a:t>
+            </a:r>
+            <a:r>
+              <a:rPr lang="en-US" dirty="0"/>
+              <a:t>structure from motion</a:t>
+            </a:r>
+            <a:r>
+              <a:rPr lang="ru-RU" dirty="0"/>
+              <a:t>, </a:t>
+            </a:r>
+            <a:r>
+              <a:rPr lang="en-US" dirty="0" err="1"/>
+              <a:t>SfM</a:t>
+            </a:r>
+            <a:r>
+              <a:rPr lang="ru-RU" dirty="0"/>
+              <a:t>)</a:t>
+            </a:r>
           </a:p>
         </p:txBody>
       </p:sp>
@@ -3741,36 +5577,54 @@
         </p:nvSpPr>
         <p:spPr/>
         <p:txBody>
-          <a:bodyPr/>
-          <a:lstStyle/>
-          <a:p>
-            <a:r>
-              <a:rPr lang="ru-RU" dirty="0" smtClean="0"/>
-              <a:t>Результаты на тестовых данных</a:t>
+          <a:bodyPr>
+            <a:normAutofit fontScale="90000"/>
+          </a:bodyPr>
+          <a:lstStyle/>
+          <a:p>
+            <a:r>
+              <a:rPr lang="ru-RU" dirty="0" smtClean="0"/>
+              <a:t>Пример результат</a:t>
+            </a:r>
+            <a:r>
+              <a:rPr lang="ru-RU" dirty="0"/>
+              <a:t>а</a:t>
+            </a:r>
+            <a:r>
+              <a:rPr lang="ru-RU" dirty="0" smtClean="0"/>
+              <a:t> работы метода </a:t>
+            </a:r>
+            <a:r>
+              <a:rPr lang="en-US" dirty="0" smtClean="0"/>
+              <a:t>SLAM</a:t>
             </a:r>
             <a:endParaRPr lang="ru-RU" dirty="0"/>
           </a:p>
         </p:txBody>
       </p:sp>
-      <p:sp>
-        <p:nvSpPr>
-          <p:cNvPr id="3" name="Содержимое 2"/>
-          <p:cNvSpPr>
-            <a:spLocks noGrp="1"/>
-          </p:cNvSpPr>
+      <p:pic>
+        <p:nvPicPr>
+          <p:cNvPr id="4" name="Содержимое 3" descr="slam_example.jpg"/>
+          <p:cNvPicPr>
+            <a:picLocks noGrp="1" noChangeAspect="1"/>
+          </p:cNvPicPr>
           <p:nvPr>
             <p:ph idx="1"/>
           </p:nvPr>
-        </p:nvSpPr>
-        <p:spPr/>
-        <p:txBody>
-          <a:bodyPr/>
-          <a:lstStyle/>
-          <a:p>
-            <a:endParaRPr lang="ru-RU"/>
-          </a:p>
-        </p:txBody>
-      </p:sp>
+        </p:nvPicPr>
+        <p:blipFill>
+          <a:blip r:embed="rId2" cstate="print"/>
+          <a:stretch>
+            <a:fillRect/>
+          </a:stretch>
+        </p:blipFill>
+        <p:spPr>
+          <a:xfrm>
+            <a:off x="950694" y="1484784"/>
+            <a:ext cx="7077690" cy="4949049"/>
+          </a:xfrm>
+        </p:spPr>
+      </p:pic>
     </p:spTree>
   </p:cSld>
   <p:clrMapOvr>

</xml_diff>

<commit_message>
+ tuesday midday continue on presentation
</commit_message>
<xml_diff>
--- a/presentation.pptx
+++ b/presentation.pptx
@@ -4,25 +4,28 @@
   <p:sldMasterIdLst>
     <p:sldMasterId id="2147483648" r:id="rId1"/>
   </p:sldMasterIdLst>
+  <p:notesMasterIdLst>
+    <p:notesMasterId r:id="rId21"/>
+  </p:notesMasterIdLst>
   <p:sldIdLst>
     <p:sldId id="256" r:id="rId2"/>
-    <p:sldId id="257" r:id="rId3"/>
-    <p:sldId id="267" r:id="rId4"/>
-    <p:sldId id="265" r:id="rId5"/>
-    <p:sldId id="270" r:id="rId6"/>
-    <p:sldId id="271" r:id="rId7"/>
-    <p:sldId id="272" r:id="rId8"/>
-    <p:sldId id="266" r:id="rId9"/>
-    <p:sldId id="273" r:id="rId10"/>
-    <p:sldId id="277" r:id="rId11"/>
-    <p:sldId id="274" r:id="rId12"/>
-    <p:sldId id="275" r:id="rId13"/>
-    <p:sldId id="278" r:id="rId14"/>
-    <p:sldId id="276" r:id="rId15"/>
-    <p:sldId id="261" r:id="rId16"/>
-    <p:sldId id="279" r:id="rId17"/>
-    <p:sldId id="262" r:id="rId18"/>
-    <p:sldId id="263" r:id="rId19"/>
+    <p:sldId id="265" r:id="rId3"/>
+    <p:sldId id="270" r:id="rId4"/>
+    <p:sldId id="271" r:id="rId5"/>
+    <p:sldId id="272" r:id="rId6"/>
+    <p:sldId id="257" r:id="rId7"/>
+    <p:sldId id="267" r:id="rId8"/>
+    <p:sldId id="274" r:id="rId9"/>
+    <p:sldId id="283" r:id="rId10"/>
+    <p:sldId id="280" r:id="rId11"/>
+    <p:sldId id="281" r:id="rId12"/>
+    <p:sldId id="261" r:id="rId13"/>
+    <p:sldId id="275" r:id="rId14"/>
+    <p:sldId id="279" r:id="rId15"/>
+    <p:sldId id="278" r:id="rId16"/>
+    <p:sldId id="262" r:id="rId17"/>
+    <p:sldId id="263" r:id="rId18"/>
+    <p:sldId id="282" r:id="rId19"/>
     <p:sldId id="264" r:id="rId20"/>
   </p:sldIdLst>
   <p:sldSz cx="9144000" cy="6858000" type="screen4x3"/>
@@ -127,6 +130,7 @@
 
 <file path=ppt/charts/chart1.xml><?xml version="1.0" encoding="utf-8"?>
 <c:chartSpace xmlns:c="http://schemas.openxmlformats.org/drawingml/2006/chart" xmlns:a="http://schemas.openxmlformats.org/drawingml/2006/main" xmlns:r="http://schemas.openxmlformats.org/officeDocument/2006/relationships">
+  <c:date1904 val="1"/>
   <c:lang val="ru-RU"/>
   <c:chart>
     <c:title>
@@ -177,13 +181,13 @@
                 <c:formatCode>General</c:formatCode>
                 <c:ptCount val="9"/>
                 <c:pt idx="0">
-                  <c:v>0.13453294649086756</c:v>
+                  <c:v>0.13453294649086761</c:v>
                 </c:pt>
                 <c:pt idx="1">
-                  <c:v>5.6453063177152778</c:v>
+                  <c:v>5.645306317715276</c:v>
                 </c:pt>
                 <c:pt idx="2">
-                  <c:v>11.156079688939693</c:v>
+                  <c:v>11.156079688939696</c:v>
                 </c:pt>
                 <c:pt idx="3">
                   <c:v>16.666853060164105</c:v>
@@ -192,13 +196,13 @@
                   <c:v>22.177626431388514</c:v>
                 </c:pt>
                 <c:pt idx="5">
-                  <c:v>27.688399802612921</c:v>
+                  <c:v>27.688399802612913</c:v>
                 </c:pt>
                 <c:pt idx="6">
                   <c:v>33.199173173837337</c:v>
                 </c:pt>
                 <c:pt idx="7">
-                  <c:v>38.709946545061754</c:v>
+                  <c:v>38.709946545061761</c:v>
                 </c:pt>
               </c:numCache>
             </c:numRef>
@@ -262,13 +266,13 @@
                 <c:formatCode>General</c:formatCode>
                 <c:ptCount val="9"/>
                 <c:pt idx="0">
-                  <c:v>0.13453294649086756</c:v>
+                  <c:v>0.13453294649086761</c:v>
                 </c:pt>
                 <c:pt idx="1">
-                  <c:v>5.6453063177152778</c:v>
+                  <c:v>5.645306317715276</c:v>
                 </c:pt>
                 <c:pt idx="2">
-                  <c:v>11.156079688939693</c:v>
+                  <c:v>11.156079688939696</c:v>
                 </c:pt>
                 <c:pt idx="3">
                   <c:v>16.666853060164105</c:v>
@@ -277,13 +281,13 @@
                   <c:v>22.177626431388514</c:v>
                 </c:pt>
                 <c:pt idx="5">
-                  <c:v>27.688399802612921</c:v>
+                  <c:v>27.688399802612913</c:v>
                 </c:pt>
                 <c:pt idx="6">
                   <c:v>33.199173173837337</c:v>
                 </c:pt>
                 <c:pt idx="7">
-                  <c:v>38.709946545061754</c:v>
+                  <c:v>38.709946545061761</c:v>
                 </c:pt>
               </c:numCache>
             </c:numRef>
@@ -347,13 +351,13 @@
                 <c:formatCode>General</c:formatCode>
                 <c:ptCount val="9"/>
                 <c:pt idx="0">
-                  <c:v>0.13453294649086756</c:v>
+                  <c:v>0.13453294649086761</c:v>
                 </c:pt>
                 <c:pt idx="1">
-                  <c:v>5.6453063177152778</c:v>
+                  <c:v>5.645306317715276</c:v>
                 </c:pt>
                 <c:pt idx="2">
-                  <c:v>11.156079688939693</c:v>
+                  <c:v>11.156079688939696</c:v>
                 </c:pt>
                 <c:pt idx="3">
                   <c:v>16.666853060164105</c:v>
@@ -362,13 +366,13 @@
                   <c:v>22.177626431388514</c:v>
                 </c:pt>
                 <c:pt idx="5">
-                  <c:v>27.688399802612921</c:v>
+                  <c:v>27.688399802612913</c:v>
                 </c:pt>
                 <c:pt idx="6">
                   <c:v>33.199173173837337</c:v>
                 </c:pt>
                 <c:pt idx="7">
-                  <c:v>38.709946545061754</c:v>
+                  <c:v>38.709946545061761</c:v>
                 </c:pt>
               </c:numCache>
             </c:numRef>
@@ -411,11 +415,11 @@
           </c:yVal>
           <c:smooth val="1"/>
         </c:ser>
-        <c:axId val="47544576"/>
-        <c:axId val="47575040"/>
+        <c:axId val="45870080"/>
+        <c:axId val="49226496"/>
       </c:scatterChart>
       <c:valAx>
-        <c:axId val="47544576"/>
+        <c:axId val="45870080"/>
         <c:scaling>
           <c:orientation val="minMax"/>
         </c:scaling>
@@ -432,12 +436,12 @@
             <a:endParaRPr lang="ru-RU"/>
           </a:p>
         </c:txPr>
-        <c:crossAx val="47575040"/>
+        <c:crossAx val="49226496"/>
         <c:crosses val="autoZero"/>
         <c:crossBetween val="midCat"/>
       </c:valAx>
       <c:valAx>
-        <c:axId val="47575040"/>
+        <c:axId val="49226496"/>
         <c:scaling>
           <c:orientation val="minMax"/>
         </c:scaling>
@@ -455,7 +459,7 @@
             <a:endParaRPr lang="ru-RU"/>
           </a:p>
         </c:txPr>
-        <c:crossAx val="47544576"/>
+        <c:crossAx val="45870080"/>
         <c:crosses val="autoZero"/>
         <c:crossBetween val="midCat"/>
       </c:valAx>
@@ -532,16 +536,16 @@
                 <c:formatCode>General</c:formatCode>
                 <c:ptCount val="9"/>
                 <c:pt idx="0">
-                  <c:v>0.3941954012462775</c:v>
+                  <c:v>0.39419540124627761</c:v>
                 </c:pt>
                 <c:pt idx="1">
-                  <c:v>7.0408578466579108</c:v>
+                  <c:v>7.0408578466579073</c:v>
                 </c:pt>
                 <c:pt idx="2">
                   <c:v>13.687520292069546</c:v>
                 </c:pt>
                 <c:pt idx="3">
-                  <c:v>20.334182737481186</c:v>
+                  <c:v>20.334182737481193</c:v>
                 </c:pt>
                 <c:pt idx="4">
                   <c:v>26.980845182892818</c:v>
@@ -550,10 +554,10 @@
                   <c:v>33.62750762830445</c:v>
                 </c:pt>
                 <c:pt idx="6">
-                  <c:v>40.274170073716078</c:v>
+                  <c:v>40.274170073716064</c:v>
                 </c:pt>
                 <c:pt idx="7">
-                  <c:v>46.920832519127728</c:v>
+                  <c:v>46.920832519127742</c:v>
                 </c:pt>
               </c:numCache>
             </c:numRef>
@@ -617,16 +621,16 @@
                 <c:formatCode>General</c:formatCode>
                 <c:ptCount val="9"/>
                 <c:pt idx="0">
-                  <c:v>0.3941954012462775</c:v>
+                  <c:v>0.39419540124627761</c:v>
                 </c:pt>
                 <c:pt idx="1">
-                  <c:v>7.0408578466579108</c:v>
+                  <c:v>7.0408578466579073</c:v>
                 </c:pt>
                 <c:pt idx="2">
                   <c:v>13.687520292069546</c:v>
                 </c:pt>
                 <c:pt idx="3">
-                  <c:v>20.334182737481186</c:v>
+                  <c:v>20.334182737481193</c:v>
                 </c:pt>
                 <c:pt idx="4">
                   <c:v>26.980845182892818</c:v>
@@ -635,10 +639,10 @@
                   <c:v>33.62750762830445</c:v>
                 </c:pt>
                 <c:pt idx="6">
-                  <c:v>40.274170073716078</c:v>
+                  <c:v>40.274170073716064</c:v>
                 </c:pt>
                 <c:pt idx="7">
-                  <c:v>46.920832519127728</c:v>
+                  <c:v>46.920832519127742</c:v>
                 </c:pt>
               </c:numCache>
             </c:numRef>
@@ -702,16 +706,16 @@
                 <c:formatCode>General</c:formatCode>
                 <c:ptCount val="9"/>
                 <c:pt idx="0">
-                  <c:v>0.3941954012462775</c:v>
+                  <c:v>0.39419540124627761</c:v>
                 </c:pt>
                 <c:pt idx="1">
-                  <c:v>7.0408578466579108</c:v>
+                  <c:v>7.0408578466579073</c:v>
                 </c:pt>
                 <c:pt idx="2">
                   <c:v>13.687520292069546</c:v>
                 </c:pt>
                 <c:pt idx="3">
-                  <c:v>20.334182737481186</c:v>
+                  <c:v>20.334182737481193</c:v>
                 </c:pt>
                 <c:pt idx="4">
                   <c:v>26.980845182892818</c:v>
@@ -720,10 +724,10 @@
                   <c:v>33.62750762830445</c:v>
                 </c:pt>
                 <c:pt idx="6">
-                  <c:v>40.274170073716078</c:v>
+                  <c:v>40.274170073716064</c:v>
                 </c:pt>
                 <c:pt idx="7">
-                  <c:v>46.920832519127728</c:v>
+                  <c:v>46.920832519127742</c:v>
                 </c:pt>
               </c:numCache>
             </c:numRef>
@@ -766,11 +770,11 @@
           </c:yVal>
           <c:smooth val="1"/>
         </c:ser>
-        <c:axId val="67029248"/>
-        <c:axId val="67048576"/>
+        <c:axId val="49260800"/>
+        <c:axId val="49270784"/>
       </c:scatterChart>
       <c:valAx>
-        <c:axId val="67029248"/>
+        <c:axId val="49260800"/>
         <c:scaling>
           <c:orientation val="minMax"/>
         </c:scaling>
@@ -787,12 +791,12 @@
             <a:endParaRPr lang="ru-RU"/>
           </a:p>
         </c:txPr>
-        <c:crossAx val="67048576"/>
+        <c:crossAx val="49270784"/>
         <c:crosses val="autoZero"/>
         <c:crossBetween val="midCat"/>
       </c:valAx>
       <c:valAx>
-        <c:axId val="67048576"/>
+        <c:axId val="49270784"/>
         <c:scaling>
           <c:orientation val="minMax"/>
         </c:scaling>
@@ -810,7 +814,7 @@
             <a:endParaRPr lang="ru-RU"/>
           </a:p>
         </c:txPr>
-        <c:crossAx val="67029248"/>
+        <c:crossAx val="49260800"/>
         <c:crosses val="autoZero"/>
         <c:crossBetween val="midCat"/>
       </c:valAx>
@@ -833,6 +837,595 @@
   </c:chart>
   <c:externalData r:id="rId1"/>
 </c:chartSpace>
+</file>
+
+<file path=ppt/notesMasters/notesMaster1.xml><?xml version="1.0" encoding="utf-8"?>
+<p:notesMaster xmlns:a="http://schemas.openxmlformats.org/drawingml/2006/main" xmlns:r="http://schemas.openxmlformats.org/officeDocument/2006/relationships" xmlns:p="http://schemas.openxmlformats.org/presentationml/2006/main">
+  <p:cSld>
+    <p:bg>
+      <p:bgRef idx="1001">
+        <a:schemeClr val="bg1"/>
+      </p:bgRef>
+    </p:bg>
+    <p:spTree>
+      <p:nvGrpSpPr>
+        <p:cNvPr id="1" name=""/>
+        <p:cNvGrpSpPr/>
+        <p:nvPr/>
+      </p:nvGrpSpPr>
+      <p:grpSpPr>
+        <a:xfrm>
+          <a:off x="0" y="0"/>
+          <a:ext cx="0" cy="0"/>
+          <a:chOff x="0" y="0"/>
+          <a:chExt cx="0" cy="0"/>
+        </a:xfrm>
+      </p:grpSpPr>
+      <p:sp>
+        <p:nvSpPr>
+          <p:cNvPr id="2" name="Верхний колонтитул 1"/>
+          <p:cNvSpPr>
+            <a:spLocks noGrp="1"/>
+          </p:cNvSpPr>
+          <p:nvPr>
+            <p:ph type="hdr" sz="quarter"/>
+          </p:nvPr>
+        </p:nvSpPr>
+        <p:spPr>
+          <a:xfrm>
+            <a:off x="0" y="0"/>
+            <a:ext cx="2971800" cy="457200"/>
+          </a:xfrm>
+          <a:prstGeom prst="rect">
+            <a:avLst/>
+          </a:prstGeom>
+        </p:spPr>
+        <p:txBody>
+          <a:bodyPr vert="horz" lIns="91440" tIns="45720" rIns="91440" bIns="45720" rtlCol="0"/>
+          <a:lstStyle>
+            <a:lvl1pPr algn="l">
+              <a:defRPr sz="1200"/>
+            </a:lvl1pPr>
+          </a:lstStyle>
+          <a:p>
+            <a:endParaRPr lang="ru-RU"/>
+          </a:p>
+        </p:txBody>
+      </p:sp>
+      <p:sp>
+        <p:nvSpPr>
+          <p:cNvPr id="3" name="Дата 2"/>
+          <p:cNvSpPr>
+            <a:spLocks noGrp="1"/>
+          </p:cNvSpPr>
+          <p:nvPr>
+            <p:ph type="dt" idx="1"/>
+          </p:nvPr>
+        </p:nvSpPr>
+        <p:spPr>
+          <a:xfrm>
+            <a:off x="3884613" y="0"/>
+            <a:ext cx="2971800" cy="457200"/>
+          </a:xfrm>
+          <a:prstGeom prst="rect">
+            <a:avLst/>
+          </a:prstGeom>
+        </p:spPr>
+        <p:txBody>
+          <a:bodyPr vert="horz" lIns="91440" tIns="45720" rIns="91440" bIns="45720" rtlCol="0"/>
+          <a:lstStyle>
+            <a:lvl1pPr algn="r">
+              <a:defRPr sz="1200"/>
+            </a:lvl1pPr>
+          </a:lstStyle>
+          <a:p>
+            <a:fld id="{EFC40B54-B27A-4958-8F10-57DB79714519}" type="datetimeFigureOut">
+              <a:rPr lang="ru-RU" smtClean="0"/>
+              <a:pPr/>
+              <a:t>02.06.2015</a:t>
+            </a:fld>
+            <a:endParaRPr lang="ru-RU"/>
+          </a:p>
+        </p:txBody>
+      </p:sp>
+      <p:sp>
+        <p:nvSpPr>
+          <p:cNvPr id="4" name="Образ слайда 3"/>
+          <p:cNvSpPr>
+            <a:spLocks noGrp="1" noRot="1" noChangeAspect="1"/>
+          </p:cNvSpPr>
+          <p:nvPr>
+            <p:ph type="sldImg" idx="2"/>
+          </p:nvPr>
+        </p:nvSpPr>
+        <p:spPr>
+          <a:xfrm>
+            <a:off x="1143000" y="685800"/>
+            <a:ext cx="4572000" cy="3429000"/>
+          </a:xfrm>
+          <a:prstGeom prst="rect">
+            <a:avLst/>
+          </a:prstGeom>
+          <a:noFill/>
+          <a:ln w="12700">
+            <a:solidFill>
+              <a:prstClr val="black"/>
+            </a:solidFill>
+          </a:ln>
+        </p:spPr>
+        <p:txBody>
+          <a:bodyPr vert="horz" lIns="91440" tIns="45720" rIns="91440" bIns="45720" rtlCol="0" anchor="ctr"/>
+          <a:lstStyle/>
+          <a:p>
+            <a:endParaRPr lang="ru-RU"/>
+          </a:p>
+        </p:txBody>
+      </p:sp>
+      <p:sp>
+        <p:nvSpPr>
+          <p:cNvPr id="5" name="Заметки 4"/>
+          <p:cNvSpPr>
+            <a:spLocks noGrp="1"/>
+          </p:cNvSpPr>
+          <p:nvPr>
+            <p:ph type="body" sz="quarter" idx="3"/>
+          </p:nvPr>
+        </p:nvSpPr>
+        <p:spPr>
+          <a:xfrm>
+            <a:off x="685800" y="4343400"/>
+            <a:ext cx="5486400" cy="4114800"/>
+          </a:xfrm>
+          <a:prstGeom prst="rect">
+            <a:avLst/>
+          </a:prstGeom>
+        </p:spPr>
+        <p:txBody>
+          <a:bodyPr vert="horz" lIns="91440" tIns="45720" rIns="91440" bIns="45720" rtlCol="0">
+            <a:normAutofit/>
+          </a:bodyPr>
+          <a:lstStyle/>
+          <a:p>
+            <a:pPr lvl="0"/>
+            <a:r>
+              <a:rPr lang="ru-RU" smtClean="0"/>
+              <a:t>Образец текста</a:t>
+            </a:r>
+          </a:p>
+          <a:p>
+            <a:pPr lvl="1"/>
+            <a:r>
+              <a:rPr lang="ru-RU" smtClean="0"/>
+              <a:t>Второй уровень</a:t>
+            </a:r>
+          </a:p>
+          <a:p>
+            <a:pPr lvl="2"/>
+            <a:r>
+              <a:rPr lang="ru-RU" smtClean="0"/>
+              <a:t>Третий уровень</a:t>
+            </a:r>
+          </a:p>
+          <a:p>
+            <a:pPr lvl="3"/>
+            <a:r>
+              <a:rPr lang="ru-RU" smtClean="0"/>
+              <a:t>Четвертый уровень</a:t>
+            </a:r>
+          </a:p>
+          <a:p>
+            <a:pPr lvl="4"/>
+            <a:r>
+              <a:rPr lang="ru-RU" smtClean="0"/>
+              <a:t>Пятый уровень</a:t>
+            </a:r>
+            <a:endParaRPr lang="ru-RU"/>
+          </a:p>
+        </p:txBody>
+      </p:sp>
+      <p:sp>
+        <p:nvSpPr>
+          <p:cNvPr id="6" name="Нижний колонтитул 5"/>
+          <p:cNvSpPr>
+            <a:spLocks noGrp="1"/>
+          </p:cNvSpPr>
+          <p:nvPr>
+            <p:ph type="ftr" sz="quarter" idx="4"/>
+          </p:nvPr>
+        </p:nvSpPr>
+        <p:spPr>
+          <a:xfrm>
+            <a:off x="0" y="8685213"/>
+            <a:ext cx="2971800" cy="457200"/>
+          </a:xfrm>
+          <a:prstGeom prst="rect">
+            <a:avLst/>
+          </a:prstGeom>
+        </p:spPr>
+        <p:txBody>
+          <a:bodyPr vert="horz" lIns="91440" tIns="45720" rIns="91440" bIns="45720" rtlCol="0" anchor="b"/>
+          <a:lstStyle>
+            <a:lvl1pPr algn="l">
+              <a:defRPr sz="1200"/>
+            </a:lvl1pPr>
+          </a:lstStyle>
+          <a:p>
+            <a:endParaRPr lang="ru-RU"/>
+          </a:p>
+        </p:txBody>
+      </p:sp>
+      <p:sp>
+        <p:nvSpPr>
+          <p:cNvPr id="7" name="Номер слайда 6"/>
+          <p:cNvSpPr>
+            <a:spLocks noGrp="1"/>
+          </p:cNvSpPr>
+          <p:nvPr>
+            <p:ph type="sldNum" sz="quarter" idx="5"/>
+          </p:nvPr>
+        </p:nvSpPr>
+        <p:spPr>
+          <a:xfrm>
+            <a:off x="3884613" y="8685213"/>
+            <a:ext cx="2971800" cy="457200"/>
+          </a:xfrm>
+          <a:prstGeom prst="rect">
+            <a:avLst/>
+          </a:prstGeom>
+        </p:spPr>
+        <p:txBody>
+          <a:bodyPr vert="horz" lIns="91440" tIns="45720" rIns="91440" bIns="45720" rtlCol="0" anchor="b"/>
+          <a:lstStyle>
+            <a:lvl1pPr algn="r">
+              <a:defRPr sz="1200"/>
+            </a:lvl1pPr>
+          </a:lstStyle>
+          <a:p>
+            <a:fld id="{FD38BDC0-7F5F-4F6D-B2CA-25DAD62565D8}" type="slidenum">
+              <a:rPr lang="ru-RU" smtClean="0"/>
+              <a:pPr/>
+              <a:t>‹#›</a:t>
+            </a:fld>
+            <a:endParaRPr lang="ru-RU"/>
+          </a:p>
+        </p:txBody>
+      </p:sp>
+    </p:spTree>
+  </p:cSld>
+  <p:clrMap bg1="lt1" tx1="dk1" bg2="lt2" tx2="dk2" accent1="accent1" accent2="accent2" accent3="accent3" accent4="accent4" accent5="accent5" accent6="accent6" hlink="hlink" folHlink="folHlink"/>
+  <p:notesStyle>
+    <a:lvl1pPr marL="0" algn="l" defTabSz="914400" rtl="0" eaLnBrk="1" latinLnBrk="0" hangingPunct="1">
+      <a:defRPr sz="1200" kern="1200">
+        <a:solidFill>
+          <a:schemeClr val="tx1"/>
+        </a:solidFill>
+        <a:latin typeface="+mn-lt"/>
+        <a:ea typeface="+mn-ea"/>
+        <a:cs typeface="+mn-cs"/>
+      </a:defRPr>
+    </a:lvl1pPr>
+    <a:lvl2pPr marL="457200" algn="l" defTabSz="914400" rtl="0" eaLnBrk="1" latinLnBrk="0" hangingPunct="1">
+      <a:defRPr sz="1200" kern="1200">
+        <a:solidFill>
+          <a:schemeClr val="tx1"/>
+        </a:solidFill>
+        <a:latin typeface="+mn-lt"/>
+        <a:ea typeface="+mn-ea"/>
+        <a:cs typeface="+mn-cs"/>
+      </a:defRPr>
+    </a:lvl2pPr>
+    <a:lvl3pPr marL="914400" algn="l" defTabSz="914400" rtl="0" eaLnBrk="1" latinLnBrk="0" hangingPunct="1">
+      <a:defRPr sz="1200" kern="1200">
+        <a:solidFill>
+          <a:schemeClr val="tx1"/>
+        </a:solidFill>
+        <a:latin typeface="+mn-lt"/>
+        <a:ea typeface="+mn-ea"/>
+        <a:cs typeface="+mn-cs"/>
+      </a:defRPr>
+    </a:lvl3pPr>
+    <a:lvl4pPr marL="1371600" algn="l" defTabSz="914400" rtl="0" eaLnBrk="1" latinLnBrk="0" hangingPunct="1">
+      <a:defRPr sz="1200" kern="1200">
+        <a:solidFill>
+          <a:schemeClr val="tx1"/>
+        </a:solidFill>
+        <a:latin typeface="+mn-lt"/>
+        <a:ea typeface="+mn-ea"/>
+        <a:cs typeface="+mn-cs"/>
+      </a:defRPr>
+    </a:lvl4pPr>
+    <a:lvl5pPr marL="1828800" algn="l" defTabSz="914400" rtl="0" eaLnBrk="1" latinLnBrk="0" hangingPunct="1">
+      <a:defRPr sz="1200" kern="1200">
+        <a:solidFill>
+          <a:schemeClr val="tx1"/>
+        </a:solidFill>
+        <a:latin typeface="+mn-lt"/>
+        <a:ea typeface="+mn-ea"/>
+        <a:cs typeface="+mn-cs"/>
+      </a:defRPr>
+    </a:lvl5pPr>
+    <a:lvl6pPr marL="2286000" algn="l" defTabSz="914400" rtl="0" eaLnBrk="1" latinLnBrk="0" hangingPunct="1">
+      <a:defRPr sz="1200" kern="1200">
+        <a:solidFill>
+          <a:schemeClr val="tx1"/>
+        </a:solidFill>
+        <a:latin typeface="+mn-lt"/>
+        <a:ea typeface="+mn-ea"/>
+        <a:cs typeface="+mn-cs"/>
+      </a:defRPr>
+    </a:lvl6pPr>
+    <a:lvl7pPr marL="2743200" algn="l" defTabSz="914400" rtl="0" eaLnBrk="1" latinLnBrk="0" hangingPunct="1">
+      <a:defRPr sz="1200" kern="1200">
+        <a:solidFill>
+          <a:schemeClr val="tx1"/>
+        </a:solidFill>
+        <a:latin typeface="+mn-lt"/>
+        <a:ea typeface="+mn-ea"/>
+        <a:cs typeface="+mn-cs"/>
+      </a:defRPr>
+    </a:lvl7pPr>
+    <a:lvl8pPr marL="3200400" algn="l" defTabSz="914400" rtl="0" eaLnBrk="1" latinLnBrk="0" hangingPunct="1">
+      <a:defRPr sz="1200" kern="1200">
+        <a:solidFill>
+          <a:schemeClr val="tx1"/>
+        </a:solidFill>
+        <a:latin typeface="+mn-lt"/>
+        <a:ea typeface="+mn-ea"/>
+        <a:cs typeface="+mn-cs"/>
+      </a:defRPr>
+    </a:lvl8pPr>
+    <a:lvl9pPr marL="3657600" algn="l" defTabSz="914400" rtl="0" eaLnBrk="1" latinLnBrk="0" hangingPunct="1">
+      <a:defRPr sz="1200" kern="1200">
+        <a:solidFill>
+          <a:schemeClr val="tx1"/>
+        </a:solidFill>
+        <a:latin typeface="+mn-lt"/>
+        <a:ea typeface="+mn-ea"/>
+        <a:cs typeface="+mn-cs"/>
+      </a:defRPr>
+    </a:lvl9pPr>
+  </p:notesStyle>
+</p:notesMaster>
+</file>
+
+<file path=ppt/notesSlides/notesSlide1.xml><?xml version="1.0" encoding="utf-8"?>
+<p:notes xmlns:a="http://schemas.openxmlformats.org/drawingml/2006/main" xmlns:r="http://schemas.openxmlformats.org/officeDocument/2006/relationships" xmlns:p="http://schemas.openxmlformats.org/presentationml/2006/main">
+  <p:cSld>
+    <p:spTree>
+      <p:nvGrpSpPr>
+        <p:cNvPr id="1" name=""/>
+        <p:cNvGrpSpPr/>
+        <p:nvPr/>
+      </p:nvGrpSpPr>
+      <p:grpSpPr>
+        <a:xfrm>
+          <a:off x="0" y="0"/>
+          <a:ext cx="0" cy="0"/>
+          <a:chOff x="0" y="0"/>
+          <a:chExt cx="0" cy="0"/>
+        </a:xfrm>
+      </p:grpSpPr>
+      <p:sp>
+        <p:nvSpPr>
+          <p:cNvPr id="2" name="Образ слайда 1"/>
+          <p:cNvSpPr>
+            <a:spLocks noGrp="1" noRot="1" noChangeAspect="1"/>
+          </p:cNvSpPr>
+          <p:nvPr>
+            <p:ph type="sldImg"/>
+          </p:nvPr>
+        </p:nvSpPr>
+        <p:spPr/>
+      </p:sp>
+      <p:sp>
+        <p:nvSpPr>
+          <p:cNvPr id="3" name="Заметки 2"/>
+          <p:cNvSpPr>
+            <a:spLocks noGrp="1"/>
+          </p:cNvSpPr>
+          <p:nvPr>
+            <p:ph type="body" idx="1"/>
+          </p:nvPr>
+        </p:nvSpPr>
+        <p:spPr/>
+        <p:txBody>
+          <a:bodyPr>
+            <a:normAutofit/>
+          </a:bodyPr>
+          <a:lstStyle/>
+          <a:p>
+            <a:r>
+              <a:rPr lang="en-US" dirty="0" smtClean="0"/>
+              <a:t>* </a:t>
+            </a:r>
+            <a:r>
+              <a:rPr lang="ru-RU" dirty="0" smtClean="0"/>
+              <a:t>решает задачу определения трехмерной ориентации монокулярной камеры путем нахождения точек схождения перспективы, обнаруженных на изображении</a:t>
+            </a:r>
+          </a:p>
+          <a:p>
+            <a:r>
+              <a:rPr lang="en-US" dirty="0" smtClean="0"/>
+              <a:t>* </a:t>
+            </a:r>
+            <a:r>
+              <a:rPr lang="ru-RU" dirty="0" smtClean="0"/>
+              <a:t>предполагается, что точки схождения перспективы образованы проекциями линий, образующих ортогональную систему</a:t>
+            </a:r>
+          </a:p>
+          <a:p>
+            <a:r>
+              <a:rPr lang="en-US" dirty="0" smtClean="0"/>
+              <a:t>* </a:t>
+            </a:r>
+            <a:r>
+              <a:rPr lang="ru-RU" dirty="0" smtClean="0"/>
+              <a:t>такая ситуация возможна, например, внутри помещений, где хорошо выделяются линии, образованные стенами, полом и потолком, а также предметами интерьера, расположенными параллельно или ортогонально им</a:t>
+            </a:r>
+          </a:p>
+          <a:p>
+            <a:r>
+              <a:rPr lang="en-US" dirty="0" smtClean="0"/>
+              <a:t>* </a:t>
+            </a:r>
+            <a:r>
+              <a:rPr lang="ru-RU" dirty="0" smtClean="0"/>
+              <a:t>предположение можно расширить на изображения городской застройки,  которая обычно  ведется на декартовой сетке, а дома имеют форму параллелепипедов</a:t>
+            </a:r>
+            <a:endParaRPr lang="ru-RU" dirty="0"/>
+          </a:p>
+        </p:txBody>
+      </p:sp>
+      <p:sp>
+        <p:nvSpPr>
+          <p:cNvPr id="4" name="Номер слайда 3"/>
+          <p:cNvSpPr>
+            <a:spLocks noGrp="1"/>
+          </p:cNvSpPr>
+          <p:nvPr>
+            <p:ph type="sldNum" sz="quarter" idx="10"/>
+          </p:nvPr>
+        </p:nvSpPr>
+        <p:spPr/>
+        <p:txBody>
+          <a:bodyPr/>
+          <a:lstStyle/>
+          <a:p>
+            <a:fld id="{FD38BDC0-7F5F-4F6D-B2CA-25DAD62565D8}" type="slidenum">
+              <a:rPr lang="ru-RU" smtClean="0"/>
+              <a:pPr/>
+              <a:t>8</a:t>
+            </a:fld>
+            <a:endParaRPr lang="ru-RU"/>
+          </a:p>
+        </p:txBody>
+      </p:sp>
+    </p:spTree>
+  </p:cSld>
+  <p:clrMapOvr>
+    <a:masterClrMapping/>
+  </p:clrMapOvr>
+</p:notes>
+</file>
+
+<file path=ppt/notesSlides/notesSlide2.xml><?xml version="1.0" encoding="utf-8"?>
+<p:notes xmlns:a="http://schemas.openxmlformats.org/drawingml/2006/main" xmlns:r="http://schemas.openxmlformats.org/officeDocument/2006/relationships" xmlns:p="http://schemas.openxmlformats.org/presentationml/2006/main">
+  <p:cSld>
+    <p:spTree>
+      <p:nvGrpSpPr>
+        <p:cNvPr id="1" name=""/>
+        <p:cNvGrpSpPr/>
+        <p:nvPr/>
+      </p:nvGrpSpPr>
+      <p:grpSpPr>
+        <a:xfrm>
+          <a:off x="0" y="0"/>
+          <a:ext cx="0" cy="0"/>
+          <a:chOff x="0" y="0"/>
+          <a:chExt cx="0" cy="0"/>
+        </a:xfrm>
+      </p:grpSpPr>
+      <p:sp>
+        <p:nvSpPr>
+          <p:cNvPr id="2" name="Образ слайда 1"/>
+          <p:cNvSpPr>
+            <a:spLocks noGrp="1" noRot="1" noChangeAspect="1"/>
+          </p:cNvSpPr>
+          <p:nvPr>
+            <p:ph type="sldImg"/>
+          </p:nvPr>
+        </p:nvSpPr>
+        <p:spPr/>
+      </p:sp>
+      <p:sp>
+        <p:nvSpPr>
+          <p:cNvPr id="3" name="Заметки 2"/>
+          <p:cNvSpPr>
+            <a:spLocks noGrp="1"/>
+          </p:cNvSpPr>
+          <p:nvPr>
+            <p:ph type="body" idx="1"/>
+          </p:nvPr>
+        </p:nvSpPr>
+        <p:spPr/>
+        <p:txBody>
+          <a:bodyPr>
+            <a:normAutofit/>
+          </a:bodyPr>
+          <a:lstStyle/>
+          <a:p>
+            <a:r>
+              <a:rPr lang="en-US" dirty="0" smtClean="0"/>
+              <a:t>* </a:t>
+            </a:r>
+            <a:r>
+              <a:rPr lang="ru-RU" dirty="0" smtClean="0"/>
+              <a:t>решает задачу определения трехмерной ориентации монокулярной камеры путем нахождения точек схождения перспективы, обнаруженных на изображении</a:t>
+            </a:r>
+          </a:p>
+          <a:p>
+            <a:r>
+              <a:rPr lang="en-US" dirty="0" smtClean="0"/>
+              <a:t>* </a:t>
+            </a:r>
+            <a:r>
+              <a:rPr lang="ru-RU" dirty="0" smtClean="0"/>
+              <a:t>предполагается, что точки схождения перспективы образованы проекциями линий, образующих ортогональную систему</a:t>
+            </a:r>
+          </a:p>
+          <a:p>
+            <a:r>
+              <a:rPr lang="en-US" dirty="0" smtClean="0"/>
+              <a:t>* </a:t>
+            </a:r>
+            <a:r>
+              <a:rPr lang="ru-RU" dirty="0" smtClean="0"/>
+              <a:t>такая ситуация возможна, например, внутри помещений, где хорошо выделяются линии, образованные стенами, полом и потолком, а также предметами интерьера, расположенными параллельно или ортогонально им</a:t>
+            </a:r>
+          </a:p>
+          <a:p>
+            <a:r>
+              <a:rPr lang="en-US" dirty="0" smtClean="0"/>
+              <a:t>* </a:t>
+            </a:r>
+            <a:r>
+              <a:rPr lang="ru-RU" dirty="0" smtClean="0"/>
+              <a:t>предположение можно расширить на изображения городской застройки,  которая обычно  ведется на декартовой сетке, а дома имеют форму параллелепипедов</a:t>
+            </a:r>
+            <a:endParaRPr lang="ru-RU" dirty="0"/>
+          </a:p>
+        </p:txBody>
+      </p:sp>
+      <p:sp>
+        <p:nvSpPr>
+          <p:cNvPr id="4" name="Номер слайда 3"/>
+          <p:cNvSpPr>
+            <a:spLocks noGrp="1"/>
+          </p:cNvSpPr>
+          <p:nvPr>
+            <p:ph type="sldNum" sz="quarter" idx="10"/>
+          </p:nvPr>
+        </p:nvSpPr>
+        <p:spPr/>
+        <p:txBody>
+          <a:bodyPr/>
+          <a:lstStyle/>
+          <a:p>
+            <a:fld id="{FD38BDC0-7F5F-4F6D-B2CA-25DAD62565D8}" type="slidenum">
+              <a:rPr lang="ru-RU" smtClean="0"/>
+              <a:pPr/>
+              <a:t>9</a:t>
+            </a:fld>
+            <a:endParaRPr lang="ru-RU"/>
+          </a:p>
+        </p:txBody>
+      </p:sp>
+    </p:spTree>
+  </p:cSld>
+  <p:clrMapOvr>
+    <a:masterClrMapping/>
+  </p:clrMapOvr>
+</p:notes>
 </file>
 
 <file path=ppt/slideLayouts/slideLayout1.xml><?xml version="1.0" encoding="utf-8"?>
@@ -1016,7 +1609,8 @@
           <a:p>
             <a:fld id="{749B8E95-59D6-4D5D-A45B-3A830F7C86C5}" type="datetimeFigureOut">
               <a:rPr lang="ru-RU" smtClean="0"/>
-              <a:t>01.06.2015</a:t>
+              <a:pPr/>
+              <a:t>02.06.2015</a:t>
             </a:fld>
             <a:endParaRPr lang="ru-RU"/>
           </a:p>
@@ -1058,6 +1652,7 @@
           <a:p>
             <a:fld id="{954A7B01-00E0-40D2-9DD2-38C8B44D0DE7}" type="slidenum">
               <a:rPr lang="ru-RU" smtClean="0"/>
+              <a:pPr/>
               <a:t>‹#›</a:t>
             </a:fld>
             <a:endParaRPr lang="ru-RU"/>
@@ -1181,7 +1776,8 @@
           <a:p>
             <a:fld id="{749B8E95-59D6-4D5D-A45B-3A830F7C86C5}" type="datetimeFigureOut">
               <a:rPr lang="ru-RU" smtClean="0"/>
-              <a:t>01.06.2015</a:t>
+              <a:pPr/>
+              <a:t>02.06.2015</a:t>
             </a:fld>
             <a:endParaRPr lang="ru-RU"/>
           </a:p>
@@ -1223,6 +1819,7 @@
           <a:p>
             <a:fld id="{954A7B01-00E0-40D2-9DD2-38C8B44D0DE7}" type="slidenum">
               <a:rPr lang="ru-RU" smtClean="0"/>
+              <a:pPr/>
               <a:t>‹#›</a:t>
             </a:fld>
             <a:endParaRPr lang="ru-RU"/>
@@ -1356,7 +1953,8 @@
           <a:p>
             <a:fld id="{749B8E95-59D6-4D5D-A45B-3A830F7C86C5}" type="datetimeFigureOut">
               <a:rPr lang="ru-RU" smtClean="0"/>
-              <a:t>01.06.2015</a:t>
+              <a:pPr/>
+              <a:t>02.06.2015</a:t>
             </a:fld>
             <a:endParaRPr lang="ru-RU"/>
           </a:p>
@@ -1398,6 +1996,7 @@
           <a:p>
             <a:fld id="{954A7B01-00E0-40D2-9DD2-38C8B44D0DE7}" type="slidenum">
               <a:rPr lang="ru-RU" smtClean="0"/>
+              <a:pPr/>
               <a:t>‹#›</a:t>
             </a:fld>
             <a:endParaRPr lang="ru-RU"/>
@@ -1521,7 +2120,8 @@
           <a:p>
             <a:fld id="{749B8E95-59D6-4D5D-A45B-3A830F7C86C5}" type="datetimeFigureOut">
               <a:rPr lang="ru-RU" smtClean="0"/>
-              <a:t>01.06.2015</a:t>
+              <a:pPr/>
+              <a:t>02.06.2015</a:t>
             </a:fld>
             <a:endParaRPr lang="ru-RU"/>
           </a:p>
@@ -1563,6 +2163,7 @@
           <a:p>
             <a:fld id="{954A7B01-00E0-40D2-9DD2-38C8B44D0DE7}" type="slidenum">
               <a:rPr lang="ru-RU" smtClean="0"/>
+              <a:pPr/>
               <a:t>‹#›</a:t>
             </a:fld>
             <a:endParaRPr lang="ru-RU"/>
@@ -1762,7 +2363,8 @@
           <a:p>
             <a:fld id="{749B8E95-59D6-4D5D-A45B-3A830F7C86C5}" type="datetimeFigureOut">
               <a:rPr lang="ru-RU" smtClean="0"/>
-              <a:t>01.06.2015</a:t>
+              <a:pPr/>
+              <a:t>02.06.2015</a:t>
             </a:fld>
             <a:endParaRPr lang="ru-RU"/>
           </a:p>
@@ -1804,6 +2406,7 @@
           <a:p>
             <a:fld id="{954A7B01-00E0-40D2-9DD2-38C8B44D0DE7}" type="slidenum">
               <a:rPr lang="ru-RU" smtClean="0"/>
+              <a:pPr/>
               <a:t>‹#›</a:t>
             </a:fld>
             <a:endParaRPr lang="ru-RU"/>
@@ -2045,7 +2648,8 @@
           <a:p>
             <a:fld id="{749B8E95-59D6-4D5D-A45B-3A830F7C86C5}" type="datetimeFigureOut">
               <a:rPr lang="ru-RU" smtClean="0"/>
-              <a:t>01.06.2015</a:t>
+              <a:pPr/>
+              <a:t>02.06.2015</a:t>
             </a:fld>
             <a:endParaRPr lang="ru-RU"/>
           </a:p>
@@ -2087,6 +2691,7 @@
           <a:p>
             <a:fld id="{954A7B01-00E0-40D2-9DD2-38C8B44D0DE7}" type="slidenum">
               <a:rPr lang="ru-RU" smtClean="0"/>
+              <a:pPr/>
               <a:t>‹#›</a:t>
             </a:fld>
             <a:endParaRPr lang="ru-RU"/>
@@ -2462,7 +3067,8 @@
           <a:p>
             <a:fld id="{749B8E95-59D6-4D5D-A45B-3A830F7C86C5}" type="datetimeFigureOut">
               <a:rPr lang="ru-RU" smtClean="0"/>
-              <a:t>01.06.2015</a:t>
+              <a:pPr/>
+              <a:t>02.06.2015</a:t>
             </a:fld>
             <a:endParaRPr lang="ru-RU"/>
           </a:p>
@@ -2504,6 +3110,7 @@
           <a:p>
             <a:fld id="{954A7B01-00E0-40D2-9DD2-38C8B44D0DE7}" type="slidenum">
               <a:rPr lang="ru-RU" smtClean="0"/>
+              <a:pPr/>
               <a:t>‹#›</a:t>
             </a:fld>
             <a:endParaRPr lang="ru-RU"/>
@@ -2575,7 +3182,8 @@
           <a:p>
             <a:fld id="{749B8E95-59D6-4D5D-A45B-3A830F7C86C5}" type="datetimeFigureOut">
               <a:rPr lang="ru-RU" smtClean="0"/>
-              <a:t>01.06.2015</a:t>
+              <a:pPr/>
+              <a:t>02.06.2015</a:t>
             </a:fld>
             <a:endParaRPr lang="ru-RU"/>
           </a:p>
@@ -2617,6 +3225,7 @@
           <a:p>
             <a:fld id="{954A7B01-00E0-40D2-9DD2-38C8B44D0DE7}" type="slidenum">
               <a:rPr lang="ru-RU" smtClean="0"/>
+              <a:pPr/>
               <a:t>‹#›</a:t>
             </a:fld>
             <a:endParaRPr lang="ru-RU"/>
@@ -2665,7 +3274,8 @@
           <a:p>
             <a:fld id="{749B8E95-59D6-4D5D-A45B-3A830F7C86C5}" type="datetimeFigureOut">
               <a:rPr lang="ru-RU" smtClean="0"/>
-              <a:t>01.06.2015</a:t>
+              <a:pPr/>
+              <a:t>02.06.2015</a:t>
             </a:fld>
             <a:endParaRPr lang="ru-RU"/>
           </a:p>
@@ -2707,6 +3317,7 @@
           <a:p>
             <a:fld id="{954A7B01-00E0-40D2-9DD2-38C8B44D0DE7}" type="slidenum">
               <a:rPr lang="ru-RU" smtClean="0"/>
+              <a:pPr/>
               <a:t>‹#›</a:t>
             </a:fld>
             <a:endParaRPr lang="ru-RU"/>
@@ -2937,7 +3548,8 @@
           <a:p>
             <a:fld id="{749B8E95-59D6-4D5D-A45B-3A830F7C86C5}" type="datetimeFigureOut">
               <a:rPr lang="ru-RU" smtClean="0"/>
-              <a:t>01.06.2015</a:t>
+              <a:pPr/>
+              <a:t>02.06.2015</a:t>
             </a:fld>
             <a:endParaRPr lang="ru-RU"/>
           </a:p>
@@ -2979,6 +3591,7 @@
           <a:p>
             <a:fld id="{954A7B01-00E0-40D2-9DD2-38C8B44D0DE7}" type="slidenum">
               <a:rPr lang="ru-RU" smtClean="0"/>
+              <a:pPr/>
               <a:t>‹#›</a:t>
             </a:fld>
             <a:endParaRPr lang="ru-RU"/>
@@ -3185,7 +3798,8 @@
           <a:p>
             <a:fld id="{749B8E95-59D6-4D5D-A45B-3A830F7C86C5}" type="datetimeFigureOut">
               <a:rPr lang="ru-RU" smtClean="0"/>
-              <a:t>01.06.2015</a:t>
+              <a:pPr/>
+              <a:t>02.06.2015</a:t>
             </a:fld>
             <a:endParaRPr lang="ru-RU"/>
           </a:p>
@@ -3227,6 +3841,7 @@
           <a:p>
             <a:fld id="{954A7B01-00E0-40D2-9DD2-38C8B44D0DE7}" type="slidenum">
               <a:rPr lang="ru-RU" smtClean="0"/>
+              <a:pPr/>
               <a:t>‹#›</a:t>
             </a:fld>
             <a:endParaRPr lang="ru-RU"/>
@@ -3393,7 +4008,8 @@
           <a:p>
             <a:fld id="{749B8E95-59D6-4D5D-A45B-3A830F7C86C5}" type="datetimeFigureOut">
               <a:rPr lang="ru-RU" smtClean="0"/>
-              <a:t>01.06.2015</a:t>
+              <a:pPr/>
+              <a:t>02.06.2015</a:t>
             </a:fld>
             <a:endParaRPr lang="ru-RU"/>
           </a:p>
@@ -3471,6 +4087,7 @@
           <a:p>
             <a:fld id="{954A7B01-00E0-40D2-9DD2-38C8B44D0DE7}" type="slidenum">
               <a:rPr lang="ru-RU" smtClean="0"/>
+              <a:pPr/>
               <a:t>‹#›</a:t>
             </a:fld>
             <a:endParaRPr lang="ru-RU"/>
@@ -3775,23 +4392,24 @@
         </p:nvSpPr>
         <p:spPr>
           <a:xfrm>
-            <a:off x="685800" y="1268761"/>
-            <a:ext cx="7772400" cy="2331690"/>
+            <a:off x="683568" y="2420888"/>
+            <a:ext cx="7772400" cy="2304256"/>
           </a:xfrm>
         </p:spPr>
         <p:txBody>
           <a:bodyPr>
-            <a:normAutofit fontScale="90000"/>
+            <a:normAutofit/>
           </a:bodyPr>
           <a:lstStyle/>
           <a:p>
             <a:r>
               <a:rPr lang="ru-RU" dirty="0"/>
-              <a:t>Ориентация монокулярной камеры с использованием точек схождения перспективы</a:t>
-            </a:r>
-            <a:br>
-              <a:rPr lang="ru-RU" dirty="0"/>
-            </a:br>
+              <a:t>Ориентация монокулярной камеры с использованием точек схождения </a:t>
+            </a:r>
+            <a:r>
+              <a:rPr lang="ru-RU" dirty="0" smtClean="0"/>
+              <a:t>перспективы</a:t>
+            </a:r>
             <a:endParaRPr lang="ru-RU" dirty="0"/>
           </a:p>
         </p:txBody>
@@ -3806,12 +4424,445 @@
             <p:ph type="subTitle" idx="1"/>
           </p:nvPr>
         </p:nvSpPr>
-        <p:spPr/>
-        <p:txBody>
-          <a:bodyPr/>
-          <a:lstStyle/>
-          <a:p>
-            <a:endParaRPr lang="ru-RU"/>
+        <p:spPr>
+          <a:xfrm>
+            <a:off x="5940152" y="4941168"/>
+            <a:ext cx="2880320" cy="792088"/>
+          </a:xfrm>
+        </p:spPr>
+        <p:txBody>
+          <a:bodyPr>
+            <a:normAutofit/>
+          </a:bodyPr>
+          <a:lstStyle/>
+          <a:p>
+            <a:pPr algn="l"/>
+            <a:r>
+              <a:rPr lang="ru-RU" sz="1800" dirty="0" smtClean="0">
+                <a:solidFill>
+                  <a:schemeClr val="tx1"/>
+                </a:solidFill>
+              </a:rPr>
+              <a:t>Выполнил: </a:t>
+            </a:r>
+            <a:r>
+              <a:rPr lang="ru-RU" sz="1800" dirty="0" err="1" smtClean="0">
+                <a:solidFill>
+                  <a:schemeClr val="tx1"/>
+                </a:solidFill>
+              </a:rPr>
+              <a:t>Кудеров</a:t>
+            </a:r>
+            <a:r>
+              <a:rPr lang="ru-RU" sz="1800" dirty="0" smtClean="0">
+                <a:solidFill>
+                  <a:schemeClr val="tx1"/>
+                </a:solidFill>
+              </a:rPr>
+              <a:t> П.В.</a:t>
+            </a:r>
+          </a:p>
+          <a:p>
+            <a:pPr algn="l"/>
+            <a:r>
+              <a:rPr lang="ru-RU" sz="1800" dirty="0" smtClean="0">
+                <a:solidFill>
+                  <a:schemeClr val="tx1"/>
+                </a:solidFill>
+              </a:rPr>
+              <a:t>Проверил: </a:t>
+            </a:r>
+            <a:r>
+              <a:rPr lang="ru-RU" sz="1800" dirty="0" err="1" smtClean="0">
+                <a:solidFill>
+                  <a:schemeClr val="tx1"/>
+                </a:solidFill>
+              </a:rPr>
+              <a:t>Домрачева</a:t>
+            </a:r>
+            <a:r>
+              <a:rPr lang="ru-RU" sz="1800" dirty="0" smtClean="0">
+                <a:solidFill>
+                  <a:schemeClr val="tx1"/>
+                </a:solidFill>
+              </a:rPr>
+              <a:t> А.Б.</a:t>
+            </a:r>
+            <a:endParaRPr lang="ru-RU" sz="1800" dirty="0">
+              <a:solidFill>
+                <a:schemeClr val="tx1"/>
+              </a:solidFill>
+            </a:endParaRPr>
+          </a:p>
+        </p:txBody>
+      </p:sp>
+      <p:sp>
+        <p:nvSpPr>
+          <p:cNvPr id="4" name="TextBox 3"/>
+          <p:cNvSpPr txBox="1"/>
+          <p:nvPr/>
+        </p:nvSpPr>
+        <p:spPr>
+          <a:xfrm>
+            <a:off x="1331640" y="476672"/>
+            <a:ext cx="6552728" cy="369332"/>
+          </a:xfrm>
+          <a:prstGeom prst="rect">
+            <a:avLst/>
+          </a:prstGeom>
+          <a:noFill/>
+        </p:spPr>
+        <p:txBody>
+          <a:bodyPr wrap="square" rtlCol="0">
+            <a:spAutoFit/>
+          </a:bodyPr>
+          <a:lstStyle/>
+          <a:p>
+            <a:endParaRPr lang="ru-RU" dirty="0"/>
+          </a:p>
+        </p:txBody>
+      </p:sp>
+      <p:graphicFrame>
+        <p:nvGraphicFramePr>
+          <p:cNvPr id="5" name="Таблица 4"/>
+          <p:cNvGraphicFramePr>
+            <a:graphicFrameLocks noGrp="1"/>
+          </p:cNvGraphicFramePr>
+          <p:nvPr/>
+        </p:nvGraphicFramePr>
+        <p:xfrm>
+          <a:off x="467544" y="548680"/>
+          <a:ext cx="8352928" cy="1224136"/>
+        </p:xfrm>
+        <a:graphic>
+          <a:graphicData uri="http://schemas.openxmlformats.org/drawingml/2006/table">
+            <a:tbl>
+              <a:tblPr/>
+              <a:tblGrid>
+                <a:gridCol w="1880280"/>
+                <a:gridCol w="6472648"/>
+              </a:tblGrid>
+              <a:tr h="1224136">
+                <a:tc>
+                  <a:txBody>
+                    <a:bodyPr/>
+                    <a:lstStyle/>
+                    <a:p>
+                      <a:pPr algn="ctr">
+                        <a:spcBef>
+                          <a:spcPts val="1200"/>
+                        </a:spcBef>
+                        <a:spcAft>
+                          <a:spcPts val="1200"/>
+                        </a:spcAft>
+                      </a:pPr>
+                      <a:endParaRPr lang="ru-RU" sz="1000" kern="150" dirty="0">
+                        <a:latin typeface="Times New Roman"/>
+                        <a:ea typeface="Times New Roman"/>
+                        <a:cs typeface="Mangal"/>
+                      </a:endParaRPr>
+                    </a:p>
+                  </a:txBody>
+                  <a:tcPr marL="65431" marR="65431" marT="0" marB="0" anchor="ctr">
+                    <a:lnL>
+                      <a:noFill/>
+                    </a:lnL>
+                    <a:lnR>
+                      <a:noFill/>
+                    </a:lnR>
+                    <a:lnT>
+                      <a:noFill/>
+                    </a:lnT>
+                    <a:lnB w="28575" cap="flat" cmpd="sng" algn="ctr">
+                      <a:solidFill>
+                        <a:srgbClr val="000000"/>
+                      </a:solidFill>
+                      <a:prstDash val="solid"/>
+                      <a:round/>
+                      <a:headEnd type="none" w="med" len="med"/>
+                      <a:tailEnd type="none" w="med" len="med"/>
+                    </a:lnB>
+                  </a:tcPr>
+                </a:tc>
+                <a:tc>
+                  <a:txBody>
+                    <a:bodyPr/>
+                    <a:lstStyle/>
+                    <a:p>
+                      <a:pPr algn="ctr">
+                        <a:spcBef>
+                          <a:spcPts val="600"/>
+                        </a:spcBef>
+                        <a:spcAft>
+                          <a:spcPts val="600"/>
+                        </a:spcAft>
+                      </a:pPr>
+                      <a:r>
+                        <a:rPr lang="ru-RU" sz="1300" b="1" i="1" kern="150" dirty="0">
+                          <a:latin typeface="Times New Roman"/>
+                          <a:ea typeface="Times New Roman"/>
+                          <a:cs typeface="Mangal"/>
+                        </a:rPr>
+                        <a:t>«Московский государственный технический университет </a:t>
+                      </a:r>
+                      <a:br>
+                        <a:rPr lang="ru-RU" sz="1300" b="1" i="1" kern="150" dirty="0">
+                          <a:latin typeface="Times New Roman"/>
+                          <a:ea typeface="Times New Roman"/>
+                          <a:cs typeface="Mangal"/>
+                        </a:rPr>
+                      </a:br>
+                      <a:r>
+                        <a:rPr lang="ru-RU" sz="1300" b="1" i="1" kern="150" dirty="0">
+                          <a:latin typeface="Times New Roman"/>
+                          <a:ea typeface="Times New Roman"/>
+                          <a:cs typeface="Mangal"/>
+                        </a:rPr>
+                        <a:t>имени Н.Э. Баумана»</a:t>
+                      </a:r>
+                      <a:endParaRPr lang="ru-RU" sz="1000" kern="150" dirty="0">
+                        <a:latin typeface="Times New Roman"/>
+                        <a:ea typeface="Times New Roman"/>
+                        <a:cs typeface="Mangal"/>
+                      </a:endParaRPr>
+                    </a:p>
+                    <a:p>
+                      <a:pPr algn="ctr">
+                        <a:spcBef>
+                          <a:spcPts val="600"/>
+                        </a:spcBef>
+                        <a:spcAft>
+                          <a:spcPts val="600"/>
+                        </a:spcAft>
+                      </a:pPr>
+                      <a:r>
+                        <a:rPr lang="ru-RU" sz="1300" b="1" i="1" kern="150" dirty="0">
+                          <a:latin typeface="Times New Roman"/>
+                          <a:ea typeface="Times New Roman"/>
+                          <a:cs typeface="Mangal"/>
+                        </a:rPr>
+                        <a:t>(</a:t>
+                      </a:r>
+                      <a:r>
+                        <a:rPr lang="ru-RU" sz="1300" b="1" i="1" kern="150" dirty="0" err="1">
+                          <a:latin typeface="Times New Roman"/>
+                          <a:ea typeface="Times New Roman"/>
+                          <a:cs typeface="Mangal"/>
+                        </a:rPr>
+                        <a:t>МГТУ</a:t>
+                      </a:r>
+                      <a:r>
+                        <a:rPr lang="ru-RU" sz="1300" b="1" i="1" kern="150" dirty="0">
+                          <a:latin typeface="Times New Roman"/>
+                          <a:ea typeface="Times New Roman"/>
+                          <a:cs typeface="Mangal"/>
+                        </a:rPr>
+                        <a:t> им. Н.Э. Баумана)</a:t>
+                      </a:r>
+                      <a:endParaRPr lang="ru-RU" sz="1000" kern="150" dirty="0">
+                        <a:latin typeface="Times New Roman"/>
+                        <a:ea typeface="Times New Roman"/>
+                        <a:cs typeface="Mangal"/>
+                      </a:endParaRPr>
+                    </a:p>
+                  </a:txBody>
+                  <a:tcPr marL="65431" marR="65431" marT="0" marB="0" anchor="ctr">
+                    <a:lnL>
+                      <a:noFill/>
+                    </a:lnL>
+                    <a:lnR>
+                      <a:noFill/>
+                    </a:lnR>
+                    <a:lnT>
+                      <a:noFill/>
+                    </a:lnT>
+                    <a:lnB w="28575" cap="flat" cmpd="sng" algn="ctr">
+                      <a:solidFill>
+                        <a:srgbClr val="000000"/>
+                      </a:solidFill>
+                      <a:prstDash val="solid"/>
+                      <a:round/>
+                      <a:headEnd type="none" w="med" len="med"/>
+                      <a:tailEnd type="none" w="med" len="med"/>
+                    </a:lnB>
+                  </a:tcPr>
+                </a:tc>
+              </a:tr>
+            </a:tbl>
+          </a:graphicData>
+        </a:graphic>
+      </p:graphicFrame>
+      <p:sp>
+        <p:nvSpPr>
+          <p:cNvPr id="16386" name="Rectangle 2"/>
+          <p:cNvSpPr>
+            <a:spLocks noChangeArrowheads="1"/>
+          </p:cNvSpPr>
+          <p:nvPr/>
+        </p:nvSpPr>
+        <p:spPr bwMode="auto">
+          <a:xfrm>
+            <a:off x="0" y="0"/>
+            <a:ext cx="9144000" cy="457200"/>
+          </a:xfrm>
+          <a:prstGeom prst="rect">
+            <a:avLst/>
+          </a:prstGeom>
+          <a:noFill/>
+          <a:ln w="9525">
+            <a:noFill/>
+            <a:miter lim="800000"/>
+            <a:headEnd/>
+            <a:tailEnd/>
+          </a:ln>
+          <a:effectLst/>
+        </p:spPr>
+        <p:txBody>
+          <a:bodyPr vert="horz" wrap="none" lIns="91440" tIns="45720" rIns="91440" bIns="45720" numCol="1" anchor="ctr" anchorCtr="0" compatLnSpc="1">
+            <a:prstTxWarp prst="textNoShape">
+              <a:avLst/>
+            </a:prstTxWarp>
+            <a:spAutoFit/>
+          </a:bodyPr>
+          <a:lstStyle/>
+          <a:p>
+            <a:pPr marL="0" marR="0" lvl="0" indent="0" algn="ctr" defTabSz="914400" rtl="0" eaLnBrk="1" fontAlgn="base" latinLnBrk="0" hangingPunct="1">
+              <a:lnSpc>
+                <a:spcPct val="100000"/>
+              </a:lnSpc>
+              <a:spcBef>
+                <a:spcPct val="0"/>
+              </a:spcBef>
+              <a:spcAft>
+                <a:spcPct val="0"/>
+              </a:spcAft>
+              <a:buClrTx/>
+              <a:buSzTx/>
+              <a:buFontTx/>
+              <a:buNone/>
+              <a:tabLst/>
+            </a:pPr>
+            <a:r>
+              <a:rPr kumimoji="0" lang="ru-RU" sz="1200" b="0" i="1" u="none" strike="noStrike" cap="none" normalizeH="0" baseline="0" dirty="0" smtClean="0">
+                <a:ln>
+                  <a:noFill/>
+                </a:ln>
+                <a:solidFill>
+                  <a:schemeClr val="tx1"/>
+                </a:solidFill>
+                <a:effectLst/>
+                <a:latin typeface="Arial" pitchFamily="34" charset="0"/>
+                <a:ea typeface="Times New Roman" pitchFamily="18" charset="0"/>
+                <a:cs typeface="Arial" pitchFamily="34" charset="0"/>
+              </a:rPr>
+              <a:t>Государственное образовательное учреждение высшего профессионального образования</a:t>
+            </a:r>
+            <a:endParaRPr kumimoji="0" lang="ru-RU" sz="1800" b="0" i="0" u="none" strike="noStrike" cap="none" normalizeH="0" baseline="0" dirty="0" smtClean="0">
+              <a:ln>
+                <a:noFill/>
+              </a:ln>
+              <a:solidFill>
+                <a:schemeClr val="tx1"/>
+              </a:solidFill>
+              <a:effectLst/>
+              <a:latin typeface="Arial" pitchFamily="34" charset="0"/>
+              <a:cs typeface="Arial" pitchFamily="34" charset="0"/>
+            </a:endParaRPr>
+          </a:p>
+        </p:txBody>
+      </p:sp>
+      <p:pic>
+        <p:nvPicPr>
+          <p:cNvPr id="16385" name="Picture 1" descr="Gerb-BMSTU_01"/>
+          <p:cNvPicPr>
+            <a:picLocks noChangeAspect="1" noChangeArrowheads="1"/>
+          </p:cNvPicPr>
+          <p:nvPr/>
+        </p:nvPicPr>
+        <p:blipFill>
+          <a:blip r:embed="rId2" cstate="print"/>
+          <a:srcRect/>
+          <a:stretch>
+            <a:fillRect/>
+          </a:stretch>
+        </p:blipFill>
+        <p:spPr bwMode="auto">
+          <a:xfrm>
+            <a:off x="755576" y="404664"/>
+            <a:ext cx="1093465" cy="1235473"/>
+          </a:xfrm>
+          <a:prstGeom prst="rect">
+            <a:avLst/>
+          </a:prstGeom>
+          <a:noFill/>
+        </p:spPr>
+      </p:pic>
+      <p:sp>
+        <p:nvSpPr>
+          <p:cNvPr id="8" name="TextBox 7"/>
+          <p:cNvSpPr txBox="1"/>
+          <p:nvPr/>
+        </p:nvSpPr>
+        <p:spPr>
+          <a:xfrm>
+            <a:off x="3635896" y="6165304"/>
+            <a:ext cx="1636154" cy="369332"/>
+          </a:xfrm>
+          <a:prstGeom prst="rect">
+            <a:avLst/>
+          </a:prstGeom>
+          <a:noFill/>
+        </p:spPr>
+        <p:txBody>
+          <a:bodyPr wrap="none" rtlCol="0">
+            <a:spAutoFit/>
+          </a:bodyPr>
+          <a:lstStyle/>
+          <a:p>
+            <a:r>
+              <a:rPr lang="ru-RU" dirty="0" smtClean="0"/>
+              <a:t>Москва, </a:t>
+            </a:r>
+            <a:r>
+              <a:rPr lang="ru-RU" dirty="0" err="1" smtClean="0"/>
+              <a:t>2015г</a:t>
+            </a:r>
+            <a:r>
+              <a:rPr lang="ru-RU" dirty="0" smtClean="0"/>
+              <a:t>.</a:t>
+            </a:r>
+            <a:endParaRPr lang="ru-RU" dirty="0"/>
+          </a:p>
+        </p:txBody>
+      </p:sp>
+      <p:sp>
+        <p:nvSpPr>
+          <p:cNvPr id="9" name="TextBox 8"/>
+          <p:cNvSpPr txBox="1"/>
+          <p:nvPr/>
+        </p:nvSpPr>
+        <p:spPr>
+          <a:xfrm>
+            <a:off x="1619672" y="2060848"/>
+            <a:ext cx="5832648" cy="369332"/>
+          </a:xfrm>
+          <a:prstGeom prst="rect">
+            <a:avLst/>
+          </a:prstGeom>
+          <a:noFill/>
+        </p:spPr>
+        <p:txBody>
+          <a:bodyPr wrap="square" rtlCol="0">
+            <a:spAutoFit/>
+          </a:bodyPr>
+          <a:lstStyle/>
+          <a:p>
+            <a:pPr algn="ctr"/>
+            <a:r>
+              <a:rPr lang="ru-RU" dirty="0" smtClean="0"/>
+              <a:t>Презентация к дипломной работе на тему:</a:t>
+            </a:r>
+            <a:endParaRPr lang="ru-RU" dirty="0"/>
           </a:p>
         </p:txBody>
       </p:sp>
@@ -3850,48 +4901,241 @@
             <p:ph type="title"/>
           </p:nvPr>
         </p:nvSpPr>
-        <p:spPr/>
-        <p:txBody>
-          <a:bodyPr>
-            <a:normAutofit fontScale="90000"/>
-          </a:bodyPr>
-          <a:lstStyle/>
-          <a:p>
-            <a:r>
-              <a:rPr lang="ru-RU" dirty="0" smtClean="0"/>
-              <a:t>Пример результата работы метода </a:t>
-            </a:r>
-            <a:r>
-              <a:rPr lang="en-US" dirty="0" err="1" smtClean="0"/>
-              <a:t>SfM</a:t>
-            </a:r>
-            <a:endParaRPr lang="ru-RU" dirty="0"/>
-          </a:p>
-        </p:txBody>
-      </p:sp>
-      <p:pic>
-        <p:nvPicPr>
-          <p:cNvPr id="5" name="Содержимое 4" descr="sfm_example.png"/>
-          <p:cNvPicPr>
-            <a:picLocks noGrp="1" noChangeAspect="1"/>
-          </p:cNvPicPr>
-          <p:nvPr>
-            <p:ph idx="1"/>
-          </p:nvPr>
-        </p:nvPicPr>
-        <p:blipFill>
-          <a:blip r:embed="rId2" cstate="print"/>
-          <a:stretch>
-            <a:fillRect/>
-          </a:stretch>
-        </p:blipFill>
         <p:spPr>
           <a:xfrm>
-            <a:off x="323528" y="1772816"/>
-            <a:ext cx="8581728" cy="3240360"/>
+            <a:off x="457200" y="274638"/>
+            <a:ext cx="8229600" cy="778098"/>
           </a:xfrm>
         </p:spPr>
-      </p:pic>
+        <p:txBody>
+          <a:bodyPr/>
+          <a:lstStyle/>
+          <a:p>
+            <a:r>
+              <a:rPr lang="ru-RU" dirty="0" smtClean="0"/>
+              <a:t>Технологическая часть</a:t>
+            </a:r>
+            <a:endParaRPr lang="ru-RU" dirty="0"/>
+          </a:p>
+        </p:txBody>
+      </p:sp>
+      <p:sp>
+        <p:nvSpPr>
+          <p:cNvPr id="3" name="Содержимое 2"/>
+          <p:cNvSpPr>
+            <a:spLocks noGrp="1"/>
+          </p:cNvSpPr>
+          <p:nvPr>
+            <p:ph idx="1"/>
+          </p:nvPr>
+        </p:nvSpPr>
+        <p:spPr>
+          <a:xfrm>
+            <a:off x="457200" y="1268760"/>
+            <a:ext cx="8229600" cy="5256584"/>
+          </a:xfrm>
+        </p:spPr>
+        <p:txBody>
+          <a:bodyPr>
+            <a:normAutofit fontScale="62500" lnSpcReduction="20000"/>
+          </a:bodyPr>
+          <a:lstStyle/>
+          <a:p>
+            <a:r>
+              <a:rPr lang="ru-RU" dirty="0" smtClean="0"/>
+              <a:t>Создано </a:t>
+            </a:r>
+            <a:r>
+              <a:rPr lang="ru-RU" dirty="0" smtClean="0"/>
+              <a:t>тестовое приложение</a:t>
+            </a:r>
+            <a:endParaRPr lang="en-US" dirty="0" smtClean="0"/>
+          </a:p>
+          <a:p>
+            <a:pPr lvl="1"/>
+            <a:r>
+              <a:rPr lang="en-US" dirty="0" smtClean="0"/>
+              <a:t>32-</a:t>
+            </a:r>
+            <a:r>
+              <a:rPr lang="ru-RU" dirty="0" smtClean="0"/>
+              <a:t>разрядное под ОС </a:t>
+            </a:r>
+            <a:r>
+              <a:rPr lang="en-US" dirty="0" smtClean="0"/>
+              <a:t>Windows </a:t>
+            </a:r>
+          </a:p>
+          <a:p>
+            <a:pPr lvl="1"/>
+            <a:r>
+              <a:rPr lang="ru-RU" dirty="0" smtClean="0"/>
+              <a:t>На языке </a:t>
+            </a:r>
+            <a:r>
+              <a:rPr lang="en-US" dirty="0" smtClean="0"/>
+              <a:t>C++ </a:t>
+            </a:r>
+            <a:r>
+              <a:rPr lang="ru-RU" dirty="0" smtClean="0"/>
+              <a:t>с использованием среды разработки </a:t>
+            </a:r>
+            <a:r>
+              <a:rPr lang="en-US" dirty="0" smtClean="0"/>
+              <a:t>Visual Studio 2010</a:t>
+            </a:r>
+          </a:p>
+          <a:p>
+            <a:pPr lvl="1"/>
+            <a:r>
+              <a:rPr lang="ru-RU" dirty="0" smtClean="0"/>
+              <a:t>С</a:t>
+            </a:r>
+            <a:r>
+              <a:rPr lang="en-US" dirty="0" smtClean="0"/>
+              <a:t> </a:t>
+            </a:r>
+            <a:r>
+              <a:rPr lang="ru-RU" dirty="0" smtClean="0"/>
+              <a:t>использованием библиотеки алгоритмов компьютерного зрения с открытым исходным кодом </a:t>
+            </a:r>
+            <a:r>
+              <a:rPr lang="en-US" dirty="0" err="1" smtClean="0"/>
+              <a:t>OpenCV</a:t>
+            </a:r>
+            <a:r>
+              <a:rPr lang="ru-RU" dirty="0" smtClean="0"/>
+              <a:t> версии 3.0.0 </a:t>
+            </a:r>
+            <a:r>
+              <a:rPr lang="en-US" dirty="0" smtClean="0"/>
+              <a:t>beta</a:t>
+            </a:r>
+            <a:endParaRPr lang="ru-RU" dirty="0" smtClean="0"/>
+          </a:p>
+          <a:p>
+            <a:r>
+              <a:rPr lang="ru-RU" dirty="0" smtClean="0"/>
+              <a:t>Использованы методы</a:t>
+            </a:r>
+          </a:p>
+          <a:p>
+            <a:pPr lvl="1"/>
+            <a:r>
+              <a:rPr lang="ru-RU" dirty="0" smtClean="0"/>
+              <a:t>???</a:t>
+            </a:r>
+            <a:endParaRPr lang="ru-RU" dirty="0" smtClean="0"/>
+          </a:p>
+          <a:p>
+            <a:r>
+              <a:rPr lang="ru-RU" dirty="0" smtClean="0"/>
+              <a:t>В ходе работы решены следующие проблемы технологического характера:</a:t>
+            </a:r>
+          </a:p>
+          <a:p>
+            <a:pPr lvl="1"/>
+            <a:r>
+              <a:rPr lang="ru-RU" dirty="0" smtClean="0"/>
+              <a:t>Компиляция библиотеки </a:t>
+            </a:r>
+            <a:r>
+              <a:rPr lang="en-US" dirty="0" err="1" smtClean="0"/>
+              <a:t>OpenCV</a:t>
+            </a:r>
+            <a:r>
+              <a:rPr lang="ru-RU" dirty="0" smtClean="0"/>
+              <a:t> из файлов исходного кода. Подключение ее к проекту разрабатываемого приложения. </a:t>
+            </a:r>
+            <a:r>
+              <a:rPr lang="ru-RU" dirty="0" smtClean="0"/>
+              <a:t>Поиск существующих </a:t>
+            </a:r>
+            <a:r>
+              <a:rPr lang="ru-RU" dirty="0" smtClean="0"/>
+              <a:t>реализаций необходимых методов </a:t>
+            </a:r>
+            <a:r>
+              <a:rPr lang="ru-RU" dirty="0" smtClean="0"/>
+              <a:t>и </a:t>
+            </a:r>
+            <a:r>
+              <a:rPr lang="ru-RU" dirty="0" smtClean="0"/>
+              <a:t>алгоритмов. </a:t>
+            </a:r>
+            <a:r>
+              <a:rPr lang="ru-RU" dirty="0" smtClean="0"/>
+              <a:t>Разбор документации </a:t>
+            </a:r>
+            <a:r>
+              <a:rPr lang="ru-RU" dirty="0" smtClean="0"/>
+              <a:t>библиотеки.</a:t>
+            </a:r>
+          </a:p>
+          <a:p>
+            <a:pPr lvl="1"/>
+            <a:r>
+              <a:rPr lang="ru-RU" dirty="0" smtClean="0"/>
+              <a:t>Нахождение и исправление ошибок в исходном коде приложения</a:t>
+            </a:r>
+          </a:p>
+          <a:p>
+            <a:pPr lvl="1"/>
+            <a:r>
+              <a:rPr lang="ru-RU" dirty="0" smtClean="0"/>
+              <a:t>Подбор </a:t>
+            </a:r>
+            <a:r>
+              <a:rPr lang="ru-RU" dirty="0" smtClean="0"/>
+              <a:t>тестовых данных</a:t>
+            </a:r>
+          </a:p>
+          <a:p>
+            <a:pPr lvl="1"/>
+            <a:r>
+              <a:rPr lang="ru-RU" dirty="0" smtClean="0"/>
+              <a:t>Выделение информации об изображениях базы тестовых данных </a:t>
+            </a:r>
+            <a:r>
+              <a:rPr lang="en-US" dirty="0" err="1" smtClean="0"/>
+              <a:t>YorkUrbanDb</a:t>
+            </a:r>
+            <a:r>
+              <a:rPr lang="ru-RU" dirty="0" smtClean="0"/>
+              <a:t> </a:t>
+            </a:r>
+            <a:r>
+              <a:rPr lang="ru-RU" dirty="0" smtClean="0"/>
+              <a:t>из бинарного формата «</a:t>
+            </a:r>
+            <a:r>
+              <a:rPr lang="en-US" dirty="0" smtClean="0"/>
+              <a:t>.m</a:t>
+            </a:r>
+            <a:r>
+              <a:rPr lang="ru-RU" dirty="0" smtClean="0"/>
+              <a:t>» </a:t>
+            </a:r>
+            <a:r>
+              <a:rPr lang="ru-RU" dirty="0" smtClean="0"/>
+              <a:t>программы</a:t>
+            </a:r>
+            <a:r>
+              <a:rPr lang="en-US" dirty="0" smtClean="0"/>
+              <a:t> </a:t>
+            </a:r>
+            <a:r>
+              <a:rPr lang="en-US" dirty="0" err="1" smtClean="0"/>
+              <a:t>MATLAB</a:t>
+            </a:r>
+            <a:r>
+              <a:rPr lang="ru-RU" dirty="0" smtClean="0"/>
+              <a:t> в текстовый формат</a:t>
+            </a:r>
+            <a:endParaRPr lang="ru-RU" dirty="0" smtClean="0"/>
+          </a:p>
+        </p:txBody>
+      </p:sp>
     </p:spTree>
   </p:cSld>
   <p:clrMapOvr>
@@ -3934,23 +5178,7 @@
           <a:p>
             <a:r>
               <a:rPr lang="ru-RU" dirty="0" smtClean="0"/>
-              <a:t>Кратко о методе</a:t>
-            </a:r>
-            <a:r>
-              <a:rPr lang="en-US" dirty="0" smtClean="0"/>
-              <a:t> </a:t>
-            </a:r>
-            <a:r>
-              <a:rPr lang="ru-RU" dirty="0" err="1" smtClean="0"/>
-              <a:t>Хуттунена</a:t>
-            </a:r>
-            <a:r>
-              <a:rPr lang="ru-RU" dirty="0" smtClean="0"/>
-              <a:t>, </a:t>
-            </a:r>
-            <a:r>
-              <a:rPr lang="ru-RU" dirty="0" err="1" smtClean="0"/>
-              <a:t>Пише</a:t>
+              <a:t>Структурная схема тестового ПО</a:t>
             </a:r>
             <a:endParaRPr lang="ru-RU" dirty="0"/>
           </a:p>
@@ -3968,56 +5196,12 @@
         </p:nvSpPr>
         <p:spPr/>
         <p:txBody>
-          <a:bodyPr>
-            <a:normAutofit fontScale="70000" lnSpcReduction="20000"/>
-          </a:bodyPr>
-          <a:lstStyle/>
-          <a:p>
-            <a:r>
-              <a:rPr lang="ru-RU" dirty="0" smtClean="0"/>
-              <a:t>решает задачу определения трехмерной </a:t>
-            </a:r>
-            <a:r>
-              <a:rPr lang="ru-RU" dirty="0"/>
-              <a:t>ориентации монокулярной камеры </a:t>
-            </a:r>
-            <a:r>
-              <a:rPr lang="ru-RU" dirty="0" smtClean="0"/>
-              <a:t>путем нахождения точек </a:t>
-            </a:r>
-            <a:r>
-              <a:rPr lang="ru-RU" dirty="0"/>
-              <a:t>схождения </a:t>
-            </a:r>
-            <a:r>
-              <a:rPr lang="ru-RU" dirty="0" smtClean="0"/>
-              <a:t>перспективы, </a:t>
-            </a:r>
-            <a:r>
-              <a:rPr lang="ru-RU" dirty="0"/>
-              <a:t>обнаруженных на </a:t>
-            </a:r>
-            <a:r>
-              <a:rPr lang="ru-RU" dirty="0" smtClean="0"/>
-              <a:t>изображении</a:t>
-            </a:r>
-          </a:p>
-          <a:p>
-            <a:r>
-              <a:rPr lang="ru-RU" dirty="0" smtClean="0"/>
-              <a:t>предполагается, что точки схождения перспективы образованы проекциями линий, образующих ортогональную систему</a:t>
-            </a:r>
-          </a:p>
-          <a:p>
-            <a:r>
-              <a:rPr lang="ru-RU" dirty="0" smtClean="0"/>
-              <a:t>такая ситуация возможна, например, внутри помещений, где хорошо выделяются линии, образованные стенами, полом и потолком, а также предметами интерьера, расположенными параллельно или ортогонально им</a:t>
-            </a:r>
-          </a:p>
-          <a:p>
-            <a:r>
-              <a:rPr lang="ru-RU" dirty="0" smtClean="0"/>
-              <a:t>предположение можно расширить на изображения городской застройки,  которая обычно  ведется на декартовой сетке, а дома имеют форму параллелепипедов</a:t>
+          <a:bodyPr/>
+          <a:lstStyle/>
+          <a:p>
+            <a:r>
+              <a:rPr lang="ru-RU" dirty="0" smtClean="0"/>
+              <a:t>Что-то вроде диаграммы классов</a:t>
             </a:r>
             <a:endParaRPr lang="ru-RU" dirty="0"/>
           </a:p>
@@ -4058,44 +5242,123 @@
             <p:ph type="title"/>
           </p:nvPr>
         </p:nvSpPr>
-        <p:spPr/>
-        <p:txBody>
-          <a:bodyPr>
-            <a:normAutofit fontScale="90000"/>
-          </a:bodyPr>
-          <a:lstStyle/>
-          <a:p>
-            <a:r>
-              <a:rPr lang="ru-RU" dirty="0" smtClean="0"/>
-              <a:t>Пример изображения внутри помещения</a:t>
-            </a:r>
-            <a:endParaRPr lang="ru-RU" dirty="0"/>
-          </a:p>
-        </p:txBody>
-      </p:sp>
-      <p:pic>
-        <p:nvPicPr>
-          <p:cNvPr id="4" name="Содержимое 3" descr="indoor_raw_example.jpg"/>
-          <p:cNvPicPr>
-            <a:picLocks noGrp="1" noChangeAspect="1"/>
-          </p:cNvPicPr>
-          <p:nvPr>
-            <p:ph idx="1"/>
-          </p:nvPr>
-        </p:nvPicPr>
-        <p:blipFill>
-          <a:blip r:embed="rId2" cstate="print"/>
-          <a:stretch>
-            <a:fillRect/>
-          </a:stretch>
-        </p:blipFill>
         <p:spPr>
           <a:xfrm>
-            <a:off x="1115616" y="1484784"/>
-            <a:ext cx="6912768" cy="5184576"/>
+            <a:off x="457200" y="260648"/>
+            <a:ext cx="8229600" cy="936104"/>
           </a:xfrm>
         </p:spPr>
-      </p:pic>
+        <p:txBody>
+          <a:bodyPr/>
+          <a:lstStyle/>
+          <a:p>
+            <a:r>
+              <a:rPr lang="ru-RU" smtClean="0"/>
+              <a:t>Данные тестирования</a:t>
+            </a:r>
+            <a:endParaRPr lang="ru-RU" dirty="0"/>
+          </a:p>
+        </p:txBody>
+      </p:sp>
+      <p:sp>
+        <p:nvSpPr>
+          <p:cNvPr id="3" name="Содержимое 2"/>
+          <p:cNvSpPr>
+            <a:spLocks noGrp="1"/>
+          </p:cNvSpPr>
+          <p:nvPr>
+            <p:ph idx="1"/>
+          </p:nvPr>
+        </p:nvSpPr>
+        <p:spPr>
+          <a:xfrm>
+            <a:off x="457200" y="1600200"/>
+            <a:ext cx="8229600" cy="4853136"/>
+          </a:xfrm>
+        </p:spPr>
+        <p:txBody>
+          <a:bodyPr>
+            <a:normAutofit fontScale="92500" lnSpcReduction="20000"/>
+          </a:bodyPr>
+          <a:lstStyle/>
+          <a:p>
+            <a:r>
+              <a:rPr lang="ru-RU" dirty="0" smtClean="0"/>
+              <a:t>за основу тестовых данных выбрана база изображений</a:t>
+            </a:r>
+            <a:r>
+              <a:rPr lang="en-US" dirty="0" smtClean="0"/>
+              <a:t> </a:t>
+            </a:r>
+            <a:r>
+              <a:rPr lang="en-US" dirty="0" err="1" smtClean="0"/>
+              <a:t>YorkUrbanDb</a:t>
+            </a:r>
+            <a:r>
+              <a:rPr lang="ru-RU" dirty="0" smtClean="0"/>
+              <a:t>, которая содержит: </a:t>
+            </a:r>
+          </a:p>
+          <a:p>
+            <a:pPr lvl="1"/>
+            <a:r>
+              <a:rPr lang="ru-RU" dirty="0" smtClean="0"/>
+              <a:t>45 снимков, снятых </a:t>
+            </a:r>
+            <a:r>
+              <a:rPr lang="ru-RU" dirty="0" smtClean="0"/>
+              <a:t>внутри помещений</a:t>
+            </a:r>
+            <a:endParaRPr lang="ru-RU" dirty="0" smtClean="0"/>
+          </a:p>
+          <a:p>
+            <a:pPr lvl="1"/>
+            <a:r>
+              <a:rPr lang="ru-RU" dirty="0" smtClean="0"/>
+              <a:t>57 снимков городской местности города Торонто (Канада)</a:t>
+            </a:r>
+          </a:p>
+          <a:p>
+            <a:pPr lvl="1"/>
+            <a:r>
+              <a:rPr lang="ru-RU" dirty="0" smtClean="0"/>
+              <a:t>информацию о матрице калибровки используемой камеры</a:t>
+            </a:r>
+          </a:p>
+          <a:p>
+            <a:pPr lvl="1"/>
+            <a:r>
+              <a:rPr lang="ru-RU" dirty="0" smtClean="0"/>
+              <a:t>вычисленную матрицу </a:t>
+            </a:r>
+            <a:r>
+              <a:rPr lang="ru-RU" dirty="0" smtClean="0"/>
+              <a:t>единичных направлений трех найденных на изображении </a:t>
+            </a:r>
+            <a:r>
+              <a:rPr lang="ru-RU" dirty="0" err="1" smtClean="0"/>
+              <a:t>ТСП</a:t>
+            </a:r>
+            <a:endParaRPr lang="ru-RU" dirty="0" smtClean="0"/>
+          </a:p>
+          <a:p>
+            <a:pPr lvl="1"/>
+            <a:r>
+              <a:rPr lang="ru-RU" dirty="0" smtClean="0"/>
+              <a:t>список </a:t>
+            </a:r>
+            <a:r>
+              <a:rPr lang="ru-RU" dirty="0" smtClean="0"/>
+              <a:t>распознанных сегментов линий с отмеченным соответствием их </a:t>
+            </a:r>
+            <a:r>
+              <a:rPr lang="ru-RU" dirty="0" smtClean="0"/>
+              <a:t>точкам схождения перспективы</a:t>
+            </a:r>
+            <a:endParaRPr lang="ru-RU" dirty="0" smtClean="0"/>
+          </a:p>
+        </p:txBody>
+      </p:sp>
     </p:spTree>
   </p:cSld>
   <p:clrMapOvr>
@@ -4140,7 +5403,7 @@
           <a:p>
             <a:r>
               <a:rPr lang="ru-RU" dirty="0" smtClean="0"/>
-              <a:t>Пример изображения вне помещения</a:t>
+              <a:t>Пример изображения внутри помещения</a:t>
             </a:r>
             <a:endParaRPr lang="ru-RU" dirty="0"/>
           </a:p>
@@ -4206,88 +5469,39 @@
         </p:nvSpPr>
         <p:spPr/>
         <p:txBody>
-          <a:bodyPr/>
-          <a:lstStyle/>
-          <a:p>
-            <a:r>
-              <a:rPr lang="ru-RU" dirty="0" smtClean="0"/>
-              <a:t>Этапы работы алгоритма</a:t>
+          <a:bodyPr>
+            <a:normAutofit fontScale="90000"/>
+          </a:bodyPr>
+          <a:lstStyle/>
+          <a:p>
+            <a:r>
+              <a:rPr lang="ru-RU" dirty="0" smtClean="0"/>
+              <a:t>Результаты тестирования на изображениях внутри помещений</a:t>
             </a:r>
             <a:endParaRPr lang="ru-RU" dirty="0"/>
           </a:p>
         </p:txBody>
       </p:sp>
-      <p:sp>
-        <p:nvSpPr>
-          <p:cNvPr id="3" name="Содержимое 2"/>
-          <p:cNvSpPr>
-            <a:spLocks noGrp="1"/>
-          </p:cNvSpPr>
+      <p:graphicFrame>
+        <p:nvGraphicFramePr>
+          <p:cNvPr id="5" name="Содержимое 4"/>
+          <p:cNvGraphicFramePr>
+            <a:graphicFrameLocks noGrp="1"/>
+          </p:cNvGraphicFramePr>
           <p:nvPr>
             <p:ph idx="1"/>
           </p:nvPr>
-        </p:nvSpPr>
-        <p:spPr/>
-        <p:txBody>
-          <a:bodyPr>
-            <a:normAutofit fontScale="85000" lnSpcReduction="20000"/>
-          </a:bodyPr>
-          <a:lstStyle/>
-          <a:p>
-            <a:r>
-              <a:rPr lang="ru-RU" dirty="0" smtClean="0"/>
-              <a:t>регистрация видеоряда с декомпозицией на кадры или регистрация отдельного снимка</a:t>
-            </a:r>
-          </a:p>
-          <a:p>
-            <a:r>
-              <a:rPr lang="ru-RU" dirty="0" smtClean="0"/>
-              <a:t>выделение сегментов линий</a:t>
-            </a:r>
-          </a:p>
-          <a:p>
-            <a:r>
-              <a:rPr lang="ru-RU" dirty="0" smtClean="0"/>
-              <a:t>объединение сегментов в кластеры по принципу пересечения в одной точке. Будем считать, что точка пересечения – точка схождения перспективы (</a:t>
-            </a:r>
-            <a:r>
-              <a:rPr lang="ru-RU" dirty="0" err="1" smtClean="0"/>
-              <a:t>ТСП</a:t>
-            </a:r>
-            <a:r>
-              <a:rPr lang="ru-RU" dirty="0" smtClean="0"/>
-              <a:t>)</a:t>
-            </a:r>
-          </a:p>
-          <a:p>
-            <a:r>
-              <a:rPr lang="ru-RU" dirty="0" smtClean="0"/>
-              <a:t>выделение 3 наибольших сегментов</a:t>
-            </a:r>
-          </a:p>
-          <a:p>
-            <a:r>
-              <a:rPr lang="ru-RU" dirty="0" smtClean="0"/>
-              <a:t>уточнение каждой из предполагаемых </a:t>
-            </a:r>
-            <a:r>
-              <a:rPr lang="ru-RU" dirty="0" err="1" smtClean="0"/>
-              <a:t>ТСП</a:t>
-            </a:r>
-            <a:r>
-              <a:rPr lang="ru-RU" dirty="0" smtClean="0"/>
-              <a:t> на основе информации о кластере</a:t>
-            </a:r>
-          </a:p>
-          <a:p>
-            <a:r>
-              <a:rPr lang="ru-RU" dirty="0" smtClean="0"/>
-              <a:t>вычисление углов пространственной ориентации на основе полученной матрицы поворота камеры</a:t>
-            </a:r>
-            <a:endParaRPr lang="ru-RU" dirty="0"/>
-          </a:p>
-        </p:txBody>
-      </p:sp>
+        </p:nvGraphicFramePr>
+        <p:xfrm>
+          <a:off x="457200" y="1600200"/>
+          <a:ext cx="8229600" cy="4525963"/>
+        </p:xfrm>
+        <a:graphic>
+          <a:graphicData uri="http://schemas.openxmlformats.org/drawingml/2006/chart">
+            <c:chart xmlns:c="http://schemas.openxmlformats.org/drawingml/2006/chart" xmlns:r="http://schemas.openxmlformats.org/officeDocument/2006/relationships" r:id="rId2"/>
+          </a:graphicData>
+        </a:graphic>
+      </p:graphicFrame>
     </p:spTree>
   </p:cSld>
   <p:clrMapOvr>
@@ -4325,88 +5539,42 @@
         </p:nvSpPr>
         <p:spPr/>
         <p:txBody>
-          <a:bodyPr/>
-          <a:lstStyle/>
-          <a:p>
-            <a:r>
-              <a:rPr lang="ru-RU" dirty="0" smtClean="0"/>
-              <a:t>Тестовые данные</a:t>
+          <a:bodyPr>
+            <a:normAutofit fontScale="90000"/>
+          </a:bodyPr>
+          <a:lstStyle/>
+          <a:p>
+            <a:r>
+              <a:rPr lang="ru-RU" dirty="0" smtClean="0"/>
+              <a:t>Пример изображения вне помещения</a:t>
             </a:r>
             <a:endParaRPr lang="ru-RU" dirty="0"/>
           </a:p>
         </p:txBody>
       </p:sp>
-      <p:sp>
-        <p:nvSpPr>
-          <p:cNvPr id="3" name="Содержимое 2"/>
-          <p:cNvSpPr>
-            <a:spLocks noGrp="1"/>
-          </p:cNvSpPr>
+      <p:pic>
+        <p:nvPicPr>
+          <p:cNvPr id="4" name="Содержимое 3" descr="indoor_raw_example.jpg"/>
+          <p:cNvPicPr>
+            <a:picLocks noGrp="1" noChangeAspect="1"/>
+          </p:cNvPicPr>
           <p:nvPr>
             <p:ph idx="1"/>
           </p:nvPr>
-        </p:nvSpPr>
-        <p:spPr/>
-        <p:txBody>
-          <a:bodyPr>
-            <a:normAutofit fontScale="92500" lnSpcReduction="20000"/>
-          </a:bodyPr>
-          <a:lstStyle/>
-          <a:p>
-            <a:r>
-              <a:rPr lang="ru-RU" dirty="0" smtClean="0"/>
-              <a:t>за основу тестовых данных выбрана база изображений</a:t>
-            </a:r>
-            <a:r>
-              <a:rPr lang="en-US" dirty="0" smtClean="0"/>
-              <a:t> </a:t>
-            </a:r>
-            <a:r>
-              <a:rPr lang="en-US" dirty="0" err="1" smtClean="0"/>
-              <a:t>YorkUrbanDb</a:t>
-            </a:r>
-            <a:r>
-              <a:rPr lang="ru-RU" dirty="0" smtClean="0"/>
-              <a:t>, которая содержит: </a:t>
-            </a:r>
-          </a:p>
-          <a:p>
-            <a:pPr lvl="1"/>
-            <a:r>
-              <a:rPr lang="ru-RU" dirty="0" smtClean="0"/>
-              <a:t>45 снимков, снятых внутри помещения</a:t>
-            </a:r>
-          </a:p>
-          <a:p>
-            <a:pPr lvl="1"/>
-            <a:r>
-              <a:rPr lang="ru-RU" dirty="0" smtClean="0"/>
-              <a:t>57 снимков городской местности города Торонто (Канада)</a:t>
-            </a:r>
-          </a:p>
-          <a:p>
-            <a:pPr lvl="1"/>
-            <a:r>
-              <a:rPr lang="ru-RU" dirty="0" smtClean="0"/>
-              <a:t>информацию о матрице калибровки используемой камеры</a:t>
-            </a:r>
-          </a:p>
-          <a:p>
-            <a:pPr lvl="1"/>
-            <a:r>
-              <a:rPr lang="ru-RU" dirty="0" smtClean="0"/>
-              <a:t>вычисленную матрицу поворота системы координат камеры</a:t>
-            </a:r>
-          </a:p>
-          <a:p>
-            <a:pPr lvl="1"/>
-            <a:r>
-              <a:rPr lang="ru-RU" dirty="0" smtClean="0"/>
-              <a:t>список распознанных сегментов линий с отмеченным соответствием их точкам схождения перспективы</a:t>
-            </a:r>
-          </a:p>
-        </p:txBody>
-      </p:sp>
+        </p:nvPicPr>
+        <p:blipFill>
+          <a:blip r:embed="rId2" cstate="print"/>
+          <a:stretch>
+            <a:fillRect/>
+          </a:stretch>
+        </p:blipFill>
+        <p:spPr>
+          <a:xfrm>
+            <a:off x="1115616" y="1484784"/>
+            <a:ext cx="6912768" cy="5184576"/>
+          </a:xfrm>
+        </p:spPr>
+      </p:pic>
     </p:spTree>
   </p:cSld>
   <p:clrMapOvr>
@@ -4451,7 +5619,7 @@
           <a:p>
             <a:r>
               <a:rPr lang="ru-RU" dirty="0" smtClean="0"/>
-              <a:t>Результаты тестирования на изображениях внутри помещений</a:t>
+              <a:t>Результаты тестирования на изображениях вне помещений</a:t>
             </a:r>
             <a:endParaRPr lang="ru-RU" dirty="0"/>
           </a:p>
@@ -4459,7 +5627,7 @@
       </p:sp>
       <p:graphicFrame>
         <p:nvGraphicFramePr>
-          <p:cNvPr id="5" name="Содержимое 4"/>
+          <p:cNvPr id="8" name="Содержимое 7"/>
           <p:cNvGraphicFramePr>
             <a:graphicFrameLocks noGrp="1"/>
           </p:cNvGraphicFramePr>
@@ -4514,39 +5682,36 @@
         </p:nvSpPr>
         <p:spPr/>
         <p:txBody>
-          <a:bodyPr>
-            <a:normAutofit fontScale="90000"/>
-          </a:bodyPr>
-          <a:lstStyle/>
-          <a:p>
-            <a:r>
-              <a:rPr lang="ru-RU" dirty="0" smtClean="0"/>
-              <a:t>Результаты тестирования на изображениях вне помещений</a:t>
+          <a:bodyPr/>
+          <a:lstStyle/>
+          <a:p>
+            <a:r>
+              <a:rPr lang="ru-RU" dirty="0" smtClean="0"/>
+              <a:t>Результаты работы</a:t>
             </a:r>
             <a:endParaRPr lang="ru-RU" dirty="0"/>
           </a:p>
         </p:txBody>
       </p:sp>
-      <p:graphicFrame>
-        <p:nvGraphicFramePr>
-          <p:cNvPr id="8" name="Содержимое 7"/>
-          <p:cNvGraphicFramePr>
-            <a:graphicFrameLocks noGrp="1"/>
-          </p:cNvGraphicFramePr>
+      <p:sp>
+        <p:nvSpPr>
+          <p:cNvPr id="3" name="Содержимое 2"/>
+          <p:cNvSpPr>
+            <a:spLocks noGrp="1"/>
+          </p:cNvSpPr>
           <p:nvPr>
             <p:ph idx="1"/>
           </p:nvPr>
-        </p:nvGraphicFramePr>
-        <p:xfrm>
-          <a:off x="457200" y="1600200"/>
-          <a:ext cx="8229600" cy="4525963"/>
-        </p:xfrm>
-        <a:graphic>
-          <a:graphicData uri="http://schemas.openxmlformats.org/drawingml/2006/chart">
-            <c:chart xmlns:c="http://schemas.openxmlformats.org/drawingml/2006/chart" xmlns:r="http://schemas.openxmlformats.org/officeDocument/2006/relationships" r:id="rId2"/>
-          </a:graphicData>
-        </a:graphic>
-      </p:graphicFrame>
+        </p:nvSpPr>
+        <p:spPr/>
+        <p:txBody>
+          <a:bodyPr/>
+          <a:lstStyle/>
+          <a:p>
+            <a:endParaRPr lang="ru-RU"/>
+          </a:p>
+        </p:txBody>
+      </p:sp>
     </p:spTree>
   </p:cSld>
   <p:clrMapOvr>
@@ -4589,7 +5754,7 @@
           <a:p>
             <a:r>
               <a:rPr lang="ru-RU" dirty="0" smtClean="0"/>
-              <a:t>Результаты работы</a:t>
+              <a:t>Экономическая часть</a:t>
             </a:r>
             <a:endParaRPr lang="ru-RU" dirty="0"/>
           </a:p>
@@ -4718,87 +5883,61 @@
         </p:nvSpPr>
         <p:spPr/>
         <p:txBody>
+          <a:bodyPr>
+            <a:normAutofit fontScale="90000"/>
+          </a:bodyPr>
+          <a:lstStyle/>
+          <a:p>
+            <a:r>
+              <a:rPr lang="ru-RU" dirty="0" smtClean="0"/>
+              <a:t>Распространенные способы решения задачи позиционирования</a:t>
+            </a:r>
+            <a:endParaRPr lang="ru-RU" dirty="0"/>
+          </a:p>
+        </p:txBody>
+      </p:sp>
+      <p:sp>
+        <p:nvSpPr>
+          <p:cNvPr id="3" name="Содержимое 2"/>
+          <p:cNvSpPr>
+            <a:spLocks noGrp="1"/>
+          </p:cNvSpPr>
+          <p:nvPr>
+            <p:ph idx="1"/>
+          </p:nvPr>
+        </p:nvSpPr>
+        <p:spPr/>
+        <p:txBody>
           <a:bodyPr/>
           <a:lstStyle/>
           <a:p>
             <a:r>
               <a:rPr lang="ru-RU" dirty="0" smtClean="0"/>
-              <a:t>???</a:t>
-            </a:r>
-            <a:endParaRPr lang="ru-RU" dirty="0"/>
-          </a:p>
-        </p:txBody>
-      </p:sp>
-      <p:sp>
-        <p:nvSpPr>
-          <p:cNvPr id="3" name="Содержимое 2"/>
-          <p:cNvSpPr>
-            <a:spLocks noGrp="1"/>
-          </p:cNvSpPr>
-          <p:nvPr>
-            <p:ph idx="1"/>
-          </p:nvPr>
-        </p:nvSpPr>
-        <p:spPr/>
-        <p:txBody>
-          <a:bodyPr>
-            <a:normAutofit fontScale="92500" lnSpcReduction="10000"/>
-          </a:bodyPr>
-          <a:lstStyle/>
-          <a:p>
-            <a:r>
-              <a:rPr lang="ru-RU" dirty="0" smtClean="0"/>
-              <a:t>высокий </a:t>
-            </a:r>
-            <a:r>
-              <a:rPr lang="ru-RU" dirty="0"/>
-              <a:t>уровень интереса к автономной самоуправляемой </a:t>
-            </a:r>
-            <a:r>
-              <a:rPr lang="ru-RU" dirty="0" smtClean="0"/>
-              <a:t>технике</a:t>
-            </a:r>
-          </a:p>
-          <a:p>
-            <a:r>
-              <a:rPr lang="ru-RU" dirty="0" smtClean="0"/>
-              <a:t>в </a:t>
-            </a:r>
-            <a:r>
-              <a:rPr lang="ru-RU" dirty="0"/>
-              <a:t>числе наиболее проблемных подсистем </a:t>
-            </a:r>
-            <a:r>
-              <a:rPr lang="ru-RU" dirty="0" smtClean="0"/>
-              <a:t>значится </a:t>
-            </a:r>
-            <a:r>
-              <a:rPr lang="ru-RU" dirty="0"/>
-              <a:t>система </a:t>
-            </a:r>
-            <a:r>
-              <a:rPr lang="ru-RU" dirty="0" smtClean="0"/>
-              <a:t>навигации и позиционирования</a:t>
-            </a:r>
-          </a:p>
-          <a:p>
-            <a:r>
-              <a:rPr lang="ru-RU" dirty="0" smtClean="0"/>
-              <a:t>такую систему можно построить с использованием методов компьютерного зрения</a:t>
-            </a:r>
-          </a:p>
-          <a:p>
-            <a:r>
-              <a:rPr lang="ru-RU" dirty="0" smtClean="0"/>
-              <a:t>одна из решаемых задач – определение </a:t>
-            </a:r>
-            <a:r>
-              <a:rPr lang="ru-RU" dirty="0"/>
-              <a:t>углов наклона и поворота </a:t>
-            </a:r>
-            <a:r>
-              <a:rPr lang="ru-RU" dirty="0" smtClean="0"/>
-              <a:t>камеры</a:t>
+              <a:t>Спутниковые системы </a:t>
+            </a:r>
+            <a:r>
+              <a:rPr lang="ru-RU" dirty="0" smtClean="0"/>
+              <a:t>навигации</a:t>
+            </a:r>
+          </a:p>
+          <a:p>
+            <a:r>
+              <a:rPr lang="ru-RU" dirty="0" smtClean="0"/>
+              <a:t>Инерциальные </a:t>
+            </a:r>
+            <a:r>
+              <a:rPr lang="ru-RU" dirty="0" smtClean="0"/>
+              <a:t>системы навигации</a:t>
+            </a:r>
+          </a:p>
+          <a:p>
+            <a:r>
+              <a:rPr lang="ru-RU" dirty="0" smtClean="0"/>
+              <a:t>Системы локального </a:t>
+            </a:r>
+            <a:r>
+              <a:rPr lang="ru-RU" dirty="0" smtClean="0"/>
+              <a:t>позиционирования</a:t>
             </a:r>
             <a:endParaRPr lang="ru-RU" dirty="0"/>
           </a:p>
@@ -4846,7 +5985,7 @@
           <a:p>
             <a:r>
               <a:rPr lang="ru-RU" dirty="0" smtClean="0"/>
-              <a:t>Постановка задачи</a:t>
+              <a:t>Спутниковые системы навигации</a:t>
             </a:r>
             <a:endParaRPr lang="ru-RU" dirty="0"/>
           </a:p>
@@ -4865,76 +6004,112 @@
         <p:spPr/>
         <p:txBody>
           <a:bodyPr>
-            <a:normAutofit fontScale="92500" lnSpcReduction="20000"/>
+            <a:normAutofit fontScale="77500" lnSpcReduction="20000"/>
           </a:bodyPr>
           <a:lstStyle/>
           <a:p>
             <a:r>
               <a:rPr lang="ru-RU" dirty="0" smtClean="0"/>
-              <a:t>реализация метода, предложенного </a:t>
+              <a:t>Примеры: </a:t>
+            </a:r>
+            <a:r>
+              <a:rPr lang="en-US" dirty="0" smtClean="0"/>
+              <a:t>GPS</a:t>
             </a:r>
             <a:r>
               <a:rPr lang="ru-RU" dirty="0"/>
-              <a:t>Вилле </a:t>
-            </a:r>
-            <a:r>
-              <a:rPr lang="ru-RU" dirty="0" err="1"/>
-              <a:t>Хуттуненом</a:t>
+              <a:t>, </a:t>
+            </a:r>
+            <a:r>
+              <a:rPr lang="en-US" dirty="0" err="1"/>
+              <a:t>GLONASS</a:t>
             </a:r>
             <a:r>
               <a:rPr lang="ru-RU" dirty="0"/>
-              <a:t> и Робертом </a:t>
-            </a:r>
-            <a:r>
-              <a:rPr lang="ru-RU" dirty="0" err="1"/>
-              <a:t>Пише</a:t>
+              <a:t>, </a:t>
+            </a:r>
+            <a:r>
+              <a:rPr lang="en-US" dirty="0"/>
+              <a:t>GALILEO</a:t>
             </a:r>
             <a:r>
               <a:rPr lang="ru-RU" dirty="0"/>
-              <a:t> [</a:t>
-            </a:r>
-            <a:r>
-              <a:rPr lang="en-US" b="1" dirty="0"/>
-              <a:t>Link</a:t>
-            </a:r>
-            <a:r>
-              <a:rPr lang="ru-RU" b="1" dirty="0"/>
-              <a:t>1</a:t>
-            </a:r>
-            <a:r>
-              <a:rPr lang="ru-RU" dirty="0" smtClean="0"/>
-              <a:t>]</a:t>
-            </a:r>
-          </a:p>
-          <a:p>
-            <a:r>
-              <a:rPr lang="ru-RU" dirty="0" smtClean="0"/>
-              <a:t>проверка работоспособности на изображениях внутренних помещений</a:t>
-            </a:r>
-          </a:p>
-          <a:p>
-            <a:r>
-              <a:rPr lang="ru-RU" dirty="0" smtClean="0"/>
-              <a:t>перенос метода в условия городской среды</a:t>
-            </a:r>
-          </a:p>
-          <a:p>
-            <a:r>
-              <a:rPr lang="ru-RU" dirty="0" smtClean="0"/>
-              <a:t>проведение тестирования на наборе изображений городской застройки</a:t>
-            </a:r>
-          </a:p>
-          <a:p>
-            <a:r>
-              <a:rPr lang="ru-RU" dirty="0" smtClean="0"/>
-              <a:t>тестирование на наборе «плохих» с точки зрения специфики метода изображениях</a:t>
-            </a:r>
-          </a:p>
-          <a:p>
-            <a:r>
-              <a:rPr lang="ru-RU" dirty="0" smtClean="0"/>
-              <a:t>анализ проблем</a:t>
-            </a:r>
+              <a:t> и другие их </a:t>
+            </a:r>
+            <a:r>
+              <a:rPr lang="ru-RU" dirty="0" smtClean="0"/>
+              <a:t>аналоги</a:t>
+            </a:r>
+          </a:p>
+          <a:p>
+            <a:r>
+              <a:rPr lang="ru-RU" dirty="0" smtClean="0"/>
+              <a:t>Плюсы:</a:t>
+            </a:r>
+            <a:endParaRPr lang="ru-RU" dirty="0" smtClean="0"/>
+          </a:p>
+          <a:p>
+            <a:pPr lvl="1"/>
+            <a:r>
+              <a:rPr lang="ru-RU" dirty="0" smtClean="0"/>
+              <a:t>Универсальность – доступны почти </a:t>
+            </a:r>
+            <a:r>
+              <a:rPr lang="ru-RU" dirty="0" smtClean="0"/>
+              <a:t>везде и всегда</a:t>
+            </a:r>
+          </a:p>
+          <a:p>
+            <a:pPr lvl="1"/>
+            <a:r>
+              <a:rPr lang="ru-RU" dirty="0" smtClean="0"/>
+              <a:t>Является пассивной </a:t>
+            </a:r>
+            <a:r>
+              <a:rPr lang="ru-RU" dirty="0" smtClean="0"/>
+              <a:t>системой – требуются минимальные вычисления со стороны приемника</a:t>
+            </a:r>
+          </a:p>
+          <a:p>
+            <a:pPr lvl="1"/>
+            <a:r>
+              <a:rPr lang="ru-RU" dirty="0" smtClean="0"/>
+              <a:t>Не имеют </a:t>
+            </a:r>
+            <a:r>
+              <a:rPr lang="ru-RU" dirty="0" smtClean="0"/>
+              <a:t>дрейфа</a:t>
+            </a:r>
+          </a:p>
+          <a:p>
+            <a:r>
+              <a:rPr lang="ru-RU" dirty="0" smtClean="0"/>
+              <a:t>Минусы:</a:t>
+            </a:r>
+            <a:endParaRPr lang="ru-RU" dirty="0" smtClean="0"/>
+          </a:p>
+          <a:p>
+            <a:pPr lvl="1"/>
+            <a:r>
+              <a:rPr lang="ru-RU" dirty="0" smtClean="0"/>
+              <a:t>Погрешность порядка </a:t>
+            </a:r>
+            <a:r>
+              <a:rPr lang="ru-RU" dirty="0" smtClean="0"/>
+              <a:t>5-15 метров – слишком высокая для объектов, чьи линейные размеры не превышают нескольких метров</a:t>
+            </a:r>
+          </a:p>
+          <a:p>
+            <a:pPr lvl="1"/>
+            <a:r>
+              <a:rPr lang="ru-RU" dirty="0" smtClean="0"/>
+              <a:t>Увеличение погрешности </a:t>
+            </a:r>
+            <a:r>
+              <a:rPr lang="ru-RU" dirty="0" smtClean="0"/>
+              <a:t>или невозможность использования в условиях городской застройки, внутри помещений, внутри тоннелей, под землей и даже под густой листвой</a:t>
+            </a:r>
+            <a:endParaRPr lang="ru-RU" dirty="0"/>
           </a:p>
         </p:txBody>
       </p:sp>
@@ -4982,7 +6157,7 @@
           <a:p>
             <a:r>
               <a:rPr lang="ru-RU" dirty="0" smtClean="0"/>
-              <a:t>Распространенные способы решения задачи позиционирования</a:t>
+              <a:t>Инерциальные системы навигации</a:t>
             </a:r>
             <a:endParaRPr lang="ru-RU" dirty="0"/>
           </a:p>
@@ -5000,26 +6175,107 @@
         </p:nvSpPr>
         <p:spPr/>
         <p:txBody>
-          <a:bodyPr/>
-          <a:lstStyle/>
-          <a:p>
-            <a:r>
-              <a:rPr lang="ru-RU" dirty="0" smtClean="0"/>
-              <a:t>спутниковые системы навигации</a:t>
-            </a:r>
-          </a:p>
-          <a:p>
-            <a:r>
-              <a:rPr lang="ru-RU" dirty="0" smtClean="0"/>
-              <a:t>инерциальные системы навигации</a:t>
-            </a:r>
-          </a:p>
-          <a:p>
-            <a:r>
-              <a:rPr lang="ru-RU" dirty="0" smtClean="0"/>
-              <a:t>системы локального позиционирования</a:t>
-            </a:r>
-            <a:endParaRPr lang="ru-RU" dirty="0"/>
+          <a:bodyPr>
+            <a:normAutofit fontScale="77500" lnSpcReduction="20000"/>
+          </a:bodyPr>
+          <a:lstStyle/>
+          <a:p>
+            <a:r>
+              <a:rPr lang="ru-RU" dirty="0" smtClean="0"/>
+              <a:t>Акселерометры </a:t>
+            </a:r>
+            <a:r>
+              <a:rPr lang="ru-RU" dirty="0"/>
+              <a:t>для определения параметров линейного </a:t>
+            </a:r>
+            <a:r>
+              <a:rPr lang="ru-RU" dirty="0" smtClean="0"/>
+              <a:t>ускорения и гироскоп для </a:t>
+            </a:r>
+            <a:r>
+              <a:rPr lang="ru-RU" dirty="0"/>
+              <a:t>определения углов поворота и наклона</a:t>
+            </a:r>
+            <a:endParaRPr lang="ru-RU" dirty="0" smtClean="0"/>
+          </a:p>
+          <a:p>
+            <a:r>
+              <a:rPr lang="ru-RU" dirty="0" smtClean="0"/>
+              <a:t>Плюсы:</a:t>
+            </a:r>
+            <a:endParaRPr lang="ru-RU" dirty="0" smtClean="0"/>
+          </a:p>
+          <a:p>
+            <a:pPr lvl="1"/>
+            <a:r>
+              <a:rPr lang="ru-RU" dirty="0" smtClean="0"/>
+              <a:t>Автономность</a:t>
+            </a:r>
+            <a:endParaRPr lang="ru-RU" dirty="0" smtClean="0"/>
+          </a:p>
+          <a:p>
+            <a:pPr lvl="1"/>
+            <a:r>
+              <a:rPr lang="ru-RU" dirty="0" smtClean="0"/>
+              <a:t>Помехозащищенность</a:t>
+            </a:r>
+            <a:endParaRPr lang="ru-RU" dirty="0" smtClean="0"/>
+          </a:p>
+          <a:p>
+            <a:pPr lvl="1"/>
+            <a:r>
+              <a:rPr lang="ru-RU" dirty="0" smtClean="0"/>
+              <a:t>Возможность </a:t>
+            </a:r>
+            <a:r>
+              <a:rPr lang="ru-RU" dirty="0"/>
+              <a:t>полной автоматизации всех процессов </a:t>
+            </a:r>
+            <a:r>
+              <a:rPr lang="ru-RU" dirty="0" smtClean="0"/>
+              <a:t>навигации</a:t>
+            </a:r>
+          </a:p>
+          <a:p>
+            <a:pPr lvl="1"/>
+            <a:r>
+              <a:rPr lang="ru-RU" dirty="0" smtClean="0"/>
+              <a:t>Низкое </a:t>
+            </a:r>
+            <a:r>
+              <a:rPr lang="ru-RU" dirty="0" smtClean="0"/>
+              <a:t>энергопотребление</a:t>
+            </a:r>
+          </a:p>
+          <a:p>
+            <a:r>
+              <a:rPr lang="ru-RU" dirty="0" smtClean="0"/>
+              <a:t>Минусы:</a:t>
+            </a:r>
+            <a:endParaRPr lang="ru-RU" dirty="0" smtClean="0"/>
+          </a:p>
+          <a:p>
+            <a:pPr lvl="1"/>
+            <a:r>
+              <a:rPr lang="ru-RU" dirty="0" smtClean="0"/>
+              <a:t>Наличие </a:t>
+            </a:r>
+            <a:r>
+              <a:rPr lang="ru-RU" dirty="0" smtClean="0"/>
+              <a:t>дрейфа – </a:t>
+            </a:r>
+            <a:r>
+              <a:rPr lang="ru-RU" dirty="0" smtClean="0"/>
+              <a:t>то есть накопление </a:t>
+            </a:r>
+            <a:r>
+              <a:rPr lang="ru-RU" dirty="0" smtClean="0"/>
+              <a:t>ошибки </a:t>
+            </a:r>
+            <a:r>
+              <a:rPr lang="ru-RU" dirty="0"/>
+              <a:t>со временем работы. Различными техниками можно уменьшить величину ошибки, но не избавиться вовсе.</a:t>
+            </a:r>
           </a:p>
         </p:txBody>
       </p:sp>
@@ -5060,108 +6316,96 @@
         </p:nvSpPr>
         <p:spPr/>
         <p:txBody>
+          <a:bodyPr>
+            <a:normAutofit fontScale="90000"/>
+          </a:bodyPr>
+          <a:lstStyle/>
+          <a:p>
+            <a:r>
+              <a:rPr lang="ru-RU" dirty="0" smtClean="0"/>
+              <a:t>Системы локального позиционирования</a:t>
+            </a:r>
+            <a:endParaRPr lang="ru-RU" dirty="0"/>
+          </a:p>
+        </p:txBody>
+      </p:sp>
+      <p:sp>
+        <p:nvSpPr>
+          <p:cNvPr id="3" name="Содержимое 2"/>
+          <p:cNvSpPr>
+            <a:spLocks noGrp="1"/>
+          </p:cNvSpPr>
+          <p:nvPr>
+            <p:ph idx="1"/>
+          </p:nvPr>
+        </p:nvSpPr>
+        <p:spPr/>
+        <p:txBody>
           <a:bodyPr/>
           <a:lstStyle/>
           <a:p>
             <a:r>
               <a:rPr lang="ru-RU" dirty="0" smtClean="0"/>
-              <a:t>Спутниковые системы навигации</a:t>
-            </a:r>
-            <a:endParaRPr lang="ru-RU" dirty="0"/>
-          </a:p>
-        </p:txBody>
-      </p:sp>
-      <p:sp>
-        <p:nvSpPr>
-          <p:cNvPr id="3" name="Содержимое 2"/>
-          <p:cNvSpPr>
-            <a:spLocks noGrp="1"/>
-          </p:cNvSpPr>
-          <p:nvPr>
-            <p:ph idx="1"/>
-          </p:nvPr>
-        </p:nvSpPr>
-        <p:spPr/>
-        <p:txBody>
-          <a:bodyPr>
-            <a:normAutofit fontScale="77500" lnSpcReduction="20000"/>
-          </a:bodyPr>
-          <a:lstStyle/>
-          <a:p>
-            <a:r>
-              <a:rPr lang="en-US" dirty="0" smtClean="0"/>
-              <a:t>GPS</a:t>
+              <a:t>Использование </a:t>
             </a:r>
             <a:r>
               <a:rPr lang="ru-RU" dirty="0"/>
-              <a:t>, </a:t>
-            </a:r>
-            <a:r>
-              <a:rPr lang="en-US" dirty="0" err="1"/>
-              <a:t>GLONASS</a:t>
+              <a:t>технологий построения трехмерной карты окружающей </a:t>
+            </a:r>
+            <a:r>
+              <a:rPr lang="ru-RU" dirty="0" smtClean="0"/>
+              <a:t>среды:</a:t>
+            </a:r>
+          </a:p>
+          <a:p>
+            <a:pPr lvl="1"/>
+            <a:r>
+              <a:rPr lang="ru-RU" dirty="0" smtClean="0"/>
+              <a:t>На </a:t>
+            </a:r>
+            <a:r>
+              <a:rPr lang="ru-RU" dirty="0" smtClean="0"/>
+              <a:t>основе данных </a:t>
+            </a:r>
+            <a:r>
+              <a:rPr lang="ru-RU" dirty="0" err="1"/>
+              <a:t>эхолокации</a:t>
             </a:r>
             <a:r>
               <a:rPr lang="ru-RU" dirty="0"/>
-              <a:t>, </a:t>
-            </a:r>
-            <a:r>
-              <a:rPr lang="en-US" dirty="0"/>
-              <a:t>GALILEO</a:t>
+              <a:t> </a:t>
+            </a:r>
+            <a:r>
+              <a:rPr lang="ru-RU" dirty="0" smtClean="0"/>
+              <a:t>с инфракрасных </a:t>
             </a:r>
             <a:r>
               <a:rPr lang="ru-RU" dirty="0"/>
-              <a:t> и другие их </a:t>
-            </a:r>
-            <a:r>
-              <a:rPr lang="ru-RU" dirty="0" smtClean="0"/>
-              <a:t>аналоги</a:t>
-            </a:r>
-          </a:p>
-          <a:p>
-            <a:r>
-              <a:rPr lang="ru-RU" dirty="0" smtClean="0"/>
-              <a:t>плюсы:</a:t>
-            </a:r>
+              <a:t>или </a:t>
+            </a:r>
+            <a:r>
+              <a:rPr lang="ru-RU" dirty="0" smtClean="0"/>
+              <a:t>ультразвуковых датчиков</a:t>
+            </a:r>
+            <a:endParaRPr lang="ru-RU" dirty="0" smtClean="0"/>
           </a:p>
           <a:p>
             <a:pPr lvl="1"/>
             <a:r>
               <a:rPr lang="ru-RU" dirty="0" smtClean="0"/>
-              <a:t>универсальность, доступны почти везде и всегда</a:t>
-            </a:r>
-          </a:p>
-          <a:p>
-            <a:pPr lvl="1"/>
-            <a:r>
-              <a:rPr lang="ru-RU" dirty="0" smtClean="0"/>
-              <a:t>является пассивной системой – требуются минимальные вычисления со стороны приемника</a:t>
-            </a:r>
-          </a:p>
-          <a:p>
-            <a:pPr lvl="1"/>
-            <a:r>
-              <a:rPr lang="ru-RU" dirty="0" smtClean="0"/>
-              <a:t>не имеет дрейфа</a:t>
-            </a:r>
-          </a:p>
-          <a:p>
-            <a:r>
-              <a:rPr lang="ru-RU" dirty="0" smtClean="0"/>
-              <a:t>минусы:</a:t>
-            </a:r>
-          </a:p>
-          <a:p>
-            <a:pPr lvl="1"/>
-            <a:r>
-              <a:rPr lang="ru-RU" dirty="0" smtClean="0"/>
-              <a:t>погрешность порядка 5-15 метров – слишком высокая для объектов, чьи линейные размеры не превышают нескольких метров</a:t>
-            </a:r>
-          </a:p>
-          <a:p>
-            <a:pPr lvl="1"/>
-            <a:r>
-              <a:rPr lang="ru-RU" dirty="0" smtClean="0"/>
-              <a:t>увеличение погрешности или невозможность использования в условиях городской застройки, внутри помещений, внутри тоннелей, под землей и даже под густой листвой</a:t>
+              <a:t>На </a:t>
+            </a:r>
+            <a:r>
+              <a:rPr lang="ru-RU" dirty="0" smtClean="0"/>
+              <a:t>основе фотографических данных </a:t>
+            </a:r>
+            <a:r>
+              <a:rPr lang="ru-RU" dirty="0" smtClean="0"/>
+              <a:t>с использованием методов компьютерного </a:t>
+            </a:r>
+            <a:r>
+              <a:rPr lang="ru-RU" dirty="0" smtClean="0"/>
+              <a:t>зрения</a:t>
             </a:r>
             <a:endParaRPr lang="ru-RU" dirty="0"/>
           </a:p>
@@ -5202,7 +6446,12 @@
             <p:ph type="title"/>
           </p:nvPr>
         </p:nvSpPr>
-        <p:spPr/>
+        <p:spPr>
+          <a:xfrm>
+            <a:off x="251520" y="274638"/>
+            <a:ext cx="8568952" cy="1143000"/>
+          </a:xfrm>
+        </p:spPr>
         <p:txBody>
           <a:bodyPr>
             <a:normAutofit fontScale="90000"/>
@@ -5211,7 +6460,7 @@
           <a:p>
             <a:r>
               <a:rPr lang="ru-RU" dirty="0" smtClean="0"/>
-              <a:t>Инерциальные системы навигации</a:t>
+              <a:t>Системы локального позиционирования с использованием методов компьютерного зрения</a:t>
             </a:r>
             <a:endParaRPr lang="ru-RU" dirty="0"/>
           </a:p>
@@ -5227,85 +6476,86 @@
             <p:ph idx="1"/>
           </p:nvPr>
         </p:nvSpPr>
-        <p:spPr/>
+        <p:spPr>
+          <a:xfrm>
+            <a:off x="457200" y="1988840"/>
+            <a:ext cx="8229600" cy="4137323"/>
+          </a:xfrm>
+        </p:spPr>
         <p:txBody>
           <a:bodyPr>
-            <a:normAutofit fontScale="77500" lnSpcReduction="20000"/>
+            <a:normAutofit fontScale="92500"/>
           </a:bodyPr>
           <a:lstStyle/>
           <a:p>
             <a:r>
+              <a:rPr lang="ru-RU" dirty="0" smtClean="0"/>
+              <a:t>Высокий </a:t>
+            </a:r>
+            <a:r>
               <a:rPr lang="ru-RU" dirty="0"/>
-              <a:t>содержат акселерометры для определения параметров линейного </a:t>
-            </a:r>
-            <a:r>
-              <a:rPr lang="ru-RU" dirty="0" smtClean="0"/>
-              <a:t>ускорения и гироскоп для </a:t>
+              <a:t>уровень интереса к автономной самоуправляемой </a:t>
+            </a:r>
+            <a:r>
+              <a:rPr lang="ru-RU" dirty="0" smtClean="0"/>
+              <a:t>технике</a:t>
+            </a:r>
+          </a:p>
+          <a:p>
+            <a:r>
+              <a:rPr lang="ru-RU" dirty="0" smtClean="0"/>
+              <a:t>Система навигации </a:t>
+            </a:r>
+            <a:r>
+              <a:rPr lang="ru-RU" dirty="0" smtClean="0"/>
+              <a:t>и </a:t>
+            </a:r>
+            <a:r>
+              <a:rPr lang="ru-RU" dirty="0" smtClean="0"/>
+              <a:t>позиционирования (</a:t>
+            </a:r>
+            <a:r>
+              <a:rPr lang="ru-RU" dirty="0" err="1" smtClean="0"/>
+              <a:t>СНиП</a:t>
+            </a:r>
+            <a:r>
+              <a:rPr lang="ru-RU" dirty="0" smtClean="0"/>
+              <a:t>) как наиболее проблемная подсистема</a:t>
+            </a:r>
+            <a:endParaRPr lang="ru-RU" dirty="0" smtClean="0"/>
+          </a:p>
+          <a:p>
+            <a:r>
+              <a:rPr lang="ru-RU" dirty="0" smtClean="0"/>
+              <a:t>Построение </a:t>
+            </a:r>
+            <a:r>
+              <a:rPr lang="ru-RU" dirty="0" err="1" smtClean="0"/>
+              <a:t>СНиП</a:t>
+            </a:r>
+            <a:r>
+              <a:rPr lang="ru-RU" dirty="0" smtClean="0"/>
+              <a:t> </a:t>
+            </a:r>
+            <a:r>
+              <a:rPr lang="ru-RU" dirty="0" smtClean="0"/>
+              <a:t>с использованием методов компьютерного зрения</a:t>
+            </a:r>
+          </a:p>
+          <a:p>
+            <a:r>
+              <a:rPr lang="ru-RU" dirty="0" smtClean="0"/>
+              <a:t>Решение задачи определения </a:t>
             </a:r>
             <a:r>
               <a:rPr lang="ru-RU" dirty="0"/>
-              <a:t>определения углов поворота и наклона</a:t>
-            </a:r>
-            <a:endParaRPr lang="ru-RU" dirty="0" smtClean="0"/>
-          </a:p>
-          <a:p>
-            <a:r>
-              <a:rPr lang="ru-RU" dirty="0" smtClean="0"/>
-              <a:t>плюсы:</a:t>
-            </a:r>
-          </a:p>
-          <a:p>
-            <a:pPr lvl="1"/>
-            <a:r>
-              <a:rPr lang="ru-RU" dirty="0" smtClean="0"/>
-              <a:t>автономность</a:t>
-            </a:r>
-          </a:p>
-          <a:p>
-            <a:pPr lvl="1"/>
-            <a:r>
-              <a:rPr lang="ru-RU" dirty="0" smtClean="0"/>
-              <a:t>помехозащищенность</a:t>
-            </a:r>
-          </a:p>
-          <a:p>
-            <a:pPr lvl="1"/>
-            <a:r>
-              <a:rPr lang="ru-RU" dirty="0" smtClean="0"/>
-              <a:t>возможность </a:t>
-            </a:r>
-            <a:r>
-              <a:rPr lang="ru-RU" dirty="0"/>
-              <a:t>полной автоматизации всех процессов </a:t>
-            </a:r>
-            <a:r>
-              <a:rPr lang="ru-RU" dirty="0" smtClean="0"/>
-              <a:t>навигации</a:t>
-            </a:r>
-          </a:p>
-          <a:p>
-            <a:pPr lvl="1"/>
-            <a:r>
-              <a:rPr lang="ru-RU" dirty="0" smtClean="0"/>
-              <a:t>низкое энергопотребление</a:t>
-            </a:r>
-          </a:p>
-          <a:p>
-            <a:r>
-              <a:rPr lang="ru-RU" dirty="0" smtClean="0"/>
-              <a:t>минусы:</a:t>
-            </a:r>
-          </a:p>
-          <a:p>
-            <a:pPr lvl="1"/>
-            <a:r>
-              <a:rPr lang="ru-RU" dirty="0" smtClean="0"/>
-              <a:t>наличие дрейфа – накопление ошибки </a:t>
-            </a:r>
-            <a:r>
-              <a:rPr lang="ru-RU" dirty="0"/>
-              <a:t>со временем работы. Различными техниками можно уменьшить величину ошибки, но не избавиться вовсе.</a:t>
-            </a:r>
+              <a:t>углов наклона и поворота </a:t>
+            </a:r>
+            <a:r>
+              <a:rPr lang="ru-RU" dirty="0" smtClean="0"/>
+              <a:t>камеры</a:t>
+            </a:r>
+            <a:endParaRPr lang="ru-RU" dirty="0"/>
           </a:p>
         </p:txBody>
       </p:sp>
@@ -5346,69 +6596,116 @@
         </p:nvSpPr>
         <p:spPr/>
         <p:txBody>
+          <a:bodyPr/>
+          <a:lstStyle/>
+          <a:p>
+            <a:r>
+              <a:rPr lang="ru-RU" dirty="0" smtClean="0"/>
+              <a:t>Постановка задачи</a:t>
+            </a:r>
+            <a:endParaRPr lang="ru-RU" dirty="0"/>
+          </a:p>
+        </p:txBody>
+      </p:sp>
+      <p:sp>
+        <p:nvSpPr>
+          <p:cNvPr id="3" name="Содержимое 2"/>
+          <p:cNvSpPr>
+            <a:spLocks noGrp="1"/>
+          </p:cNvSpPr>
+          <p:nvPr>
+            <p:ph idx="1"/>
+          </p:nvPr>
+        </p:nvSpPr>
+        <p:spPr/>
+        <p:txBody>
           <a:bodyPr>
-            <a:normAutofit fontScale="90000"/>
+            <a:normAutofit/>
           </a:bodyPr>
           <a:lstStyle/>
           <a:p>
             <a:r>
               <a:rPr lang="ru-RU" dirty="0" smtClean="0"/>
-              <a:t>Системы локального позиционирования</a:t>
-            </a:r>
-            <a:endParaRPr lang="ru-RU" dirty="0"/>
-          </a:p>
-        </p:txBody>
-      </p:sp>
-      <p:sp>
-        <p:nvSpPr>
-          <p:cNvPr id="3" name="Содержимое 2"/>
-          <p:cNvSpPr>
-            <a:spLocks noGrp="1"/>
-          </p:cNvSpPr>
-          <p:nvPr>
-            <p:ph idx="1"/>
-          </p:nvPr>
-        </p:nvSpPr>
-        <p:spPr/>
-        <p:txBody>
-          <a:bodyPr/>
-          <a:lstStyle/>
-          <a:p>
+              <a:t>Реализация </a:t>
+            </a:r>
+            <a:r>
+              <a:rPr lang="ru-RU" dirty="0" smtClean="0"/>
+              <a:t>метода, предложенного </a:t>
+            </a:r>
             <a:r>
               <a:rPr lang="ru-RU" dirty="0"/>
-              <a:t>использование технологий построения трехмерной карты окружающей </a:t>
-            </a:r>
-            <a:r>
-              <a:rPr lang="ru-RU" dirty="0" smtClean="0"/>
-              <a:t>среды:</a:t>
+              <a:t>Вилле </a:t>
+            </a:r>
+            <a:r>
+              <a:rPr lang="ru-RU" dirty="0" err="1"/>
+              <a:t>Хуттуненом</a:t>
+            </a:r>
+            <a:r>
+              <a:rPr lang="ru-RU" dirty="0"/>
+              <a:t> и Робертом </a:t>
+            </a:r>
+            <a:r>
+              <a:rPr lang="ru-RU" dirty="0" err="1"/>
+              <a:t>Пише</a:t>
+            </a:r>
+            <a:r>
+              <a:rPr lang="ru-RU" dirty="0"/>
+              <a:t> [</a:t>
+            </a:r>
+            <a:r>
+              <a:rPr lang="en-US" b="1" dirty="0"/>
+              <a:t>Link</a:t>
+            </a:r>
+            <a:r>
+              <a:rPr lang="ru-RU" b="1" dirty="0"/>
+              <a:t>1</a:t>
+            </a:r>
+            <a:r>
+              <a:rPr lang="ru-RU" dirty="0" smtClean="0"/>
+              <a:t>]</a:t>
+            </a:r>
+          </a:p>
+          <a:p>
+            <a:r>
+              <a:rPr lang="ru-RU" dirty="0" smtClean="0"/>
+              <a:t>Проверка работоспособности </a:t>
+            </a:r>
+            <a:r>
+              <a:rPr lang="ru-RU" dirty="0" smtClean="0"/>
+              <a:t>метода</a:t>
             </a:r>
           </a:p>
           <a:p>
             <a:pPr lvl="1"/>
             <a:r>
               <a:rPr lang="ru-RU" dirty="0" smtClean="0"/>
-              <a:t>на основе данных </a:t>
-            </a:r>
-            <a:r>
-              <a:rPr lang="ru-RU" dirty="0" err="1"/>
-              <a:t>эхолокации</a:t>
-            </a:r>
-            <a:r>
-              <a:rPr lang="ru-RU" dirty="0"/>
-              <a:t> инфракрасными или ультразвуковыми </a:t>
-            </a:r>
-            <a:r>
-              <a:rPr lang="ru-RU" dirty="0" smtClean="0"/>
-              <a:t>датчиками</a:t>
+              <a:t>Проверка на </a:t>
+            </a:r>
+            <a:r>
+              <a:rPr lang="ru-RU" dirty="0" smtClean="0"/>
+              <a:t>изображениях внутренних помещений</a:t>
+            </a:r>
+          </a:p>
+          <a:p>
+            <a:r>
+              <a:rPr lang="ru-RU" dirty="0" smtClean="0"/>
+              <a:t>Перенос метода </a:t>
+            </a:r>
+            <a:r>
+              <a:rPr lang="ru-RU" dirty="0" smtClean="0"/>
+              <a:t>в условия городской среды</a:t>
             </a:r>
           </a:p>
           <a:p>
             <a:pPr lvl="1"/>
             <a:r>
               <a:rPr lang="ru-RU" dirty="0" smtClean="0"/>
-              <a:t>на основе фотографических данных методами компьютерного зрения</a:t>
-            </a:r>
-            <a:endParaRPr lang="ru-RU" dirty="0"/>
+              <a:t>Тестирования </a:t>
+            </a:r>
+            <a:r>
+              <a:rPr lang="ru-RU" dirty="0" smtClean="0"/>
+              <a:t>на наборе изображений городской застройки</a:t>
+            </a:r>
           </a:p>
         </p:txBody>
       </p:sp>
@@ -5449,23 +6746,25 @@
         </p:nvSpPr>
         <p:spPr>
           <a:xfrm>
-            <a:off x="323528" y="274638"/>
-            <a:ext cx="8568952" cy="1498178"/>
+            <a:off x="467544" y="116632"/>
+            <a:ext cx="8229600" cy="792088"/>
           </a:xfrm>
         </p:spPr>
         <p:txBody>
-          <a:bodyPr>
-            <a:normAutofit fontScale="90000"/>
-          </a:bodyPr>
-          <a:lstStyle/>
-          <a:p>
-            <a:r>
-              <a:rPr lang="ru-RU" dirty="0" smtClean="0"/>
-              <a:t>Методы компьютерного зрения, использующиеся в системах по</a:t>
-            </a:r>
-            <a:r>
-              <a:rPr lang="ru-RU" dirty="0" smtClean="0"/>
-              <a:t>зиционирования</a:t>
+          <a:bodyPr/>
+          <a:lstStyle/>
+          <a:p>
+            <a:r>
+              <a:rPr lang="ru-RU" dirty="0" smtClean="0"/>
+              <a:t>Метод</a:t>
+            </a:r>
+            <a:r>
+              <a:rPr lang="en-US" dirty="0" smtClean="0"/>
+              <a:t> </a:t>
+            </a:r>
+            <a:r>
+              <a:rPr lang="ru-RU" dirty="0" smtClean="0"/>
+              <a:t>Хуттунена-Пише</a:t>
             </a:r>
             <a:endParaRPr lang="ru-RU" dirty="0"/>
           </a:p>
@@ -5483,29 +6782,40 @@
         </p:nvSpPr>
         <p:spPr>
           <a:xfrm>
-            <a:off x="457200" y="1988840"/>
-            <a:ext cx="8229600" cy="4137323"/>
+            <a:off x="251520" y="908720"/>
+            <a:ext cx="4896544" cy="5688632"/>
           </a:xfrm>
         </p:spPr>
         <p:txBody>
-          <a:bodyPr/>
-          <a:lstStyle/>
-          <a:p>
-            <a:r>
-              <a:rPr lang="ru-RU" dirty="0"/>
-              <a:t>метод одновременной навигации и картирования (</a:t>
-            </a:r>
-            <a:r>
-              <a:rPr lang="en-US" dirty="0"/>
-              <a:t>simultaneous localization and mapping</a:t>
-            </a:r>
-            <a:r>
-              <a:rPr lang="ru-RU" dirty="0"/>
-              <a:t>, </a:t>
-            </a:r>
-            <a:r>
-              <a:rPr lang="en-US" dirty="0"/>
-              <a:t>SLAM</a:t>
+          <a:bodyPr>
+            <a:normAutofit fontScale="77500" lnSpcReduction="20000"/>
+          </a:bodyPr>
+          <a:lstStyle/>
+          <a:p>
+            <a:r>
+              <a:rPr lang="ru-RU" dirty="0" smtClean="0"/>
+              <a:t>Рассматривается модель камеры-обскуры</a:t>
+            </a:r>
+          </a:p>
+          <a:p>
+            <a:endParaRPr lang="ru-RU" dirty="0" smtClean="0"/>
+          </a:p>
+          <a:p>
+            <a:r>
+              <a:rPr lang="ru-RU" dirty="0" smtClean="0"/>
+              <a:t>При </a:t>
+            </a:r>
+            <a:r>
+              <a:rPr lang="ru-RU" dirty="0" smtClean="0"/>
+              <a:t>проекции п</a:t>
+            </a:r>
+            <a:r>
+              <a:rPr lang="ru-RU" dirty="0" smtClean="0"/>
+              <a:t>араллельные прямые пересекаются в точках схождения перспективы (</a:t>
+            </a:r>
+            <a:r>
+              <a:rPr lang="ru-RU" dirty="0" err="1" smtClean="0"/>
+              <a:t>ТСП</a:t>
             </a:r>
             <a:r>
               <a:rPr lang="ru-RU" dirty="0" smtClean="0"/>
@@ -5513,33 +6823,231 @@
             </a:r>
           </a:p>
           <a:p>
-            <a:r>
-              <a:rPr lang="ru-RU" dirty="0" smtClean="0"/>
-              <a:t>метод </a:t>
-            </a:r>
-            <a:r>
-              <a:rPr lang="ru-RU" dirty="0"/>
-              <a:t>определения структуры объекта в процессе движения (</a:t>
-            </a:r>
-            <a:r>
-              <a:rPr lang="en-US" dirty="0"/>
-              <a:t>structure from motion</a:t>
-            </a:r>
-            <a:r>
-              <a:rPr lang="ru-RU" dirty="0"/>
-              <a:t>, </a:t>
-            </a:r>
-            <a:r>
-              <a:rPr lang="en-US" dirty="0" err="1"/>
-              <a:t>SfM</a:t>
-            </a:r>
-            <a:r>
-              <a:rPr lang="ru-RU" dirty="0"/>
-              <a:t>)</a:t>
-            </a:r>
-          </a:p>
-        </p:txBody>
-      </p:sp>
+            <a:endParaRPr lang="ru-RU" dirty="0" smtClean="0"/>
+          </a:p>
+          <a:p>
+            <a:r>
+              <a:rPr lang="ru-RU" dirty="0" smtClean="0"/>
+              <a:t>Производится поиск сегментов линий (СЛ) на </a:t>
+            </a:r>
+            <a:r>
+              <a:rPr lang="ru-RU" dirty="0" smtClean="0"/>
+              <a:t>изображении</a:t>
+            </a:r>
+          </a:p>
+          <a:p>
+            <a:pPr lvl="1"/>
+            <a:r>
+              <a:rPr lang="ru-RU" dirty="0" smtClean="0"/>
+              <a:t>используется детектор</a:t>
+            </a:r>
+            <a:r>
+              <a:rPr lang="en-US" dirty="0" smtClean="0"/>
+              <a:t> </a:t>
+            </a:r>
+            <a:r>
+              <a:rPr lang="ru-RU" dirty="0" smtClean="0"/>
+              <a:t>СЛ, предложенный </a:t>
+            </a:r>
+            <a:r>
+              <a:rPr lang="ru-RU" dirty="0" err="1" smtClean="0"/>
+              <a:t>Джиои</a:t>
+            </a:r>
+            <a:endParaRPr lang="en-US" dirty="0" smtClean="0"/>
+          </a:p>
+          <a:p>
+            <a:r>
+              <a:rPr lang="ru-RU" dirty="0" smtClean="0"/>
+              <a:t>Выделяются три наибольших кластера СЛ с помощью алгоритма </a:t>
+            </a:r>
+            <a:r>
+              <a:rPr lang="en-US" dirty="0" err="1" smtClean="0"/>
+              <a:t>RANSAC</a:t>
+            </a:r>
+            <a:endParaRPr lang="ru-RU" dirty="0" smtClean="0"/>
+          </a:p>
+          <a:p>
+            <a:pPr lvl="1"/>
+            <a:r>
+              <a:rPr lang="ru-RU" dirty="0" smtClean="0"/>
+              <a:t>Помимо самих кластеров СЛ, получены грубые оценки искомых </a:t>
+            </a:r>
+            <a:r>
+              <a:rPr lang="ru-RU" dirty="0" err="1" smtClean="0"/>
+              <a:t>ТСП</a:t>
+            </a:r>
+            <a:endParaRPr lang="ru-RU" dirty="0" smtClean="0"/>
+          </a:p>
+        </p:txBody>
+      </p:sp>
+      <p:pic>
+        <p:nvPicPr>
+          <p:cNvPr id="4" name="Рисунок 3" descr="huttunen_pishe.png"/>
+          <p:cNvPicPr>
+            <a:picLocks noChangeAspect="1"/>
+          </p:cNvPicPr>
+          <p:nvPr/>
+        </p:nvPicPr>
+        <p:blipFill>
+          <a:blip r:embed="rId3" cstate="print"/>
+          <a:stretch>
+            <a:fillRect/>
+          </a:stretch>
+        </p:blipFill>
+        <p:spPr>
+          <a:xfrm>
+            <a:off x="5220072" y="3360582"/>
+            <a:ext cx="3852448" cy="1436570"/>
+          </a:xfrm>
+          <a:prstGeom prst="rect">
+            <a:avLst/>
+          </a:prstGeom>
+        </p:spPr>
+      </p:pic>
+      <p:pic>
+        <p:nvPicPr>
+          <p:cNvPr id="5" name="Рисунок 4" descr="huttunen_pishe_angles.png"/>
+          <p:cNvPicPr>
+            <a:picLocks noChangeAspect="1"/>
+          </p:cNvPicPr>
+          <p:nvPr/>
+        </p:nvPicPr>
+        <p:blipFill>
+          <a:blip r:embed="rId4" cstate="print"/>
+          <a:stretch>
+            <a:fillRect/>
+          </a:stretch>
+        </p:blipFill>
+        <p:spPr>
+          <a:xfrm>
+            <a:off x="5220072" y="4857899"/>
+            <a:ext cx="3010320" cy="1379413"/>
+          </a:xfrm>
+          <a:prstGeom prst="rect">
+            <a:avLst/>
+          </a:prstGeom>
+        </p:spPr>
+      </p:pic>
+      <p:pic>
+        <p:nvPicPr>
+          <p:cNvPr id="9218" name="Picture 2"/>
+          <p:cNvPicPr>
+            <a:picLocks noChangeAspect="1" noChangeArrowheads="1"/>
+          </p:cNvPicPr>
+          <p:nvPr/>
+        </p:nvPicPr>
+        <p:blipFill>
+          <a:blip r:embed="rId5" cstate="print"/>
+          <a:srcRect/>
+          <a:stretch>
+            <a:fillRect/>
+          </a:stretch>
+        </p:blipFill>
+        <p:spPr bwMode="auto">
+          <a:xfrm>
+            <a:off x="1187624" y="1637940"/>
+            <a:ext cx="3044571" cy="278892"/>
+          </a:xfrm>
+          <a:prstGeom prst="rect">
+            <a:avLst/>
+          </a:prstGeom>
+          <a:noFill/>
+          <a:ln w="9525">
+            <a:noFill/>
+            <a:miter lim="800000"/>
+            <a:headEnd/>
+            <a:tailEnd/>
+          </a:ln>
+        </p:spPr>
+      </p:pic>
+      <p:pic>
+        <p:nvPicPr>
+          <p:cNvPr id="8" name="Рисунок 7" descr="huttunen_pishe_pinhole_model.png"/>
+          <p:cNvPicPr>
+            <a:picLocks noChangeAspect="1"/>
+          </p:cNvPicPr>
+          <p:nvPr/>
+        </p:nvPicPr>
+        <p:blipFill>
+          <a:blip r:embed="rId6" cstate="print"/>
+          <a:stretch>
+            <a:fillRect/>
+          </a:stretch>
+        </p:blipFill>
+        <p:spPr>
+          <a:xfrm>
+            <a:off x="5364089" y="762469"/>
+            <a:ext cx="3565705" cy="2054353"/>
+          </a:xfrm>
+          <a:prstGeom prst="rect">
+            <a:avLst/>
+          </a:prstGeom>
+        </p:spPr>
+      </p:pic>
+      <p:pic>
+        <p:nvPicPr>
+          <p:cNvPr id="9220" name="Picture 4"/>
+          <p:cNvPicPr>
+            <a:picLocks noChangeAspect="1" noChangeArrowheads="1"/>
+          </p:cNvPicPr>
+          <p:nvPr/>
+        </p:nvPicPr>
+        <p:blipFill>
+          <a:blip r:embed="rId7" cstate="print"/>
+          <a:srcRect/>
+          <a:stretch>
+            <a:fillRect/>
+          </a:stretch>
+        </p:blipFill>
+        <p:spPr bwMode="auto">
+          <a:xfrm>
+            <a:off x="1115616" y="2960181"/>
+            <a:ext cx="3038475" cy="324803"/>
+          </a:xfrm>
+          <a:prstGeom prst="rect">
+            <a:avLst/>
+          </a:prstGeom>
+          <a:noFill/>
+          <a:ln w="9525">
+            <a:noFill/>
+            <a:miter lim="800000"/>
+            <a:headEnd/>
+            <a:tailEnd/>
+          </a:ln>
+        </p:spPr>
+      </p:pic>
+      <p:pic>
+        <p:nvPicPr>
+          <p:cNvPr id="9221" name="Picture 5"/>
+          <p:cNvPicPr>
+            <a:picLocks noChangeAspect="1" noChangeArrowheads="1"/>
+          </p:cNvPicPr>
+          <p:nvPr/>
+        </p:nvPicPr>
+        <p:blipFill>
+          <a:blip r:embed="rId8" cstate="print"/>
+          <a:srcRect/>
+          <a:stretch>
+            <a:fillRect/>
+          </a:stretch>
+        </p:blipFill>
+        <p:spPr bwMode="auto">
+          <a:xfrm>
+            <a:off x="5364088" y="6278835"/>
+            <a:ext cx="1066800" cy="390525"/>
+          </a:xfrm>
+          <a:prstGeom prst="rect">
+            <a:avLst/>
+          </a:prstGeom>
+          <a:noFill/>
+          <a:ln w="9525">
+            <a:noFill/>
+            <a:miter lim="800000"/>
+            <a:headEnd/>
+            <a:tailEnd/>
+          </a:ln>
+        </p:spPr>
+      </p:pic>
     </p:spTree>
   </p:cSld>
   <p:clrMapOvr>
@@ -5575,7 +7083,12 @@
             <p:ph type="title"/>
           </p:nvPr>
         </p:nvSpPr>
-        <p:spPr/>
+        <p:spPr>
+          <a:xfrm>
+            <a:off x="251520" y="44624"/>
+            <a:ext cx="8640960" cy="792088"/>
+          </a:xfrm>
+        </p:spPr>
         <p:txBody>
           <a:bodyPr>
             <a:normAutofit fontScale="90000"/>
@@ -5584,45 +7097,441 @@
           <a:p>
             <a:r>
               <a:rPr lang="ru-RU" dirty="0" smtClean="0"/>
-              <a:t>Пример результат</a:t>
-            </a:r>
-            <a:r>
-              <a:rPr lang="ru-RU" dirty="0"/>
-              <a:t>а</a:t>
-            </a:r>
-            <a:r>
-              <a:rPr lang="ru-RU" dirty="0" smtClean="0"/>
-              <a:t> работы метода </a:t>
+              <a:t>Метод</a:t>
             </a:r>
             <a:r>
               <a:rPr lang="en-US" dirty="0" smtClean="0"/>
-              <a:t>SLAM</a:t>
+              <a:t> </a:t>
+            </a:r>
+            <a:r>
+              <a:rPr lang="ru-RU" dirty="0" smtClean="0"/>
+              <a:t>Хуттунена-Пише (продолжение)</a:t>
             </a:r>
             <a:endParaRPr lang="ru-RU" dirty="0"/>
+          </a:p>
+        </p:txBody>
+      </p:sp>
+      <p:sp>
+        <p:nvSpPr>
+          <p:cNvPr id="3" name="Содержимое 2"/>
+          <p:cNvSpPr>
+            <a:spLocks noGrp="1"/>
+          </p:cNvSpPr>
+          <p:nvPr>
+            <p:ph idx="1"/>
+          </p:nvPr>
+        </p:nvSpPr>
+        <p:spPr>
+          <a:xfrm>
+            <a:off x="251520" y="980728"/>
+            <a:ext cx="5472608" cy="5256584"/>
+          </a:xfrm>
+        </p:spPr>
+        <p:txBody>
+          <a:bodyPr>
+            <a:normAutofit fontScale="70000" lnSpcReduction="20000"/>
+          </a:bodyPr>
+          <a:lstStyle/>
+          <a:p>
+            <a:r>
+              <a:rPr lang="ru-RU" dirty="0" smtClean="0"/>
+              <a:t>Производится уточнение каждой найденной </a:t>
+            </a:r>
+            <a:r>
+              <a:rPr lang="ru-RU" dirty="0" err="1" smtClean="0"/>
+              <a:t>ТСП</a:t>
+            </a:r>
+            <a:endParaRPr lang="ru-RU" dirty="0" smtClean="0"/>
+          </a:p>
+          <a:p>
+            <a:pPr lvl="1"/>
+            <a:r>
+              <a:rPr lang="ru-RU" dirty="0" smtClean="0"/>
+              <a:t>Решение переопределенной </a:t>
+            </a:r>
+            <a:r>
+              <a:rPr lang="ru-RU" dirty="0" err="1" smtClean="0"/>
+              <a:t>СЛАУ</a:t>
+            </a:r>
+            <a:r>
+              <a:rPr lang="ru-RU" dirty="0" smtClean="0"/>
+              <a:t>, образованной линиями кластера</a:t>
+            </a:r>
+          </a:p>
+          <a:p>
+            <a:pPr lvl="1"/>
+            <a:r>
+              <a:rPr lang="ru-RU" dirty="0" smtClean="0"/>
+              <a:t>Для решения используется сингулярное разложение матрицы </a:t>
+            </a:r>
+            <a:r>
+              <a:rPr lang="en-US" b="1" i="1" dirty="0" smtClean="0"/>
+              <a:t>L</a:t>
+            </a:r>
+            <a:endParaRPr lang="ru-RU" b="1" i="1" dirty="0" smtClean="0"/>
+          </a:p>
+          <a:p>
+            <a:r>
+              <a:rPr lang="ru-RU" dirty="0" smtClean="0"/>
+              <a:t>Матрица поворота камеры составляется из векторов-столбцов полученных единичных направлений </a:t>
+            </a:r>
+            <a:r>
+              <a:rPr lang="ru-RU" dirty="0" err="1" smtClean="0"/>
+              <a:t>ТСП</a:t>
+            </a:r>
+            <a:endParaRPr lang="ru-RU" dirty="0" smtClean="0"/>
+          </a:p>
+          <a:p>
+            <a:r>
+              <a:rPr lang="ru-RU" dirty="0" smtClean="0"/>
+              <a:t>Производится дополнительная ортогонализация полученной матрицы</a:t>
+            </a:r>
+          </a:p>
+          <a:p>
+            <a:pPr lvl="1"/>
+            <a:r>
+              <a:rPr lang="ru-RU" dirty="0" smtClean="0"/>
+              <a:t>Снова используется метод сингулярного разложения матрицы</a:t>
+            </a:r>
+          </a:p>
+          <a:p>
+            <a:r>
+              <a:rPr lang="ru-RU" dirty="0" smtClean="0"/>
+              <a:t>По полученной матрице поворота камеры </a:t>
+            </a:r>
+            <a:r>
+              <a:rPr lang="ru-RU" dirty="0" smtClean="0"/>
+              <a:t>определяются </a:t>
+            </a:r>
+            <a:r>
+              <a:rPr lang="ru-RU" dirty="0" smtClean="0"/>
+              <a:t>углы </a:t>
+            </a:r>
+            <a:r>
+              <a:rPr lang="ru-RU" dirty="0" smtClean="0"/>
+              <a:t>Эйлера в нотации (1, 2, 3)</a:t>
+            </a:r>
           </a:p>
         </p:txBody>
       </p:sp>
       <p:pic>
         <p:nvPicPr>
-          <p:cNvPr id="4" name="Содержимое 3" descr="slam_example.jpg"/>
+          <p:cNvPr id="9222" name="Picture 6"/>
           <p:cNvPicPr>
-            <a:picLocks noGrp="1" noChangeAspect="1"/>
+            <a:picLocks noChangeAspect="1" noChangeArrowheads="1"/>
           </p:cNvPicPr>
-          <p:nvPr>
-            <p:ph idx="1"/>
-          </p:nvPr>
+          <p:nvPr/>
         </p:nvPicPr>
         <p:blipFill>
-          <a:blip r:embed="rId2" cstate="print"/>
+          <a:blip r:embed="rId3" cstate="print"/>
+          <a:srcRect/>
           <a:stretch>
             <a:fillRect/>
           </a:stretch>
         </p:blipFill>
-        <p:spPr>
+        <p:spPr bwMode="auto">
           <a:xfrm>
-            <a:off x="950694" y="1484784"/>
-            <a:ext cx="7077690" cy="4949049"/>
+            <a:off x="5940145" y="1196740"/>
+            <a:ext cx="1461135" cy="284798"/>
           </a:xfrm>
+          <a:prstGeom prst="rect">
+            <a:avLst/>
+          </a:prstGeom>
+          <a:noFill/>
+          <a:ln w="9525">
+            <a:noFill/>
+            <a:miter lim="800000"/>
+            <a:headEnd/>
+            <a:tailEnd/>
+          </a:ln>
+        </p:spPr>
+      </p:pic>
+      <p:pic>
+        <p:nvPicPr>
+          <p:cNvPr id="9223" name="Picture 7"/>
+          <p:cNvPicPr>
+            <a:picLocks noChangeAspect="1" noChangeArrowheads="1"/>
+          </p:cNvPicPr>
+          <p:nvPr/>
+        </p:nvPicPr>
+        <p:blipFill>
+          <a:blip r:embed="rId4" cstate="print"/>
+          <a:srcRect/>
+          <a:stretch>
+            <a:fillRect/>
+          </a:stretch>
+        </p:blipFill>
+        <p:spPr bwMode="auto">
+          <a:xfrm>
+            <a:off x="5940152" y="1540783"/>
+            <a:ext cx="2451735" cy="520065"/>
+          </a:xfrm>
+          <a:prstGeom prst="rect">
+            <a:avLst/>
+          </a:prstGeom>
+          <a:noFill/>
+          <a:ln w="9525">
+            <a:noFill/>
+            <a:miter lim="800000"/>
+            <a:headEnd/>
+            <a:tailEnd/>
+          </a:ln>
+        </p:spPr>
+      </p:pic>
+      <p:pic>
+        <p:nvPicPr>
+          <p:cNvPr id="9224" name="Picture 8"/>
+          <p:cNvPicPr>
+            <a:picLocks noChangeAspect="1" noChangeArrowheads="1"/>
+          </p:cNvPicPr>
+          <p:nvPr/>
+        </p:nvPicPr>
+        <p:blipFill>
+          <a:blip r:embed="rId5" cstate="print"/>
+          <a:srcRect/>
+          <a:stretch>
+            <a:fillRect/>
+          </a:stretch>
+        </p:blipFill>
+        <p:spPr bwMode="auto">
+          <a:xfrm>
+            <a:off x="5940152" y="2123708"/>
+            <a:ext cx="2142173" cy="297180"/>
+          </a:xfrm>
+          <a:prstGeom prst="rect">
+            <a:avLst/>
+          </a:prstGeom>
+          <a:noFill/>
+          <a:ln w="9525">
+            <a:noFill/>
+            <a:miter lim="800000"/>
+            <a:headEnd/>
+            <a:tailEnd/>
+          </a:ln>
+        </p:spPr>
+      </p:pic>
+      <p:pic>
+        <p:nvPicPr>
+          <p:cNvPr id="9225" name="Picture 9"/>
+          <p:cNvPicPr>
+            <a:picLocks noChangeAspect="1" noChangeArrowheads="1"/>
+          </p:cNvPicPr>
+          <p:nvPr/>
+        </p:nvPicPr>
+        <p:blipFill>
+          <a:blip r:embed="rId6" cstate="print"/>
+          <a:srcRect/>
+          <a:stretch>
+            <a:fillRect/>
+          </a:stretch>
+        </p:blipFill>
+        <p:spPr bwMode="auto">
+          <a:xfrm>
+            <a:off x="5940152" y="4077072"/>
+            <a:ext cx="903923" cy="272415"/>
+          </a:xfrm>
+          <a:prstGeom prst="rect">
+            <a:avLst/>
+          </a:prstGeom>
+          <a:noFill/>
+          <a:ln w="9525">
+            <a:noFill/>
+            <a:miter lim="800000"/>
+            <a:headEnd/>
+            <a:tailEnd/>
+          </a:ln>
+        </p:spPr>
+      </p:pic>
+      <p:pic>
+        <p:nvPicPr>
+          <p:cNvPr id="9226" name="Picture 10"/>
+          <p:cNvPicPr>
+            <a:picLocks noChangeAspect="1" noChangeArrowheads="1"/>
+          </p:cNvPicPr>
+          <p:nvPr/>
+        </p:nvPicPr>
+        <p:blipFill>
+          <a:blip r:embed="rId7" cstate="print"/>
+          <a:srcRect/>
+          <a:stretch>
+            <a:fillRect/>
+          </a:stretch>
+        </p:blipFill>
+        <p:spPr bwMode="auto">
+          <a:xfrm>
+            <a:off x="7164288" y="4077072"/>
+            <a:ext cx="978218" cy="222885"/>
+          </a:xfrm>
+          <a:prstGeom prst="rect">
+            <a:avLst/>
+          </a:prstGeom>
+          <a:noFill/>
+          <a:ln w="9525">
+            <a:noFill/>
+            <a:miter lim="800000"/>
+            <a:headEnd/>
+            <a:tailEnd/>
+          </a:ln>
+        </p:spPr>
+      </p:pic>
+      <p:pic>
+        <p:nvPicPr>
+          <p:cNvPr id="32770" name="Picture 2"/>
+          <p:cNvPicPr>
+            <a:picLocks noChangeAspect="1" noChangeArrowheads="1"/>
+          </p:cNvPicPr>
+          <p:nvPr/>
+        </p:nvPicPr>
+        <p:blipFill>
+          <a:blip r:embed="rId8" cstate="print"/>
+          <a:srcRect/>
+          <a:stretch>
+            <a:fillRect/>
+          </a:stretch>
+        </p:blipFill>
+        <p:spPr bwMode="auto">
+          <a:xfrm>
+            <a:off x="5940152" y="2924944"/>
+            <a:ext cx="1324928" cy="247650"/>
+          </a:xfrm>
+          <a:prstGeom prst="rect">
+            <a:avLst/>
+          </a:prstGeom>
+          <a:noFill/>
+          <a:ln w="9525">
+            <a:noFill/>
+            <a:miter lim="800000"/>
+            <a:headEnd/>
+            <a:tailEnd/>
+          </a:ln>
+        </p:spPr>
+      </p:pic>
+      <p:pic>
+        <p:nvPicPr>
+          <p:cNvPr id="32771" name="Picture 3"/>
+          <p:cNvPicPr>
+            <a:picLocks noChangeAspect="1" noChangeArrowheads="1"/>
+          </p:cNvPicPr>
+          <p:nvPr/>
+        </p:nvPicPr>
+        <p:blipFill>
+          <a:blip r:embed="rId9" cstate="print"/>
+          <a:srcRect/>
+          <a:stretch>
+            <a:fillRect/>
+          </a:stretch>
+        </p:blipFill>
+        <p:spPr bwMode="auto">
+          <a:xfrm>
+            <a:off x="5730964" y="5805264"/>
+            <a:ext cx="1577340" cy="902970"/>
+          </a:xfrm>
+          <a:prstGeom prst="rect">
+            <a:avLst/>
+          </a:prstGeom>
+          <a:noFill/>
+          <a:ln w="9525">
+            <a:noFill/>
+            <a:miter lim="800000"/>
+            <a:headEnd/>
+            <a:tailEnd/>
+          </a:ln>
+        </p:spPr>
+      </p:pic>
+      <p:pic>
+        <p:nvPicPr>
+          <p:cNvPr id="32772" name="Picture 4"/>
+          <p:cNvPicPr>
+            <a:picLocks noChangeAspect="1" noChangeArrowheads="1"/>
+          </p:cNvPicPr>
+          <p:nvPr/>
+        </p:nvPicPr>
+        <p:blipFill>
+          <a:blip r:embed="rId10" cstate="print"/>
+          <a:srcRect/>
+          <a:stretch>
+            <a:fillRect/>
+          </a:stretch>
+        </p:blipFill>
+        <p:spPr bwMode="auto">
+          <a:xfrm>
+            <a:off x="1183769" y="5819541"/>
+            <a:ext cx="3244215" cy="705803"/>
+          </a:xfrm>
+          <a:prstGeom prst="rect">
+            <a:avLst/>
+          </a:prstGeom>
+          <a:noFill/>
+          <a:ln w="9525">
+            <a:noFill/>
+            <a:miter lim="800000"/>
+            <a:headEnd/>
+            <a:tailEnd/>
+          </a:ln>
+        </p:spPr>
+      </p:pic>
+      <p:pic>
+        <p:nvPicPr>
+          <p:cNvPr id="32773" name="Picture 5"/>
+          <p:cNvPicPr>
+            <a:picLocks noChangeAspect="1" noChangeArrowheads="1"/>
+          </p:cNvPicPr>
+          <p:nvPr/>
+        </p:nvPicPr>
+        <p:blipFill>
+          <a:blip r:embed="rId11" cstate="print"/>
+          <a:srcRect/>
+          <a:stretch>
+            <a:fillRect/>
+          </a:stretch>
+        </p:blipFill>
+        <p:spPr bwMode="auto">
+          <a:xfrm>
+            <a:off x="5687506" y="5013176"/>
+            <a:ext cx="3348990" cy="651510"/>
+          </a:xfrm>
+          <a:prstGeom prst="rect">
+            <a:avLst/>
+          </a:prstGeom>
+          <a:noFill/>
+          <a:ln w="9525">
+            <a:noFill/>
+            <a:miter lim="800000"/>
+            <a:headEnd/>
+            <a:tailEnd/>
+          </a:ln>
+        </p:spPr>
+      </p:pic>
+      <p:pic>
+        <p:nvPicPr>
+          <p:cNvPr id="32774" name="Picture 6"/>
+          <p:cNvPicPr>
+            <a:picLocks noChangeAspect="1" noChangeArrowheads="1"/>
+          </p:cNvPicPr>
+          <p:nvPr/>
+        </p:nvPicPr>
+        <p:blipFill>
+          <a:blip r:embed="rId12" cstate="print"/>
+          <a:srcRect/>
+          <a:stretch>
+            <a:fillRect/>
+          </a:stretch>
+        </p:blipFill>
+        <p:spPr bwMode="auto">
+          <a:xfrm>
+            <a:off x="5730964" y="4746858"/>
+            <a:ext cx="1577340" cy="194310"/>
+          </a:xfrm>
+          <a:prstGeom prst="rect">
+            <a:avLst/>
+          </a:prstGeom>
+          <a:noFill/>
+          <a:ln w="9525">
+            <a:noFill/>
+            <a:miter lim="800000"/>
+            <a:headEnd/>
+            <a:tailEnd/>
+          </a:ln>
         </p:spPr>
       </p:pic>
     </p:spTree>
@@ -5914,4 +7823,287 @@
   <a:objectDefaults/>
   <a:extraClrSchemeLst/>
 </a:theme>
+</file>
+
+<file path=ppt/theme/theme2.xml><?xml version="1.0" encoding="utf-8"?>
+<a:theme xmlns:a="http://schemas.openxmlformats.org/drawingml/2006/main" name="Тема Office">
+  <a:themeElements>
+    <a:clrScheme name="Стандартная">
+      <a:dk1>
+        <a:sysClr val="windowText" lastClr="000000"/>
+      </a:dk1>
+      <a:lt1>
+        <a:sysClr val="window" lastClr="FFFFFF"/>
+      </a:lt1>
+      <a:dk2>
+        <a:srgbClr val="1F497D"/>
+      </a:dk2>
+      <a:lt2>
+        <a:srgbClr val="EEECE1"/>
+      </a:lt2>
+      <a:accent1>
+        <a:srgbClr val="4F81BD"/>
+      </a:accent1>
+      <a:accent2>
+        <a:srgbClr val="C0504D"/>
+      </a:accent2>
+      <a:accent3>
+        <a:srgbClr val="9BBB59"/>
+      </a:accent3>
+      <a:accent4>
+        <a:srgbClr val="8064A2"/>
+      </a:accent4>
+      <a:accent5>
+        <a:srgbClr val="4BACC6"/>
+      </a:accent5>
+      <a:accent6>
+        <a:srgbClr val="F79646"/>
+      </a:accent6>
+      <a:hlink>
+        <a:srgbClr val="0000FF"/>
+      </a:hlink>
+      <a:folHlink>
+        <a:srgbClr val="800080"/>
+      </a:folHlink>
+    </a:clrScheme>
+    <a:fontScheme name="Стандартная">
+      <a:majorFont>
+        <a:latin typeface="Calibri"/>
+        <a:ea typeface=""/>
+        <a:cs typeface=""/>
+        <a:font script="Jpan" typeface="ＭＳ Ｐゴシック"/>
+        <a:font script="Hang" typeface="맑은 고딕"/>
+        <a:font script="Hans" typeface="宋体"/>
+        <a:font script="Hant" typeface="新細明體"/>
+        <a:font script="Arab" typeface="Times New Roman"/>
+        <a:font script="Hebr" typeface="Times New Roman"/>
+        <a:font script="Thai" typeface="Angsana New"/>
+        <a:font script="Ethi" typeface="Nyala"/>
+        <a:font script="Beng" typeface="Vrinda"/>
+        <a:font script="Gujr" typeface="Shruti"/>
+        <a:font script="Khmr" typeface="MoolBoran"/>
+        <a:font script="Knda" typeface="Tunga"/>
+        <a:font script="Guru" typeface="Raavi"/>
+        <a:font script="Cans" typeface="Euphemia"/>
+        <a:font script="Cher" typeface="Plantagenet Cherokee"/>
+        <a:font script="Yiii" typeface="Microsoft Yi Baiti"/>
+        <a:font script="Tibt" typeface="Microsoft Himalaya"/>
+        <a:font script="Thaa" typeface="MV Boli"/>
+        <a:font script="Deva" typeface="Mangal"/>
+        <a:font script="Telu" typeface="Gautami"/>
+        <a:font script="Taml" typeface="Latha"/>
+        <a:font script="Syrc" typeface="Estrangelo Edessa"/>
+        <a:font script="Orya" typeface="Kalinga"/>
+        <a:font script="Mlym" typeface="Kartika"/>
+        <a:font script="Laoo" typeface="DokChampa"/>
+        <a:font script="Sinh" typeface="Iskoola Pota"/>
+        <a:font script="Mong" typeface="Mongolian Baiti"/>
+        <a:font script="Viet" typeface="Times New Roman"/>
+        <a:font script="Uigh" typeface="Microsoft Uighur"/>
+      </a:majorFont>
+      <a:minorFont>
+        <a:latin typeface="Calibri"/>
+        <a:ea typeface=""/>
+        <a:cs typeface=""/>
+        <a:font script="Jpan" typeface="ＭＳ Ｐゴシック"/>
+        <a:font script="Hang" typeface="맑은 고딕"/>
+        <a:font script="Hans" typeface="宋体"/>
+        <a:font script="Hant" typeface="新細明體"/>
+        <a:font script="Arab" typeface="Arial"/>
+        <a:font script="Hebr" typeface="Arial"/>
+        <a:font script="Thai" typeface="Cordia New"/>
+        <a:font script="Ethi" typeface="Nyala"/>
+        <a:font script="Beng" typeface="Vrinda"/>
+        <a:font script="Gujr" typeface="Shruti"/>
+        <a:font script="Khmr" typeface="DaunPenh"/>
+        <a:font script="Knda" typeface="Tunga"/>
+        <a:font script="Guru" typeface="Raavi"/>
+        <a:font script="Cans" typeface="Euphemia"/>
+        <a:font script="Cher" typeface="Plantagenet Cherokee"/>
+        <a:font script="Yiii" typeface="Microsoft Yi Baiti"/>
+        <a:font script="Tibt" typeface="Microsoft Himalaya"/>
+        <a:font script="Thaa" typeface="MV Boli"/>
+        <a:font script="Deva" typeface="Mangal"/>
+        <a:font script="Telu" typeface="Gautami"/>
+        <a:font script="Taml" typeface="Latha"/>
+        <a:font script="Syrc" typeface="Estrangelo Edessa"/>
+        <a:font script="Orya" typeface="Kalinga"/>
+        <a:font script="Mlym" typeface="Kartika"/>
+        <a:font script="Laoo" typeface="DokChampa"/>
+        <a:font script="Sinh" typeface="Iskoola Pota"/>
+        <a:font script="Mong" typeface="Mongolian Baiti"/>
+        <a:font script="Viet" typeface="Arial"/>
+        <a:font script="Uigh" typeface="Microsoft Uighur"/>
+      </a:minorFont>
+    </a:fontScheme>
+    <a:fmtScheme name="Стандартная">
+      <a:fillStyleLst>
+        <a:solidFill>
+          <a:schemeClr val="phClr"/>
+        </a:solidFill>
+        <a:gradFill rotWithShape="1">
+          <a:gsLst>
+            <a:gs pos="0">
+              <a:schemeClr val="phClr">
+                <a:tint val="50000"/>
+                <a:satMod val="300000"/>
+              </a:schemeClr>
+            </a:gs>
+            <a:gs pos="35000">
+              <a:schemeClr val="phClr">
+                <a:tint val="37000"/>
+                <a:satMod val="300000"/>
+              </a:schemeClr>
+            </a:gs>
+            <a:gs pos="100000">
+              <a:schemeClr val="phClr">
+                <a:tint val="15000"/>
+                <a:satMod val="350000"/>
+              </a:schemeClr>
+            </a:gs>
+          </a:gsLst>
+          <a:lin ang="16200000" scaled="1"/>
+        </a:gradFill>
+        <a:gradFill rotWithShape="1">
+          <a:gsLst>
+            <a:gs pos="0">
+              <a:schemeClr val="phClr">
+                <a:shade val="51000"/>
+                <a:satMod val="130000"/>
+              </a:schemeClr>
+            </a:gs>
+            <a:gs pos="80000">
+              <a:schemeClr val="phClr">
+                <a:shade val="93000"/>
+                <a:satMod val="130000"/>
+              </a:schemeClr>
+            </a:gs>
+            <a:gs pos="100000">
+              <a:schemeClr val="phClr">
+                <a:shade val="94000"/>
+                <a:satMod val="135000"/>
+              </a:schemeClr>
+            </a:gs>
+          </a:gsLst>
+          <a:lin ang="16200000" scaled="0"/>
+        </a:gradFill>
+      </a:fillStyleLst>
+      <a:lnStyleLst>
+        <a:ln w="9525" cap="flat" cmpd="sng" algn="ctr">
+          <a:solidFill>
+            <a:schemeClr val="phClr">
+              <a:shade val="95000"/>
+              <a:satMod val="105000"/>
+            </a:schemeClr>
+          </a:solidFill>
+          <a:prstDash val="solid"/>
+        </a:ln>
+        <a:ln w="25400" cap="flat" cmpd="sng" algn="ctr">
+          <a:solidFill>
+            <a:schemeClr val="phClr"/>
+          </a:solidFill>
+          <a:prstDash val="solid"/>
+        </a:ln>
+        <a:ln w="38100" cap="flat" cmpd="sng" algn="ctr">
+          <a:solidFill>
+            <a:schemeClr val="phClr"/>
+          </a:solidFill>
+          <a:prstDash val="solid"/>
+        </a:ln>
+      </a:lnStyleLst>
+      <a:effectStyleLst>
+        <a:effectStyle>
+          <a:effectLst>
+            <a:outerShdw blurRad="40000" dist="20000" dir="5400000" rotWithShape="0">
+              <a:srgbClr val="000000">
+                <a:alpha val="38000"/>
+              </a:srgbClr>
+            </a:outerShdw>
+          </a:effectLst>
+        </a:effectStyle>
+        <a:effectStyle>
+          <a:effectLst>
+            <a:outerShdw blurRad="40000" dist="23000" dir="5400000" rotWithShape="0">
+              <a:srgbClr val="000000">
+                <a:alpha val="35000"/>
+              </a:srgbClr>
+            </a:outerShdw>
+          </a:effectLst>
+        </a:effectStyle>
+        <a:effectStyle>
+          <a:effectLst>
+            <a:outerShdw blurRad="40000" dist="23000" dir="5400000" rotWithShape="0">
+              <a:srgbClr val="000000">
+                <a:alpha val="35000"/>
+              </a:srgbClr>
+            </a:outerShdw>
+          </a:effectLst>
+          <a:scene3d>
+            <a:camera prst="orthographicFront">
+              <a:rot lat="0" lon="0" rev="0"/>
+            </a:camera>
+            <a:lightRig rig="threePt" dir="t">
+              <a:rot lat="0" lon="0" rev="1200000"/>
+            </a:lightRig>
+          </a:scene3d>
+          <a:sp3d>
+            <a:bevelT w="63500" h="25400"/>
+          </a:sp3d>
+        </a:effectStyle>
+      </a:effectStyleLst>
+      <a:bgFillStyleLst>
+        <a:solidFill>
+          <a:schemeClr val="phClr"/>
+        </a:solidFill>
+        <a:gradFill rotWithShape="1">
+          <a:gsLst>
+            <a:gs pos="0">
+              <a:schemeClr val="phClr">
+                <a:tint val="40000"/>
+                <a:satMod val="350000"/>
+              </a:schemeClr>
+            </a:gs>
+            <a:gs pos="40000">
+              <a:schemeClr val="phClr">
+                <a:tint val="45000"/>
+                <a:shade val="99000"/>
+                <a:satMod val="350000"/>
+              </a:schemeClr>
+            </a:gs>
+            <a:gs pos="100000">
+              <a:schemeClr val="phClr">
+                <a:shade val="20000"/>
+                <a:satMod val="255000"/>
+              </a:schemeClr>
+            </a:gs>
+          </a:gsLst>
+          <a:path path="circle">
+            <a:fillToRect l="50000" t="-80000" r="50000" b="180000"/>
+          </a:path>
+        </a:gradFill>
+        <a:gradFill rotWithShape="1">
+          <a:gsLst>
+            <a:gs pos="0">
+              <a:schemeClr val="phClr">
+                <a:tint val="80000"/>
+                <a:satMod val="300000"/>
+              </a:schemeClr>
+            </a:gs>
+            <a:gs pos="100000">
+              <a:schemeClr val="phClr">
+                <a:shade val="30000"/>
+                <a:satMod val="200000"/>
+              </a:schemeClr>
+            </a:gs>
+          </a:gsLst>
+          <a:path path="circle">
+            <a:fillToRect l="50000" t="50000" r="50000" b="50000"/>
+          </a:path>
+        </a:gradFill>
+      </a:bgFillStyleLst>
+    </a:fmtScheme>
+  </a:themeElements>
+  <a:objectDefaults/>
+  <a:extraClrSchemeLst/>
+</a:theme>
 </file>
</xml_diff>

<commit_message>
+ tuesday midday presentation & stat charts again
</commit_message>
<xml_diff>
--- a/presentation.pptx
+++ b/presentation.pptx
@@ -130,7 +130,6 @@
 
 <file path=ppt/charts/chart1.xml><?xml version="1.0" encoding="utf-8"?>
 <c:chartSpace xmlns:c="http://schemas.openxmlformats.org/drawingml/2006/chart" xmlns:a="http://schemas.openxmlformats.org/drawingml/2006/main" xmlns:r="http://schemas.openxmlformats.org/officeDocument/2006/relationships">
-  <c:date1904 val="1"/>
   <c:lang val="ru-RU"/>
   <c:chart>
     <c:title>
@@ -165,7 +164,7 @@
           <c:order val="0"/>
           <c:tx>
             <c:strRef>
-              <c:f>[stats.xlsx]yudb_indoor_3axis!$G$1</c:f>
+              <c:f>yudb_indoor_3axis!$G$1</c:f>
               <c:strCache>
                 <c:ptCount val="1"/>
                 <c:pt idx="0">
@@ -176,18 +175,18 @@
           </c:tx>
           <c:xVal>
             <c:numRef>
-              <c:f>[stats.xlsx]yudb_indoor_3axis!$F$2:$F$10</c:f>
+              <c:f>yudb_indoor_3axis!$F$2:$F$10</c:f>
               <c:numCache>
                 <c:formatCode>General</c:formatCode>
                 <c:ptCount val="9"/>
                 <c:pt idx="0">
-                  <c:v>0.13453294649086761</c:v>
+                  <c:v>0.13453294649086753</c:v>
                 </c:pt>
                 <c:pt idx="1">
-                  <c:v>5.645306317715276</c:v>
+                  <c:v>5.6453063177152787</c:v>
                 </c:pt>
                 <c:pt idx="2">
-                  <c:v>11.156079688939696</c:v>
+                  <c:v>11.156079688939691</c:v>
                 </c:pt>
                 <c:pt idx="3">
                   <c:v>16.666853060164105</c:v>
@@ -196,20 +195,20 @@
                   <c:v>22.177626431388514</c:v>
                 </c:pt>
                 <c:pt idx="5">
-                  <c:v>27.688399802612913</c:v>
+                  <c:v>27.688399802612924</c:v>
                 </c:pt>
                 <c:pt idx="6">
                   <c:v>33.199173173837337</c:v>
                 </c:pt>
                 <c:pt idx="7">
-                  <c:v>38.709946545061761</c:v>
+                  <c:v>38.709946545061747</c:v>
                 </c:pt>
               </c:numCache>
             </c:numRef>
           </c:xVal>
           <c:yVal>
             <c:numRef>
-              <c:f>[stats.xlsx]yudb_indoor_3axis!$G$2:$G$10</c:f>
+              <c:f>yudb_indoor_3axis!$G$2:$G$10</c:f>
               <c:numCache>
                 <c:formatCode>General</c:formatCode>
                 <c:ptCount val="9"/>
@@ -250,7 +249,7 @@
           <c:order val="1"/>
           <c:tx>
             <c:strRef>
-              <c:f>[stats.xlsx]yudb_indoor_3axis!$H$1</c:f>
+              <c:f>yudb_indoor_3axis!$H$1</c:f>
               <c:strCache>
                 <c:ptCount val="1"/>
                 <c:pt idx="0">
@@ -261,18 +260,18 @@
           </c:tx>
           <c:xVal>
             <c:numRef>
-              <c:f>[stats.xlsx]yudb_indoor_3axis!$F$2:$F$10</c:f>
+              <c:f>yudb_indoor_3axis!$F$2:$F$10</c:f>
               <c:numCache>
                 <c:formatCode>General</c:formatCode>
                 <c:ptCount val="9"/>
                 <c:pt idx="0">
-                  <c:v>0.13453294649086761</c:v>
+                  <c:v>0.13453294649086753</c:v>
                 </c:pt>
                 <c:pt idx="1">
-                  <c:v>5.645306317715276</c:v>
+                  <c:v>5.6453063177152787</c:v>
                 </c:pt>
                 <c:pt idx="2">
-                  <c:v>11.156079688939696</c:v>
+                  <c:v>11.156079688939691</c:v>
                 </c:pt>
                 <c:pt idx="3">
                   <c:v>16.666853060164105</c:v>
@@ -281,20 +280,20 @@
                   <c:v>22.177626431388514</c:v>
                 </c:pt>
                 <c:pt idx="5">
-                  <c:v>27.688399802612913</c:v>
+                  <c:v>27.688399802612924</c:v>
                 </c:pt>
                 <c:pt idx="6">
                   <c:v>33.199173173837337</c:v>
                 </c:pt>
                 <c:pt idx="7">
-                  <c:v>38.709946545061761</c:v>
+                  <c:v>38.709946545061747</c:v>
                 </c:pt>
               </c:numCache>
             </c:numRef>
           </c:xVal>
           <c:yVal>
             <c:numRef>
-              <c:f>[stats.xlsx]yudb_indoor_3axis!$H$2:$H$10</c:f>
+              <c:f>yudb_indoor_3axis!$H$2:$H$10</c:f>
               <c:numCache>
                 <c:formatCode>General</c:formatCode>
                 <c:ptCount val="9"/>
@@ -335,7 +334,7 @@
           <c:order val="2"/>
           <c:tx>
             <c:strRef>
-              <c:f>[stats.xlsx]yudb_indoor_3axis!$I$1</c:f>
+              <c:f>yudb_indoor_3axis!$I$1</c:f>
               <c:strCache>
                 <c:ptCount val="1"/>
                 <c:pt idx="0">
@@ -346,18 +345,18 @@
           </c:tx>
           <c:xVal>
             <c:numRef>
-              <c:f>[stats.xlsx]yudb_indoor_3axis!$F$2:$F$10</c:f>
+              <c:f>yudb_indoor_3axis!$F$2:$F$10</c:f>
               <c:numCache>
                 <c:formatCode>General</c:formatCode>
                 <c:ptCount val="9"/>
                 <c:pt idx="0">
-                  <c:v>0.13453294649086761</c:v>
+                  <c:v>0.13453294649086753</c:v>
                 </c:pt>
                 <c:pt idx="1">
-                  <c:v>5.645306317715276</c:v>
+                  <c:v>5.6453063177152787</c:v>
                 </c:pt>
                 <c:pt idx="2">
-                  <c:v>11.156079688939696</c:v>
+                  <c:v>11.156079688939691</c:v>
                 </c:pt>
                 <c:pt idx="3">
                   <c:v>16.666853060164105</c:v>
@@ -366,20 +365,20 @@
                   <c:v>22.177626431388514</c:v>
                 </c:pt>
                 <c:pt idx="5">
-                  <c:v>27.688399802612913</c:v>
+                  <c:v>27.688399802612924</c:v>
                 </c:pt>
                 <c:pt idx="6">
                   <c:v>33.199173173837337</c:v>
                 </c:pt>
                 <c:pt idx="7">
-                  <c:v>38.709946545061761</c:v>
+                  <c:v>38.709946545061747</c:v>
                 </c:pt>
               </c:numCache>
             </c:numRef>
           </c:xVal>
           <c:yVal>
             <c:numRef>
-              <c:f>[stats.xlsx]yudb_indoor_3axis!$I$2:$I$10</c:f>
+              <c:f>yudb_indoor_3axis!$I$2:$I$10</c:f>
               <c:numCache>
                 <c:formatCode>General</c:formatCode>
                 <c:ptCount val="9"/>
@@ -415,15 +414,33 @@
           </c:yVal>
           <c:smooth val="1"/>
         </c:ser>
-        <c:axId val="45870080"/>
-        <c:axId val="49226496"/>
+        <c:axId val="92312320"/>
+        <c:axId val="92314624"/>
       </c:scatterChart>
       <c:valAx>
-        <c:axId val="45870080"/>
+        <c:axId val="92312320"/>
         <c:scaling>
           <c:orientation val="minMax"/>
         </c:scaling>
         <c:axPos val="b"/>
+        <c:title>
+          <c:tx>
+            <c:rich>
+              <a:bodyPr/>
+              <a:lstStyle/>
+              <a:p>
+                <a:pPr>
+                  <a:defRPr sz="1600" b="0"/>
+                </a:pPr>
+                <a:r>
+                  <a:rPr lang="ru-RU" sz="1600" b="0"/>
+                  <a:t>Абсолютная величина угла между вычисленным направлением оси и верным</a:t>
+                </a:r>
+              </a:p>
+            </c:rich>
+          </c:tx>
+          <c:layout/>
+        </c:title>
         <c:numFmt formatCode="General" sourceLinked="1"/>
         <c:tickLblPos val="nextTo"/>
         <c:txPr>
@@ -436,17 +453,35 @@
             <a:endParaRPr lang="ru-RU"/>
           </a:p>
         </c:txPr>
-        <c:crossAx val="49226496"/>
+        <c:crossAx val="92314624"/>
         <c:crosses val="autoZero"/>
         <c:crossBetween val="midCat"/>
       </c:valAx>
       <c:valAx>
-        <c:axId val="49226496"/>
+        <c:axId val="92314624"/>
         <c:scaling>
           <c:orientation val="minMax"/>
         </c:scaling>
         <c:axPos val="l"/>
         <c:majorGridlines/>
+        <c:title>
+          <c:tx>
+            <c:rich>
+              <a:bodyPr rot="-5400000" vert="horz"/>
+              <a:lstStyle/>
+              <a:p>
+                <a:pPr>
+                  <a:defRPr b="0"/>
+                </a:pPr>
+                <a:r>
+                  <a:rPr lang="ru-RU" sz="1600" b="0"/>
+                  <a:t>Количество изображений на интервале</a:t>
+                </a:r>
+              </a:p>
+            </c:rich>
+          </c:tx>
+          <c:layout/>
+        </c:title>
         <c:numFmt formatCode="General" sourceLinked="1"/>
         <c:tickLblPos val="nextTo"/>
         <c:txPr>
@@ -459,7 +494,7 @@
             <a:endParaRPr lang="ru-RU"/>
           </a:p>
         </c:txPr>
-        <c:crossAx val="45870080"/>
+        <c:crossAx val="92312320"/>
         <c:crosses val="autoZero"/>
         <c:crossBetween val="midCat"/>
       </c:valAx>
@@ -520,7 +555,7 @@
           <c:order val="0"/>
           <c:tx>
             <c:strRef>
-              <c:f>[stats.xlsx]yudb_outdoor_forMe!$G$1</c:f>
+              <c:f>yudb_outdoor_3axis!$G$1</c:f>
               <c:strCache>
                 <c:ptCount val="1"/>
                 <c:pt idx="0">
@@ -531,21 +566,21 @@
           </c:tx>
           <c:xVal>
             <c:numRef>
-              <c:f>[stats.xlsx]yudb_outdoor_forMe!$F$2:$F$10</c:f>
+              <c:f>yudb_outdoor_3axis!$F$2:$F$10</c:f>
               <c:numCache>
                 <c:formatCode>General</c:formatCode>
                 <c:ptCount val="9"/>
                 <c:pt idx="0">
-                  <c:v>0.39419540124627761</c:v>
+                  <c:v>0.39419540124627744</c:v>
                 </c:pt>
                 <c:pt idx="1">
-                  <c:v>7.0408578466579073</c:v>
+                  <c:v>7.0408578466579126</c:v>
                 </c:pt>
                 <c:pt idx="2">
                   <c:v>13.687520292069546</c:v>
                 </c:pt>
                 <c:pt idx="3">
-                  <c:v>20.334182737481193</c:v>
+                  <c:v>20.334182737481182</c:v>
                 </c:pt>
                 <c:pt idx="4">
                   <c:v>26.980845182892818</c:v>
@@ -554,17 +589,17 @@
                   <c:v>33.62750762830445</c:v>
                 </c:pt>
                 <c:pt idx="6">
-                  <c:v>40.274170073716064</c:v>
+                  <c:v>40.274170073716085</c:v>
                 </c:pt>
                 <c:pt idx="7">
-                  <c:v>46.920832519127742</c:v>
+                  <c:v>46.920832519127721</c:v>
                 </c:pt>
               </c:numCache>
             </c:numRef>
           </c:xVal>
           <c:yVal>
             <c:numRef>
-              <c:f>[stats.xlsx]yudb_outdoor_forMe!$G$2:$G$10</c:f>
+              <c:f>yudb_outdoor_3axis!$G$2:$G$10</c:f>
               <c:numCache>
                 <c:formatCode>General</c:formatCode>
                 <c:ptCount val="9"/>
@@ -605,7 +640,7 @@
           <c:order val="1"/>
           <c:tx>
             <c:strRef>
-              <c:f>[stats.xlsx]yudb_outdoor_forMe!$H$1</c:f>
+              <c:f>yudb_outdoor_3axis!$H$1</c:f>
               <c:strCache>
                 <c:ptCount val="1"/>
                 <c:pt idx="0">
@@ -616,21 +651,21 @@
           </c:tx>
           <c:xVal>
             <c:numRef>
-              <c:f>[stats.xlsx]yudb_outdoor_forMe!$F$2:$F$10</c:f>
+              <c:f>yudb_outdoor_3axis!$F$2:$F$10</c:f>
               <c:numCache>
                 <c:formatCode>General</c:formatCode>
                 <c:ptCount val="9"/>
                 <c:pt idx="0">
-                  <c:v>0.39419540124627761</c:v>
+                  <c:v>0.39419540124627744</c:v>
                 </c:pt>
                 <c:pt idx="1">
-                  <c:v>7.0408578466579073</c:v>
+                  <c:v>7.0408578466579126</c:v>
                 </c:pt>
                 <c:pt idx="2">
                   <c:v>13.687520292069546</c:v>
                 </c:pt>
                 <c:pt idx="3">
-                  <c:v>20.334182737481193</c:v>
+                  <c:v>20.334182737481182</c:v>
                 </c:pt>
                 <c:pt idx="4">
                   <c:v>26.980845182892818</c:v>
@@ -639,17 +674,17 @@
                   <c:v>33.62750762830445</c:v>
                 </c:pt>
                 <c:pt idx="6">
-                  <c:v>40.274170073716064</c:v>
+                  <c:v>40.274170073716085</c:v>
                 </c:pt>
                 <c:pt idx="7">
-                  <c:v>46.920832519127742</c:v>
+                  <c:v>46.920832519127721</c:v>
                 </c:pt>
               </c:numCache>
             </c:numRef>
           </c:xVal>
           <c:yVal>
             <c:numRef>
-              <c:f>[stats.xlsx]yudb_outdoor_forMe!$H$2:$H$10</c:f>
+              <c:f>yudb_outdoor_3axis!$H$2:$H$10</c:f>
               <c:numCache>
                 <c:formatCode>General</c:formatCode>
                 <c:ptCount val="9"/>
@@ -690,7 +725,7 @@
           <c:order val="2"/>
           <c:tx>
             <c:strRef>
-              <c:f>[stats.xlsx]yudb_outdoor_forMe!$I$1</c:f>
+              <c:f>yudb_outdoor_3axis!$I$1</c:f>
               <c:strCache>
                 <c:ptCount val="1"/>
                 <c:pt idx="0">
@@ -701,21 +736,21 @@
           </c:tx>
           <c:xVal>
             <c:numRef>
-              <c:f>[stats.xlsx]yudb_outdoor_forMe!$F$2:$F$10</c:f>
+              <c:f>yudb_outdoor_3axis!$F$2:$F$10</c:f>
               <c:numCache>
                 <c:formatCode>General</c:formatCode>
                 <c:ptCount val="9"/>
                 <c:pt idx="0">
-                  <c:v>0.39419540124627761</c:v>
+                  <c:v>0.39419540124627744</c:v>
                 </c:pt>
                 <c:pt idx="1">
-                  <c:v>7.0408578466579073</c:v>
+                  <c:v>7.0408578466579126</c:v>
                 </c:pt>
                 <c:pt idx="2">
                   <c:v>13.687520292069546</c:v>
                 </c:pt>
                 <c:pt idx="3">
-                  <c:v>20.334182737481193</c:v>
+                  <c:v>20.334182737481182</c:v>
                 </c:pt>
                 <c:pt idx="4">
                   <c:v>26.980845182892818</c:v>
@@ -724,17 +759,17 @@
                   <c:v>33.62750762830445</c:v>
                 </c:pt>
                 <c:pt idx="6">
-                  <c:v>40.274170073716064</c:v>
+                  <c:v>40.274170073716085</c:v>
                 </c:pt>
                 <c:pt idx="7">
-                  <c:v>46.920832519127742</c:v>
+                  <c:v>46.920832519127721</c:v>
                 </c:pt>
               </c:numCache>
             </c:numRef>
           </c:xVal>
           <c:yVal>
             <c:numRef>
-              <c:f>[stats.xlsx]yudb_outdoor_forMe!$I$2:$I$10</c:f>
+              <c:f>yudb_outdoor_3axis!$I$2:$I$10</c:f>
               <c:numCache>
                 <c:formatCode>General</c:formatCode>
                 <c:ptCount val="9"/>
@@ -770,15 +805,33 @@
           </c:yVal>
           <c:smooth val="1"/>
         </c:ser>
-        <c:axId val="49260800"/>
-        <c:axId val="49270784"/>
+        <c:axId val="67266816"/>
+        <c:axId val="67465984"/>
       </c:scatterChart>
       <c:valAx>
-        <c:axId val="49260800"/>
+        <c:axId val="67266816"/>
         <c:scaling>
           <c:orientation val="minMax"/>
         </c:scaling>
         <c:axPos val="b"/>
+        <c:title>
+          <c:tx>
+            <c:rich>
+              <a:bodyPr/>
+              <a:lstStyle/>
+              <a:p>
+                <a:pPr>
+                  <a:defRPr sz="1600" b="0"/>
+                </a:pPr>
+                <a:r>
+                  <a:rPr lang="ru-RU" sz="1600" b="0"/>
+                  <a:t>Абсолютная величина угла между вычисленным направлением оси и верным</a:t>
+                </a:r>
+              </a:p>
+            </c:rich>
+          </c:tx>
+          <c:layout/>
+        </c:title>
         <c:numFmt formatCode="General" sourceLinked="1"/>
         <c:tickLblPos val="nextTo"/>
         <c:txPr>
@@ -791,17 +844,35 @@
             <a:endParaRPr lang="ru-RU"/>
           </a:p>
         </c:txPr>
-        <c:crossAx val="49270784"/>
+        <c:crossAx val="67465984"/>
         <c:crosses val="autoZero"/>
         <c:crossBetween val="midCat"/>
       </c:valAx>
       <c:valAx>
-        <c:axId val="49270784"/>
+        <c:axId val="67465984"/>
         <c:scaling>
           <c:orientation val="minMax"/>
         </c:scaling>
         <c:axPos val="l"/>
         <c:majorGridlines/>
+        <c:title>
+          <c:tx>
+            <c:rich>
+              <a:bodyPr rot="-5400000" vert="horz"/>
+              <a:lstStyle/>
+              <a:p>
+                <a:pPr>
+                  <a:defRPr sz="1600" b="0"/>
+                </a:pPr>
+                <a:r>
+                  <a:rPr lang="ru-RU" sz="1600" b="0"/>
+                  <a:t>Количество изображений на интервале</a:t>
+                </a:r>
+              </a:p>
+            </c:rich>
+          </c:tx>
+          <c:layout/>
+        </c:title>
         <c:numFmt formatCode="General" sourceLinked="1"/>
         <c:tickLblPos val="nextTo"/>
         <c:txPr>
@@ -814,7 +885,7 @@
             <a:endParaRPr lang="ru-RU"/>
           </a:p>
         </c:txPr>
-        <c:crossAx val="49260800"/>
+        <c:crossAx val="67266816"/>
         <c:crosses val="autoZero"/>
         <c:crossBetween val="midCat"/>
       </c:valAx>
@@ -5253,7 +5324,7 @@
           <a:lstStyle/>
           <a:p>
             <a:r>
-              <a:rPr lang="ru-RU" smtClean="0"/>
+              <a:rPr lang="ru-RU" dirty="0" smtClean="0"/>
               <a:t>Данные тестирования</a:t>
             </a:r>
             <a:endParaRPr lang="ru-RU" dirty="0"/>
@@ -5284,7 +5355,11 @@
           <a:p>
             <a:r>
               <a:rPr lang="ru-RU" dirty="0" smtClean="0"/>
-              <a:t>за основу тестовых данных выбрана база изображений</a:t>
+              <a:t>Тестирование проводилось на базе </a:t>
+            </a:r>
+            <a:r>
+              <a:rPr lang="ru-RU" dirty="0" smtClean="0"/>
+              <a:t>изображений</a:t>
             </a:r>
             <a:r>
               <a:rPr lang="en-US" dirty="0" smtClean="0"/>
@@ -5303,11 +5378,11 @@
             <a:pPr lvl="1"/>
             <a:r>
               <a:rPr lang="ru-RU" dirty="0" smtClean="0"/>
-              <a:t>45 снимков, снятых </a:t>
-            </a:r>
-            <a:r>
-              <a:rPr lang="ru-RU" dirty="0" smtClean="0"/>
-              <a:t>внутри помещений</a:t>
+              <a:t>45 </a:t>
+            </a:r>
+            <a:r>
+              <a:rPr lang="ru-RU" dirty="0" smtClean="0"/>
+              <a:t>снимков в помещениях</a:t>
             </a:r>
             <a:endParaRPr lang="ru-RU" dirty="0" smtClean="0"/>
           </a:p>
@@ -5322,18 +5397,38 @@
             <a:pPr lvl="1"/>
             <a:r>
               <a:rPr lang="ru-RU" dirty="0" smtClean="0"/>
-              <a:t>информацию о матрице калибровки используемой камеры</a:t>
+              <a:t>информацию о </a:t>
+            </a:r>
+            <a:r>
+              <a:rPr lang="ru-RU" dirty="0" smtClean="0"/>
+              <a:t>внутренних </a:t>
+            </a:r>
+            <a:r>
+              <a:rPr lang="ru-RU" dirty="0" smtClean="0"/>
+              <a:t>параметрах</a:t>
+            </a:r>
+            <a:r>
+              <a:rPr lang="ru-RU" dirty="0" smtClean="0"/>
+              <a:t> </a:t>
+            </a:r>
+            <a:r>
+              <a:rPr lang="ru-RU" dirty="0" smtClean="0"/>
+              <a:t>используемой камеры</a:t>
             </a:r>
           </a:p>
           <a:p>
             <a:pPr lvl="1"/>
             <a:r>
               <a:rPr lang="ru-RU" dirty="0" smtClean="0"/>
-              <a:t>вычисленную матрицу </a:t>
-            </a:r>
-            <a:r>
-              <a:rPr lang="ru-RU" dirty="0" smtClean="0"/>
-              <a:t>единичных направлений трех найденных на изображении </a:t>
+              <a:t>матрицу </a:t>
+            </a:r>
+            <a:r>
+              <a:rPr lang="ru-RU" dirty="0" smtClean="0"/>
+              <a:t>рассчитанных единичных </a:t>
+            </a:r>
+            <a:r>
+              <a:rPr lang="ru-RU" dirty="0" smtClean="0"/>
+              <a:t>направлений трех найденных на изображении </a:t>
             </a:r>
             <a:r>
               <a:rPr lang="ru-RU" dirty="0" err="1" smtClean="0"/>
@@ -5354,6 +5449,13 @@
             <a:r>
               <a:rPr lang="ru-RU" dirty="0" smtClean="0"/>
               <a:t>точкам схождения перспективы</a:t>
+            </a:r>
+            <a:endParaRPr lang="ru-RU" dirty="0" smtClean="0"/>
+          </a:p>
+          <a:p>
+            <a:r>
+              <a:rPr lang="ru-RU" dirty="0" smtClean="0"/>
+              <a:t>Изображения не из базы ???</a:t>
             </a:r>
             <a:endParaRPr lang="ru-RU" dirty="0" smtClean="0"/>
           </a:p>
@@ -5394,7 +5496,12 @@
             <p:ph type="title"/>
           </p:nvPr>
         </p:nvSpPr>
-        <p:spPr/>
+        <p:spPr>
+          <a:xfrm>
+            <a:off x="323528" y="188640"/>
+            <a:ext cx="8496944" cy="1143000"/>
+          </a:xfrm>
+        </p:spPr>
         <p:txBody>
           <a:bodyPr>
             <a:normAutofit fontScale="90000"/>
@@ -5403,7 +5510,7 @@
           <a:p>
             <a:r>
               <a:rPr lang="ru-RU" dirty="0" smtClean="0"/>
-              <a:t>Пример изображения внутри помещения</a:t>
+              <a:t>Результаты тестирования метода Хуттунена-Пише «внутри помещения»</a:t>
             </a:r>
             <a:endParaRPr lang="ru-RU" dirty="0"/>
           </a:p>
@@ -5484,7 +5591,7 @@
       </p:sp>
       <p:graphicFrame>
         <p:nvGraphicFramePr>
-          <p:cNvPr id="5" name="Содержимое 4"/>
+          <p:cNvPr id="6" name="Содержимое 5"/>
           <p:cNvGraphicFramePr>
             <a:graphicFrameLocks noGrp="1"/>
           </p:cNvGraphicFramePr>
@@ -5493,8 +5600,8 @@
           </p:nvPr>
         </p:nvGraphicFramePr>
         <p:xfrm>
-          <a:off x="457200" y="1600200"/>
-          <a:ext cx="8229600" cy="4525963"/>
+          <a:off x="251520" y="1600200"/>
+          <a:ext cx="8640960" cy="4925144"/>
         </p:xfrm>
         <a:graphic>
           <a:graphicData uri="http://schemas.openxmlformats.org/drawingml/2006/chart">
@@ -5627,7 +5734,7 @@
       </p:sp>
       <p:graphicFrame>
         <p:nvGraphicFramePr>
-          <p:cNvPr id="8" name="Содержимое 7"/>
+          <p:cNvPr id="5" name="Содержимое 4"/>
           <p:cNvGraphicFramePr>
             <a:graphicFrameLocks noGrp="1"/>
           </p:cNvGraphicFramePr>
@@ -5636,8 +5743,8 @@
           </p:nvPr>
         </p:nvGraphicFramePr>
         <p:xfrm>
-          <a:off x="457200" y="1600200"/>
-          <a:ext cx="8229600" cy="4525963"/>
+          <a:off x="251520" y="1600200"/>
+          <a:ext cx="8640960" cy="4997152"/>
         </p:xfrm>
         <a:graphic>
           <a:graphicData uri="http://schemas.openxmlformats.org/drawingml/2006/chart">
@@ -5775,7 +5882,28 @@
           <a:bodyPr/>
           <a:lstStyle/>
           <a:p>
-            <a:endParaRPr lang="ru-RU"/>
+            <a:r>
+              <a:rPr lang="ru-RU" dirty="0" smtClean="0"/>
+              <a:t>Диаграмма </a:t>
+            </a:r>
+            <a:r>
+              <a:rPr lang="ru-RU" dirty="0" err="1" smtClean="0"/>
+              <a:t>Ганта</a:t>
+            </a:r>
+            <a:endParaRPr lang="ru-RU" dirty="0" smtClean="0"/>
+          </a:p>
+          <a:p>
+            <a:r>
+              <a:rPr lang="ru-RU" dirty="0" smtClean="0"/>
+              <a:t>Стоимость продукта</a:t>
+            </a:r>
+          </a:p>
+          <a:p>
+            <a:r>
+              <a:rPr lang="ru-RU" dirty="0" smtClean="0"/>
+              <a:t>???</a:t>
+            </a:r>
+            <a:endParaRPr lang="ru-RU" dirty="0"/>
           </a:p>
         </p:txBody>
       </p:sp>
@@ -5906,7 +6034,12 @@
             <p:ph idx="1"/>
           </p:nvPr>
         </p:nvSpPr>
-        <p:spPr/>
+        <p:spPr>
+          <a:xfrm>
+            <a:off x="457200" y="1772816"/>
+            <a:ext cx="8229600" cy="4353347"/>
+          </a:xfrm>
+        </p:spPr>
         <p:txBody>
           <a:bodyPr/>
           <a:lstStyle/>
@@ -6314,7 +6447,12 @@
             <p:ph type="title"/>
           </p:nvPr>
         </p:nvSpPr>
-        <p:spPr/>
+        <p:spPr>
+          <a:xfrm>
+            <a:off x="0" y="274638"/>
+            <a:ext cx="9144000" cy="1143000"/>
+          </a:xfrm>
+        </p:spPr>
         <p:txBody>
           <a:bodyPr>
             <a:normAutofit fontScale="90000"/>
@@ -6460,7 +6598,7 @@
           <a:p>
             <a:r>
               <a:rPr lang="ru-RU" dirty="0" smtClean="0"/>
-              <a:t>Системы локального позиционирования с использованием методов компьютерного зрения</a:t>
+              <a:t>Использование методов компьютерного зрения</a:t>
             </a:r>
             <a:endParaRPr lang="ru-RU" dirty="0"/>
           </a:p>
@@ -6645,25 +6783,10 @@
               <a:t> и Робертом </a:t>
             </a:r>
             <a:r>
-              <a:rPr lang="ru-RU" dirty="0" err="1"/>
+              <a:rPr lang="ru-RU" dirty="0" err="1" smtClean="0"/>
               <a:t>Пише</a:t>
             </a:r>
-            <a:r>
-              <a:rPr lang="ru-RU" dirty="0"/>
-              <a:t> [</a:t>
-            </a:r>
-            <a:r>
-              <a:rPr lang="en-US" b="1" dirty="0"/>
-              <a:t>Link</a:t>
-            </a:r>
-            <a:r>
-              <a:rPr lang="ru-RU" b="1" dirty="0"/>
-              <a:t>1</a:t>
-            </a:r>
-            <a:r>
-              <a:rPr lang="ru-RU" dirty="0" smtClean="0"/>
-              <a:t>]</a:t>
-            </a:r>
+            <a:endParaRPr lang="ru-RU" dirty="0" smtClean="0"/>
           </a:p>
           <a:p>
             <a:r>

</xml_diff>

<commit_message>
+ friday early morning presentation
</commit_message>
<xml_diff>
--- a/presentation.pptx
+++ b/presentation.pptx
@@ -5,7 +5,7 @@
     <p:sldMasterId id="2147483648" r:id="rId1"/>
   </p:sldMasterIdLst>
   <p:notesMasterIdLst>
-    <p:notesMasterId r:id="rId25"/>
+    <p:notesMasterId r:id="rId27"/>
   </p:notesMasterIdLst>
   <p:sldIdLst>
     <p:sldId id="256" r:id="rId2"/>
@@ -25,12 +25,14 @@
     <p:sldId id="275" r:id="rId16"/>
     <p:sldId id="279" r:id="rId17"/>
     <p:sldId id="284" r:id="rId18"/>
-    <p:sldId id="278" r:id="rId19"/>
-    <p:sldId id="262" r:id="rId20"/>
-    <p:sldId id="285" r:id="rId21"/>
-    <p:sldId id="263" r:id="rId22"/>
-    <p:sldId id="282" r:id="rId23"/>
-    <p:sldId id="264" r:id="rId24"/>
+    <p:sldId id="289" r:id="rId19"/>
+    <p:sldId id="288" r:id="rId20"/>
+    <p:sldId id="262" r:id="rId21"/>
+    <p:sldId id="285" r:id="rId22"/>
+    <p:sldId id="290" r:id="rId23"/>
+    <p:sldId id="263" r:id="rId24"/>
+    <p:sldId id="282" r:id="rId25"/>
+    <p:sldId id="264" r:id="rId26"/>
   </p:sldIdLst>
   <p:sldSz cx="9144000" cy="6858000" type="screen4x3"/>
   <p:notesSz cx="6858000" cy="9144000"/>
@@ -129,6 +131,41 @@
       </a:defRPr>
     </a:lvl9pPr>
   </p:defaultTextStyle>
+  <p:extLst>
+    <p:ext uri="{521415D9-36F7-43E2-AB2F-B90AF26B5E84}">
+      <p14:sectionLst xmlns:p14="http://schemas.microsoft.com/office/powerpoint/2010/main">
+        <p14:section name="Default Section" id="{600BADDA-8B67-4DF7-AD14-06F762629BE4}">
+          <p14:sldIdLst>
+            <p14:sldId id="256"/>
+            <p14:sldId id="265"/>
+            <p14:sldId id="270"/>
+            <p14:sldId id="271"/>
+            <p14:sldId id="272"/>
+            <p14:sldId id="257"/>
+            <p14:sldId id="267"/>
+            <p14:sldId id="274"/>
+            <p14:sldId id="286"/>
+            <p14:sldId id="283"/>
+            <p14:sldId id="287"/>
+            <p14:sldId id="281"/>
+            <p14:sldId id="280"/>
+            <p14:sldId id="261"/>
+            <p14:sldId id="275"/>
+            <p14:sldId id="279"/>
+            <p14:sldId id="284"/>
+            <p14:sldId id="289"/>
+            <p14:sldId id="288"/>
+            <p14:sldId id="262"/>
+            <p14:sldId id="285"/>
+            <p14:sldId id="290"/>
+            <p14:sldId id="263"/>
+            <p14:sldId id="282"/>
+            <p14:sldId id="264"/>
+          </p14:sldIdLst>
+        </p14:section>
+      </p14:sectionLst>
+    </p:ext>
+  </p:extLst>
 </p:presentation>
 </file>
 
@@ -1303,6 +1340,1068 @@
               <a:defRPr/>
             </a:pPr>
             <a:r>
+              <a:rPr lang="ru-RU" dirty="0"/>
+              <a:t>Диаграмма распределения точности обработки изображений</a:t>
+            </a:r>
+            <a:r>
+              <a:rPr lang="ru-RU" baseline="0" dirty="0"/>
+              <a:t> по величине углов абсолютного отклонения </a:t>
+            </a:r>
+            <a:r>
+              <a:rPr lang="ru-RU" dirty="0"/>
+              <a:t>осей координат от верных значений</a:t>
+            </a:r>
+          </a:p>
+        </c:rich>
+      </c:tx>
+      <c:layout/>
+      <c:overlay val="0"/>
+    </c:title>
+    <c:autoTitleDeleted val="0"/>
+    <c:plotArea>
+      <c:layout/>
+      <c:scatterChart>
+        <c:scatterStyle val="lineMarker"/>
+        <c:varyColors val="0"/>
+        <c:ser>
+          <c:idx val="0"/>
+          <c:order val="0"/>
+          <c:tx>
+            <c:strRef>
+              <c:f>outdoor_res!$H$11</c:f>
+              <c:strCache>
+                <c:ptCount val="1"/>
+                <c:pt idx="0">
+                  <c:v>Ось X</c:v>
+                </c:pt>
+              </c:strCache>
+            </c:strRef>
+          </c:tx>
+          <c:marker>
+            <c:symbol val="none"/>
+          </c:marker>
+          <c:xVal>
+            <c:numRef>
+              <c:f>outdoor_res!$G$12:$G$53</c:f>
+              <c:numCache>
+                <c:formatCode>General</c:formatCode>
+                <c:ptCount val="42"/>
+                <c:pt idx="0">
+                  <c:v>3.9360791121539396E-2</c:v>
+                </c:pt>
+                <c:pt idx="1">
+                  <c:v>0.23939258645732439</c:v>
+                </c:pt>
+                <c:pt idx="2">
+                  <c:v>0.43942438179310939</c:v>
+                </c:pt>
+                <c:pt idx="3">
+                  <c:v>0.63945617712889447</c:v>
+                </c:pt>
+                <c:pt idx="4">
+                  <c:v>0.83948797246467932</c:v>
+                </c:pt>
+                <c:pt idx="5">
+                  <c:v>1.0395197678004644</c:v>
+                </c:pt>
+                <c:pt idx="6">
+                  <c:v>1.2395515631362495</c:v>
+                </c:pt>
+                <c:pt idx="7">
+                  <c:v>1.4395833584720343</c:v>
+                </c:pt>
+                <c:pt idx="8">
+                  <c:v>1.6396151538078194</c:v>
+                </c:pt>
+                <c:pt idx="9">
+                  <c:v>1.8396469491436045</c:v>
+                </c:pt>
+                <c:pt idx="10">
+                  <c:v>2.0396787444793891</c:v>
+                </c:pt>
+                <c:pt idx="11">
+                  <c:v>2.239710539815174</c:v>
+                </c:pt>
+                <c:pt idx="12">
+                  <c:v>2.4397423351509593</c:v>
+                </c:pt>
+                <c:pt idx="13">
+                  <c:v>2.6397741304867441</c:v>
+                </c:pt>
+                <c:pt idx="14">
+                  <c:v>2.839805925822529</c:v>
+                </c:pt>
+                <c:pt idx="15">
+                  <c:v>3.0398377211583143</c:v>
+                </c:pt>
+                <c:pt idx="16">
+                  <c:v>3.2398695164940992</c:v>
+                </c:pt>
+                <c:pt idx="17">
+                  <c:v>3.439901311829884</c:v>
+                </c:pt>
+                <c:pt idx="18">
+                  <c:v>3.6399331071656693</c:v>
+                </c:pt>
+                <c:pt idx="19">
+                  <c:v>3.8399649025014542</c:v>
+                </c:pt>
+                <c:pt idx="20">
+                  <c:v>4.039996697837239</c:v>
+                </c:pt>
+                <c:pt idx="21">
+                  <c:v>4.2400284931730239</c:v>
+                </c:pt>
+                <c:pt idx="22">
+                  <c:v>4.4400602885088087</c:v>
+                </c:pt>
+                <c:pt idx="23">
+                  <c:v>4.6400920838445945</c:v>
+                </c:pt>
+                <c:pt idx="24">
+                  <c:v>4.8401238791803793</c:v>
+                </c:pt>
+                <c:pt idx="25">
+                  <c:v>5.0401556745161642</c:v>
+                </c:pt>
+                <c:pt idx="26">
+                  <c:v>5.2401874698519491</c:v>
+                </c:pt>
+                <c:pt idx="27">
+                  <c:v>5.4402192651877339</c:v>
+                </c:pt>
+                <c:pt idx="28">
+                  <c:v>5.6402510605235188</c:v>
+                </c:pt>
+                <c:pt idx="29">
+                  <c:v>5.8402828558593045</c:v>
+                </c:pt>
+                <c:pt idx="30">
+                  <c:v>6.0403146511950894</c:v>
+                </c:pt>
+                <c:pt idx="31">
+                  <c:v>6.2403464465308742</c:v>
+                </c:pt>
+                <c:pt idx="32">
+                  <c:v>6.4403782418666591</c:v>
+                </c:pt>
+                <c:pt idx="33">
+                  <c:v>6.6404100372024439</c:v>
+                </c:pt>
+                <c:pt idx="34">
+                  <c:v>6.8404418325382288</c:v>
+                </c:pt>
+                <c:pt idx="35">
+                  <c:v>7.0404736278740137</c:v>
+                </c:pt>
+                <c:pt idx="36">
+                  <c:v>7.2405054232097994</c:v>
+                </c:pt>
+                <c:pt idx="37">
+                  <c:v>7.4405372185455843</c:v>
+                </c:pt>
+                <c:pt idx="38">
+                  <c:v>7.6405690138813691</c:v>
+                </c:pt>
+                <c:pt idx="39">
+                  <c:v>7.840600809217154</c:v>
+                </c:pt>
+                <c:pt idx="40">
+                  <c:v>8.0406326045529397</c:v>
+                </c:pt>
+                <c:pt idx="41">
+                  <c:v>8.2406643998887255</c:v>
+                </c:pt>
+              </c:numCache>
+            </c:numRef>
+          </c:xVal>
+          <c:yVal>
+            <c:numRef>
+              <c:f>outdoor_res!$H$12:$H$53</c:f>
+              <c:numCache>
+                <c:formatCode>0%</c:formatCode>
+                <c:ptCount val="42"/>
+                <c:pt idx="0">
+                  <c:v>0</c:v>
+                </c:pt>
+                <c:pt idx="1">
+                  <c:v>5.2631578947368418E-2</c:v>
+                </c:pt>
+                <c:pt idx="2">
+                  <c:v>8.771929824561403E-2</c:v>
+                </c:pt>
+                <c:pt idx="3">
+                  <c:v>0.17543859649122806</c:v>
+                </c:pt>
+                <c:pt idx="4">
+                  <c:v>0.2982456140350877</c:v>
+                </c:pt>
+                <c:pt idx="5">
+                  <c:v>0.35087719298245612</c:v>
+                </c:pt>
+                <c:pt idx="6">
+                  <c:v>0.52631578947368418</c:v>
+                </c:pt>
+                <c:pt idx="7">
+                  <c:v>0.59649122807017541</c:v>
+                </c:pt>
+                <c:pt idx="8">
+                  <c:v>0.64912280701754388</c:v>
+                </c:pt>
+                <c:pt idx="9">
+                  <c:v>0.73684210526315785</c:v>
+                </c:pt>
+                <c:pt idx="10">
+                  <c:v>0.78947368421052633</c:v>
+                </c:pt>
+                <c:pt idx="11">
+                  <c:v>0.82456140350877194</c:v>
+                </c:pt>
+                <c:pt idx="12">
+                  <c:v>0.8771929824561403</c:v>
+                </c:pt>
+                <c:pt idx="13">
+                  <c:v>0.91228070175438591</c:v>
+                </c:pt>
+                <c:pt idx="14">
+                  <c:v>0.91228070175438591</c:v>
+                </c:pt>
+                <c:pt idx="15">
+                  <c:v>0.91228070175438591</c:v>
+                </c:pt>
+                <c:pt idx="16">
+                  <c:v>0.91228070175438591</c:v>
+                </c:pt>
+                <c:pt idx="17">
+                  <c:v>0.91228070175438591</c:v>
+                </c:pt>
+                <c:pt idx="18">
+                  <c:v>0.91228070175438591</c:v>
+                </c:pt>
+                <c:pt idx="19">
+                  <c:v>0.91228070175438591</c:v>
+                </c:pt>
+                <c:pt idx="20">
+                  <c:v>0.91228070175438591</c:v>
+                </c:pt>
+                <c:pt idx="21">
+                  <c:v>0.91228070175438591</c:v>
+                </c:pt>
+                <c:pt idx="22">
+                  <c:v>0.92982456140350878</c:v>
+                </c:pt>
+                <c:pt idx="23">
+                  <c:v>0.92982456140350878</c:v>
+                </c:pt>
+                <c:pt idx="24">
+                  <c:v>0.92982456140350878</c:v>
+                </c:pt>
+                <c:pt idx="25">
+                  <c:v>0.94736842105263153</c:v>
+                </c:pt>
+                <c:pt idx="26">
+                  <c:v>0.94736842105263153</c:v>
+                </c:pt>
+                <c:pt idx="27">
+                  <c:v>0.94736842105263153</c:v>
+                </c:pt>
+                <c:pt idx="28">
+                  <c:v>0.94736842105263153</c:v>
+                </c:pt>
+                <c:pt idx="29">
+                  <c:v>0.94736842105263153</c:v>
+                </c:pt>
+                <c:pt idx="30">
+                  <c:v>0.94736842105263153</c:v>
+                </c:pt>
+                <c:pt idx="31">
+                  <c:v>0.94736842105263153</c:v>
+                </c:pt>
+                <c:pt idx="32">
+                  <c:v>0.96491228070175439</c:v>
+                </c:pt>
+                <c:pt idx="33">
+                  <c:v>0.96491228070175439</c:v>
+                </c:pt>
+                <c:pt idx="34">
+                  <c:v>0.96491228070175439</c:v>
+                </c:pt>
+                <c:pt idx="35">
+                  <c:v>0.96491228070175439</c:v>
+                </c:pt>
+                <c:pt idx="36">
+                  <c:v>0.96491228070175439</c:v>
+                </c:pt>
+                <c:pt idx="37">
+                  <c:v>0.98245614035087714</c:v>
+                </c:pt>
+                <c:pt idx="38">
+                  <c:v>0.98245614035087714</c:v>
+                </c:pt>
+                <c:pt idx="39">
+                  <c:v>0.98245614035087714</c:v>
+                </c:pt>
+                <c:pt idx="40">
+                  <c:v>1</c:v>
+                </c:pt>
+                <c:pt idx="41">
+                  <c:v>1</c:v>
+                </c:pt>
+              </c:numCache>
+            </c:numRef>
+          </c:yVal>
+          <c:smooth val="0"/>
+        </c:ser>
+        <c:ser>
+          <c:idx val="1"/>
+          <c:order val="1"/>
+          <c:tx>
+            <c:strRef>
+              <c:f>outdoor_res!$I$11</c:f>
+              <c:strCache>
+                <c:ptCount val="1"/>
+                <c:pt idx="0">
+                  <c:v>Ось Y</c:v>
+                </c:pt>
+              </c:strCache>
+            </c:strRef>
+          </c:tx>
+          <c:marker>
+            <c:symbol val="none"/>
+          </c:marker>
+          <c:xVal>
+            <c:numRef>
+              <c:f>outdoor_res!$G$12:$G$53</c:f>
+              <c:numCache>
+                <c:formatCode>General</c:formatCode>
+                <c:ptCount val="42"/>
+                <c:pt idx="0">
+                  <c:v>3.9360791121539396E-2</c:v>
+                </c:pt>
+                <c:pt idx="1">
+                  <c:v>0.23939258645732439</c:v>
+                </c:pt>
+                <c:pt idx="2">
+                  <c:v>0.43942438179310939</c:v>
+                </c:pt>
+                <c:pt idx="3">
+                  <c:v>0.63945617712889447</c:v>
+                </c:pt>
+                <c:pt idx="4">
+                  <c:v>0.83948797246467932</c:v>
+                </c:pt>
+                <c:pt idx="5">
+                  <c:v>1.0395197678004644</c:v>
+                </c:pt>
+                <c:pt idx="6">
+                  <c:v>1.2395515631362495</c:v>
+                </c:pt>
+                <c:pt idx="7">
+                  <c:v>1.4395833584720343</c:v>
+                </c:pt>
+                <c:pt idx="8">
+                  <c:v>1.6396151538078194</c:v>
+                </c:pt>
+                <c:pt idx="9">
+                  <c:v>1.8396469491436045</c:v>
+                </c:pt>
+                <c:pt idx="10">
+                  <c:v>2.0396787444793891</c:v>
+                </c:pt>
+                <c:pt idx="11">
+                  <c:v>2.239710539815174</c:v>
+                </c:pt>
+                <c:pt idx="12">
+                  <c:v>2.4397423351509593</c:v>
+                </c:pt>
+                <c:pt idx="13">
+                  <c:v>2.6397741304867441</c:v>
+                </c:pt>
+                <c:pt idx="14">
+                  <c:v>2.839805925822529</c:v>
+                </c:pt>
+                <c:pt idx="15">
+                  <c:v>3.0398377211583143</c:v>
+                </c:pt>
+                <c:pt idx="16">
+                  <c:v>3.2398695164940992</c:v>
+                </c:pt>
+                <c:pt idx="17">
+                  <c:v>3.439901311829884</c:v>
+                </c:pt>
+                <c:pt idx="18">
+                  <c:v>3.6399331071656693</c:v>
+                </c:pt>
+                <c:pt idx="19">
+                  <c:v>3.8399649025014542</c:v>
+                </c:pt>
+                <c:pt idx="20">
+                  <c:v>4.039996697837239</c:v>
+                </c:pt>
+                <c:pt idx="21">
+                  <c:v>4.2400284931730239</c:v>
+                </c:pt>
+                <c:pt idx="22">
+                  <c:v>4.4400602885088087</c:v>
+                </c:pt>
+                <c:pt idx="23">
+                  <c:v>4.6400920838445945</c:v>
+                </c:pt>
+                <c:pt idx="24">
+                  <c:v>4.8401238791803793</c:v>
+                </c:pt>
+                <c:pt idx="25">
+                  <c:v>5.0401556745161642</c:v>
+                </c:pt>
+                <c:pt idx="26">
+                  <c:v>5.2401874698519491</c:v>
+                </c:pt>
+                <c:pt idx="27">
+                  <c:v>5.4402192651877339</c:v>
+                </c:pt>
+                <c:pt idx="28">
+                  <c:v>5.6402510605235188</c:v>
+                </c:pt>
+                <c:pt idx="29">
+                  <c:v>5.8402828558593045</c:v>
+                </c:pt>
+                <c:pt idx="30">
+                  <c:v>6.0403146511950894</c:v>
+                </c:pt>
+                <c:pt idx="31">
+                  <c:v>6.2403464465308742</c:v>
+                </c:pt>
+                <c:pt idx="32">
+                  <c:v>6.4403782418666591</c:v>
+                </c:pt>
+                <c:pt idx="33">
+                  <c:v>6.6404100372024439</c:v>
+                </c:pt>
+                <c:pt idx="34">
+                  <c:v>6.8404418325382288</c:v>
+                </c:pt>
+                <c:pt idx="35">
+                  <c:v>7.0404736278740137</c:v>
+                </c:pt>
+                <c:pt idx="36">
+                  <c:v>7.2405054232097994</c:v>
+                </c:pt>
+                <c:pt idx="37">
+                  <c:v>7.4405372185455843</c:v>
+                </c:pt>
+                <c:pt idx="38">
+                  <c:v>7.6405690138813691</c:v>
+                </c:pt>
+                <c:pt idx="39">
+                  <c:v>7.840600809217154</c:v>
+                </c:pt>
+                <c:pt idx="40">
+                  <c:v>8.0406326045529397</c:v>
+                </c:pt>
+                <c:pt idx="41">
+                  <c:v>8.2406643998887255</c:v>
+                </c:pt>
+              </c:numCache>
+            </c:numRef>
+          </c:xVal>
+          <c:yVal>
+            <c:numRef>
+              <c:f>outdoor_res!$I$12:$I$53</c:f>
+              <c:numCache>
+                <c:formatCode>0%</c:formatCode>
+                <c:ptCount val="42"/>
+                <c:pt idx="0">
+                  <c:v>0</c:v>
+                </c:pt>
+                <c:pt idx="1">
+                  <c:v>0.15789473684210525</c:v>
+                </c:pt>
+                <c:pt idx="2">
+                  <c:v>0.24561403508771928</c:v>
+                </c:pt>
+                <c:pt idx="3">
+                  <c:v>0.38596491228070173</c:v>
+                </c:pt>
+                <c:pt idx="4">
+                  <c:v>0.50877192982456143</c:v>
+                </c:pt>
+                <c:pt idx="5">
+                  <c:v>0.56140350877192979</c:v>
+                </c:pt>
+                <c:pt idx="6">
+                  <c:v>0.64912280701754388</c:v>
+                </c:pt>
+                <c:pt idx="7">
+                  <c:v>0.7192982456140351</c:v>
+                </c:pt>
+                <c:pt idx="8">
+                  <c:v>0.80701754385964908</c:v>
+                </c:pt>
+                <c:pt idx="9">
+                  <c:v>0.89473684210526316</c:v>
+                </c:pt>
+                <c:pt idx="10">
+                  <c:v>0.89473684210526316</c:v>
+                </c:pt>
+                <c:pt idx="11">
+                  <c:v>0.89473684210526316</c:v>
+                </c:pt>
+                <c:pt idx="12">
+                  <c:v>0.92982456140350878</c:v>
+                </c:pt>
+                <c:pt idx="13">
+                  <c:v>0.94736842105263153</c:v>
+                </c:pt>
+                <c:pt idx="14">
+                  <c:v>0.94736842105263153</c:v>
+                </c:pt>
+                <c:pt idx="15">
+                  <c:v>0.94736842105263153</c:v>
+                </c:pt>
+                <c:pt idx="16">
+                  <c:v>0.96491228070175439</c:v>
+                </c:pt>
+                <c:pt idx="17">
+                  <c:v>0.96491228070175439</c:v>
+                </c:pt>
+                <c:pt idx="18">
+                  <c:v>0.96491228070175439</c:v>
+                </c:pt>
+                <c:pt idx="19">
+                  <c:v>0.98245614035087714</c:v>
+                </c:pt>
+                <c:pt idx="20">
+                  <c:v>0.98245614035087714</c:v>
+                </c:pt>
+                <c:pt idx="21">
+                  <c:v>0.98245614035087714</c:v>
+                </c:pt>
+                <c:pt idx="22">
+                  <c:v>0.98245614035087714</c:v>
+                </c:pt>
+                <c:pt idx="23">
+                  <c:v>0.98245614035087714</c:v>
+                </c:pt>
+                <c:pt idx="24">
+                  <c:v>0.98245614035087714</c:v>
+                </c:pt>
+                <c:pt idx="25">
+                  <c:v>0.98245614035087714</c:v>
+                </c:pt>
+                <c:pt idx="26">
+                  <c:v>0.98245614035087714</c:v>
+                </c:pt>
+                <c:pt idx="27">
+                  <c:v>0.98245614035087714</c:v>
+                </c:pt>
+                <c:pt idx="28">
+                  <c:v>0.98245614035087714</c:v>
+                </c:pt>
+                <c:pt idx="29">
+                  <c:v>1</c:v>
+                </c:pt>
+                <c:pt idx="30">
+                  <c:v>1</c:v>
+                </c:pt>
+                <c:pt idx="31">
+                  <c:v>1</c:v>
+                </c:pt>
+                <c:pt idx="32">
+                  <c:v>1</c:v>
+                </c:pt>
+                <c:pt idx="33">
+                  <c:v>1</c:v>
+                </c:pt>
+                <c:pt idx="34">
+                  <c:v>1</c:v>
+                </c:pt>
+                <c:pt idx="35">
+                  <c:v>1</c:v>
+                </c:pt>
+                <c:pt idx="36">
+                  <c:v>1</c:v>
+                </c:pt>
+                <c:pt idx="37">
+                  <c:v>1</c:v>
+                </c:pt>
+                <c:pt idx="38">
+                  <c:v>1</c:v>
+                </c:pt>
+                <c:pt idx="39">
+                  <c:v>1</c:v>
+                </c:pt>
+                <c:pt idx="40">
+                  <c:v>1</c:v>
+                </c:pt>
+                <c:pt idx="41">
+                  <c:v>1</c:v>
+                </c:pt>
+              </c:numCache>
+            </c:numRef>
+          </c:yVal>
+          <c:smooth val="0"/>
+        </c:ser>
+        <c:ser>
+          <c:idx val="2"/>
+          <c:order val="2"/>
+          <c:tx>
+            <c:strRef>
+              <c:f>outdoor_res!$J$11</c:f>
+              <c:strCache>
+                <c:ptCount val="1"/>
+                <c:pt idx="0">
+                  <c:v>Ось Z</c:v>
+                </c:pt>
+              </c:strCache>
+            </c:strRef>
+          </c:tx>
+          <c:marker>
+            <c:symbol val="none"/>
+          </c:marker>
+          <c:xVal>
+            <c:numRef>
+              <c:f>outdoor_res!$G$12:$G$53</c:f>
+              <c:numCache>
+                <c:formatCode>General</c:formatCode>
+                <c:ptCount val="42"/>
+                <c:pt idx="0">
+                  <c:v>3.9360791121539396E-2</c:v>
+                </c:pt>
+                <c:pt idx="1">
+                  <c:v>0.23939258645732439</c:v>
+                </c:pt>
+                <c:pt idx="2">
+                  <c:v>0.43942438179310939</c:v>
+                </c:pt>
+                <c:pt idx="3">
+                  <c:v>0.63945617712889447</c:v>
+                </c:pt>
+                <c:pt idx="4">
+                  <c:v>0.83948797246467932</c:v>
+                </c:pt>
+                <c:pt idx="5">
+                  <c:v>1.0395197678004644</c:v>
+                </c:pt>
+                <c:pt idx="6">
+                  <c:v>1.2395515631362495</c:v>
+                </c:pt>
+                <c:pt idx="7">
+                  <c:v>1.4395833584720343</c:v>
+                </c:pt>
+                <c:pt idx="8">
+                  <c:v>1.6396151538078194</c:v>
+                </c:pt>
+                <c:pt idx="9">
+                  <c:v>1.8396469491436045</c:v>
+                </c:pt>
+                <c:pt idx="10">
+                  <c:v>2.0396787444793891</c:v>
+                </c:pt>
+                <c:pt idx="11">
+                  <c:v>2.239710539815174</c:v>
+                </c:pt>
+                <c:pt idx="12">
+                  <c:v>2.4397423351509593</c:v>
+                </c:pt>
+                <c:pt idx="13">
+                  <c:v>2.6397741304867441</c:v>
+                </c:pt>
+                <c:pt idx="14">
+                  <c:v>2.839805925822529</c:v>
+                </c:pt>
+                <c:pt idx="15">
+                  <c:v>3.0398377211583143</c:v>
+                </c:pt>
+                <c:pt idx="16">
+                  <c:v>3.2398695164940992</c:v>
+                </c:pt>
+                <c:pt idx="17">
+                  <c:v>3.439901311829884</c:v>
+                </c:pt>
+                <c:pt idx="18">
+                  <c:v>3.6399331071656693</c:v>
+                </c:pt>
+                <c:pt idx="19">
+                  <c:v>3.8399649025014542</c:v>
+                </c:pt>
+                <c:pt idx="20">
+                  <c:v>4.039996697837239</c:v>
+                </c:pt>
+                <c:pt idx="21">
+                  <c:v>4.2400284931730239</c:v>
+                </c:pt>
+                <c:pt idx="22">
+                  <c:v>4.4400602885088087</c:v>
+                </c:pt>
+                <c:pt idx="23">
+                  <c:v>4.6400920838445945</c:v>
+                </c:pt>
+                <c:pt idx="24">
+                  <c:v>4.8401238791803793</c:v>
+                </c:pt>
+                <c:pt idx="25">
+                  <c:v>5.0401556745161642</c:v>
+                </c:pt>
+                <c:pt idx="26">
+                  <c:v>5.2401874698519491</c:v>
+                </c:pt>
+                <c:pt idx="27">
+                  <c:v>5.4402192651877339</c:v>
+                </c:pt>
+                <c:pt idx="28">
+                  <c:v>5.6402510605235188</c:v>
+                </c:pt>
+                <c:pt idx="29">
+                  <c:v>5.8402828558593045</c:v>
+                </c:pt>
+                <c:pt idx="30">
+                  <c:v>6.0403146511950894</c:v>
+                </c:pt>
+                <c:pt idx="31">
+                  <c:v>6.2403464465308742</c:v>
+                </c:pt>
+                <c:pt idx="32">
+                  <c:v>6.4403782418666591</c:v>
+                </c:pt>
+                <c:pt idx="33">
+                  <c:v>6.6404100372024439</c:v>
+                </c:pt>
+                <c:pt idx="34">
+                  <c:v>6.8404418325382288</c:v>
+                </c:pt>
+                <c:pt idx="35">
+                  <c:v>7.0404736278740137</c:v>
+                </c:pt>
+                <c:pt idx="36">
+                  <c:v>7.2405054232097994</c:v>
+                </c:pt>
+                <c:pt idx="37">
+                  <c:v>7.4405372185455843</c:v>
+                </c:pt>
+                <c:pt idx="38">
+                  <c:v>7.6405690138813691</c:v>
+                </c:pt>
+                <c:pt idx="39">
+                  <c:v>7.840600809217154</c:v>
+                </c:pt>
+                <c:pt idx="40">
+                  <c:v>8.0406326045529397</c:v>
+                </c:pt>
+                <c:pt idx="41">
+                  <c:v>8.2406643998887255</c:v>
+                </c:pt>
+              </c:numCache>
+            </c:numRef>
+          </c:xVal>
+          <c:yVal>
+            <c:numRef>
+              <c:f>outdoor_res!$J$12:$J$53</c:f>
+              <c:numCache>
+                <c:formatCode>0%</c:formatCode>
+                <c:ptCount val="42"/>
+                <c:pt idx="0">
+                  <c:v>0</c:v>
+                </c:pt>
+                <c:pt idx="1">
+                  <c:v>5.2631578947368418E-2</c:v>
+                </c:pt>
+                <c:pt idx="2">
+                  <c:v>0.10526315789473684</c:v>
+                </c:pt>
+                <c:pt idx="3">
+                  <c:v>0.15789473684210525</c:v>
+                </c:pt>
+                <c:pt idx="4">
+                  <c:v>0.26315789473684209</c:v>
+                </c:pt>
+                <c:pt idx="5">
+                  <c:v>0.31578947368421051</c:v>
+                </c:pt>
+                <c:pt idx="6">
+                  <c:v>0.47368421052631576</c:v>
+                </c:pt>
+                <c:pt idx="7">
+                  <c:v>0.59649122807017541</c:v>
+                </c:pt>
+                <c:pt idx="8">
+                  <c:v>0.61403508771929827</c:v>
+                </c:pt>
+                <c:pt idx="9">
+                  <c:v>0.70175438596491224</c:v>
+                </c:pt>
+                <c:pt idx="10">
+                  <c:v>0.7192982456140351</c:v>
+                </c:pt>
+                <c:pt idx="11">
+                  <c:v>0.73684210526315785</c:v>
+                </c:pt>
+                <c:pt idx="12">
+                  <c:v>0.80701754385964908</c:v>
+                </c:pt>
+                <c:pt idx="13">
+                  <c:v>0.85964912280701755</c:v>
+                </c:pt>
+                <c:pt idx="14">
+                  <c:v>0.85964912280701755</c:v>
+                </c:pt>
+                <c:pt idx="15">
+                  <c:v>0.8771929824561403</c:v>
+                </c:pt>
+                <c:pt idx="16">
+                  <c:v>0.8771929824561403</c:v>
+                </c:pt>
+                <c:pt idx="17">
+                  <c:v>0.8771929824561403</c:v>
+                </c:pt>
+                <c:pt idx="18">
+                  <c:v>0.8771929824561403</c:v>
+                </c:pt>
+                <c:pt idx="19">
+                  <c:v>0.89473684210526316</c:v>
+                </c:pt>
+                <c:pt idx="20">
+                  <c:v>0.89473684210526316</c:v>
+                </c:pt>
+                <c:pt idx="21">
+                  <c:v>0.91228070175438591</c:v>
+                </c:pt>
+                <c:pt idx="22">
+                  <c:v>0.91228070175438591</c:v>
+                </c:pt>
+                <c:pt idx="23">
+                  <c:v>0.91228070175438591</c:v>
+                </c:pt>
+                <c:pt idx="24">
+                  <c:v>0.91228070175438591</c:v>
+                </c:pt>
+                <c:pt idx="25">
+                  <c:v>0.91228070175438591</c:v>
+                </c:pt>
+                <c:pt idx="26">
+                  <c:v>0.92982456140350878</c:v>
+                </c:pt>
+                <c:pt idx="27">
+                  <c:v>0.92982456140350878</c:v>
+                </c:pt>
+                <c:pt idx="28">
+                  <c:v>0.92982456140350878</c:v>
+                </c:pt>
+                <c:pt idx="29">
+                  <c:v>0.94736842105263153</c:v>
+                </c:pt>
+                <c:pt idx="30">
+                  <c:v>0.94736842105263153</c:v>
+                </c:pt>
+                <c:pt idx="31">
+                  <c:v>0.94736842105263153</c:v>
+                </c:pt>
+                <c:pt idx="32">
+                  <c:v>0.94736842105263153</c:v>
+                </c:pt>
+                <c:pt idx="33">
+                  <c:v>0.96491228070175439</c:v>
+                </c:pt>
+                <c:pt idx="34">
+                  <c:v>0.96491228070175439</c:v>
+                </c:pt>
+                <c:pt idx="35">
+                  <c:v>0.96491228070175439</c:v>
+                </c:pt>
+                <c:pt idx="36">
+                  <c:v>0.96491228070175439</c:v>
+                </c:pt>
+                <c:pt idx="37">
+                  <c:v>0.98245614035087714</c:v>
+                </c:pt>
+                <c:pt idx="38">
+                  <c:v>0.98245614035087714</c:v>
+                </c:pt>
+                <c:pt idx="39">
+                  <c:v>0.98245614035087714</c:v>
+                </c:pt>
+                <c:pt idx="40">
+                  <c:v>0.98245614035087714</c:v>
+                </c:pt>
+                <c:pt idx="41">
+                  <c:v>1</c:v>
+                </c:pt>
+              </c:numCache>
+            </c:numRef>
+          </c:yVal>
+          <c:smooth val="0"/>
+        </c:ser>
+        <c:dLbls>
+          <c:showLegendKey val="0"/>
+          <c:showVal val="0"/>
+          <c:showCatName val="0"/>
+          <c:showSerName val="0"/>
+          <c:showPercent val="0"/>
+          <c:showBubbleSize val="0"/>
+        </c:dLbls>
+        <c:axId val="95445568"/>
+        <c:axId val="95447296"/>
+      </c:scatterChart>
+      <c:valAx>
+        <c:axId val="95445568"/>
+        <c:scaling>
+          <c:orientation val="minMax"/>
+        </c:scaling>
+        <c:delete val="0"/>
+        <c:axPos val="b"/>
+        <c:title>
+          <c:tx>
+            <c:rich>
+              <a:bodyPr/>
+              <a:lstStyle/>
+              <a:p>
+                <a:pPr>
+                  <a:defRPr/>
+                </a:pPr>
+                <a:r>
+                  <a:rPr lang="ru-RU" sz="1800" b="0" i="0" baseline="0">
+                    <a:effectLst/>
+                  </a:rPr>
+                  <a:t>Величиная абсолютного отклонения найденного значения направления оси</a:t>
+                </a:r>
+                <a:r>
+                  <a:rPr lang="en-US" sz="1800" b="0" i="0" baseline="0">
+                    <a:effectLst/>
+                  </a:rPr>
+                  <a:t>, </a:t>
+                </a:r>
+                <a:r>
+                  <a:rPr lang="ru-RU" sz="1800" b="0" i="0" baseline="0">
+                    <a:effectLst/>
+                  </a:rPr>
+                  <a:t>град</a:t>
+                </a:r>
+                <a:endParaRPr lang="en-US">
+                  <a:effectLst/>
+                </a:endParaRPr>
+              </a:p>
+            </c:rich>
+          </c:tx>
+          <c:layout/>
+          <c:overlay val="0"/>
+        </c:title>
+        <c:numFmt formatCode="General" sourceLinked="1"/>
+        <c:majorTickMark val="out"/>
+        <c:minorTickMark val="none"/>
+        <c:tickLblPos val="nextTo"/>
+        <c:txPr>
+          <a:bodyPr/>
+          <a:lstStyle/>
+          <a:p>
+            <a:pPr>
+              <a:defRPr sz="1400"/>
+            </a:pPr>
+            <a:endParaRPr lang="en-US"/>
+          </a:p>
+        </c:txPr>
+        <c:crossAx val="95447296"/>
+        <c:crosses val="autoZero"/>
+        <c:crossBetween val="midCat"/>
+      </c:valAx>
+      <c:valAx>
+        <c:axId val="95447296"/>
+        <c:scaling>
+          <c:orientation val="minMax"/>
+        </c:scaling>
+        <c:delete val="0"/>
+        <c:axPos val="l"/>
+        <c:majorGridlines/>
+        <c:title>
+          <c:tx>
+            <c:rich>
+              <a:bodyPr rot="-5400000" vert="horz"/>
+              <a:lstStyle/>
+              <a:p>
+                <a:pPr>
+                  <a:defRPr/>
+                </a:pPr>
+                <a:r>
+                  <a:rPr lang="ru-RU" sz="1800" b="0" i="0" baseline="0">
+                    <a:effectLst/>
+                  </a:rPr>
+                  <a:t>Число изображений, %</a:t>
+                </a:r>
+                <a:endParaRPr lang="ru-RU">
+                  <a:effectLst/>
+                </a:endParaRPr>
+              </a:p>
+            </c:rich>
+          </c:tx>
+          <c:layout/>
+          <c:overlay val="0"/>
+        </c:title>
+        <c:numFmt formatCode="0%" sourceLinked="1"/>
+        <c:majorTickMark val="out"/>
+        <c:minorTickMark val="none"/>
+        <c:tickLblPos val="nextTo"/>
+        <c:txPr>
+          <a:bodyPr/>
+          <a:lstStyle/>
+          <a:p>
+            <a:pPr>
+              <a:defRPr sz="1400"/>
+            </a:pPr>
+            <a:endParaRPr lang="en-US"/>
+          </a:p>
+        </c:txPr>
+        <c:crossAx val="95445568"/>
+        <c:crosses val="autoZero"/>
+        <c:crossBetween val="midCat"/>
+      </c:valAx>
+    </c:plotArea>
+    <c:legend>
+      <c:legendPos val="r"/>
+      <c:layout/>
+      <c:overlay val="0"/>
+      <c:txPr>
+        <a:bodyPr/>
+        <a:lstStyle/>
+        <a:p>
+          <a:pPr>
+            <a:defRPr sz="1400"/>
+          </a:pPr>
+          <a:endParaRPr lang="en-US"/>
+        </a:p>
+      </c:txPr>
+    </c:legend>
+    <c:plotVisOnly val="1"/>
+    <c:dispBlanksAs val="gap"/>
+    <c:showDLblsOverMax val="0"/>
+  </c:chart>
+  <c:externalData r:id="rId1">
+    <c:autoUpdate val="0"/>
+  </c:externalData>
+</c:chartSpace>
+</file>
+
+<file path=ppt/charts/chart4.xml><?xml version="1.0" encoding="utf-8"?>
+<c:chartSpace xmlns:c="http://schemas.openxmlformats.org/drawingml/2006/chart" xmlns:a="http://schemas.openxmlformats.org/drawingml/2006/main" xmlns:r="http://schemas.openxmlformats.org/officeDocument/2006/relationships">
+  <c:date1904 val="0"/>
+  <c:lang val="en-US"/>
+  <c:roundedCorners val="0"/>
+  <mc:AlternateContent xmlns:mc="http://schemas.openxmlformats.org/markup-compatibility/2006">
+    <mc:Choice xmlns:c14="http://schemas.microsoft.com/office/drawing/2007/8/2/chart" Requires="c14">
+      <c14:style val="102"/>
+    </mc:Choice>
+    <mc:Fallback>
+      <c:style val="2"/>
+    </mc:Fallback>
+  </mc:AlternateContent>
+  <c:chart>
+    <c:title>
+      <c:tx>
+        <c:rich>
+          <a:bodyPr/>
+          <a:lstStyle/>
+          <a:p>
+            <a:pPr>
+              <a:defRPr/>
+            </a:pPr>
+            <a:r>
               <a:rPr lang="ru-RU" sz="1800" b="1" i="0" baseline="0">
                 <a:effectLst/>
               </a:rPr>
@@ -1726,7 +2825,7 @@
 </c:chartSpace>
 </file>
 
-<file path=ppt/charts/chart4.xml><?xml version="1.0" encoding="utf-8"?>
+<file path=ppt/charts/chart5.xml><?xml version="1.0" encoding="utf-8"?>
 <c:chartSpace xmlns:c="http://schemas.openxmlformats.org/drawingml/2006/chart" xmlns:a="http://schemas.openxmlformats.org/drawingml/2006/main" xmlns:r="http://schemas.openxmlformats.org/officeDocument/2006/relationships">
   <c:date1904 val="0"/>
   <c:lang val="en-US"/>
@@ -2396,6 +3495,1068 @@
           </a:p>
         </c:txPr>
         <c:crossAx val="82996032"/>
+        <c:crosses val="autoZero"/>
+        <c:crossBetween val="midCat"/>
+      </c:valAx>
+    </c:plotArea>
+    <c:legend>
+      <c:legendPos val="r"/>
+      <c:layout/>
+      <c:overlay val="0"/>
+      <c:txPr>
+        <a:bodyPr/>
+        <a:lstStyle/>
+        <a:p>
+          <a:pPr>
+            <a:defRPr sz="1400"/>
+          </a:pPr>
+          <a:endParaRPr lang="en-US"/>
+        </a:p>
+      </c:txPr>
+    </c:legend>
+    <c:plotVisOnly val="1"/>
+    <c:dispBlanksAs val="gap"/>
+    <c:showDLblsOverMax val="0"/>
+  </c:chart>
+  <c:externalData r:id="rId1">
+    <c:autoUpdate val="0"/>
+  </c:externalData>
+</c:chartSpace>
+</file>
+
+<file path=ppt/charts/chart6.xml><?xml version="1.0" encoding="utf-8"?>
+<c:chartSpace xmlns:c="http://schemas.openxmlformats.org/drawingml/2006/chart" xmlns:a="http://schemas.openxmlformats.org/drawingml/2006/main" xmlns:r="http://schemas.openxmlformats.org/officeDocument/2006/relationships">
+  <c:date1904 val="0"/>
+  <c:lang val="en-US"/>
+  <c:roundedCorners val="0"/>
+  <mc:AlternateContent xmlns:mc="http://schemas.openxmlformats.org/markup-compatibility/2006">
+    <mc:Choice xmlns:c14="http://schemas.microsoft.com/office/drawing/2007/8/2/chart" Requires="c14">
+      <c14:style val="102"/>
+    </mc:Choice>
+    <mc:Fallback>
+      <c:style val="2"/>
+    </mc:Fallback>
+  </mc:AlternateContent>
+  <c:chart>
+    <c:title>
+      <c:tx>
+        <c:rich>
+          <a:bodyPr/>
+          <a:lstStyle/>
+          <a:p>
+            <a:pPr>
+              <a:defRPr/>
+            </a:pPr>
+            <a:r>
+              <a:rPr lang="ru-RU" dirty="0"/>
+              <a:t>Диаграмма распределения точности обработки изображений</a:t>
+            </a:r>
+            <a:r>
+              <a:rPr lang="ru-RU" baseline="0" dirty="0"/>
+              <a:t> по величине углов абсолютного отклонения </a:t>
+            </a:r>
+            <a:r>
+              <a:rPr lang="ru-RU" dirty="0"/>
+              <a:t>осей координат от верных значений</a:t>
+            </a:r>
+          </a:p>
+        </c:rich>
+      </c:tx>
+      <c:layout/>
+      <c:overlay val="0"/>
+    </c:title>
+    <c:autoTitleDeleted val="0"/>
+    <c:plotArea>
+      <c:layout/>
+      <c:scatterChart>
+        <c:scatterStyle val="lineMarker"/>
+        <c:varyColors val="0"/>
+        <c:ser>
+          <c:idx val="0"/>
+          <c:order val="0"/>
+          <c:tx>
+            <c:strRef>
+              <c:f>outdoor_res!$H$11</c:f>
+              <c:strCache>
+                <c:ptCount val="1"/>
+                <c:pt idx="0">
+                  <c:v>Ось X</c:v>
+                </c:pt>
+              </c:strCache>
+            </c:strRef>
+          </c:tx>
+          <c:marker>
+            <c:symbol val="none"/>
+          </c:marker>
+          <c:xVal>
+            <c:numRef>
+              <c:f>outdoor_res!$G$12:$G$53</c:f>
+              <c:numCache>
+                <c:formatCode>General</c:formatCode>
+                <c:ptCount val="42"/>
+                <c:pt idx="0">
+                  <c:v>3.9360791121539396E-2</c:v>
+                </c:pt>
+                <c:pt idx="1">
+                  <c:v>0.23939258645732439</c:v>
+                </c:pt>
+                <c:pt idx="2">
+                  <c:v>0.43942438179310939</c:v>
+                </c:pt>
+                <c:pt idx="3">
+                  <c:v>0.63945617712889447</c:v>
+                </c:pt>
+                <c:pt idx="4">
+                  <c:v>0.83948797246467932</c:v>
+                </c:pt>
+                <c:pt idx="5">
+                  <c:v>1.0395197678004644</c:v>
+                </c:pt>
+                <c:pt idx="6">
+                  <c:v>1.2395515631362495</c:v>
+                </c:pt>
+                <c:pt idx="7">
+                  <c:v>1.4395833584720343</c:v>
+                </c:pt>
+                <c:pt idx="8">
+                  <c:v>1.6396151538078194</c:v>
+                </c:pt>
+                <c:pt idx="9">
+                  <c:v>1.8396469491436045</c:v>
+                </c:pt>
+                <c:pt idx="10">
+                  <c:v>2.0396787444793891</c:v>
+                </c:pt>
+                <c:pt idx="11">
+                  <c:v>2.239710539815174</c:v>
+                </c:pt>
+                <c:pt idx="12">
+                  <c:v>2.4397423351509593</c:v>
+                </c:pt>
+                <c:pt idx="13">
+                  <c:v>2.6397741304867441</c:v>
+                </c:pt>
+                <c:pt idx="14">
+                  <c:v>2.839805925822529</c:v>
+                </c:pt>
+                <c:pt idx="15">
+                  <c:v>3.0398377211583143</c:v>
+                </c:pt>
+                <c:pt idx="16">
+                  <c:v>3.2398695164940992</c:v>
+                </c:pt>
+                <c:pt idx="17">
+                  <c:v>3.439901311829884</c:v>
+                </c:pt>
+                <c:pt idx="18">
+                  <c:v>3.6399331071656693</c:v>
+                </c:pt>
+                <c:pt idx="19">
+                  <c:v>3.8399649025014542</c:v>
+                </c:pt>
+                <c:pt idx="20">
+                  <c:v>4.039996697837239</c:v>
+                </c:pt>
+                <c:pt idx="21">
+                  <c:v>4.2400284931730239</c:v>
+                </c:pt>
+                <c:pt idx="22">
+                  <c:v>4.4400602885088087</c:v>
+                </c:pt>
+                <c:pt idx="23">
+                  <c:v>4.6400920838445945</c:v>
+                </c:pt>
+                <c:pt idx="24">
+                  <c:v>4.8401238791803793</c:v>
+                </c:pt>
+                <c:pt idx="25">
+                  <c:v>5.0401556745161642</c:v>
+                </c:pt>
+                <c:pt idx="26">
+                  <c:v>5.2401874698519491</c:v>
+                </c:pt>
+                <c:pt idx="27">
+                  <c:v>5.4402192651877339</c:v>
+                </c:pt>
+                <c:pt idx="28">
+                  <c:v>5.6402510605235188</c:v>
+                </c:pt>
+                <c:pt idx="29">
+                  <c:v>5.8402828558593045</c:v>
+                </c:pt>
+                <c:pt idx="30">
+                  <c:v>6.0403146511950894</c:v>
+                </c:pt>
+                <c:pt idx="31">
+                  <c:v>6.2403464465308742</c:v>
+                </c:pt>
+                <c:pt idx="32">
+                  <c:v>6.4403782418666591</c:v>
+                </c:pt>
+                <c:pt idx="33">
+                  <c:v>6.6404100372024439</c:v>
+                </c:pt>
+                <c:pt idx="34">
+                  <c:v>6.8404418325382288</c:v>
+                </c:pt>
+                <c:pt idx="35">
+                  <c:v>7.0404736278740137</c:v>
+                </c:pt>
+                <c:pt idx="36">
+                  <c:v>7.2405054232097994</c:v>
+                </c:pt>
+                <c:pt idx="37">
+                  <c:v>7.4405372185455843</c:v>
+                </c:pt>
+                <c:pt idx="38">
+                  <c:v>7.6405690138813691</c:v>
+                </c:pt>
+                <c:pt idx="39">
+                  <c:v>7.840600809217154</c:v>
+                </c:pt>
+                <c:pt idx="40">
+                  <c:v>8.0406326045529397</c:v>
+                </c:pt>
+                <c:pt idx="41">
+                  <c:v>8.2406643998887255</c:v>
+                </c:pt>
+              </c:numCache>
+            </c:numRef>
+          </c:xVal>
+          <c:yVal>
+            <c:numRef>
+              <c:f>outdoor_res!$H$12:$H$53</c:f>
+              <c:numCache>
+                <c:formatCode>0%</c:formatCode>
+                <c:ptCount val="42"/>
+                <c:pt idx="0">
+                  <c:v>0</c:v>
+                </c:pt>
+                <c:pt idx="1">
+                  <c:v>5.2631578947368418E-2</c:v>
+                </c:pt>
+                <c:pt idx="2">
+                  <c:v>8.771929824561403E-2</c:v>
+                </c:pt>
+                <c:pt idx="3">
+                  <c:v>0.17543859649122806</c:v>
+                </c:pt>
+                <c:pt idx="4">
+                  <c:v>0.2982456140350877</c:v>
+                </c:pt>
+                <c:pt idx="5">
+                  <c:v>0.35087719298245612</c:v>
+                </c:pt>
+                <c:pt idx="6">
+                  <c:v>0.52631578947368418</c:v>
+                </c:pt>
+                <c:pt idx="7">
+                  <c:v>0.59649122807017541</c:v>
+                </c:pt>
+                <c:pt idx="8">
+                  <c:v>0.64912280701754388</c:v>
+                </c:pt>
+                <c:pt idx="9">
+                  <c:v>0.73684210526315785</c:v>
+                </c:pt>
+                <c:pt idx="10">
+                  <c:v>0.78947368421052633</c:v>
+                </c:pt>
+                <c:pt idx="11">
+                  <c:v>0.82456140350877194</c:v>
+                </c:pt>
+                <c:pt idx="12">
+                  <c:v>0.8771929824561403</c:v>
+                </c:pt>
+                <c:pt idx="13">
+                  <c:v>0.91228070175438591</c:v>
+                </c:pt>
+                <c:pt idx="14">
+                  <c:v>0.91228070175438591</c:v>
+                </c:pt>
+                <c:pt idx="15">
+                  <c:v>0.91228070175438591</c:v>
+                </c:pt>
+                <c:pt idx="16">
+                  <c:v>0.91228070175438591</c:v>
+                </c:pt>
+                <c:pt idx="17">
+                  <c:v>0.91228070175438591</c:v>
+                </c:pt>
+                <c:pt idx="18">
+                  <c:v>0.91228070175438591</c:v>
+                </c:pt>
+                <c:pt idx="19">
+                  <c:v>0.91228070175438591</c:v>
+                </c:pt>
+                <c:pt idx="20">
+                  <c:v>0.91228070175438591</c:v>
+                </c:pt>
+                <c:pt idx="21">
+                  <c:v>0.91228070175438591</c:v>
+                </c:pt>
+                <c:pt idx="22">
+                  <c:v>0.92982456140350878</c:v>
+                </c:pt>
+                <c:pt idx="23">
+                  <c:v>0.92982456140350878</c:v>
+                </c:pt>
+                <c:pt idx="24">
+                  <c:v>0.92982456140350878</c:v>
+                </c:pt>
+                <c:pt idx="25">
+                  <c:v>0.94736842105263153</c:v>
+                </c:pt>
+                <c:pt idx="26">
+                  <c:v>0.94736842105263153</c:v>
+                </c:pt>
+                <c:pt idx="27">
+                  <c:v>0.94736842105263153</c:v>
+                </c:pt>
+                <c:pt idx="28">
+                  <c:v>0.94736842105263153</c:v>
+                </c:pt>
+                <c:pt idx="29">
+                  <c:v>0.94736842105263153</c:v>
+                </c:pt>
+                <c:pt idx="30">
+                  <c:v>0.94736842105263153</c:v>
+                </c:pt>
+                <c:pt idx="31">
+                  <c:v>0.94736842105263153</c:v>
+                </c:pt>
+                <c:pt idx="32">
+                  <c:v>0.96491228070175439</c:v>
+                </c:pt>
+                <c:pt idx="33">
+                  <c:v>0.96491228070175439</c:v>
+                </c:pt>
+                <c:pt idx="34">
+                  <c:v>0.96491228070175439</c:v>
+                </c:pt>
+                <c:pt idx="35">
+                  <c:v>0.96491228070175439</c:v>
+                </c:pt>
+                <c:pt idx="36">
+                  <c:v>0.96491228070175439</c:v>
+                </c:pt>
+                <c:pt idx="37">
+                  <c:v>0.98245614035087714</c:v>
+                </c:pt>
+                <c:pt idx="38">
+                  <c:v>0.98245614035087714</c:v>
+                </c:pt>
+                <c:pt idx="39">
+                  <c:v>0.98245614035087714</c:v>
+                </c:pt>
+                <c:pt idx="40">
+                  <c:v>1</c:v>
+                </c:pt>
+                <c:pt idx="41">
+                  <c:v>1</c:v>
+                </c:pt>
+              </c:numCache>
+            </c:numRef>
+          </c:yVal>
+          <c:smooth val="0"/>
+        </c:ser>
+        <c:ser>
+          <c:idx val="1"/>
+          <c:order val="1"/>
+          <c:tx>
+            <c:strRef>
+              <c:f>outdoor_res!$I$11</c:f>
+              <c:strCache>
+                <c:ptCount val="1"/>
+                <c:pt idx="0">
+                  <c:v>Ось Y</c:v>
+                </c:pt>
+              </c:strCache>
+            </c:strRef>
+          </c:tx>
+          <c:marker>
+            <c:symbol val="none"/>
+          </c:marker>
+          <c:xVal>
+            <c:numRef>
+              <c:f>outdoor_res!$G$12:$G$53</c:f>
+              <c:numCache>
+                <c:formatCode>General</c:formatCode>
+                <c:ptCount val="42"/>
+                <c:pt idx="0">
+                  <c:v>3.9360791121539396E-2</c:v>
+                </c:pt>
+                <c:pt idx="1">
+                  <c:v>0.23939258645732439</c:v>
+                </c:pt>
+                <c:pt idx="2">
+                  <c:v>0.43942438179310939</c:v>
+                </c:pt>
+                <c:pt idx="3">
+                  <c:v>0.63945617712889447</c:v>
+                </c:pt>
+                <c:pt idx="4">
+                  <c:v>0.83948797246467932</c:v>
+                </c:pt>
+                <c:pt idx="5">
+                  <c:v>1.0395197678004644</c:v>
+                </c:pt>
+                <c:pt idx="6">
+                  <c:v>1.2395515631362495</c:v>
+                </c:pt>
+                <c:pt idx="7">
+                  <c:v>1.4395833584720343</c:v>
+                </c:pt>
+                <c:pt idx="8">
+                  <c:v>1.6396151538078194</c:v>
+                </c:pt>
+                <c:pt idx="9">
+                  <c:v>1.8396469491436045</c:v>
+                </c:pt>
+                <c:pt idx="10">
+                  <c:v>2.0396787444793891</c:v>
+                </c:pt>
+                <c:pt idx="11">
+                  <c:v>2.239710539815174</c:v>
+                </c:pt>
+                <c:pt idx="12">
+                  <c:v>2.4397423351509593</c:v>
+                </c:pt>
+                <c:pt idx="13">
+                  <c:v>2.6397741304867441</c:v>
+                </c:pt>
+                <c:pt idx="14">
+                  <c:v>2.839805925822529</c:v>
+                </c:pt>
+                <c:pt idx="15">
+                  <c:v>3.0398377211583143</c:v>
+                </c:pt>
+                <c:pt idx="16">
+                  <c:v>3.2398695164940992</c:v>
+                </c:pt>
+                <c:pt idx="17">
+                  <c:v>3.439901311829884</c:v>
+                </c:pt>
+                <c:pt idx="18">
+                  <c:v>3.6399331071656693</c:v>
+                </c:pt>
+                <c:pt idx="19">
+                  <c:v>3.8399649025014542</c:v>
+                </c:pt>
+                <c:pt idx="20">
+                  <c:v>4.039996697837239</c:v>
+                </c:pt>
+                <c:pt idx="21">
+                  <c:v>4.2400284931730239</c:v>
+                </c:pt>
+                <c:pt idx="22">
+                  <c:v>4.4400602885088087</c:v>
+                </c:pt>
+                <c:pt idx="23">
+                  <c:v>4.6400920838445945</c:v>
+                </c:pt>
+                <c:pt idx="24">
+                  <c:v>4.8401238791803793</c:v>
+                </c:pt>
+                <c:pt idx="25">
+                  <c:v>5.0401556745161642</c:v>
+                </c:pt>
+                <c:pt idx="26">
+                  <c:v>5.2401874698519491</c:v>
+                </c:pt>
+                <c:pt idx="27">
+                  <c:v>5.4402192651877339</c:v>
+                </c:pt>
+                <c:pt idx="28">
+                  <c:v>5.6402510605235188</c:v>
+                </c:pt>
+                <c:pt idx="29">
+                  <c:v>5.8402828558593045</c:v>
+                </c:pt>
+                <c:pt idx="30">
+                  <c:v>6.0403146511950894</c:v>
+                </c:pt>
+                <c:pt idx="31">
+                  <c:v>6.2403464465308742</c:v>
+                </c:pt>
+                <c:pt idx="32">
+                  <c:v>6.4403782418666591</c:v>
+                </c:pt>
+                <c:pt idx="33">
+                  <c:v>6.6404100372024439</c:v>
+                </c:pt>
+                <c:pt idx="34">
+                  <c:v>6.8404418325382288</c:v>
+                </c:pt>
+                <c:pt idx="35">
+                  <c:v>7.0404736278740137</c:v>
+                </c:pt>
+                <c:pt idx="36">
+                  <c:v>7.2405054232097994</c:v>
+                </c:pt>
+                <c:pt idx="37">
+                  <c:v>7.4405372185455843</c:v>
+                </c:pt>
+                <c:pt idx="38">
+                  <c:v>7.6405690138813691</c:v>
+                </c:pt>
+                <c:pt idx="39">
+                  <c:v>7.840600809217154</c:v>
+                </c:pt>
+                <c:pt idx="40">
+                  <c:v>8.0406326045529397</c:v>
+                </c:pt>
+                <c:pt idx="41">
+                  <c:v>8.2406643998887255</c:v>
+                </c:pt>
+              </c:numCache>
+            </c:numRef>
+          </c:xVal>
+          <c:yVal>
+            <c:numRef>
+              <c:f>outdoor_res!$I$12:$I$53</c:f>
+              <c:numCache>
+                <c:formatCode>0%</c:formatCode>
+                <c:ptCount val="42"/>
+                <c:pt idx="0">
+                  <c:v>0</c:v>
+                </c:pt>
+                <c:pt idx="1">
+                  <c:v>0.15789473684210525</c:v>
+                </c:pt>
+                <c:pt idx="2">
+                  <c:v>0.24561403508771928</c:v>
+                </c:pt>
+                <c:pt idx="3">
+                  <c:v>0.38596491228070173</c:v>
+                </c:pt>
+                <c:pt idx="4">
+                  <c:v>0.50877192982456143</c:v>
+                </c:pt>
+                <c:pt idx="5">
+                  <c:v>0.56140350877192979</c:v>
+                </c:pt>
+                <c:pt idx="6">
+                  <c:v>0.64912280701754388</c:v>
+                </c:pt>
+                <c:pt idx="7">
+                  <c:v>0.7192982456140351</c:v>
+                </c:pt>
+                <c:pt idx="8">
+                  <c:v>0.80701754385964908</c:v>
+                </c:pt>
+                <c:pt idx="9">
+                  <c:v>0.89473684210526316</c:v>
+                </c:pt>
+                <c:pt idx="10">
+                  <c:v>0.89473684210526316</c:v>
+                </c:pt>
+                <c:pt idx="11">
+                  <c:v>0.89473684210526316</c:v>
+                </c:pt>
+                <c:pt idx="12">
+                  <c:v>0.92982456140350878</c:v>
+                </c:pt>
+                <c:pt idx="13">
+                  <c:v>0.94736842105263153</c:v>
+                </c:pt>
+                <c:pt idx="14">
+                  <c:v>0.94736842105263153</c:v>
+                </c:pt>
+                <c:pt idx="15">
+                  <c:v>0.94736842105263153</c:v>
+                </c:pt>
+                <c:pt idx="16">
+                  <c:v>0.96491228070175439</c:v>
+                </c:pt>
+                <c:pt idx="17">
+                  <c:v>0.96491228070175439</c:v>
+                </c:pt>
+                <c:pt idx="18">
+                  <c:v>0.96491228070175439</c:v>
+                </c:pt>
+                <c:pt idx="19">
+                  <c:v>0.98245614035087714</c:v>
+                </c:pt>
+                <c:pt idx="20">
+                  <c:v>0.98245614035087714</c:v>
+                </c:pt>
+                <c:pt idx="21">
+                  <c:v>0.98245614035087714</c:v>
+                </c:pt>
+                <c:pt idx="22">
+                  <c:v>0.98245614035087714</c:v>
+                </c:pt>
+                <c:pt idx="23">
+                  <c:v>0.98245614035087714</c:v>
+                </c:pt>
+                <c:pt idx="24">
+                  <c:v>0.98245614035087714</c:v>
+                </c:pt>
+                <c:pt idx="25">
+                  <c:v>0.98245614035087714</c:v>
+                </c:pt>
+                <c:pt idx="26">
+                  <c:v>0.98245614035087714</c:v>
+                </c:pt>
+                <c:pt idx="27">
+                  <c:v>0.98245614035087714</c:v>
+                </c:pt>
+                <c:pt idx="28">
+                  <c:v>0.98245614035087714</c:v>
+                </c:pt>
+                <c:pt idx="29">
+                  <c:v>1</c:v>
+                </c:pt>
+                <c:pt idx="30">
+                  <c:v>1</c:v>
+                </c:pt>
+                <c:pt idx="31">
+                  <c:v>1</c:v>
+                </c:pt>
+                <c:pt idx="32">
+                  <c:v>1</c:v>
+                </c:pt>
+                <c:pt idx="33">
+                  <c:v>1</c:v>
+                </c:pt>
+                <c:pt idx="34">
+                  <c:v>1</c:v>
+                </c:pt>
+                <c:pt idx="35">
+                  <c:v>1</c:v>
+                </c:pt>
+                <c:pt idx="36">
+                  <c:v>1</c:v>
+                </c:pt>
+                <c:pt idx="37">
+                  <c:v>1</c:v>
+                </c:pt>
+                <c:pt idx="38">
+                  <c:v>1</c:v>
+                </c:pt>
+                <c:pt idx="39">
+                  <c:v>1</c:v>
+                </c:pt>
+                <c:pt idx="40">
+                  <c:v>1</c:v>
+                </c:pt>
+                <c:pt idx="41">
+                  <c:v>1</c:v>
+                </c:pt>
+              </c:numCache>
+            </c:numRef>
+          </c:yVal>
+          <c:smooth val="0"/>
+        </c:ser>
+        <c:ser>
+          <c:idx val="2"/>
+          <c:order val="2"/>
+          <c:tx>
+            <c:strRef>
+              <c:f>outdoor_res!$J$11</c:f>
+              <c:strCache>
+                <c:ptCount val="1"/>
+                <c:pt idx="0">
+                  <c:v>Ось Z</c:v>
+                </c:pt>
+              </c:strCache>
+            </c:strRef>
+          </c:tx>
+          <c:marker>
+            <c:symbol val="none"/>
+          </c:marker>
+          <c:xVal>
+            <c:numRef>
+              <c:f>outdoor_res!$G$12:$G$53</c:f>
+              <c:numCache>
+                <c:formatCode>General</c:formatCode>
+                <c:ptCount val="42"/>
+                <c:pt idx="0">
+                  <c:v>3.9360791121539396E-2</c:v>
+                </c:pt>
+                <c:pt idx="1">
+                  <c:v>0.23939258645732439</c:v>
+                </c:pt>
+                <c:pt idx="2">
+                  <c:v>0.43942438179310939</c:v>
+                </c:pt>
+                <c:pt idx="3">
+                  <c:v>0.63945617712889447</c:v>
+                </c:pt>
+                <c:pt idx="4">
+                  <c:v>0.83948797246467932</c:v>
+                </c:pt>
+                <c:pt idx="5">
+                  <c:v>1.0395197678004644</c:v>
+                </c:pt>
+                <c:pt idx="6">
+                  <c:v>1.2395515631362495</c:v>
+                </c:pt>
+                <c:pt idx="7">
+                  <c:v>1.4395833584720343</c:v>
+                </c:pt>
+                <c:pt idx="8">
+                  <c:v>1.6396151538078194</c:v>
+                </c:pt>
+                <c:pt idx="9">
+                  <c:v>1.8396469491436045</c:v>
+                </c:pt>
+                <c:pt idx="10">
+                  <c:v>2.0396787444793891</c:v>
+                </c:pt>
+                <c:pt idx="11">
+                  <c:v>2.239710539815174</c:v>
+                </c:pt>
+                <c:pt idx="12">
+                  <c:v>2.4397423351509593</c:v>
+                </c:pt>
+                <c:pt idx="13">
+                  <c:v>2.6397741304867441</c:v>
+                </c:pt>
+                <c:pt idx="14">
+                  <c:v>2.839805925822529</c:v>
+                </c:pt>
+                <c:pt idx="15">
+                  <c:v>3.0398377211583143</c:v>
+                </c:pt>
+                <c:pt idx="16">
+                  <c:v>3.2398695164940992</c:v>
+                </c:pt>
+                <c:pt idx="17">
+                  <c:v>3.439901311829884</c:v>
+                </c:pt>
+                <c:pt idx="18">
+                  <c:v>3.6399331071656693</c:v>
+                </c:pt>
+                <c:pt idx="19">
+                  <c:v>3.8399649025014542</c:v>
+                </c:pt>
+                <c:pt idx="20">
+                  <c:v>4.039996697837239</c:v>
+                </c:pt>
+                <c:pt idx="21">
+                  <c:v>4.2400284931730239</c:v>
+                </c:pt>
+                <c:pt idx="22">
+                  <c:v>4.4400602885088087</c:v>
+                </c:pt>
+                <c:pt idx="23">
+                  <c:v>4.6400920838445945</c:v>
+                </c:pt>
+                <c:pt idx="24">
+                  <c:v>4.8401238791803793</c:v>
+                </c:pt>
+                <c:pt idx="25">
+                  <c:v>5.0401556745161642</c:v>
+                </c:pt>
+                <c:pt idx="26">
+                  <c:v>5.2401874698519491</c:v>
+                </c:pt>
+                <c:pt idx="27">
+                  <c:v>5.4402192651877339</c:v>
+                </c:pt>
+                <c:pt idx="28">
+                  <c:v>5.6402510605235188</c:v>
+                </c:pt>
+                <c:pt idx="29">
+                  <c:v>5.8402828558593045</c:v>
+                </c:pt>
+                <c:pt idx="30">
+                  <c:v>6.0403146511950894</c:v>
+                </c:pt>
+                <c:pt idx="31">
+                  <c:v>6.2403464465308742</c:v>
+                </c:pt>
+                <c:pt idx="32">
+                  <c:v>6.4403782418666591</c:v>
+                </c:pt>
+                <c:pt idx="33">
+                  <c:v>6.6404100372024439</c:v>
+                </c:pt>
+                <c:pt idx="34">
+                  <c:v>6.8404418325382288</c:v>
+                </c:pt>
+                <c:pt idx="35">
+                  <c:v>7.0404736278740137</c:v>
+                </c:pt>
+                <c:pt idx="36">
+                  <c:v>7.2405054232097994</c:v>
+                </c:pt>
+                <c:pt idx="37">
+                  <c:v>7.4405372185455843</c:v>
+                </c:pt>
+                <c:pt idx="38">
+                  <c:v>7.6405690138813691</c:v>
+                </c:pt>
+                <c:pt idx="39">
+                  <c:v>7.840600809217154</c:v>
+                </c:pt>
+                <c:pt idx="40">
+                  <c:v>8.0406326045529397</c:v>
+                </c:pt>
+                <c:pt idx="41">
+                  <c:v>8.2406643998887255</c:v>
+                </c:pt>
+              </c:numCache>
+            </c:numRef>
+          </c:xVal>
+          <c:yVal>
+            <c:numRef>
+              <c:f>outdoor_res!$J$12:$J$53</c:f>
+              <c:numCache>
+                <c:formatCode>0%</c:formatCode>
+                <c:ptCount val="42"/>
+                <c:pt idx="0">
+                  <c:v>0</c:v>
+                </c:pt>
+                <c:pt idx="1">
+                  <c:v>5.2631578947368418E-2</c:v>
+                </c:pt>
+                <c:pt idx="2">
+                  <c:v>0.10526315789473684</c:v>
+                </c:pt>
+                <c:pt idx="3">
+                  <c:v>0.15789473684210525</c:v>
+                </c:pt>
+                <c:pt idx="4">
+                  <c:v>0.26315789473684209</c:v>
+                </c:pt>
+                <c:pt idx="5">
+                  <c:v>0.31578947368421051</c:v>
+                </c:pt>
+                <c:pt idx="6">
+                  <c:v>0.47368421052631576</c:v>
+                </c:pt>
+                <c:pt idx="7">
+                  <c:v>0.59649122807017541</c:v>
+                </c:pt>
+                <c:pt idx="8">
+                  <c:v>0.61403508771929827</c:v>
+                </c:pt>
+                <c:pt idx="9">
+                  <c:v>0.70175438596491224</c:v>
+                </c:pt>
+                <c:pt idx="10">
+                  <c:v>0.7192982456140351</c:v>
+                </c:pt>
+                <c:pt idx="11">
+                  <c:v>0.73684210526315785</c:v>
+                </c:pt>
+                <c:pt idx="12">
+                  <c:v>0.80701754385964908</c:v>
+                </c:pt>
+                <c:pt idx="13">
+                  <c:v>0.85964912280701755</c:v>
+                </c:pt>
+                <c:pt idx="14">
+                  <c:v>0.85964912280701755</c:v>
+                </c:pt>
+                <c:pt idx="15">
+                  <c:v>0.8771929824561403</c:v>
+                </c:pt>
+                <c:pt idx="16">
+                  <c:v>0.8771929824561403</c:v>
+                </c:pt>
+                <c:pt idx="17">
+                  <c:v>0.8771929824561403</c:v>
+                </c:pt>
+                <c:pt idx="18">
+                  <c:v>0.8771929824561403</c:v>
+                </c:pt>
+                <c:pt idx="19">
+                  <c:v>0.89473684210526316</c:v>
+                </c:pt>
+                <c:pt idx="20">
+                  <c:v>0.89473684210526316</c:v>
+                </c:pt>
+                <c:pt idx="21">
+                  <c:v>0.91228070175438591</c:v>
+                </c:pt>
+                <c:pt idx="22">
+                  <c:v>0.91228070175438591</c:v>
+                </c:pt>
+                <c:pt idx="23">
+                  <c:v>0.91228070175438591</c:v>
+                </c:pt>
+                <c:pt idx="24">
+                  <c:v>0.91228070175438591</c:v>
+                </c:pt>
+                <c:pt idx="25">
+                  <c:v>0.91228070175438591</c:v>
+                </c:pt>
+                <c:pt idx="26">
+                  <c:v>0.92982456140350878</c:v>
+                </c:pt>
+                <c:pt idx="27">
+                  <c:v>0.92982456140350878</c:v>
+                </c:pt>
+                <c:pt idx="28">
+                  <c:v>0.92982456140350878</c:v>
+                </c:pt>
+                <c:pt idx="29">
+                  <c:v>0.94736842105263153</c:v>
+                </c:pt>
+                <c:pt idx="30">
+                  <c:v>0.94736842105263153</c:v>
+                </c:pt>
+                <c:pt idx="31">
+                  <c:v>0.94736842105263153</c:v>
+                </c:pt>
+                <c:pt idx="32">
+                  <c:v>0.94736842105263153</c:v>
+                </c:pt>
+                <c:pt idx="33">
+                  <c:v>0.96491228070175439</c:v>
+                </c:pt>
+                <c:pt idx="34">
+                  <c:v>0.96491228070175439</c:v>
+                </c:pt>
+                <c:pt idx="35">
+                  <c:v>0.96491228070175439</c:v>
+                </c:pt>
+                <c:pt idx="36">
+                  <c:v>0.96491228070175439</c:v>
+                </c:pt>
+                <c:pt idx="37">
+                  <c:v>0.98245614035087714</c:v>
+                </c:pt>
+                <c:pt idx="38">
+                  <c:v>0.98245614035087714</c:v>
+                </c:pt>
+                <c:pt idx="39">
+                  <c:v>0.98245614035087714</c:v>
+                </c:pt>
+                <c:pt idx="40">
+                  <c:v>0.98245614035087714</c:v>
+                </c:pt>
+                <c:pt idx="41">
+                  <c:v>1</c:v>
+                </c:pt>
+              </c:numCache>
+            </c:numRef>
+          </c:yVal>
+          <c:smooth val="0"/>
+        </c:ser>
+        <c:dLbls>
+          <c:showLegendKey val="0"/>
+          <c:showVal val="0"/>
+          <c:showCatName val="0"/>
+          <c:showSerName val="0"/>
+          <c:showPercent val="0"/>
+          <c:showBubbleSize val="0"/>
+        </c:dLbls>
+        <c:axId val="78700544"/>
+        <c:axId val="78701120"/>
+      </c:scatterChart>
+      <c:valAx>
+        <c:axId val="78700544"/>
+        <c:scaling>
+          <c:orientation val="minMax"/>
+        </c:scaling>
+        <c:delete val="0"/>
+        <c:axPos val="b"/>
+        <c:title>
+          <c:tx>
+            <c:rich>
+              <a:bodyPr/>
+              <a:lstStyle/>
+              <a:p>
+                <a:pPr>
+                  <a:defRPr/>
+                </a:pPr>
+                <a:r>
+                  <a:rPr lang="ru-RU" sz="1800" b="0" i="0" baseline="0">
+                    <a:effectLst/>
+                  </a:rPr>
+                  <a:t>Величиная абсолютного отклонения найденного значения направления оси</a:t>
+                </a:r>
+                <a:r>
+                  <a:rPr lang="en-US" sz="1800" b="0" i="0" baseline="0">
+                    <a:effectLst/>
+                  </a:rPr>
+                  <a:t>, </a:t>
+                </a:r>
+                <a:r>
+                  <a:rPr lang="ru-RU" sz="1800" b="0" i="0" baseline="0">
+                    <a:effectLst/>
+                  </a:rPr>
+                  <a:t>град</a:t>
+                </a:r>
+                <a:endParaRPr lang="en-US">
+                  <a:effectLst/>
+                </a:endParaRPr>
+              </a:p>
+            </c:rich>
+          </c:tx>
+          <c:layout/>
+          <c:overlay val="0"/>
+        </c:title>
+        <c:numFmt formatCode="General" sourceLinked="1"/>
+        <c:majorTickMark val="out"/>
+        <c:minorTickMark val="none"/>
+        <c:tickLblPos val="nextTo"/>
+        <c:txPr>
+          <a:bodyPr/>
+          <a:lstStyle/>
+          <a:p>
+            <a:pPr>
+              <a:defRPr sz="1400"/>
+            </a:pPr>
+            <a:endParaRPr lang="en-US"/>
+          </a:p>
+        </c:txPr>
+        <c:crossAx val="78701120"/>
+        <c:crosses val="autoZero"/>
+        <c:crossBetween val="midCat"/>
+      </c:valAx>
+      <c:valAx>
+        <c:axId val="78701120"/>
+        <c:scaling>
+          <c:orientation val="minMax"/>
+        </c:scaling>
+        <c:delete val="0"/>
+        <c:axPos val="l"/>
+        <c:majorGridlines/>
+        <c:title>
+          <c:tx>
+            <c:rich>
+              <a:bodyPr rot="-5400000" vert="horz"/>
+              <a:lstStyle/>
+              <a:p>
+                <a:pPr>
+                  <a:defRPr/>
+                </a:pPr>
+                <a:r>
+                  <a:rPr lang="ru-RU" sz="1800" b="0" i="0" baseline="0">
+                    <a:effectLst/>
+                  </a:rPr>
+                  <a:t>Число изображений, %</a:t>
+                </a:r>
+                <a:endParaRPr lang="ru-RU">
+                  <a:effectLst/>
+                </a:endParaRPr>
+              </a:p>
+            </c:rich>
+          </c:tx>
+          <c:layout/>
+          <c:overlay val="0"/>
+        </c:title>
+        <c:numFmt formatCode="0%" sourceLinked="1"/>
+        <c:majorTickMark val="out"/>
+        <c:minorTickMark val="none"/>
+        <c:tickLblPos val="nextTo"/>
+        <c:txPr>
+          <a:bodyPr/>
+          <a:lstStyle/>
+          <a:p>
+            <a:pPr>
+              <a:defRPr sz="1400"/>
+            </a:pPr>
+            <a:endParaRPr lang="en-US"/>
+          </a:p>
+        </c:txPr>
+        <c:crossAx val="78700544"/>
         <c:crosses val="autoZero"/>
         <c:crossBetween val="midCat"/>
       </c:valAx>
@@ -3100,6 +5261,91 @@
         </p:txBody>
       </p:sp>
     </p:spTree>
+  </p:cSld>
+  <p:clrMapOvr>
+    <a:masterClrMapping/>
+  </p:clrMapOvr>
+</p:notes>
+</file>
+
+<file path=ppt/notesSlides/notesSlide5.xml><?xml version="1.0" encoding="utf-8"?>
+<p:notes xmlns:a="http://schemas.openxmlformats.org/drawingml/2006/main" xmlns:r="http://schemas.openxmlformats.org/officeDocument/2006/relationships" xmlns:p="http://schemas.openxmlformats.org/presentationml/2006/main">
+  <p:cSld>
+    <p:spTree>
+      <p:nvGrpSpPr>
+        <p:cNvPr id="1" name=""/>
+        <p:cNvGrpSpPr/>
+        <p:nvPr/>
+      </p:nvGrpSpPr>
+      <p:grpSpPr>
+        <a:xfrm>
+          <a:off x="0" y="0"/>
+          <a:ext cx="0" cy="0"/>
+          <a:chOff x="0" y="0"/>
+          <a:chExt cx="0" cy="0"/>
+        </a:xfrm>
+      </p:grpSpPr>
+      <p:sp>
+        <p:nvSpPr>
+          <p:cNvPr id="2" name="Slide Image Placeholder 1"/>
+          <p:cNvSpPr>
+            <a:spLocks noGrp="1" noRot="1" noChangeAspect="1"/>
+          </p:cNvSpPr>
+          <p:nvPr>
+            <p:ph type="sldImg"/>
+          </p:nvPr>
+        </p:nvSpPr>
+        <p:spPr/>
+      </p:sp>
+      <p:sp>
+        <p:nvSpPr>
+          <p:cNvPr id="3" name="Notes Placeholder 2"/>
+          <p:cNvSpPr>
+            <a:spLocks noGrp="1"/>
+          </p:cNvSpPr>
+          <p:nvPr>
+            <p:ph type="body" idx="1"/>
+          </p:nvPr>
+        </p:nvSpPr>
+        <p:spPr/>
+        <p:txBody>
+          <a:bodyPr/>
+          <a:lstStyle/>
+          <a:p>
+            <a:endParaRPr lang="en-US" dirty="0"/>
+          </a:p>
+        </p:txBody>
+      </p:sp>
+      <p:sp>
+        <p:nvSpPr>
+          <p:cNvPr id="4" name="Slide Number Placeholder 3"/>
+          <p:cNvSpPr>
+            <a:spLocks noGrp="1"/>
+          </p:cNvSpPr>
+          <p:nvPr>
+            <p:ph type="sldNum" sz="quarter" idx="10"/>
+          </p:nvPr>
+        </p:nvSpPr>
+        <p:spPr/>
+        <p:txBody>
+          <a:bodyPr/>
+          <a:lstStyle/>
+          <a:p>
+            <a:fld id="{FD38BDC0-7F5F-4F6D-B2CA-25DAD62565D8}" type="slidenum">
+              <a:rPr lang="ru-RU" smtClean="0"/>
+              <a:pPr/>
+              <a:t>19</a:t>
+            </a:fld>
+            <a:endParaRPr lang="ru-RU"/>
+          </a:p>
+        </p:txBody>
+      </p:sp>
+    </p:spTree>
+    <p:extLst>
+      <p:ext uri="{BB962C8B-B14F-4D97-AF65-F5344CB8AC3E}">
+        <p14:creationId xmlns:p14="http://schemas.microsoft.com/office/powerpoint/2010/main" val="4114130089"/>
+      </p:ext>
+    </p:extLst>
   </p:cSld>
   <p:clrMapOvr>
     <a:masterClrMapping/>
@@ -8682,8 +10928,8 @@
         </p:nvSpPr>
         <p:spPr>
           <a:xfrm>
-            <a:off x="323528" y="188640"/>
-            <a:ext cx="8496944" cy="1143000"/>
+            <a:off x="323528" y="44624"/>
+            <a:ext cx="8496944" cy="936104"/>
           </a:xfrm>
         </p:spPr>
         <p:txBody>
@@ -8718,11 +10964,799 @@
         </p:blipFill>
         <p:spPr>
           <a:xfrm>
-            <a:off x="1115616" y="1484784"/>
-            <a:ext cx="6912768" cy="5184576"/>
+            <a:off x="899592" y="1232939"/>
+            <a:ext cx="2736304" cy="2052228"/>
           </a:xfrm>
         </p:spPr>
       </p:pic>
+      <p:pic>
+        <p:nvPicPr>
+          <p:cNvPr id="5122" name="Picture 2" descr="P:\Projects\Study\Graduate work\Gyrocam\TestSamples\good_indoor\P1020839_gyrocam_processed.jpg"/>
+          <p:cNvPicPr>
+            <a:picLocks noChangeAspect="1" noChangeArrowheads="1"/>
+          </p:cNvPicPr>
+          <p:nvPr/>
+        </p:nvPicPr>
+        <p:blipFill>
+          <a:blip r:embed="rId3">
+            <a:extLst>
+              <a:ext uri="{28A0092B-C50C-407E-A947-70E740481C1C}">
+                <a14:useLocalDpi xmlns:a14="http://schemas.microsoft.com/office/drawing/2010/main" val="0"/>
+              </a:ext>
+            </a:extLst>
+          </a:blip>
+          <a:srcRect/>
+          <a:stretch>
+            <a:fillRect/>
+          </a:stretch>
+        </p:blipFill>
+        <p:spPr bwMode="auto">
+          <a:xfrm>
+            <a:off x="3635896" y="3285167"/>
+            <a:ext cx="4656518" cy="3492389"/>
+          </a:xfrm>
+          <a:prstGeom prst="rect">
+            <a:avLst/>
+          </a:prstGeom>
+          <a:noFill/>
+          <a:extLst>
+            <a:ext uri="{909E8E84-426E-40DD-AFC4-6F175D3DCCD1}">
+              <a14:hiddenFill xmlns:a14="http://schemas.microsoft.com/office/drawing/2010/main">
+                <a:solidFill>
+                  <a:srgbClr val="FFFFFF"/>
+                </a:solidFill>
+              </a14:hiddenFill>
+            </a:ext>
+          </a:extLst>
+        </p:spPr>
+      </p:pic>
+      <p:sp>
+        <p:nvSpPr>
+          <p:cNvPr id="8" name="Содержимое 2"/>
+          <p:cNvSpPr txBox="1">
+            <a:spLocks/>
+          </p:cNvSpPr>
+          <p:nvPr/>
+        </p:nvSpPr>
+        <p:spPr>
+          <a:xfrm>
+            <a:off x="3635896" y="1196753"/>
+            <a:ext cx="4656518" cy="2088232"/>
+          </a:xfrm>
+          <a:prstGeom prst="rect">
+            <a:avLst/>
+          </a:prstGeom>
+        </p:spPr>
+        <p:txBody>
+          <a:bodyPr vert="horz" lIns="91440" tIns="45720" rIns="91440" bIns="45720" rtlCol="0">
+            <a:normAutofit fontScale="62500" lnSpcReduction="20000"/>
+          </a:bodyPr>
+          <a:lstStyle>
+            <a:lvl1pPr marL="342900" indent="-342900" algn="l" defTabSz="914400" rtl="0" eaLnBrk="1" latinLnBrk="0" hangingPunct="1">
+              <a:spcBef>
+                <a:spcPct val="20000"/>
+              </a:spcBef>
+              <a:buFont typeface="Arial" pitchFamily="34" charset="0"/>
+              <a:buChar char="•"/>
+              <a:defRPr sz="3200" kern="1200">
+                <a:solidFill>
+                  <a:schemeClr val="tx1"/>
+                </a:solidFill>
+                <a:latin typeface="+mn-lt"/>
+                <a:ea typeface="+mn-ea"/>
+                <a:cs typeface="+mn-cs"/>
+              </a:defRPr>
+            </a:lvl1pPr>
+            <a:lvl2pPr marL="742950" indent="-285750" algn="l" defTabSz="914400" rtl="0" eaLnBrk="1" latinLnBrk="0" hangingPunct="1">
+              <a:spcBef>
+                <a:spcPct val="20000"/>
+              </a:spcBef>
+              <a:buFont typeface="Arial" pitchFamily="34" charset="0"/>
+              <a:buChar char="–"/>
+              <a:defRPr sz="2800" kern="1200">
+                <a:solidFill>
+                  <a:schemeClr val="tx1"/>
+                </a:solidFill>
+                <a:latin typeface="+mn-lt"/>
+                <a:ea typeface="+mn-ea"/>
+                <a:cs typeface="+mn-cs"/>
+              </a:defRPr>
+            </a:lvl2pPr>
+            <a:lvl3pPr marL="1143000" indent="-228600" algn="l" defTabSz="914400" rtl="0" eaLnBrk="1" latinLnBrk="0" hangingPunct="1">
+              <a:spcBef>
+                <a:spcPct val="20000"/>
+              </a:spcBef>
+              <a:buFont typeface="Arial" pitchFamily="34" charset="0"/>
+              <a:buChar char="•"/>
+              <a:defRPr sz="2400" kern="1200">
+                <a:solidFill>
+                  <a:schemeClr val="tx1"/>
+                </a:solidFill>
+                <a:latin typeface="+mn-lt"/>
+                <a:ea typeface="+mn-ea"/>
+                <a:cs typeface="+mn-cs"/>
+              </a:defRPr>
+            </a:lvl3pPr>
+            <a:lvl4pPr marL="1600200" indent="-228600" algn="l" defTabSz="914400" rtl="0" eaLnBrk="1" latinLnBrk="0" hangingPunct="1">
+              <a:spcBef>
+                <a:spcPct val="20000"/>
+              </a:spcBef>
+              <a:buFont typeface="Arial" pitchFamily="34" charset="0"/>
+              <a:buChar char="–"/>
+              <a:defRPr sz="2000" kern="1200">
+                <a:solidFill>
+                  <a:schemeClr val="tx1"/>
+                </a:solidFill>
+                <a:latin typeface="+mn-lt"/>
+                <a:ea typeface="+mn-ea"/>
+                <a:cs typeface="+mn-cs"/>
+              </a:defRPr>
+            </a:lvl4pPr>
+            <a:lvl5pPr marL="2057400" indent="-228600" algn="l" defTabSz="914400" rtl="0" eaLnBrk="1" latinLnBrk="0" hangingPunct="1">
+              <a:spcBef>
+                <a:spcPct val="20000"/>
+              </a:spcBef>
+              <a:buFont typeface="Arial" pitchFamily="34" charset="0"/>
+              <a:buChar char="»"/>
+              <a:defRPr sz="2000" kern="1200">
+                <a:solidFill>
+                  <a:schemeClr val="tx1"/>
+                </a:solidFill>
+                <a:latin typeface="+mn-lt"/>
+                <a:ea typeface="+mn-ea"/>
+                <a:cs typeface="+mn-cs"/>
+              </a:defRPr>
+            </a:lvl5pPr>
+            <a:lvl6pPr marL="2514600" indent="-228600" algn="l" defTabSz="914400" rtl="0" eaLnBrk="1" latinLnBrk="0" hangingPunct="1">
+              <a:spcBef>
+                <a:spcPct val="20000"/>
+              </a:spcBef>
+              <a:buFont typeface="Arial" pitchFamily="34" charset="0"/>
+              <a:buChar char="•"/>
+              <a:defRPr sz="2000" kern="1200">
+                <a:solidFill>
+                  <a:schemeClr val="tx1"/>
+                </a:solidFill>
+                <a:latin typeface="+mn-lt"/>
+                <a:ea typeface="+mn-ea"/>
+                <a:cs typeface="+mn-cs"/>
+              </a:defRPr>
+            </a:lvl6pPr>
+            <a:lvl7pPr marL="2971800" indent="-228600" algn="l" defTabSz="914400" rtl="0" eaLnBrk="1" latinLnBrk="0" hangingPunct="1">
+              <a:spcBef>
+                <a:spcPct val="20000"/>
+              </a:spcBef>
+              <a:buFont typeface="Arial" pitchFamily="34" charset="0"/>
+              <a:buChar char="•"/>
+              <a:defRPr sz="2000" kern="1200">
+                <a:solidFill>
+                  <a:schemeClr val="tx1"/>
+                </a:solidFill>
+                <a:latin typeface="+mn-lt"/>
+                <a:ea typeface="+mn-ea"/>
+                <a:cs typeface="+mn-cs"/>
+              </a:defRPr>
+            </a:lvl7pPr>
+            <a:lvl8pPr marL="3429000" indent="-228600" algn="l" defTabSz="914400" rtl="0" eaLnBrk="1" latinLnBrk="0" hangingPunct="1">
+              <a:spcBef>
+                <a:spcPct val="20000"/>
+              </a:spcBef>
+              <a:buFont typeface="Arial" pitchFamily="34" charset="0"/>
+              <a:buChar char="•"/>
+              <a:defRPr sz="2000" kern="1200">
+                <a:solidFill>
+                  <a:schemeClr val="tx1"/>
+                </a:solidFill>
+                <a:latin typeface="+mn-lt"/>
+                <a:ea typeface="+mn-ea"/>
+                <a:cs typeface="+mn-cs"/>
+              </a:defRPr>
+            </a:lvl8pPr>
+            <a:lvl9pPr marL="3886200" indent="-228600" algn="l" defTabSz="914400" rtl="0" eaLnBrk="1" latinLnBrk="0" hangingPunct="1">
+              <a:spcBef>
+                <a:spcPct val="20000"/>
+              </a:spcBef>
+              <a:buFont typeface="Arial" pitchFamily="34" charset="0"/>
+              <a:buChar char="•"/>
+              <a:defRPr sz="2000" kern="1200">
+                <a:solidFill>
+                  <a:schemeClr val="tx1"/>
+                </a:solidFill>
+                <a:latin typeface="+mn-lt"/>
+                <a:ea typeface="+mn-ea"/>
+                <a:cs typeface="+mn-cs"/>
+              </a:defRPr>
+            </a:lvl9pPr>
+          </a:lstStyle>
+          <a:p>
+            <a:r>
+              <a:rPr lang="ru-RU" dirty="0" smtClean="0"/>
+              <a:t>Обработано 45 снимков внутри помещений из коллекции базы </a:t>
+            </a:r>
+            <a:r>
+              <a:rPr lang="en-US" dirty="0" err="1" smtClean="0"/>
+              <a:t>YorkUrbanDb</a:t>
+            </a:r>
+            <a:endParaRPr lang="en-US" dirty="0" smtClean="0"/>
+          </a:p>
+          <a:p>
+            <a:r>
+              <a:rPr lang="ru-RU" dirty="0"/>
+              <a:t>Р</a:t>
+            </a:r>
+            <a:r>
+              <a:rPr lang="ru-RU" dirty="0" smtClean="0"/>
+              <a:t>абочая среда: </a:t>
+            </a:r>
+            <a:r>
+              <a:rPr lang="en-US" dirty="0" smtClean="0"/>
+              <a:t>Core i7 920, 2.66 GHz,  6Gb Ram</a:t>
+            </a:r>
+            <a:endParaRPr lang="ru-RU" dirty="0" smtClean="0"/>
+          </a:p>
+          <a:p>
+            <a:r>
+              <a:rPr lang="ru-RU" dirty="0" smtClean="0"/>
+              <a:t>Время обработки: </a:t>
+            </a:r>
+            <a:r>
+              <a:rPr lang="en-US" dirty="0"/>
+              <a:t>~</a:t>
+            </a:r>
+            <a:r>
+              <a:rPr lang="ru-RU" dirty="0" smtClean="0"/>
+              <a:t>3.7 </a:t>
+            </a:r>
+            <a:r>
+              <a:rPr lang="ru-RU" dirty="0"/>
+              <a:t>сек </a:t>
+            </a:r>
+            <a:r>
+              <a:rPr lang="ru-RU" dirty="0" smtClean="0"/>
+              <a:t>(</a:t>
+            </a:r>
+            <a:r>
+              <a:rPr lang="en-US" dirty="0" smtClean="0"/>
+              <a:t>~</a:t>
+            </a:r>
+            <a:r>
+              <a:rPr lang="ru-RU" dirty="0" smtClean="0"/>
+              <a:t>12.2</a:t>
+            </a:r>
+            <a:r>
+              <a:rPr lang="en-US" dirty="0"/>
+              <a:t> </a:t>
+            </a:r>
+            <a:r>
+              <a:rPr lang="en-US" dirty="0" smtClean="0"/>
+              <a:t>fps)</a:t>
+            </a:r>
+            <a:endParaRPr lang="ru-RU" dirty="0" smtClean="0"/>
+          </a:p>
+        </p:txBody>
+      </p:sp>
+      <mc:AlternateContent xmlns:mc="http://schemas.openxmlformats.org/markup-compatibility/2006">
+        <mc:Choice xmlns:a14="http://schemas.microsoft.com/office/drawing/2010/main" Requires="a14">
+          <p:sp>
+            <p:nvSpPr>
+              <p:cNvPr id="18" name="Содержимое 2"/>
+              <p:cNvSpPr txBox="1">
+                <a:spLocks/>
+              </p:cNvSpPr>
+              <p:nvPr/>
+            </p:nvSpPr>
+            <p:spPr>
+              <a:xfrm>
+                <a:off x="899592" y="3284984"/>
+                <a:ext cx="2736304" cy="3492572"/>
+              </a:xfrm>
+              <a:prstGeom prst="rect">
+                <a:avLst/>
+              </a:prstGeom>
+            </p:spPr>
+            <p:txBody>
+              <a:bodyPr vert="horz" lIns="91440" tIns="45720" rIns="91440" bIns="45720" rtlCol="0">
+                <a:normAutofit fontScale="40000" lnSpcReduction="20000"/>
+              </a:bodyPr>
+              <a:lstStyle>
+                <a:lvl1pPr marL="342900" indent="-342900" algn="l" defTabSz="914400" rtl="0" eaLnBrk="1" latinLnBrk="0" hangingPunct="1">
+                  <a:spcBef>
+                    <a:spcPct val="20000"/>
+                  </a:spcBef>
+                  <a:buFont typeface="Arial" pitchFamily="34" charset="0"/>
+                  <a:buChar char="•"/>
+                  <a:defRPr sz="3200" kern="1200">
+                    <a:solidFill>
+                      <a:schemeClr val="tx1"/>
+                    </a:solidFill>
+                    <a:latin typeface="+mn-lt"/>
+                    <a:ea typeface="+mn-ea"/>
+                    <a:cs typeface="+mn-cs"/>
+                  </a:defRPr>
+                </a:lvl1pPr>
+                <a:lvl2pPr marL="742950" indent="-285750" algn="l" defTabSz="914400" rtl="0" eaLnBrk="1" latinLnBrk="0" hangingPunct="1">
+                  <a:spcBef>
+                    <a:spcPct val="20000"/>
+                  </a:spcBef>
+                  <a:buFont typeface="Arial" pitchFamily="34" charset="0"/>
+                  <a:buChar char="–"/>
+                  <a:defRPr sz="2800" kern="1200">
+                    <a:solidFill>
+                      <a:schemeClr val="tx1"/>
+                    </a:solidFill>
+                    <a:latin typeface="+mn-lt"/>
+                    <a:ea typeface="+mn-ea"/>
+                    <a:cs typeface="+mn-cs"/>
+                  </a:defRPr>
+                </a:lvl2pPr>
+                <a:lvl3pPr marL="1143000" indent="-228600" algn="l" defTabSz="914400" rtl="0" eaLnBrk="1" latinLnBrk="0" hangingPunct="1">
+                  <a:spcBef>
+                    <a:spcPct val="20000"/>
+                  </a:spcBef>
+                  <a:buFont typeface="Arial" pitchFamily="34" charset="0"/>
+                  <a:buChar char="•"/>
+                  <a:defRPr sz="2400" kern="1200">
+                    <a:solidFill>
+                      <a:schemeClr val="tx1"/>
+                    </a:solidFill>
+                    <a:latin typeface="+mn-lt"/>
+                    <a:ea typeface="+mn-ea"/>
+                    <a:cs typeface="+mn-cs"/>
+                  </a:defRPr>
+                </a:lvl3pPr>
+                <a:lvl4pPr marL="1600200" indent="-228600" algn="l" defTabSz="914400" rtl="0" eaLnBrk="1" latinLnBrk="0" hangingPunct="1">
+                  <a:spcBef>
+                    <a:spcPct val="20000"/>
+                  </a:spcBef>
+                  <a:buFont typeface="Arial" pitchFamily="34" charset="0"/>
+                  <a:buChar char="–"/>
+                  <a:defRPr sz="2000" kern="1200">
+                    <a:solidFill>
+                      <a:schemeClr val="tx1"/>
+                    </a:solidFill>
+                    <a:latin typeface="+mn-lt"/>
+                    <a:ea typeface="+mn-ea"/>
+                    <a:cs typeface="+mn-cs"/>
+                  </a:defRPr>
+                </a:lvl4pPr>
+                <a:lvl5pPr marL="2057400" indent="-228600" algn="l" defTabSz="914400" rtl="0" eaLnBrk="1" latinLnBrk="0" hangingPunct="1">
+                  <a:spcBef>
+                    <a:spcPct val="20000"/>
+                  </a:spcBef>
+                  <a:buFont typeface="Arial" pitchFamily="34" charset="0"/>
+                  <a:buChar char="»"/>
+                  <a:defRPr sz="2000" kern="1200">
+                    <a:solidFill>
+                      <a:schemeClr val="tx1"/>
+                    </a:solidFill>
+                    <a:latin typeface="+mn-lt"/>
+                    <a:ea typeface="+mn-ea"/>
+                    <a:cs typeface="+mn-cs"/>
+                  </a:defRPr>
+                </a:lvl5pPr>
+                <a:lvl6pPr marL="2514600" indent="-228600" algn="l" defTabSz="914400" rtl="0" eaLnBrk="1" latinLnBrk="0" hangingPunct="1">
+                  <a:spcBef>
+                    <a:spcPct val="20000"/>
+                  </a:spcBef>
+                  <a:buFont typeface="Arial" pitchFamily="34" charset="0"/>
+                  <a:buChar char="•"/>
+                  <a:defRPr sz="2000" kern="1200">
+                    <a:solidFill>
+                      <a:schemeClr val="tx1"/>
+                    </a:solidFill>
+                    <a:latin typeface="+mn-lt"/>
+                    <a:ea typeface="+mn-ea"/>
+                    <a:cs typeface="+mn-cs"/>
+                  </a:defRPr>
+                </a:lvl6pPr>
+                <a:lvl7pPr marL="2971800" indent="-228600" algn="l" defTabSz="914400" rtl="0" eaLnBrk="1" latinLnBrk="0" hangingPunct="1">
+                  <a:spcBef>
+                    <a:spcPct val="20000"/>
+                  </a:spcBef>
+                  <a:buFont typeface="Arial" pitchFamily="34" charset="0"/>
+                  <a:buChar char="•"/>
+                  <a:defRPr sz="2000" kern="1200">
+                    <a:solidFill>
+                      <a:schemeClr val="tx1"/>
+                    </a:solidFill>
+                    <a:latin typeface="+mn-lt"/>
+                    <a:ea typeface="+mn-ea"/>
+                    <a:cs typeface="+mn-cs"/>
+                  </a:defRPr>
+                </a:lvl7pPr>
+                <a:lvl8pPr marL="3429000" indent="-228600" algn="l" defTabSz="914400" rtl="0" eaLnBrk="1" latinLnBrk="0" hangingPunct="1">
+                  <a:spcBef>
+                    <a:spcPct val="20000"/>
+                  </a:spcBef>
+                  <a:buFont typeface="Arial" pitchFamily="34" charset="0"/>
+                  <a:buChar char="•"/>
+                  <a:defRPr sz="2000" kern="1200">
+                    <a:solidFill>
+                      <a:schemeClr val="tx1"/>
+                    </a:solidFill>
+                    <a:latin typeface="+mn-lt"/>
+                    <a:ea typeface="+mn-ea"/>
+                    <a:cs typeface="+mn-cs"/>
+                  </a:defRPr>
+                </a:lvl8pPr>
+                <a:lvl9pPr marL="3886200" indent="-228600" algn="l" defTabSz="914400" rtl="0" eaLnBrk="1" latinLnBrk="0" hangingPunct="1">
+                  <a:spcBef>
+                    <a:spcPct val="20000"/>
+                  </a:spcBef>
+                  <a:buFont typeface="Arial" pitchFamily="34" charset="0"/>
+                  <a:buChar char="•"/>
+                  <a:defRPr sz="2000" kern="1200">
+                    <a:solidFill>
+                      <a:schemeClr val="tx1"/>
+                    </a:solidFill>
+                    <a:latin typeface="+mn-lt"/>
+                    <a:ea typeface="+mn-ea"/>
+                    <a:cs typeface="+mn-cs"/>
+                  </a:defRPr>
+                </a:lvl9pPr>
+              </a:lstStyle>
+              <a:p>
+                <a:pPr marL="0" indent="0">
+                  <a:buNone/>
+                </a:pPr>
+                <a:r>
+                  <a:rPr lang="ru-RU" dirty="0" smtClean="0"/>
+                  <a:t>Вектор среднего отклонения</a:t>
+                </a:r>
+                <a:r>
+                  <a:rPr lang="en-US" dirty="0" smtClean="0"/>
+                  <a:t> </a:t>
+                </a:r>
+                <a:r>
+                  <a:rPr lang="ru-RU" dirty="0"/>
+                  <a:t>углов </a:t>
+                </a:r>
+                <a:r>
+                  <a:rPr lang="ru-RU" dirty="0" smtClean="0"/>
+                  <a:t>полученных направлений ТСП от «верных» (в градусах):</a:t>
+                </a:r>
+              </a:p>
+              <a:p>
+                <a:pPr marL="0" indent="0">
+                  <a:buNone/>
+                </a:pPr>
+                <a:endParaRPr lang="ru-RU" i="1" dirty="0" smtClean="0">
+                  <a:latin typeface="Cambria Math"/>
+                </a:endParaRPr>
+              </a:p>
+              <a:p>
+                <a:pPr marL="0" indent="0">
+                  <a:buNone/>
+                </a:pPr>
+                <a14:m>
+                  <m:oMathPara xmlns:m="http://schemas.openxmlformats.org/officeDocument/2006/math">
+                    <m:oMathParaPr>
+                      <m:jc m:val="centerGroup"/>
+                    </m:oMathParaPr>
+                    <m:oMath xmlns:m="http://schemas.openxmlformats.org/officeDocument/2006/math">
+                      <m:r>
+                        <a:rPr lang="en-US" i="1" dirty="0" smtClean="0">
+                          <a:latin typeface="Cambria Math"/>
+                        </a:rPr>
+                        <m:t>𝑀</m:t>
+                      </m:r>
+                      <m:r>
+                        <a:rPr lang="en-US" b="0" i="1" dirty="0" smtClean="0">
+                          <a:latin typeface="Cambria Math"/>
+                        </a:rPr>
+                        <m:t>=</m:t>
+                      </m:r>
+                      <m:r>
+                        <a:rPr lang="ru-RU" i="1" dirty="0" smtClean="0">
+                          <a:latin typeface="Cambria Math"/>
+                        </a:rPr>
+                        <m:t>[</m:t>
+                      </m:r>
+                      <m:r>
+                        <a:rPr lang="ru-RU" b="0" i="1" dirty="0" smtClean="0">
+                          <a:latin typeface="Cambria Math"/>
+                        </a:rPr>
+                        <m:t>2</m:t>
+                      </m:r>
+                      <m:r>
+                        <a:rPr lang="en-US" b="0" i="1" dirty="0" smtClean="0">
+                          <a:latin typeface="Cambria Math"/>
+                        </a:rPr>
+                        <m:t>.07;0.65</m:t>
+                      </m:r>
+                      <m:r>
+                        <a:rPr lang="ru-RU" i="1" dirty="0" smtClean="0">
+                          <a:latin typeface="Cambria Math"/>
+                        </a:rPr>
+                        <m:t>;</m:t>
+                      </m:r>
+                      <m:r>
+                        <a:rPr lang="en-US" b="0" i="1" dirty="0" smtClean="0">
+                          <a:latin typeface="Cambria Math"/>
+                        </a:rPr>
+                        <m:t>2.18</m:t>
+                      </m:r>
+                      <m:r>
+                        <a:rPr lang="en-US" i="1" dirty="0" smtClean="0">
+                          <a:latin typeface="Cambria Math"/>
+                        </a:rPr>
+                        <m:t>]</m:t>
+                      </m:r>
+                    </m:oMath>
+                  </m:oMathPara>
+                </a14:m>
+                <a:endParaRPr lang="ru-RU" dirty="0" smtClean="0"/>
+              </a:p>
+              <a:p>
+                <a:pPr marL="0" indent="0">
+                  <a:buNone/>
+                </a:pPr>
+                <a:endParaRPr lang="en-US" dirty="0" smtClean="0"/>
+              </a:p>
+              <a:p>
+                <a:pPr marL="0" indent="0">
+                  <a:buNone/>
+                </a:pPr>
+                <a:r>
+                  <a:rPr lang="ru-RU" dirty="0"/>
+                  <a:t>В</a:t>
+                </a:r>
+                <a:r>
+                  <a:rPr lang="ru-RU" dirty="0" smtClean="0"/>
+                  <a:t>ектор </a:t>
+                </a:r>
+                <a:r>
+                  <a:rPr lang="ru-RU" dirty="0"/>
+                  <a:t>среднеквадратичного отклонения углов полученных ТСП от «</a:t>
+                </a:r>
+                <a:r>
+                  <a:rPr lang="ru-RU" dirty="0" smtClean="0"/>
+                  <a:t>верных» (в градусах): </a:t>
+                </a:r>
+              </a:p>
+              <a:p>
+                <a:pPr marL="0" indent="0">
+                  <a:buNone/>
+                </a:pPr>
+                <a:endParaRPr lang="ru-RU" dirty="0" smtClean="0"/>
+              </a:p>
+              <a:p>
+                <a:pPr marL="0" indent="0">
+                  <a:buNone/>
+                </a:pPr>
+                <a14:m>
+                  <m:oMathPara xmlns:m="http://schemas.openxmlformats.org/officeDocument/2006/math">
+                    <m:oMathParaPr>
+                      <m:jc m:val="centerGroup"/>
+                    </m:oMathParaPr>
+                    <m:oMath xmlns:m="http://schemas.openxmlformats.org/officeDocument/2006/math">
+                      <m:r>
+                        <m:rPr>
+                          <m:sty m:val="p"/>
+                        </m:rPr>
+                        <a:rPr lang="en-US" i="1" dirty="0" smtClean="0">
+                          <a:latin typeface="Cambria Math"/>
+                        </a:rPr>
+                        <m:t>V</m:t>
+                      </m:r>
+                      <m:r>
+                        <a:rPr lang="en-US" b="0" i="1" dirty="0" smtClean="0">
+                          <a:latin typeface="Cambria Math"/>
+                        </a:rPr>
+                        <m:t>=</m:t>
+                      </m:r>
+                      <m:r>
+                        <a:rPr lang="ru-RU" i="1" dirty="0" smtClean="0">
+                          <a:latin typeface="Cambria Math"/>
+                        </a:rPr>
+                        <m:t>[</m:t>
+                      </m:r>
+                      <m:r>
+                        <a:rPr lang="ru-RU" b="0" i="1" dirty="0" smtClean="0">
+                          <a:latin typeface="Cambria Math"/>
+                        </a:rPr>
+                        <m:t>0.54</m:t>
+                      </m:r>
+                      <m:r>
+                        <a:rPr lang="en-US" b="0" i="1" dirty="0" smtClean="0">
+                          <a:latin typeface="Cambria Math"/>
+                        </a:rPr>
+                        <m:t>;0.10</m:t>
+                      </m:r>
+                      <m:r>
+                        <a:rPr lang="ru-RU" i="1" dirty="0" smtClean="0">
+                          <a:latin typeface="Cambria Math"/>
+                        </a:rPr>
+                        <m:t>;</m:t>
+                      </m:r>
+                      <m:r>
+                        <a:rPr lang="en-US" b="0" i="1" dirty="0" smtClean="0">
+                          <a:latin typeface="Cambria Math"/>
+                        </a:rPr>
+                        <m:t>0.55</m:t>
+                      </m:r>
+                      <m:r>
+                        <a:rPr lang="en-US" i="1" dirty="0" smtClean="0">
+                          <a:latin typeface="Cambria Math"/>
+                        </a:rPr>
+                        <m:t>]</m:t>
+                      </m:r>
+                    </m:oMath>
+                  </m:oMathPara>
+                </a14:m>
+                <a:endParaRPr lang="ru-RU" dirty="0" smtClean="0"/>
+              </a:p>
+              <a:p>
+                <a:pPr marL="0" indent="0">
+                  <a:buNone/>
+                </a:pPr>
+                <a:endParaRPr lang="en-US" dirty="0" smtClean="0"/>
+              </a:p>
+              <a:p>
+                <a:pPr marL="0" indent="0">
+                  <a:buNone/>
+                </a:pPr>
+                <a:r>
+                  <a:rPr lang="ru-RU" dirty="0"/>
+                  <a:t>П</a:t>
+                </a:r>
+                <a:r>
+                  <a:rPr lang="ru-RU" dirty="0" smtClean="0"/>
+                  <a:t>о </a:t>
+                </a:r>
+                <a:r>
+                  <a:rPr lang="ru-RU" dirty="0"/>
+                  <a:t>каждой из </a:t>
+                </a:r>
+                <a:r>
+                  <a:rPr lang="ru-RU" dirty="0" smtClean="0"/>
+                  <a:t>осей: </a:t>
+                </a:r>
+                <a:endParaRPr lang="en-US" dirty="0" smtClean="0"/>
+              </a:p>
+              <a:p>
+                <a:pPr marL="0" indent="0">
+                  <a:buNone/>
+                </a:pPr>
+                <a:endParaRPr lang="ru-RU" dirty="0" smtClean="0"/>
+              </a:p>
+              <a:p>
+                <a:pPr marL="0" indent="0">
+                  <a:buNone/>
+                </a:pPr>
+                <a14:m>
+                  <m:oMathPara xmlns:m="http://schemas.openxmlformats.org/officeDocument/2006/math">
+                    <m:oMathParaPr>
+                      <m:jc m:val="centerGroup"/>
+                    </m:oMathParaPr>
+                    <m:oMath xmlns:m="http://schemas.openxmlformats.org/officeDocument/2006/math">
+                      <m:r>
+                        <m:rPr>
+                          <m:nor/>
+                        </m:rPr>
+                        <a:rPr lang="ru-RU" dirty="0"/>
+                        <m:t>50-я перцентиль</m:t>
+                      </m:r>
+                      <m:r>
+                        <a:rPr lang="en-US" i="1">
+                          <a:latin typeface="Cambria Math"/>
+                          <a:ea typeface="Cambria Math"/>
+                        </a:rPr>
+                        <m:t>≅</m:t>
+                      </m:r>
+                      <m:r>
+                        <a:rPr lang="ru-RU" i="1">
+                          <a:latin typeface="Cambria Math"/>
+                          <a:ea typeface="Cambria Math"/>
+                        </a:rPr>
+                        <m:t>1</m:t>
+                      </m:r>
+                      <m:r>
+                        <a:rPr lang="ru-RU" b="0" i="1" smtClean="0">
+                          <a:latin typeface="Cambria Math"/>
+                          <a:ea typeface="Cambria Math"/>
+                        </a:rPr>
+                        <m:t> </m:t>
+                      </m:r>
+                      <m:r>
+                        <a:rPr lang="ru-RU" i="1">
+                          <a:latin typeface="Cambria Math"/>
+                          <a:ea typeface="Cambria Math"/>
+                        </a:rPr>
+                        <m:t>град </m:t>
+                      </m:r>
+                    </m:oMath>
+                  </m:oMathPara>
+                </a14:m>
+                <a:endParaRPr lang="ru-RU" dirty="0" smtClean="0">
+                  <a:ea typeface="Cambria Math"/>
+                </a:endParaRPr>
+              </a:p>
+              <a:p>
+                <a:pPr marL="0" indent="0">
+                  <a:buNone/>
+                </a:pPr>
+                <a14:m>
+                  <m:oMathPara xmlns:m="http://schemas.openxmlformats.org/officeDocument/2006/math">
+                    <m:oMathParaPr>
+                      <m:jc m:val="centerGroup"/>
+                    </m:oMathParaPr>
+                    <m:oMath xmlns:m="http://schemas.openxmlformats.org/officeDocument/2006/math">
+                      <m:r>
+                        <m:rPr>
+                          <m:nor/>
+                        </m:rPr>
+                        <a:rPr lang="ru-RU" dirty="0"/>
+                        <m:t>90-я перцентиль</m:t>
+                      </m:r>
+                      <m:r>
+                        <a:rPr lang="en-US" i="1">
+                          <a:latin typeface="Cambria Math"/>
+                          <a:ea typeface="Cambria Math"/>
+                        </a:rPr>
+                        <m:t>≅</m:t>
+                      </m:r>
+                      <m:r>
+                        <a:rPr lang="ru-RU" b="0" i="1" smtClean="0">
+                          <a:latin typeface="Cambria Math"/>
+                          <a:ea typeface="Cambria Math"/>
+                        </a:rPr>
+                        <m:t>3.5</m:t>
+                      </m:r>
+                      <m:r>
+                        <a:rPr lang="ru-RU" i="1">
+                          <a:latin typeface="Cambria Math"/>
+                          <a:ea typeface="Cambria Math"/>
+                        </a:rPr>
+                        <m:t> град</m:t>
+                      </m:r>
+                    </m:oMath>
+                  </m:oMathPara>
+                </a14:m>
+                <a:endParaRPr lang="ru-RU" dirty="0" smtClean="0"/>
+              </a:p>
+            </p:txBody>
+          </p:sp>
+        </mc:Choice>
+        <mc:Fallback>
+          <p:sp>
+            <p:nvSpPr>
+              <p:cNvPr id="18" name="Содержимое 2"/>
+              <p:cNvSpPr txBox="1">
+                <a:spLocks noRot="1" noChangeAspect="1" noMove="1" noResize="1" noEditPoints="1" noAdjustHandles="1" noChangeArrowheads="1" noChangeShapeType="1" noTextEdit="1"/>
+              </p:cNvSpPr>
+              <p:nvPr/>
+            </p:nvSpPr>
+            <p:spPr>
+              <a:xfrm>
+                <a:off x="899592" y="3284984"/>
+                <a:ext cx="2736304" cy="3492572"/>
+              </a:xfrm>
+              <a:prstGeom prst="rect">
+                <a:avLst/>
+              </a:prstGeom>
+              <a:blipFill rotWithShape="1">
+                <a:blip r:embed="rId4"/>
+                <a:stretch>
+                  <a:fillRect l="-446" t="-1047"/>
+                </a:stretch>
+              </a:blipFill>
+            </p:spPr>
+            <p:txBody>
+              <a:bodyPr/>
+              <a:lstStyle/>
+              <a:p>
+                <a:r>
+                  <a:rPr lang="en-US">
+                    <a:noFill/>
+                  </a:rPr>
+                  <a:t> </a:t>
+                </a:r>
+              </a:p>
+            </p:txBody>
+          </p:sp>
+        </mc:Fallback>
+      </mc:AlternateContent>
     </p:spTree>
   </p:cSld>
   <p:clrMapOvr>
@@ -8732,7 +11766,7 @@
 </file>
 
 <file path=ppt/slides/slide16.xml><?xml version="1.0" encoding="utf-8"?>
-<p:sld xmlns:a="http://schemas.openxmlformats.org/drawingml/2006/main" xmlns:r="http://schemas.openxmlformats.org/officeDocument/2006/relationships" xmlns:p="http://schemas.openxmlformats.org/presentationml/2006/main">
+<p:sld xmlns:a="http://schemas.openxmlformats.org/drawingml/2006/main" xmlns:r="http://schemas.openxmlformats.org/officeDocument/2006/relationships" xmlns:p="http://schemas.openxmlformats.org/presentationml/2006/main" show="0">
   <p:cSld>
     <p:spTree>
       <p:nvGrpSpPr>
@@ -8807,6 +11841,14 @@
   <p:clrMapOvr>
     <a:masterClrMapping/>
   </p:clrMapOvr>
+  <mc:AlternateContent xmlns:mc="http://schemas.openxmlformats.org/markup-compatibility/2006">
+    <mc:Choice xmlns:p14="http://schemas.microsoft.com/office/powerpoint/2010/main" Requires="p14">
+      <p:transition spd="slow" p14:dur="2000"/>
+    </mc:Choice>
+    <mc:Fallback>
+      <p:transition spd="slow"/>
+    </mc:Fallback>
+  </mc:AlternateContent>
 </p:sld>
 </file>
 
@@ -8846,11 +11888,15 @@
           <a:p>
             <a:r>
               <a:rPr lang="ru-RU" dirty="0" smtClean="0"/>
-              <a:t>Результаты тестирования на изображениях внутри </a:t>
+              <a:t>Результаты тестирования </a:t>
             </a:r>
             <a:r>
               <a:rPr lang="ru-RU" dirty="0" smtClean="0"/>
-              <a:t>помещений</a:t>
+              <a:t>на </a:t>
+            </a:r>
+            <a:r>
+              <a:rPr lang="ru-RU" dirty="0" smtClean="0"/>
+              <a:t>наборе изображений «внутри помещения»</a:t>
             </a:r>
             <a:endParaRPr lang="ru-RU" dirty="0"/>
           </a:p>
@@ -8866,14 +11912,14 @@
             <p:ph idx="1"/>
             <p:extLst>
               <p:ext uri="{D42A27DB-BD31-4B8C-83A1-F6EECF244321}">
-                <p14:modId xmlns:p14="http://schemas.microsoft.com/office/powerpoint/2010/main" val="2042465216"/>
+                <p14:modId xmlns:p14="http://schemas.microsoft.com/office/powerpoint/2010/main" val="2141250943"/>
               </p:ext>
             </p:extLst>
           </p:nvPr>
         </p:nvGraphicFramePr>
         <p:xfrm>
-          <a:off x="457200" y="1600200"/>
-          <a:ext cx="8229600" cy="4853136"/>
+          <a:off x="323528" y="1600200"/>
+          <a:ext cx="8496944" cy="4997152"/>
         </p:xfrm>
         <a:graphic>
           <a:graphicData uri="http://schemas.openxmlformats.org/drawingml/2006/chart">
@@ -8921,7 +11967,12 @@
             <p:ph type="title"/>
           </p:nvPr>
         </p:nvSpPr>
-        <p:spPr/>
+        <p:spPr>
+          <a:xfrm>
+            <a:off x="251520" y="44624"/>
+            <a:ext cx="8568952" cy="1584176"/>
+          </a:xfrm>
+        </p:spPr>
         <p:txBody>
           <a:bodyPr>
             <a:normAutofit fontScale="90000"/>
@@ -8930,36 +11981,43 @@
           <a:p>
             <a:r>
               <a:rPr lang="ru-RU" dirty="0" smtClean="0"/>
-              <a:t>Пример изображения вне помещения</a:t>
+              <a:t>Распределение точности найденных направлений ТСП на наборе «внутри помещения»</a:t>
             </a:r>
             <a:endParaRPr lang="ru-RU" dirty="0"/>
           </a:p>
         </p:txBody>
       </p:sp>
-      <p:pic>
-        <p:nvPicPr>
-          <p:cNvPr id="4" name="Содержимое 3" descr="indoor_raw_example.jpg"/>
-          <p:cNvPicPr>
-            <a:picLocks noGrp="1" noChangeAspect="1"/>
-          </p:cNvPicPr>
+      <p:graphicFrame>
+        <p:nvGraphicFramePr>
+          <p:cNvPr id="6" name="Content Placeholder 5"/>
+          <p:cNvGraphicFramePr>
+            <a:graphicFrameLocks noGrp="1"/>
+          </p:cNvGraphicFramePr>
           <p:nvPr>
             <p:ph idx="1"/>
+            <p:extLst>
+              <p:ext uri="{D42A27DB-BD31-4B8C-83A1-F6EECF244321}">
+                <p14:modId xmlns:p14="http://schemas.microsoft.com/office/powerpoint/2010/main" val="3311384486"/>
+              </p:ext>
+            </p:extLst>
           </p:nvPr>
-        </p:nvPicPr>
-        <p:blipFill>
-          <a:blip r:embed="rId2" cstate="print"/>
-          <a:stretch>
-            <a:fillRect/>
-          </a:stretch>
-        </p:blipFill>
-        <p:spPr>
-          <a:xfrm>
-            <a:off x="1115616" y="1484784"/>
-            <a:ext cx="6912768" cy="5184576"/>
-          </a:xfrm>
-        </p:spPr>
-      </p:pic>
+        </p:nvGraphicFramePr>
+        <p:xfrm>
+          <a:off x="251520" y="1772816"/>
+          <a:ext cx="8640960" cy="4925144"/>
+        </p:xfrm>
+        <a:graphic>
+          <a:graphicData uri="http://schemas.openxmlformats.org/drawingml/2006/chart">
+            <c:chart xmlns:c="http://schemas.openxmlformats.org/drawingml/2006/chart" xmlns:r="http://schemas.openxmlformats.org/officeDocument/2006/relationships" r:id="rId2"/>
+          </a:graphicData>
+        </a:graphic>
+      </p:graphicFrame>
     </p:spTree>
+    <p:extLst>
+      <p:ext uri="{BB962C8B-B14F-4D97-AF65-F5344CB8AC3E}">
+        <p14:creationId xmlns:p14="http://schemas.microsoft.com/office/powerpoint/2010/main" val="924917208"/>
+      </p:ext>
+    </p:extLst>
   </p:cSld>
   <p:clrMapOvr>
     <a:masterClrMapping/>
@@ -8994,7 +12052,12 @@
             <p:ph type="title"/>
           </p:nvPr>
         </p:nvSpPr>
-        <p:spPr/>
+        <p:spPr>
+          <a:xfrm>
+            <a:off x="323528" y="44624"/>
+            <a:ext cx="8496944" cy="936104"/>
+          </a:xfrm>
+        </p:spPr>
         <p:txBody>
           <a:bodyPr>
             <a:normAutofit fontScale="90000"/>
@@ -9003,38 +12066,850 @@
           <a:p>
             <a:r>
               <a:rPr lang="ru-RU" dirty="0" smtClean="0"/>
-              <a:t>Результаты тестирования на изображениях вне помещений</a:t>
+              <a:t>Результаты тестирования метода Хуттунена-Пише </a:t>
+            </a:r>
+            <a:r>
+              <a:rPr lang="ru-RU" dirty="0" smtClean="0"/>
+              <a:t>«</a:t>
+            </a:r>
+            <a:r>
+              <a:rPr lang="ru-RU" dirty="0" smtClean="0"/>
+              <a:t>вне</a:t>
+            </a:r>
+            <a:r>
+              <a:rPr lang="ru-RU" dirty="0" smtClean="0"/>
+              <a:t> </a:t>
+            </a:r>
+            <a:r>
+              <a:rPr lang="ru-RU" dirty="0" smtClean="0"/>
+              <a:t>помещения»</a:t>
             </a:r>
             <a:endParaRPr lang="ru-RU" dirty="0"/>
           </a:p>
         </p:txBody>
       </p:sp>
-      <p:graphicFrame>
-        <p:nvGraphicFramePr>
-          <p:cNvPr id="7" name="Диаграмма 2"/>
-          <p:cNvGraphicFramePr>
-            <a:graphicFrameLocks noGrp="1"/>
-          </p:cNvGraphicFramePr>
-          <p:nvPr>
-            <p:ph idx="1"/>
-            <p:extLst>
-              <p:ext uri="{D42A27DB-BD31-4B8C-83A1-F6EECF244321}">
-                <p14:modId xmlns:p14="http://schemas.microsoft.com/office/powerpoint/2010/main" val="2976516471"/>
-              </p:ext>
-            </p:extLst>
-          </p:nvPr>
-        </p:nvGraphicFramePr>
-        <p:xfrm>
-          <a:off x="457200" y="1600200"/>
-          <a:ext cx="8229600" cy="4997152"/>
-        </p:xfrm>
-        <a:graphic>
-          <a:graphicData uri="http://schemas.openxmlformats.org/drawingml/2006/chart">
-            <c:chart xmlns:c="http://schemas.openxmlformats.org/drawingml/2006/chart" xmlns:r="http://schemas.openxmlformats.org/officeDocument/2006/relationships" r:id="rId2"/>
-          </a:graphicData>
-        </a:graphic>
-      </p:graphicFrame>
+      <p:sp>
+        <p:nvSpPr>
+          <p:cNvPr id="8" name="Содержимое 2"/>
+          <p:cNvSpPr txBox="1">
+            <a:spLocks/>
+          </p:cNvSpPr>
+          <p:nvPr/>
+        </p:nvSpPr>
+        <p:spPr>
+          <a:xfrm>
+            <a:off x="3635896" y="1178658"/>
+            <a:ext cx="4656518" cy="2052228"/>
+          </a:xfrm>
+          <a:prstGeom prst="rect">
+            <a:avLst/>
+          </a:prstGeom>
+        </p:spPr>
+        <p:txBody>
+          <a:bodyPr vert="horz" lIns="91440" tIns="45720" rIns="91440" bIns="45720" rtlCol="0">
+            <a:normAutofit fontScale="62500" lnSpcReduction="20000"/>
+          </a:bodyPr>
+          <a:lstStyle>
+            <a:lvl1pPr marL="342900" indent="-342900" algn="l" defTabSz="914400" rtl="0" eaLnBrk="1" latinLnBrk="0" hangingPunct="1">
+              <a:spcBef>
+                <a:spcPct val="20000"/>
+              </a:spcBef>
+              <a:buFont typeface="Arial" pitchFamily="34" charset="0"/>
+              <a:buChar char="•"/>
+              <a:defRPr sz="3200" kern="1200">
+                <a:solidFill>
+                  <a:schemeClr val="tx1"/>
+                </a:solidFill>
+                <a:latin typeface="+mn-lt"/>
+                <a:ea typeface="+mn-ea"/>
+                <a:cs typeface="+mn-cs"/>
+              </a:defRPr>
+            </a:lvl1pPr>
+            <a:lvl2pPr marL="742950" indent="-285750" algn="l" defTabSz="914400" rtl="0" eaLnBrk="1" latinLnBrk="0" hangingPunct="1">
+              <a:spcBef>
+                <a:spcPct val="20000"/>
+              </a:spcBef>
+              <a:buFont typeface="Arial" pitchFamily="34" charset="0"/>
+              <a:buChar char="–"/>
+              <a:defRPr sz="2800" kern="1200">
+                <a:solidFill>
+                  <a:schemeClr val="tx1"/>
+                </a:solidFill>
+                <a:latin typeface="+mn-lt"/>
+                <a:ea typeface="+mn-ea"/>
+                <a:cs typeface="+mn-cs"/>
+              </a:defRPr>
+            </a:lvl2pPr>
+            <a:lvl3pPr marL="1143000" indent="-228600" algn="l" defTabSz="914400" rtl="0" eaLnBrk="1" latinLnBrk="0" hangingPunct="1">
+              <a:spcBef>
+                <a:spcPct val="20000"/>
+              </a:spcBef>
+              <a:buFont typeface="Arial" pitchFamily="34" charset="0"/>
+              <a:buChar char="•"/>
+              <a:defRPr sz="2400" kern="1200">
+                <a:solidFill>
+                  <a:schemeClr val="tx1"/>
+                </a:solidFill>
+                <a:latin typeface="+mn-lt"/>
+                <a:ea typeface="+mn-ea"/>
+                <a:cs typeface="+mn-cs"/>
+              </a:defRPr>
+            </a:lvl3pPr>
+            <a:lvl4pPr marL="1600200" indent="-228600" algn="l" defTabSz="914400" rtl="0" eaLnBrk="1" latinLnBrk="0" hangingPunct="1">
+              <a:spcBef>
+                <a:spcPct val="20000"/>
+              </a:spcBef>
+              <a:buFont typeface="Arial" pitchFamily="34" charset="0"/>
+              <a:buChar char="–"/>
+              <a:defRPr sz="2000" kern="1200">
+                <a:solidFill>
+                  <a:schemeClr val="tx1"/>
+                </a:solidFill>
+                <a:latin typeface="+mn-lt"/>
+                <a:ea typeface="+mn-ea"/>
+                <a:cs typeface="+mn-cs"/>
+              </a:defRPr>
+            </a:lvl4pPr>
+            <a:lvl5pPr marL="2057400" indent="-228600" algn="l" defTabSz="914400" rtl="0" eaLnBrk="1" latinLnBrk="0" hangingPunct="1">
+              <a:spcBef>
+                <a:spcPct val="20000"/>
+              </a:spcBef>
+              <a:buFont typeface="Arial" pitchFamily="34" charset="0"/>
+              <a:buChar char="»"/>
+              <a:defRPr sz="2000" kern="1200">
+                <a:solidFill>
+                  <a:schemeClr val="tx1"/>
+                </a:solidFill>
+                <a:latin typeface="+mn-lt"/>
+                <a:ea typeface="+mn-ea"/>
+                <a:cs typeface="+mn-cs"/>
+              </a:defRPr>
+            </a:lvl5pPr>
+            <a:lvl6pPr marL="2514600" indent="-228600" algn="l" defTabSz="914400" rtl="0" eaLnBrk="1" latinLnBrk="0" hangingPunct="1">
+              <a:spcBef>
+                <a:spcPct val="20000"/>
+              </a:spcBef>
+              <a:buFont typeface="Arial" pitchFamily="34" charset="0"/>
+              <a:buChar char="•"/>
+              <a:defRPr sz="2000" kern="1200">
+                <a:solidFill>
+                  <a:schemeClr val="tx1"/>
+                </a:solidFill>
+                <a:latin typeface="+mn-lt"/>
+                <a:ea typeface="+mn-ea"/>
+                <a:cs typeface="+mn-cs"/>
+              </a:defRPr>
+            </a:lvl6pPr>
+            <a:lvl7pPr marL="2971800" indent="-228600" algn="l" defTabSz="914400" rtl="0" eaLnBrk="1" latinLnBrk="0" hangingPunct="1">
+              <a:spcBef>
+                <a:spcPct val="20000"/>
+              </a:spcBef>
+              <a:buFont typeface="Arial" pitchFamily="34" charset="0"/>
+              <a:buChar char="•"/>
+              <a:defRPr sz="2000" kern="1200">
+                <a:solidFill>
+                  <a:schemeClr val="tx1"/>
+                </a:solidFill>
+                <a:latin typeface="+mn-lt"/>
+                <a:ea typeface="+mn-ea"/>
+                <a:cs typeface="+mn-cs"/>
+              </a:defRPr>
+            </a:lvl7pPr>
+            <a:lvl8pPr marL="3429000" indent="-228600" algn="l" defTabSz="914400" rtl="0" eaLnBrk="1" latinLnBrk="0" hangingPunct="1">
+              <a:spcBef>
+                <a:spcPct val="20000"/>
+              </a:spcBef>
+              <a:buFont typeface="Arial" pitchFamily="34" charset="0"/>
+              <a:buChar char="•"/>
+              <a:defRPr sz="2000" kern="1200">
+                <a:solidFill>
+                  <a:schemeClr val="tx1"/>
+                </a:solidFill>
+                <a:latin typeface="+mn-lt"/>
+                <a:ea typeface="+mn-ea"/>
+                <a:cs typeface="+mn-cs"/>
+              </a:defRPr>
+            </a:lvl8pPr>
+            <a:lvl9pPr marL="3886200" indent="-228600" algn="l" defTabSz="914400" rtl="0" eaLnBrk="1" latinLnBrk="0" hangingPunct="1">
+              <a:spcBef>
+                <a:spcPct val="20000"/>
+              </a:spcBef>
+              <a:buFont typeface="Arial" pitchFamily="34" charset="0"/>
+              <a:buChar char="•"/>
+              <a:defRPr sz="2000" kern="1200">
+                <a:solidFill>
+                  <a:schemeClr val="tx1"/>
+                </a:solidFill>
+                <a:latin typeface="+mn-lt"/>
+                <a:ea typeface="+mn-ea"/>
+                <a:cs typeface="+mn-cs"/>
+              </a:defRPr>
+            </a:lvl9pPr>
+          </a:lstStyle>
+          <a:p>
+            <a:r>
+              <a:rPr lang="ru-RU" dirty="0" smtClean="0"/>
+              <a:t>Обработано 57 снимков вне помещений из коллекции базы </a:t>
+            </a:r>
+            <a:r>
+              <a:rPr lang="en-US" dirty="0" err="1" smtClean="0"/>
+              <a:t>YorkUrbanDb</a:t>
+            </a:r>
+            <a:endParaRPr lang="en-US" dirty="0" smtClean="0"/>
+          </a:p>
+          <a:p>
+            <a:r>
+              <a:rPr lang="ru-RU" dirty="0"/>
+              <a:t>Р</a:t>
+            </a:r>
+            <a:r>
+              <a:rPr lang="ru-RU" dirty="0" smtClean="0"/>
+              <a:t>абочая среда: </a:t>
+            </a:r>
+            <a:r>
+              <a:rPr lang="en-US" dirty="0" smtClean="0"/>
+              <a:t>Core i7 920, 2.66 GHz,  6Gb Ram</a:t>
+            </a:r>
+            <a:endParaRPr lang="ru-RU" dirty="0" smtClean="0"/>
+          </a:p>
+          <a:p>
+            <a:r>
+              <a:rPr lang="ru-RU" dirty="0" smtClean="0"/>
+              <a:t>Время обработки: </a:t>
+            </a:r>
+            <a:r>
+              <a:rPr lang="en-US" dirty="0" smtClean="0"/>
+              <a:t>~</a:t>
+            </a:r>
+            <a:r>
+              <a:rPr lang="ru-RU" dirty="0" smtClean="0"/>
+              <a:t>6.7 </a:t>
+            </a:r>
+            <a:r>
+              <a:rPr lang="ru-RU" dirty="0"/>
+              <a:t>сек </a:t>
+            </a:r>
+            <a:r>
+              <a:rPr lang="ru-RU" dirty="0" smtClean="0"/>
+              <a:t>(</a:t>
+            </a:r>
+            <a:r>
+              <a:rPr lang="en-US" dirty="0" smtClean="0"/>
+              <a:t>~</a:t>
+            </a:r>
+            <a:r>
+              <a:rPr lang="ru-RU" dirty="0" smtClean="0"/>
+              <a:t>8.5</a:t>
+            </a:r>
+            <a:r>
+              <a:rPr lang="en-US" dirty="0" smtClean="0"/>
+              <a:t> fps)</a:t>
+            </a:r>
+            <a:endParaRPr lang="ru-RU" dirty="0" smtClean="0"/>
+          </a:p>
+        </p:txBody>
+      </p:sp>
+      <mc:AlternateContent xmlns:mc="http://schemas.openxmlformats.org/markup-compatibility/2006">
+        <mc:Choice xmlns:a14="http://schemas.microsoft.com/office/drawing/2010/main" Requires="a14">
+          <p:sp>
+            <p:nvSpPr>
+              <p:cNvPr id="18" name="Содержимое 2"/>
+              <p:cNvSpPr txBox="1">
+                <a:spLocks/>
+              </p:cNvSpPr>
+              <p:nvPr/>
+            </p:nvSpPr>
+            <p:spPr>
+              <a:xfrm>
+                <a:off x="899592" y="3230886"/>
+                <a:ext cx="2726035" cy="3492388"/>
+              </a:xfrm>
+              <a:prstGeom prst="rect">
+                <a:avLst/>
+              </a:prstGeom>
+            </p:spPr>
+            <p:txBody>
+              <a:bodyPr vert="horz" lIns="91440" tIns="45720" rIns="91440" bIns="45720" rtlCol="0">
+                <a:normAutofit fontScale="40000" lnSpcReduction="20000"/>
+              </a:bodyPr>
+              <a:lstStyle>
+                <a:lvl1pPr marL="342900" indent="-342900" algn="l" defTabSz="914400" rtl="0" eaLnBrk="1" latinLnBrk="0" hangingPunct="1">
+                  <a:spcBef>
+                    <a:spcPct val="20000"/>
+                  </a:spcBef>
+                  <a:buFont typeface="Arial" pitchFamily="34" charset="0"/>
+                  <a:buChar char="•"/>
+                  <a:defRPr sz="3200" kern="1200">
+                    <a:solidFill>
+                      <a:schemeClr val="tx1"/>
+                    </a:solidFill>
+                    <a:latin typeface="+mn-lt"/>
+                    <a:ea typeface="+mn-ea"/>
+                    <a:cs typeface="+mn-cs"/>
+                  </a:defRPr>
+                </a:lvl1pPr>
+                <a:lvl2pPr marL="742950" indent="-285750" algn="l" defTabSz="914400" rtl="0" eaLnBrk="1" latinLnBrk="0" hangingPunct="1">
+                  <a:spcBef>
+                    <a:spcPct val="20000"/>
+                  </a:spcBef>
+                  <a:buFont typeface="Arial" pitchFamily="34" charset="0"/>
+                  <a:buChar char="–"/>
+                  <a:defRPr sz="2800" kern="1200">
+                    <a:solidFill>
+                      <a:schemeClr val="tx1"/>
+                    </a:solidFill>
+                    <a:latin typeface="+mn-lt"/>
+                    <a:ea typeface="+mn-ea"/>
+                    <a:cs typeface="+mn-cs"/>
+                  </a:defRPr>
+                </a:lvl2pPr>
+                <a:lvl3pPr marL="1143000" indent="-228600" algn="l" defTabSz="914400" rtl="0" eaLnBrk="1" latinLnBrk="0" hangingPunct="1">
+                  <a:spcBef>
+                    <a:spcPct val="20000"/>
+                  </a:spcBef>
+                  <a:buFont typeface="Arial" pitchFamily="34" charset="0"/>
+                  <a:buChar char="•"/>
+                  <a:defRPr sz="2400" kern="1200">
+                    <a:solidFill>
+                      <a:schemeClr val="tx1"/>
+                    </a:solidFill>
+                    <a:latin typeface="+mn-lt"/>
+                    <a:ea typeface="+mn-ea"/>
+                    <a:cs typeface="+mn-cs"/>
+                  </a:defRPr>
+                </a:lvl3pPr>
+                <a:lvl4pPr marL="1600200" indent="-228600" algn="l" defTabSz="914400" rtl="0" eaLnBrk="1" latinLnBrk="0" hangingPunct="1">
+                  <a:spcBef>
+                    <a:spcPct val="20000"/>
+                  </a:spcBef>
+                  <a:buFont typeface="Arial" pitchFamily="34" charset="0"/>
+                  <a:buChar char="–"/>
+                  <a:defRPr sz="2000" kern="1200">
+                    <a:solidFill>
+                      <a:schemeClr val="tx1"/>
+                    </a:solidFill>
+                    <a:latin typeface="+mn-lt"/>
+                    <a:ea typeface="+mn-ea"/>
+                    <a:cs typeface="+mn-cs"/>
+                  </a:defRPr>
+                </a:lvl4pPr>
+                <a:lvl5pPr marL="2057400" indent="-228600" algn="l" defTabSz="914400" rtl="0" eaLnBrk="1" latinLnBrk="0" hangingPunct="1">
+                  <a:spcBef>
+                    <a:spcPct val="20000"/>
+                  </a:spcBef>
+                  <a:buFont typeface="Arial" pitchFamily="34" charset="0"/>
+                  <a:buChar char="»"/>
+                  <a:defRPr sz="2000" kern="1200">
+                    <a:solidFill>
+                      <a:schemeClr val="tx1"/>
+                    </a:solidFill>
+                    <a:latin typeface="+mn-lt"/>
+                    <a:ea typeface="+mn-ea"/>
+                    <a:cs typeface="+mn-cs"/>
+                  </a:defRPr>
+                </a:lvl5pPr>
+                <a:lvl6pPr marL="2514600" indent="-228600" algn="l" defTabSz="914400" rtl="0" eaLnBrk="1" latinLnBrk="0" hangingPunct="1">
+                  <a:spcBef>
+                    <a:spcPct val="20000"/>
+                  </a:spcBef>
+                  <a:buFont typeface="Arial" pitchFamily="34" charset="0"/>
+                  <a:buChar char="•"/>
+                  <a:defRPr sz="2000" kern="1200">
+                    <a:solidFill>
+                      <a:schemeClr val="tx1"/>
+                    </a:solidFill>
+                    <a:latin typeface="+mn-lt"/>
+                    <a:ea typeface="+mn-ea"/>
+                    <a:cs typeface="+mn-cs"/>
+                  </a:defRPr>
+                </a:lvl6pPr>
+                <a:lvl7pPr marL="2971800" indent="-228600" algn="l" defTabSz="914400" rtl="0" eaLnBrk="1" latinLnBrk="0" hangingPunct="1">
+                  <a:spcBef>
+                    <a:spcPct val="20000"/>
+                  </a:spcBef>
+                  <a:buFont typeface="Arial" pitchFamily="34" charset="0"/>
+                  <a:buChar char="•"/>
+                  <a:defRPr sz="2000" kern="1200">
+                    <a:solidFill>
+                      <a:schemeClr val="tx1"/>
+                    </a:solidFill>
+                    <a:latin typeface="+mn-lt"/>
+                    <a:ea typeface="+mn-ea"/>
+                    <a:cs typeface="+mn-cs"/>
+                  </a:defRPr>
+                </a:lvl7pPr>
+                <a:lvl8pPr marL="3429000" indent="-228600" algn="l" defTabSz="914400" rtl="0" eaLnBrk="1" latinLnBrk="0" hangingPunct="1">
+                  <a:spcBef>
+                    <a:spcPct val="20000"/>
+                  </a:spcBef>
+                  <a:buFont typeface="Arial" pitchFamily="34" charset="0"/>
+                  <a:buChar char="•"/>
+                  <a:defRPr sz="2000" kern="1200">
+                    <a:solidFill>
+                      <a:schemeClr val="tx1"/>
+                    </a:solidFill>
+                    <a:latin typeface="+mn-lt"/>
+                    <a:ea typeface="+mn-ea"/>
+                    <a:cs typeface="+mn-cs"/>
+                  </a:defRPr>
+                </a:lvl8pPr>
+                <a:lvl9pPr marL="3886200" indent="-228600" algn="l" defTabSz="914400" rtl="0" eaLnBrk="1" latinLnBrk="0" hangingPunct="1">
+                  <a:spcBef>
+                    <a:spcPct val="20000"/>
+                  </a:spcBef>
+                  <a:buFont typeface="Arial" pitchFamily="34" charset="0"/>
+                  <a:buChar char="•"/>
+                  <a:defRPr sz="2000" kern="1200">
+                    <a:solidFill>
+                      <a:schemeClr val="tx1"/>
+                    </a:solidFill>
+                    <a:latin typeface="+mn-lt"/>
+                    <a:ea typeface="+mn-ea"/>
+                    <a:cs typeface="+mn-cs"/>
+                  </a:defRPr>
+                </a:lvl9pPr>
+              </a:lstStyle>
+              <a:p>
+                <a:pPr marL="0" indent="0">
+                  <a:buNone/>
+                </a:pPr>
+                <a:r>
+                  <a:rPr lang="ru-RU" dirty="0" smtClean="0"/>
+                  <a:t>Вектор среднего отклонения</a:t>
+                </a:r>
+                <a:r>
+                  <a:rPr lang="en-US" dirty="0" smtClean="0"/>
+                  <a:t> </a:t>
+                </a:r>
+                <a:r>
+                  <a:rPr lang="ru-RU" dirty="0"/>
+                  <a:t>углов </a:t>
+                </a:r>
+                <a:r>
+                  <a:rPr lang="ru-RU" dirty="0" smtClean="0"/>
+                  <a:t>полученных направлений ТСП от «верных» (в градусах):</a:t>
+                </a:r>
+              </a:p>
+              <a:p>
+                <a:pPr marL="0" indent="0">
+                  <a:buNone/>
+                </a:pPr>
+                <a:endParaRPr lang="ru-RU" i="1" dirty="0" smtClean="0">
+                  <a:latin typeface="Cambria Math"/>
+                </a:endParaRPr>
+              </a:p>
+              <a:p>
+                <a:pPr marL="0" indent="0">
+                  <a:buNone/>
+                </a:pPr>
+                <a14:m>
+                  <m:oMathPara xmlns:m="http://schemas.openxmlformats.org/officeDocument/2006/math">
+                    <m:oMathParaPr>
+                      <m:jc m:val="centerGroup"/>
+                    </m:oMathParaPr>
+                    <m:oMath xmlns:m="http://schemas.openxmlformats.org/officeDocument/2006/math">
+                      <m:r>
+                        <a:rPr lang="en-US" i="1" dirty="0" smtClean="0">
+                          <a:latin typeface="Cambria Math"/>
+                        </a:rPr>
+                        <m:t>𝑀</m:t>
+                      </m:r>
+                      <m:r>
+                        <a:rPr lang="en-US" b="0" i="1" dirty="0" smtClean="0">
+                          <a:latin typeface="Cambria Math"/>
+                        </a:rPr>
+                        <m:t>=</m:t>
+                      </m:r>
+                      <m:r>
+                        <a:rPr lang="ru-RU" i="1" dirty="0" smtClean="0">
+                          <a:latin typeface="Cambria Math"/>
+                        </a:rPr>
+                        <m:t>[</m:t>
+                      </m:r>
+                      <m:r>
+                        <a:rPr lang="ru-RU" b="0" i="1" dirty="0" smtClean="0">
+                          <a:latin typeface="Cambria Math"/>
+                        </a:rPr>
+                        <m:t>1.66</m:t>
+                      </m:r>
+                      <m:r>
+                        <a:rPr lang="en-US" b="0" i="1" dirty="0" smtClean="0">
+                          <a:latin typeface="Cambria Math"/>
+                        </a:rPr>
+                        <m:t>;1.10;1.9</m:t>
+                      </m:r>
+                      <m:r>
+                        <a:rPr lang="en-US" i="1" dirty="0" smtClean="0">
+                          <a:latin typeface="Cambria Math"/>
+                        </a:rPr>
+                        <m:t>]</m:t>
+                      </m:r>
+                    </m:oMath>
+                  </m:oMathPara>
+                </a14:m>
+                <a:endParaRPr lang="ru-RU" dirty="0" smtClean="0"/>
+              </a:p>
+              <a:p>
+                <a:pPr marL="0" indent="0">
+                  <a:buNone/>
+                </a:pPr>
+                <a:endParaRPr lang="en-US" dirty="0" smtClean="0"/>
+              </a:p>
+              <a:p>
+                <a:pPr marL="0" indent="0">
+                  <a:buNone/>
+                </a:pPr>
+                <a:r>
+                  <a:rPr lang="ru-RU" dirty="0"/>
+                  <a:t>В</a:t>
+                </a:r>
+                <a:r>
+                  <a:rPr lang="ru-RU" dirty="0" smtClean="0"/>
+                  <a:t>ектор </a:t>
+                </a:r>
+                <a:r>
+                  <a:rPr lang="ru-RU" dirty="0"/>
+                  <a:t>среднеквадратичного отклонения углов полученных ТСП от «</a:t>
+                </a:r>
+                <a:r>
+                  <a:rPr lang="ru-RU" dirty="0" smtClean="0"/>
+                  <a:t>верных» (в градусах): </a:t>
+                </a:r>
+              </a:p>
+              <a:p>
+                <a:pPr marL="0" indent="0">
+                  <a:buNone/>
+                </a:pPr>
+                <a:endParaRPr lang="ru-RU" dirty="0" smtClean="0"/>
+              </a:p>
+              <a:p>
+                <a:pPr marL="0" indent="0">
+                  <a:buNone/>
+                </a:pPr>
+                <a14:m>
+                  <m:oMathPara xmlns:m="http://schemas.openxmlformats.org/officeDocument/2006/math">
+                    <m:oMathParaPr>
+                      <m:jc m:val="centerGroup"/>
+                    </m:oMathParaPr>
+                    <m:oMath xmlns:m="http://schemas.openxmlformats.org/officeDocument/2006/math">
+                      <m:r>
+                        <m:rPr>
+                          <m:sty m:val="p"/>
+                        </m:rPr>
+                        <a:rPr lang="en-US" i="1" dirty="0" smtClean="0">
+                          <a:latin typeface="Cambria Math"/>
+                        </a:rPr>
+                        <m:t>V</m:t>
+                      </m:r>
+                      <m:r>
+                        <a:rPr lang="en-US" b="0" i="1" dirty="0" smtClean="0">
+                          <a:latin typeface="Cambria Math"/>
+                        </a:rPr>
+                        <m:t>=</m:t>
+                      </m:r>
+                      <m:r>
+                        <a:rPr lang="ru-RU" i="1" dirty="0" smtClean="0">
+                          <a:latin typeface="Cambria Math"/>
+                        </a:rPr>
+                        <m:t>[</m:t>
+                      </m:r>
+                      <m:r>
+                        <a:rPr lang="en-US" b="0" i="1" dirty="0" smtClean="0">
+                          <a:latin typeface="Cambria Math"/>
+                        </a:rPr>
+                        <m:t>0.22;0.13;0.23</m:t>
+                      </m:r>
+                      <m:r>
+                        <a:rPr lang="en-US" i="1" dirty="0" smtClean="0">
+                          <a:latin typeface="Cambria Math"/>
+                        </a:rPr>
+                        <m:t>]</m:t>
+                      </m:r>
+                    </m:oMath>
+                  </m:oMathPara>
+                </a14:m>
+                <a:endParaRPr lang="ru-RU" dirty="0" smtClean="0"/>
+              </a:p>
+              <a:p>
+                <a:pPr marL="0" indent="0">
+                  <a:buNone/>
+                </a:pPr>
+                <a:endParaRPr lang="en-US" dirty="0" smtClean="0"/>
+              </a:p>
+              <a:p>
+                <a:pPr marL="0" indent="0">
+                  <a:buNone/>
+                </a:pPr>
+                <a:r>
+                  <a:rPr lang="ru-RU" dirty="0"/>
+                  <a:t>П</a:t>
+                </a:r>
+                <a:r>
+                  <a:rPr lang="ru-RU" dirty="0" smtClean="0"/>
+                  <a:t>о </a:t>
+                </a:r>
+                <a:r>
+                  <a:rPr lang="ru-RU" dirty="0"/>
+                  <a:t>каждой из </a:t>
+                </a:r>
+                <a:r>
+                  <a:rPr lang="ru-RU" dirty="0" smtClean="0"/>
+                  <a:t>осей: </a:t>
+                </a:r>
+                <a:endParaRPr lang="en-US" dirty="0" smtClean="0"/>
+              </a:p>
+              <a:p>
+                <a:pPr marL="0" indent="0">
+                  <a:buNone/>
+                </a:pPr>
+                <a:endParaRPr lang="ru-RU" dirty="0" smtClean="0"/>
+              </a:p>
+              <a:p>
+                <a:pPr marL="0" indent="0">
+                  <a:buNone/>
+                </a:pPr>
+                <a14:m>
+                  <m:oMathPara xmlns:m="http://schemas.openxmlformats.org/officeDocument/2006/math">
+                    <m:oMathParaPr>
+                      <m:jc m:val="centerGroup"/>
+                    </m:oMathParaPr>
+                    <m:oMath xmlns:m="http://schemas.openxmlformats.org/officeDocument/2006/math">
+                      <m:r>
+                        <m:rPr>
+                          <m:nor/>
+                        </m:rPr>
+                        <a:rPr lang="ru-RU" dirty="0"/>
+                        <m:t>50-я перцентиль</m:t>
+                      </m:r>
+                      <m:r>
+                        <a:rPr lang="en-US" i="1">
+                          <a:latin typeface="Cambria Math"/>
+                          <a:ea typeface="Cambria Math"/>
+                        </a:rPr>
+                        <m:t>≅</m:t>
+                      </m:r>
+                      <m:r>
+                        <a:rPr lang="ru-RU" i="1">
+                          <a:latin typeface="Cambria Math"/>
+                          <a:ea typeface="Cambria Math"/>
+                        </a:rPr>
+                        <m:t>1</m:t>
+                      </m:r>
+                      <m:r>
+                        <a:rPr lang="en-US" b="0" i="1" smtClean="0">
+                          <a:latin typeface="Cambria Math"/>
+                          <a:ea typeface="Cambria Math"/>
+                        </a:rPr>
+                        <m:t>.4</m:t>
+                      </m:r>
+                      <m:r>
+                        <a:rPr lang="ru-RU" b="0" i="1" smtClean="0">
+                          <a:latin typeface="Cambria Math"/>
+                          <a:ea typeface="Cambria Math"/>
+                        </a:rPr>
+                        <m:t> </m:t>
+                      </m:r>
+                      <m:r>
+                        <a:rPr lang="ru-RU" i="1">
+                          <a:latin typeface="Cambria Math"/>
+                          <a:ea typeface="Cambria Math"/>
+                        </a:rPr>
+                        <m:t>град </m:t>
+                      </m:r>
+                    </m:oMath>
+                  </m:oMathPara>
+                </a14:m>
+                <a:endParaRPr lang="ru-RU" dirty="0" smtClean="0">
+                  <a:ea typeface="Cambria Math"/>
+                </a:endParaRPr>
+              </a:p>
+              <a:p>
+                <a:pPr marL="0" indent="0">
+                  <a:buNone/>
+                </a:pPr>
+                <a14:m>
+                  <m:oMathPara xmlns:m="http://schemas.openxmlformats.org/officeDocument/2006/math">
+                    <m:oMathParaPr>
+                      <m:jc m:val="centerGroup"/>
+                    </m:oMathParaPr>
+                    <m:oMath xmlns:m="http://schemas.openxmlformats.org/officeDocument/2006/math">
+                      <m:r>
+                        <m:rPr>
+                          <m:nor/>
+                        </m:rPr>
+                        <a:rPr lang="ru-RU" dirty="0"/>
+                        <m:t>90-я перцентиль</m:t>
+                      </m:r>
+                      <m:r>
+                        <a:rPr lang="en-US" i="1">
+                          <a:latin typeface="Cambria Math"/>
+                          <a:ea typeface="Cambria Math"/>
+                        </a:rPr>
+                        <m:t>≅</m:t>
+                      </m:r>
+                      <m:r>
+                        <a:rPr lang="en-US" b="0" i="1" smtClean="0">
+                          <a:latin typeface="Cambria Math"/>
+                          <a:ea typeface="Cambria Math"/>
+                        </a:rPr>
+                        <m:t>4</m:t>
+                      </m:r>
+                      <m:r>
+                        <a:rPr lang="ru-RU" b="0" i="1" smtClean="0">
+                          <a:latin typeface="Cambria Math"/>
+                          <a:ea typeface="Cambria Math"/>
+                        </a:rPr>
+                        <m:t>.</m:t>
+                      </m:r>
+                      <m:r>
+                        <a:rPr lang="en-US" b="0" i="1" smtClean="0">
+                          <a:latin typeface="Cambria Math"/>
+                          <a:ea typeface="Cambria Math"/>
+                        </a:rPr>
+                        <m:t>1</m:t>
+                      </m:r>
+                      <m:r>
+                        <a:rPr lang="ru-RU" i="1">
+                          <a:latin typeface="Cambria Math"/>
+                          <a:ea typeface="Cambria Math"/>
+                        </a:rPr>
+                        <m:t> град</m:t>
+                      </m:r>
+                    </m:oMath>
+                  </m:oMathPara>
+                </a14:m>
+                <a:endParaRPr lang="ru-RU" dirty="0" smtClean="0"/>
+              </a:p>
+            </p:txBody>
+          </p:sp>
+        </mc:Choice>
+        <mc:Fallback>
+          <p:sp>
+            <p:nvSpPr>
+              <p:cNvPr id="18" name="Содержимое 2"/>
+              <p:cNvSpPr txBox="1">
+                <a:spLocks noRot="1" noChangeAspect="1" noMove="1" noResize="1" noEditPoints="1" noAdjustHandles="1" noChangeArrowheads="1" noChangeShapeType="1" noTextEdit="1"/>
+              </p:cNvSpPr>
+              <p:nvPr/>
+            </p:nvSpPr>
+            <p:spPr>
+              <a:xfrm>
+                <a:off x="899592" y="3230886"/>
+                <a:ext cx="2726035" cy="3492388"/>
+              </a:xfrm>
+              <a:prstGeom prst="rect">
+                <a:avLst/>
+              </a:prstGeom>
+              <a:blipFill rotWithShape="1">
+                <a:blip r:embed="rId3"/>
+                <a:stretch>
+                  <a:fillRect l="-447" t="-1047"/>
+                </a:stretch>
+              </a:blipFill>
+            </p:spPr>
+            <p:txBody>
+              <a:bodyPr/>
+              <a:lstStyle/>
+              <a:p>
+                <a:r>
+                  <a:rPr lang="en-US">
+                    <a:noFill/>
+                  </a:rPr>
+                  <a:t> </a:t>
+                </a:r>
+              </a:p>
+            </p:txBody>
+          </p:sp>
+        </mc:Fallback>
+      </mc:AlternateContent>
+      <p:pic>
+        <p:nvPicPr>
+          <p:cNvPr id="6146" name="Picture 2" descr="P:\Projects\Study\Graduate work\Gyrocam\TestSamples\good_outdoor\P1080055.jpg"/>
+          <p:cNvPicPr>
+            <a:picLocks noChangeAspect="1" noChangeArrowheads="1"/>
+          </p:cNvPicPr>
+          <p:nvPr/>
+        </p:nvPicPr>
+        <p:blipFill>
+          <a:blip r:embed="rId4">
+            <a:extLst>
+              <a:ext uri="{28A0092B-C50C-407E-A947-70E740481C1C}">
+                <a14:useLocalDpi xmlns:a14="http://schemas.microsoft.com/office/drawing/2010/main" val="0"/>
+              </a:ext>
+            </a:extLst>
+          </a:blip>
+          <a:srcRect/>
+          <a:stretch>
+            <a:fillRect/>
+          </a:stretch>
+        </p:blipFill>
+        <p:spPr bwMode="auto">
+          <a:xfrm>
+            <a:off x="889323" y="1178657"/>
+            <a:ext cx="2736304" cy="2052228"/>
+          </a:xfrm>
+          <a:prstGeom prst="rect">
+            <a:avLst/>
+          </a:prstGeom>
+          <a:noFill/>
+          <a:extLst>
+            <a:ext uri="{909E8E84-426E-40DD-AFC4-6F175D3DCCD1}">
+              <a14:hiddenFill xmlns:a14="http://schemas.microsoft.com/office/drawing/2010/main">
+                <a:solidFill>
+                  <a:srgbClr val="FFFFFF"/>
+                </a:solidFill>
+              </a14:hiddenFill>
+            </a:ext>
+          </a:extLst>
+        </p:spPr>
+      </p:pic>
+      <p:pic>
+        <p:nvPicPr>
+          <p:cNvPr id="6147" name="Picture 3" descr="P:\Projects\Study\Graduate work\Gyrocam\TestSamples\good_outdoor\P1080055_gyrocam_processed.jpg"/>
+          <p:cNvPicPr>
+            <a:picLocks noChangeAspect="1" noChangeArrowheads="1"/>
+          </p:cNvPicPr>
+          <p:nvPr/>
+        </p:nvPicPr>
+        <p:blipFill>
+          <a:blip r:embed="rId5">
+            <a:extLst>
+              <a:ext uri="{28A0092B-C50C-407E-A947-70E740481C1C}">
+                <a14:useLocalDpi xmlns:a14="http://schemas.microsoft.com/office/drawing/2010/main" val="0"/>
+              </a:ext>
+            </a:extLst>
+          </a:blip>
+          <a:srcRect/>
+          <a:stretch>
+            <a:fillRect/>
+          </a:stretch>
+        </p:blipFill>
+        <p:spPr bwMode="auto">
+          <a:xfrm>
+            <a:off x="3625627" y="3233167"/>
+            <a:ext cx="4666787" cy="3500090"/>
+          </a:xfrm>
+          <a:prstGeom prst="rect">
+            <a:avLst/>
+          </a:prstGeom>
+          <a:noFill/>
+          <a:extLst>
+            <a:ext uri="{909E8E84-426E-40DD-AFC4-6F175D3DCCD1}">
+              <a14:hiddenFill xmlns:a14="http://schemas.microsoft.com/office/drawing/2010/main">
+                <a:solidFill>
+                  <a:srgbClr val="FFFFFF"/>
+                </a:solidFill>
+              </a14:hiddenFill>
+            </a:ext>
+          </a:extLst>
+        </p:spPr>
+      </p:pic>
     </p:spTree>
+    <p:extLst>
+      <p:ext uri="{BB962C8B-B14F-4D97-AF65-F5344CB8AC3E}">
+        <p14:creationId xmlns:p14="http://schemas.microsoft.com/office/powerpoint/2010/main" val="2667932299"/>
+      </p:ext>
+    </p:extLst>
   </p:cSld>
   <p:clrMapOvr>
     <a:masterClrMapping/>
@@ -9269,7 +13144,7 @@
 </file>
 
 <file path=ppt/slides/slide20.xml><?xml version="1.0" encoding="utf-8"?>
-<p:sld xmlns:a="http://schemas.openxmlformats.org/drawingml/2006/main" xmlns:r="http://schemas.openxmlformats.org/officeDocument/2006/relationships" xmlns:p="http://schemas.openxmlformats.org/presentationml/2006/main">
+<p:sld xmlns:a="http://schemas.openxmlformats.org/drawingml/2006/main" xmlns:r="http://schemas.openxmlformats.org/officeDocument/2006/relationships" xmlns:p="http://schemas.openxmlformats.org/presentationml/2006/main" show="0">
   <p:cSld>
     <p:spTree>
       <p:nvGrpSpPr>
@@ -9312,7 +13187,7 @@
       </p:sp>
       <p:graphicFrame>
         <p:nvGraphicFramePr>
-          <p:cNvPr id="5" name="Content Placeholder 4"/>
+          <p:cNvPr id="7" name="Диаграмма 2"/>
           <p:cNvGraphicFramePr>
             <a:graphicFrameLocks noGrp="1"/>
           </p:cNvGraphicFramePr>
@@ -9320,14 +13195,14 @@
             <p:ph idx="1"/>
             <p:extLst>
               <p:ext uri="{D42A27DB-BD31-4B8C-83A1-F6EECF244321}">
-                <p14:modId xmlns:p14="http://schemas.microsoft.com/office/powerpoint/2010/main" val="2617811605"/>
+                <p14:modId xmlns:p14="http://schemas.microsoft.com/office/powerpoint/2010/main" val="2976516471"/>
               </p:ext>
             </p:extLst>
           </p:nvPr>
         </p:nvGraphicFramePr>
         <p:xfrm>
           <a:off x="457200" y="1600200"/>
-          <a:ext cx="8229600" cy="4925144"/>
+          <a:ext cx="8229600" cy="4997152"/>
         </p:xfrm>
         <a:graphic>
           <a:graphicData uri="http://schemas.openxmlformats.org/drawingml/2006/chart">
@@ -9336,15 +13211,18 @@
         </a:graphic>
       </p:graphicFrame>
     </p:spTree>
-    <p:extLst>
-      <p:ext uri="{BB962C8B-B14F-4D97-AF65-F5344CB8AC3E}">
-        <p14:creationId xmlns:p14="http://schemas.microsoft.com/office/powerpoint/2010/main" val="106776384"/>
-      </p:ext>
-    </p:extLst>
   </p:cSld>
   <p:clrMapOvr>
     <a:masterClrMapping/>
   </p:clrMapOvr>
+  <mc:AlternateContent xmlns:mc="http://schemas.openxmlformats.org/markup-compatibility/2006">
+    <mc:Choice xmlns:p14="http://schemas.microsoft.com/office/powerpoint/2010/main" Requires="p14">
+      <p:transition spd="slow" p14:dur="2000"/>
+    </mc:Choice>
+    <mc:Fallback>
+      <p:transition spd="slow"/>
+    </mc:Fallback>
+  </mc:AlternateContent>
 </p:sld>
 </file>
 
@@ -9375,39 +13253,61 @@
             <p:ph type="title"/>
           </p:nvPr>
         </p:nvSpPr>
-        <p:spPr/>
+        <p:spPr>
+          <a:xfrm>
+            <a:off x="457200" y="188640"/>
+            <a:ext cx="8229600" cy="1143000"/>
+          </a:xfrm>
+        </p:spPr>
         <p:txBody>
-          <a:bodyPr/>
+          <a:bodyPr>
+            <a:normAutofit fontScale="90000"/>
+          </a:bodyPr>
           <a:lstStyle/>
           <a:p>
             <a:r>
               <a:rPr lang="ru-RU" dirty="0" smtClean="0"/>
-              <a:t>Результаты работы</a:t>
+              <a:t>Результаты тестирования на </a:t>
+            </a:r>
+            <a:r>
+              <a:rPr lang="ru-RU" dirty="0" smtClean="0"/>
+              <a:t>наборе изображений «вне помещения»</a:t>
             </a:r>
             <a:endParaRPr lang="ru-RU" dirty="0"/>
           </a:p>
         </p:txBody>
       </p:sp>
-      <p:sp>
-        <p:nvSpPr>
-          <p:cNvPr id="3" name="Содержимое 2"/>
-          <p:cNvSpPr>
-            <a:spLocks noGrp="1"/>
-          </p:cNvSpPr>
+      <p:graphicFrame>
+        <p:nvGraphicFramePr>
+          <p:cNvPr id="5" name="Content Placeholder 4"/>
+          <p:cNvGraphicFramePr>
+            <a:graphicFrameLocks noGrp="1"/>
+          </p:cNvGraphicFramePr>
           <p:nvPr>
             <p:ph idx="1"/>
+            <p:extLst>
+              <p:ext uri="{D42A27DB-BD31-4B8C-83A1-F6EECF244321}">
+                <p14:modId xmlns:p14="http://schemas.microsoft.com/office/powerpoint/2010/main" val="1100041631"/>
+              </p:ext>
+            </p:extLst>
           </p:nvPr>
-        </p:nvSpPr>
-        <p:spPr/>
-        <p:txBody>
-          <a:bodyPr/>
-          <a:lstStyle/>
-          <a:p>
-            <a:endParaRPr lang="ru-RU"/>
-          </a:p>
-        </p:txBody>
-      </p:sp>
+        </p:nvGraphicFramePr>
+        <p:xfrm>
+          <a:off x="251520" y="1600200"/>
+          <a:ext cx="8640960" cy="4997152"/>
+        </p:xfrm>
+        <a:graphic>
+          <a:graphicData uri="http://schemas.openxmlformats.org/drawingml/2006/chart">
+            <c:chart xmlns:c="http://schemas.openxmlformats.org/drawingml/2006/chart" xmlns:r="http://schemas.openxmlformats.org/officeDocument/2006/relationships" r:id="rId2"/>
+          </a:graphicData>
+        </a:graphic>
+      </p:graphicFrame>
     </p:spTree>
+    <p:extLst>
+      <p:ext uri="{BB962C8B-B14F-4D97-AF65-F5344CB8AC3E}">
+        <p14:creationId xmlns:p14="http://schemas.microsoft.com/office/powerpoint/2010/main" val="106776384"/>
+      </p:ext>
+    </p:extLst>
   </p:cSld>
   <p:clrMapOvr>
     <a:masterClrMapping/>
@@ -9442,60 +13342,57 @@
             <p:ph type="title"/>
           </p:nvPr>
         </p:nvSpPr>
-        <p:spPr/>
+        <p:spPr>
+          <a:xfrm>
+            <a:off x="457200" y="116632"/>
+            <a:ext cx="8229600" cy="1512168"/>
+          </a:xfrm>
+        </p:spPr>
         <p:txBody>
-          <a:bodyPr/>
+          <a:bodyPr>
+            <a:normAutofit fontScale="90000"/>
+          </a:bodyPr>
           <a:lstStyle/>
           <a:p>
             <a:r>
-              <a:rPr lang="ru-RU" dirty="0" smtClean="0"/>
-              <a:t>Экономическая часть</a:t>
+              <a:rPr lang="ru-RU" dirty="0"/>
+              <a:t>Распределение точности найденных направлений ТСП на наборе «внутри помещения»</a:t>
             </a:r>
             <a:endParaRPr lang="ru-RU" dirty="0"/>
           </a:p>
         </p:txBody>
       </p:sp>
-      <p:sp>
-        <p:nvSpPr>
-          <p:cNvPr id="3" name="Содержимое 2"/>
-          <p:cNvSpPr>
-            <a:spLocks noGrp="1"/>
-          </p:cNvSpPr>
+      <p:graphicFrame>
+        <p:nvGraphicFramePr>
+          <p:cNvPr id="6" name="Content Placeholder 5"/>
+          <p:cNvGraphicFramePr>
+            <a:graphicFrameLocks noGrp="1"/>
+          </p:cNvGraphicFramePr>
           <p:nvPr>
             <p:ph idx="1"/>
+            <p:extLst>
+              <p:ext uri="{D42A27DB-BD31-4B8C-83A1-F6EECF244321}">
+                <p14:modId xmlns:p14="http://schemas.microsoft.com/office/powerpoint/2010/main" val="1119559749"/>
+              </p:ext>
+            </p:extLst>
           </p:nvPr>
-        </p:nvSpPr>
-        <p:spPr/>
-        <p:txBody>
-          <a:bodyPr/>
-          <a:lstStyle/>
-          <a:p>
-            <a:r>
-              <a:rPr lang="ru-RU" dirty="0" smtClean="0"/>
-              <a:t>Диаграмма </a:t>
-            </a:r>
-            <a:r>
-              <a:rPr lang="ru-RU" dirty="0" err="1" smtClean="0"/>
-              <a:t>Ганта</a:t>
-            </a:r>
-            <a:endParaRPr lang="ru-RU" dirty="0" smtClean="0"/>
-          </a:p>
-          <a:p>
-            <a:r>
-              <a:rPr lang="ru-RU" dirty="0" smtClean="0"/>
-              <a:t>Стоимость продукта</a:t>
-            </a:r>
-          </a:p>
-          <a:p>
-            <a:r>
-              <a:rPr lang="ru-RU" dirty="0" smtClean="0"/>
-              <a:t>???</a:t>
-            </a:r>
-            <a:endParaRPr lang="ru-RU" dirty="0"/>
-          </a:p>
-        </p:txBody>
-      </p:sp>
+        </p:nvGraphicFramePr>
+        <p:xfrm>
+          <a:off x="251520" y="1844824"/>
+          <a:ext cx="8640960" cy="4853136"/>
+        </p:xfrm>
+        <a:graphic>
+          <a:graphicData uri="http://schemas.openxmlformats.org/drawingml/2006/chart">
+            <c:chart xmlns:c="http://schemas.openxmlformats.org/drawingml/2006/chart" xmlns:r="http://schemas.openxmlformats.org/officeDocument/2006/relationships" r:id="rId2"/>
+          </a:graphicData>
+        </a:graphic>
+      </p:graphicFrame>
     </p:spTree>
+    <p:extLst>
+      <p:ext uri="{BB962C8B-B14F-4D97-AF65-F5344CB8AC3E}">
+        <p14:creationId xmlns:p14="http://schemas.microsoft.com/office/powerpoint/2010/main" val="3726777767"/>
+      </p:ext>
+    </p:extLst>
   </p:cSld>
   <p:clrMapOvr>
     <a:masterClrMapping/>
@@ -9530,6 +13427,454 @@
             <p:ph type="title"/>
           </p:nvPr>
         </p:nvSpPr>
+        <p:spPr>
+          <a:xfrm>
+            <a:off x="457200" y="188640"/>
+            <a:ext cx="8229600" cy="864096"/>
+          </a:xfrm>
+        </p:spPr>
+        <p:txBody>
+          <a:bodyPr/>
+          <a:lstStyle/>
+          <a:p>
+            <a:r>
+              <a:rPr lang="ru-RU" dirty="0" smtClean="0"/>
+              <a:t>Результаты работы</a:t>
+            </a:r>
+            <a:endParaRPr lang="ru-RU" dirty="0"/>
+          </a:p>
+        </p:txBody>
+      </p:sp>
+      <p:sp>
+        <p:nvSpPr>
+          <p:cNvPr id="3" name="Содержимое 2"/>
+          <p:cNvSpPr>
+            <a:spLocks noGrp="1"/>
+          </p:cNvSpPr>
+          <p:nvPr>
+            <p:ph idx="1"/>
+          </p:nvPr>
+        </p:nvSpPr>
+        <p:spPr>
+          <a:xfrm>
+            <a:off x="457200" y="1268760"/>
+            <a:ext cx="8229600" cy="5328592"/>
+          </a:xfrm>
+        </p:spPr>
+        <p:txBody>
+          <a:bodyPr>
+            <a:normAutofit fontScale="92500" lnSpcReduction="20000"/>
+          </a:bodyPr>
+          <a:lstStyle/>
+          <a:p>
+            <a:r>
+              <a:rPr lang="ru-RU" dirty="0" smtClean="0"/>
+              <a:t>Создано тестовое приложение, реализующее метод Хуттунена-Пише</a:t>
+            </a:r>
+          </a:p>
+          <a:p>
+            <a:r>
+              <a:rPr lang="ru-RU" dirty="0" smtClean="0"/>
+              <a:t>Проверена работоспособность метода на тестовых данных изображений, снятых внутри помещений</a:t>
+            </a:r>
+          </a:p>
+          <a:p>
+            <a:r>
+              <a:rPr lang="ru-RU" dirty="0" smtClean="0"/>
+              <a:t>Сделан перенос метода в условия городской застройки. По результатам тестирования подтвержден высокий уровень точности работы на изображениях городской среды базы данных </a:t>
+            </a:r>
+            <a:r>
+              <a:rPr lang="en-US" dirty="0" err="1" smtClean="0"/>
+              <a:t>YorkUrbanDb</a:t>
+            </a:r>
+            <a:endParaRPr lang="en-US" dirty="0" smtClean="0"/>
+          </a:p>
+          <a:p>
+            <a:r>
+              <a:rPr lang="ru-RU" dirty="0" smtClean="0"/>
+              <a:t>Точность метода в благоприятных условиях сравнима с точностью ИНС потребительского класса</a:t>
+            </a:r>
+            <a:endParaRPr lang="en-US" dirty="0" smtClean="0"/>
+          </a:p>
+          <a:p>
+            <a:endParaRPr lang="ru-RU" dirty="0"/>
+          </a:p>
+        </p:txBody>
+      </p:sp>
+    </p:spTree>
+  </p:cSld>
+  <p:clrMapOvr>
+    <a:masterClrMapping/>
+  </p:clrMapOvr>
+</p:sld>
+</file>
+
+<file path=ppt/slides/slide24.xml><?xml version="1.0" encoding="utf-8"?>
+<p:sld xmlns:a="http://schemas.openxmlformats.org/drawingml/2006/main" xmlns:r="http://schemas.openxmlformats.org/officeDocument/2006/relationships" xmlns:p="http://schemas.openxmlformats.org/presentationml/2006/main">
+  <p:cSld>
+    <p:spTree>
+      <p:nvGrpSpPr>
+        <p:cNvPr id="1" name=""/>
+        <p:cNvGrpSpPr/>
+        <p:nvPr/>
+      </p:nvGrpSpPr>
+      <p:grpSpPr>
+        <a:xfrm>
+          <a:off x="0" y="0"/>
+          <a:ext cx="0" cy="0"/>
+          <a:chOff x="0" y="0"/>
+          <a:chExt cx="0" cy="0"/>
+        </a:xfrm>
+      </p:grpSpPr>
+      <p:sp>
+        <p:nvSpPr>
+          <p:cNvPr id="2" name="Заголовок 1"/>
+          <p:cNvSpPr>
+            <a:spLocks noGrp="1"/>
+          </p:cNvSpPr>
+          <p:nvPr>
+            <p:ph type="title"/>
+          </p:nvPr>
+        </p:nvSpPr>
+        <p:spPr>
+          <a:xfrm>
+            <a:off x="457200" y="188640"/>
+            <a:ext cx="8229600" cy="864096"/>
+          </a:xfrm>
+        </p:spPr>
+        <p:txBody>
+          <a:bodyPr/>
+          <a:lstStyle/>
+          <a:p>
+            <a:r>
+              <a:rPr lang="ru-RU" dirty="0" smtClean="0"/>
+              <a:t>Экономическая часть</a:t>
+            </a:r>
+            <a:endParaRPr lang="ru-RU" dirty="0"/>
+          </a:p>
+        </p:txBody>
+      </p:sp>
+      <p:sp>
+        <p:nvSpPr>
+          <p:cNvPr id="3" name="Содержимое 2"/>
+          <p:cNvSpPr>
+            <a:spLocks noGrp="1"/>
+          </p:cNvSpPr>
+          <p:nvPr>
+            <p:ph idx="1"/>
+          </p:nvPr>
+        </p:nvSpPr>
+        <p:spPr>
+          <a:xfrm>
+            <a:off x="1331640" y="1124744"/>
+            <a:ext cx="6120680" cy="460647"/>
+          </a:xfrm>
+        </p:spPr>
+        <p:txBody>
+          <a:bodyPr>
+            <a:normAutofit/>
+          </a:bodyPr>
+          <a:lstStyle/>
+          <a:p>
+            <a:pPr marL="0" indent="0" algn="ctr">
+              <a:buNone/>
+            </a:pPr>
+            <a:r>
+              <a:rPr lang="ru-RU" sz="1800" dirty="0"/>
+              <a:t>Диаграмма Ганта выполняемых работ</a:t>
+            </a:r>
+            <a:endParaRPr lang="en-US" sz="1800" dirty="0"/>
+          </a:p>
+          <a:p>
+            <a:endParaRPr lang="ru-RU" dirty="0"/>
+          </a:p>
+        </p:txBody>
+      </p:sp>
+      <p:graphicFrame>
+        <p:nvGraphicFramePr>
+          <p:cNvPr id="4" name="Object 3"/>
+          <p:cNvGraphicFramePr>
+            <a:graphicFrameLocks noChangeAspect="1"/>
+          </p:cNvGraphicFramePr>
+          <p:nvPr>
+            <p:extLst>
+              <p:ext uri="{D42A27DB-BD31-4B8C-83A1-F6EECF244321}">
+                <p14:modId xmlns:p14="http://schemas.microsoft.com/office/powerpoint/2010/main" val="4080491442"/>
+              </p:ext>
+            </p:extLst>
+          </p:nvPr>
+        </p:nvGraphicFramePr>
+        <p:xfrm>
+          <a:off x="611560" y="1484784"/>
+          <a:ext cx="7916422" cy="3600400"/>
+        </p:xfrm>
+        <a:graphic>
+          <a:graphicData uri="http://schemas.openxmlformats.org/presentationml/2006/ole">
+            <mc:AlternateContent xmlns:mc="http://schemas.openxmlformats.org/markup-compatibility/2006">
+              <mc:Choice xmlns:v="urn:schemas-microsoft-com:vml" Requires="v">
+                <p:oleObj spid="_x0000_s7173" name="Document" r:id="rId3" imgW="13927304" imgH="5677033" progId="Word.Document.12">
+                  <p:embed/>
+                </p:oleObj>
+              </mc:Choice>
+              <mc:Fallback>
+                <p:oleObj name="Document" r:id="rId3" imgW="13927304" imgH="5677033" progId="Word.Document.12">
+                  <p:embed/>
+                  <p:pic>
+                    <p:nvPicPr>
+                      <p:cNvPr id="0" name=""/>
+                      <p:cNvPicPr/>
+                      <p:nvPr/>
+                    </p:nvPicPr>
+                    <p:blipFill>
+                      <a:blip r:embed="rId4"/>
+                      <a:stretch>
+                        <a:fillRect/>
+                      </a:stretch>
+                    </p:blipFill>
+                    <p:spPr>
+                      <a:xfrm>
+                        <a:off x="611560" y="1484784"/>
+                        <a:ext cx="7916422" cy="3600400"/>
+                      </a:xfrm>
+                      <a:prstGeom prst="rect">
+                        <a:avLst/>
+                      </a:prstGeom>
+                    </p:spPr>
+                  </p:pic>
+                </p:oleObj>
+              </mc:Fallback>
+            </mc:AlternateContent>
+          </a:graphicData>
+        </a:graphic>
+      </p:graphicFrame>
+      <p:sp>
+        <p:nvSpPr>
+          <p:cNvPr id="8" name="Содержимое 2"/>
+          <p:cNvSpPr txBox="1">
+            <a:spLocks/>
+          </p:cNvSpPr>
+          <p:nvPr/>
+        </p:nvSpPr>
+        <p:spPr>
+          <a:xfrm>
+            <a:off x="1385739" y="5351884"/>
+            <a:ext cx="6120680" cy="827162"/>
+          </a:xfrm>
+          <a:prstGeom prst="rect">
+            <a:avLst/>
+          </a:prstGeom>
+        </p:spPr>
+        <p:txBody>
+          <a:bodyPr vert="horz" lIns="91440" tIns="45720" rIns="91440" bIns="45720" rtlCol="0">
+            <a:normAutofit/>
+          </a:bodyPr>
+          <a:lstStyle>
+            <a:lvl1pPr marL="342900" indent="-342900" algn="l" defTabSz="914400" rtl="0" eaLnBrk="1" latinLnBrk="0" hangingPunct="1">
+              <a:spcBef>
+                <a:spcPct val="20000"/>
+              </a:spcBef>
+              <a:buFont typeface="Arial" pitchFamily="34" charset="0"/>
+              <a:buChar char="•"/>
+              <a:defRPr sz="3200" kern="1200">
+                <a:solidFill>
+                  <a:schemeClr val="tx1"/>
+                </a:solidFill>
+                <a:latin typeface="+mn-lt"/>
+                <a:ea typeface="+mn-ea"/>
+                <a:cs typeface="+mn-cs"/>
+              </a:defRPr>
+            </a:lvl1pPr>
+            <a:lvl2pPr marL="742950" indent="-285750" algn="l" defTabSz="914400" rtl="0" eaLnBrk="1" latinLnBrk="0" hangingPunct="1">
+              <a:spcBef>
+                <a:spcPct val="20000"/>
+              </a:spcBef>
+              <a:buFont typeface="Arial" pitchFamily="34" charset="0"/>
+              <a:buChar char="–"/>
+              <a:defRPr sz="2800" kern="1200">
+                <a:solidFill>
+                  <a:schemeClr val="tx1"/>
+                </a:solidFill>
+                <a:latin typeface="+mn-lt"/>
+                <a:ea typeface="+mn-ea"/>
+                <a:cs typeface="+mn-cs"/>
+              </a:defRPr>
+            </a:lvl2pPr>
+            <a:lvl3pPr marL="1143000" indent="-228600" algn="l" defTabSz="914400" rtl="0" eaLnBrk="1" latinLnBrk="0" hangingPunct="1">
+              <a:spcBef>
+                <a:spcPct val="20000"/>
+              </a:spcBef>
+              <a:buFont typeface="Arial" pitchFamily="34" charset="0"/>
+              <a:buChar char="•"/>
+              <a:defRPr sz="2400" kern="1200">
+                <a:solidFill>
+                  <a:schemeClr val="tx1"/>
+                </a:solidFill>
+                <a:latin typeface="+mn-lt"/>
+                <a:ea typeface="+mn-ea"/>
+                <a:cs typeface="+mn-cs"/>
+              </a:defRPr>
+            </a:lvl3pPr>
+            <a:lvl4pPr marL="1600200" indent="-228600" algn="l" defTabSz="914400" rtl="0" eaLnBrk="1" latinLnBrk="0" hangingPunct="1">
+              <a:spcBef>
+                <a:spcPct val="20000"/>
+              </a:spcBef>
+              <a:buFont typeface="Arial" pitchFamily="34" charset="0"/>
+              <a:buChar char="–"/>
+              <a:defRPr sz="2000" kern="1200">
+                <a:solidFill>
+                  <a:schemeClr val="tx1"/>
+                </a:solidFill>
+                <a:latin typeface="+mn-lt"/>
+                <a:ea typeface="+mn-ea"/>
+                <a:cs typeface="+mn-cs"/>
+              </a:defRPr>
+            </a:lvl4pPr>
+            <a:lvl5pPr marL="2057400" indent="-228600" algn="l" defTabSz="914400" rtl="0" eaLnBrk="1" latinLnBrk="0" hangingPunct="1">
+              <a:spcBef>
+                <a:spcPct val="20000"/>
+              </a:spcBef>
+              <a:buFont typeface="Arial" pitchFamily="34" charset="0"/>
+              <a:buChar char="»"/>
+              <a:defRPr sz="2000" kern="1200">
+                <a:solidFill>
+                  <a:schemeClr val="tx1"/>
+                </a:solidFill>
+                <a:latin typeface="+mn-lt"/>
+                <a:ea typeface="+mn-ea"/>
+                <a:cs typeface="+mn-cs"/>
+              </a:defRPr>
+            </a:lvl5pPr>
+            <a:lvl6pPr marL="2514600" indent="-228600" algn="l" defTabSz="914400" rtl="0" eaLnBrk="1" latinLnBrk="0" hangingPunct="1">
+              <a:spcBef>
+                <a:spcPct val="20000"/>
+              </a:spcBef>
+              <a:buFont typeface="Arial" pitchFamily="34" charset="0"/>
+              <a:buChar char="•"/>
+              <a:defRPr sz="2000" kern="1200">
+                <a:solidFill>
+                  <a:schemeClr val="tx1"/>
+                </a:solidFill>
+                <a:latin typeface="+mn-lt"/>
+                <a:ea typeface="+mn-ea"/>
+                <a:cs typeface="+mn-cs"/>
+              </a:defRPr>
+            </a:lvl6pPr>
+            <a:lvl7pPr marL="2971800" indent="-228600" algn="l" defTabSz="914400" rtl="0" eaLnBrk="1" latinLnBrk="0" hangingPunct="1">
+              <a:spcBef>
+                <a:spcPct val="20000"/>
+              </a:spcBef>
+              <a:buFont typeface="Arial" pitchFamily="34" charset="0"/>
+              <a:buChar char="•"/>
+              <a:defRPr sz="2000" kern="1200">
+                <a:solidFill>
+                  <a:schemeClr val="tx1"/>
+                </a:solidFill>
+                <a:latin typeface="+mn-lt"/>
+                <a:ea typeface="+mn-ea"/>
+                <a:cs typeface="+mn-cs"/>
+              </a:defRPr>
+            </a:lvl7pPr>
+            <a:lvl8pPr marL="3429000" indent="-228600" algn="l" defTabSz="914400" rtl="0" eaLnBrk="1" latinLnBrk="0" hangingPunct="1">
+              <a:spcBef>
+                <a:spcPct val="20000"/>
+              </a:spcBef>
+              <a:buFont typeface="Arial" pitchFamily="34" charset="0"/>
+              <a:buChar char="•"/>
+              <a:defRPr sz="2000" kern="1200">
+                <a:solidFill>
+                  <a:schemeClr val="tx1"/>
+                </a:solidFill>
+                <a:latin typeface="+mn-lt"/>
+                <a:ea typeface="+mn-ea"/>
+                <a:cs typeface="+mn-cs"/>
+              </a:defRPr>
+            </a:lvl8pPr>
+            <a:lvl9pPr marL="3886200" indent="-228600" algn="l" defTabSz="914400" rtl="0" eaLnBrk="1" latinLnBrk="0" hangingPunct="1">
+              <a:spcBef>
+                <a:spcPct val="20000"/>
+              </a:spcBef>
+              <a:buFont typeface="Arial" pitchFamily="34" charset="0"/>
+              <a:buChar char="•"/>
+              <a:defRPr sz="2000" kern="1200">
+                <a:solidFill>
+                  <a:schemeClr val="tx1"/>
+                </a:solidFill>
+                <a:latin typeface="+mn-lt"/>
+                <a:ea typeface="+mn-ea"/>
+                <a:cs typeface="+mn-cs"/>
+              </a:defRPr>
+            </a:lvl9pPr>
+          </a:lstStyle>
+          <a:p>
+            <a:pPr marL="0" indent="0" algn="ctr">
+              <a:buNone/>
+            </a:pPr>
+            <a:r>
+              <a:rPr lang="ru-RU" sz="1800" dirty="0"/>
+              <a:t>Стоимость </a:t>
+            </a:r>
+            <a:r>
+              <a:rPr lang="ru-RU" sz="1800" dirty="0" smtClean="0"/>
+              <a:t>продукта</a:t>
+            </a:r>
+            <a:r>
+              <a:rPr lang="en-US" sz="1800" dirty="0" smtClean="0"/>
+              <a:t>:</a:t>
+            </a:r>
+          </a:p>
+          <a:p>
+            <a:pPr marL="0" indent="0" algn="ctr">
+              <a:buNone/>
+            </a:pPr>
+            <a:r>
+              <a:rPr lang="ru-RU" sz="1800" dirty="0"/>
+              <a:t>1 513 000 рублей</a:t>
+            </a:r>
+            <a:endParaRPr lang="en-US" sz="1800" dirty="0"/>
+          </a:p>
+          <a:p>
+            <a:pPr marL="0" indent="0" algn="ctr">
+              <a:buNone/>
+            </a:pPr>
+            <a:endParaRPr lang="ru-RU" sz="1800" dirty="0"/>
+          </a:p>
+        </p:txBody>
+      </p:sp>
+    </p:spTree>
+  </p:cSld>
+  <p:clrMapOvr>
+    <a:masterClrMapping/>
+  </p:clrMapOvr>
+</p:sld>
+</file>
+
+<file path=ppt/slides/slide25.xml><?xml version="1.0" encoding="utf-8"?>
+<p:sld xmlns:a="http://schemas.openxmlformats.org/drawingml/2006/main" xmlns:r="http://schemas.openxmlformats.org/officeDocument/2006/relationships" xmlns:p="http://schemas.openxmlformats.org/presentationml/2006/main" show="0">
+  <p:cSld>
+    <p:spTree>
+      <p:nvGrpSpPr>
+        <p:cNvPr id="1" name=""/>
+        <p:cNvGrpSpPr/>
+        <p:nvPr/>
+      </p:nvGrpSpPr>
+      <p:grpSpPr>
+        <a:xfrm>
+          <a:off x="0" y="0"/>
+          <a:ext cx="0" cy="0"/>
+          <a:chOff x="0" y="0"/>
+          <a:chExt cx="0" cy="0"/>
+        </a:xfrm>
+      </p:grpSpPr>
+      <p:sp>
+        <p:nvSpPr>
+          <p:cNvPr id="2" name="Заголовок 1"/>
+          <p:cNvSpPr>
+            <a:spLocks noGrp="1"/>
+          </p:cNvSpPr>
+          <p:nvPr>
+            <p:ph type="title"/>
+          </p:nvPr>
+        </p:nvSpPr>
         <p:spPr/>
         <p:txBody>
           <a:bodyPr/>
@@ -9567,6 +13912,14 @@
   <p:clrMapOvr>
     <a:masterClrMapping/>
   </p:clrMapOvr>
+  <mc:AlternateContent xmlns:mc="http://schemas.openxmlformats.org/markup-compatibility/2006">
+    <mc:Choice xmlns:p14="http://schemas.microsoft.com/office/powerpoint/2010/main" Requires="p14">
+      <p:transition spd="slow" p14:dur="2000"/>
+    </mc:Choice>
+    <mc:Fallback>
+      <p:transition spd="slow"/>
+    </mc:Fallback>
+  </mc:AlternateContent>
 </p:sld>
 </file>
 

</xml_diff>